<commit_message>
Updated the result slides
</commit_message>
<xml_diff>
--- a/ResultsSlides.pptx
+++ b/ResultsSlides.pptx
@@ -15,6 +15,13 @@
     <p:sldId id="264" r:id="rId9"/>
     <p:sldId id="266" r:id="rId10"/>
     <p:sldId id="267" r:id="rId11"/>
+    <p:sldId id="271" r:id="rId12"/>
+    <p:sldId id="268" r:id="rId13"/>
+    <p:sldId id="269" r:id="rId14"/>
+    <p:sldId id="272" r:id="rId15"/>
+    <p:sldId id="273" r:id="rId16"/>
+    <p:sldId id="274" r:id="rId17"/>
+    <p:sldId id="275" r:id="rId18"/>
   </p:sldIdLst>
   <p:sldSz cx="9144000" cy="6858000" type="screen4x3"/>
   <p:notesSz cx="6858000" cy="9144000"/>
@@ -297,7 +304,7 @@
           <a:p>
             <a:fld id="{437BC0E1-BD5C-0446-92AB-909DA47EBC51}" type="datetimeFigureOut">
               <a:rPr lang="en-US" smtClean="0"/>
-              <a:t>3/31/15</a:t>
+              <a:t>4/9/15</a:t>
             </a:fld>
             <a:endParaRPr lang="en-US"/>
           </a:p>
@@ -467,7 +474,7 @@
           <a:p>
             <a:fld id="{437BC0E1-BD5C-0446-92AB-909DA47EBC51}" type="datetimeFigureOut">
               <a:rPr lang="en-US" smtClean="0"/>
-              <a:t>3/31/15</a:t>
+              <a:t>4/9/15</a:t>
             </a:fld>
             <a:endParaRPr lang="en-US"/>
           </a:p>
@@ -647,7 +654,7 @@
           <a:p>
             <a:fld id="{437BC0E1-BD5C-0446-92AB-909DA47EBC51}" type="datetimeFigureOut">
               <a:rPr lang="en-US" smtClean="0"/>
-              <a:t>3/31/15</a:t>
+              <a:t>4/9/15</a:t>
             </a:fld>
             <a:endParaRPr lang="en-US"/>
           </a:p>
@@ -817,7 +824,7 @@
           <a:p>
             <a:fld id="{437BC0E1-BD5C-0446-92AB-909DA47EBC51}" type="datetimeFigureOut">
               <a:rPr lang="en-US" smtClean="0"/>
-              <a:t>3/31/15</a:t>
+              <a:t>4/9/15</a:t>
             </a:fld>
             <a:endParaRPr lang="en-US"/>
           </a:p>
@@ -1063,7 +1070,7 @@
           <a:p>
             <a:fld id="{437BC0E1-BD5C-0446-92AB-909DA47EBC51}" type="datetimeFigureOut">
               <a:rPr lang="en-US" smtClean="0"/>
-              <a:t>3/31/15</a:t>
+              <a:t>4/9/15</a:t>
             </a:fld>
             <a:endParaRPr lang="en-US"/>
           </a:p>
@@ -1351,7 +1358,7 @@
           <a:p>
             <a:fld id="{437BC0E1-BD5C-0446-92AB-909DA47EBC51}" type="datetimeFigureOut">
               <a:rPr lang="en-US" smtClean="0"/>
-              <a:t>3/31/15</a:t>
+              <a:t>4/9/15</a:t>
             </a:fld>
             <a:endParaRPr lang="en-US"/>
           </a:p>
@@ -1773,7 +1780,7 @@
           <a:p>
             <a:fld id="{437BC0E1-BD5C-0446-92AB-909DA47EBC51}" type="datetimeFigureOut">
               <a:rPr lang="en-US" smtClean="0"/>
-              <a:t>3/31/15</a:t>
+              <a:t>4/9/15</a:t>
             </a:fld>
             <a:endParaRPr lang="en-US"/>
           </a:p>
@@ -1891,7 +1898,7 @@
           <a:p>
             <a:fld id="{437BC0E1-BD5C-0446-92AB-909DA47EBC51}" type="datetimeFigureOut">
               <a:rPr lang="en-US" smtClean="0"/>
-              <a:t>3/31/15</a:t>
+              <a:t>4/9/15</a:t>
             </a:fld>
             <a:endParaRPr lang="en-US"/>
           </a:p>
@@ -1986,7 +1993,7 @@
           <a:p>
             <a:fld id="{437BC0E1-BD5C-0446-92AB-909DA47EBC51}" type="datetimeFigureOut">
               <a:rPr lang="en-US" smtClean="0"/>
-              <a:t>3/31/15</a:t>
+              <a:t>4/9/15</a:t>
             </a:fld>
             <a:endParaRPr lang="en-US"/>
           </a:p>
@@ -2263,7 +2270,7 @@
           <a:p>
             <a:fld id="{437BC0E1-BD5C-0446-92AB-909DA47EBC51}" type="datetimeFigureOut">
               <a:rPr lang="en-US" smtClean="0"/>
-              <a:t>3/31/15</a:t>
+              <a:t>4/9/15</a:t>
             </a:fld>
             <a:endParaRPr lang="en-US"/>
           </a:p>
@@ -2516,7 +2523,7 @@
           <a:p>
             <a:fld id="{437BC0E1-BD5C-0446-92AB-909DA47EBC51}" type="datetimeFigureOut">
               <a:rPr lang="en-US" smtClean="0"/>
-              <a:t>3/31/15</a:t>
+              <a:t>4/9/15</a:t>
             </a:fld>
             <a:endParaRPr lang="en-US"/>
           </a:p>
@@ -2729,7 +2736,7 @@
           <a:p>
             <a:fld id="{437BC0E1-BD5C-0446-92AB-909DA47EBC51}" type="datetimeFigureOut">
               <a:rPr lang="en-US" smtClean="0"/>
-              <a:t>3/31/15</a:t>
+              <a:t>4/9/15</a:t>
             </a:fld>
             <a:endParaRPr lang="en-US"/>
           </a:p>
@@ -3123,7 +3130,15 @@
           <a:p>
             <a:r>
               <a:rPr lang="en-US" dirty="0" smtClean="0"/>
-              <a:t>Predicting weight gain based on body composition and metabolic rates using random forest algorithm</a:t>
+              <a:t>Predicting weight gain based on body composition and metabolic </a:t>
+            </a:r>
+            <a:r>
+              <a:rPr lang="en-US" dirty="0" smtClean="0"/>
+              <a:t>rate </a:t>
+            </a:r>
+            <a:r>
+              <a:rPr lang="en-US" dirty="0" smtClean="0"/>
+              <a:t>using random forest algorithm</a:t>
             </a:r>
             <a:endParaRPr lang="en-US" dirty="0"/>
           </a:p>
@@ -3180,6 +3195,79 @@
       </p:grpSpPr>
       <p:sp>
         <p:nvSpPr>
+          <p:cNvPr id="4" name="Title 3"/>
+          <p:cNvSpPr>
+            <a:spLocks noGrp="1"/>
+          </p:cNvSpPr>
+          <p:nvPr>
+            <p:ph type="title"/>
+          </p:nvPr>
+        </p:nvSpPr>
+        <p:spPr/>
+        <p:txBody>
+          <a:bodyPr/>
+          <a:lstStyle/>
+          <a:p>
+            <a:endParaRPr lang="en-US"/>
+          </a:p>
+        </p:txBody>
+      </p:sp>
+      <p:pic>
+        <p:nvPicPr>
+          <p:cNvPr id="5" name="Picture 4"/>
+          <p:cNvPicPr>
+            <a:picLocks noChangeAspect="1"/>
+          </p:cNvPicPr>
+          <p:nvPr/>
+        </p:nvPicPr>
+        <p:blipFill>
+          <a:blip r:embed="rId2"/>
+          <a:stretch>
+            <a:fillRect/>
+          </a:stretch>
+        </p:blipFill>
+        <p:spPr>
+          <a:xfrm>
+            <a:off x="1092200" y="0"/>
+            <a:ext cx="6949930" cy="6858000"/>
+          </a:xfrm>
+          <a:prstGeom prst="rect">
+            <a:avLst/>
+          </a:prstGeom>
+        </p:spPr>
+      </p:pic>
+    </p:spTree>
+    <p:extLst>
+      <p:ext uri="{BB962C8B-B14F-4D97-AF65-F5344CB8AC3E}">
+        <p14:creationId xmlns:p14="http://schemas.microsoft.com/office/powerpoint/2010/main" val="2719338169"/>
+      </p:ext>
+    </p:extLst>
+  </p:cSld>
+  <p:clrMapOvr>
+    <a:masterClrMapping/>
+  </p:clrMapOvr>
+</p:sld>
+</file>
+
+<file path=ppt/slides/slide11.xml><?xml version="1.0" encoding="utf-8"?>
+<p:sld xmlns:a="http://schemas.openxmlformats.org/drawingml/2006/main" xmlns:r="http://schemas.openxmlformats.org/officeDocument/2006/relationships" xmlns:p="http://schemas.openxmlformats.org/presentationml/2006/main">
+  <p:cSld>
+    <p:spTree>
+      <p:nvGrpSpPr>
+        <p:cNvPr id="1" name=""/>
+        <p:cNvGrpSpPr/>
+        <p:nvPr/>
+      </p:nvGrpSpPr>
+      <p:grpSpPr>
+        <a:xfrm>
+          <a:off x="0" y="0"/>
+          <a:ext cx="0" cy="0"/>
+          <a:chOff x="0" y="0"/>
+          <a:chExt cx="0" cy="0"/>
+        </a:xfrm>
+      </p:grpSpPr>
+      <p:sp>
+        <p:nvSpPr>
           <p:cNvPr id="2" name="Title 1"/>
           <p:cNvSpPr>
             <a:spLocks noGrp="1"/>
@@ -3190,12 +3278,22 @@
         </p:nvSpPr>
         <p:spPr/>
         <p:txBody>
-          <a:bodyPr/>
+          <a:bodyPr>
+            <a:normAutofit fontScale="90000"/>
+          </a:bodyPr>
           <a:lstStyle/>
           <a:p>
             <a:r>
               <a:rPr lang="en-US" dirty="0" smtClean="0"/>
-              <a:t>Dark</a:t>
+              <a:t>Optimal # of </a:t>
+            </a:r>
+            <a:r>
+              <a:rPr lang="en-US" dirty="0" err="1" smtClean="0"/>
+              <a:t>vars</a:t>
+            </a:r>
+            <a:r>
+              <a:rPr lang="en-US" dirty="0" smtClean="0"/>
+              <a:t> to split at each node</a:t>
             </a:r>
             <a:endParaRPr lang="en-US" dirty="0"/>
           </a:p>
@@ -3217,8 +3315,8 @@
         </p:blipFill>
         <p:spPr>
           <a:xfrm>
-            <a:off x="1559333" y="1090108"/>
-            <a:ext cx="6158935" cy="5767892"/>
+            <a:off x="1736165" y="1285828"/>
+            <a:ext cx="5646865" cy="5572172"/>
           </a:xfrm>
           <a:prstGeom prst="rect">
             <a:avLst/>
@@ -3228,7 +3326,367 @@
     </p:spTree>
     <p:extLst>
       <p:ext uri="{BB962C8B-B14F-4D97-AF65-F5344CB8AC3E}">
-        <p14:creationId xmlns:p14="http://schemas.microsoft.com/office/powerpoint/2010/main" val="2719338169"/>
+        <p14:creationId xmlns:p14="http://schemas.microsoft.com/office/powerpoint/2010/main" val="559375767"/>
+      </p:ext>
+    </p:extLst>
+  </p:cSld>
+  <p:clrMapOvr>
+    <a:masterClrMapping/>
+  </p:clrMapOvr>
+</p:sld>
+</file>
+
+<file path=ppt/slides/slide12.xml><?xml version="1.0" encoding="utf-8"?>
+<p:sld xmlns:a="http://schemas.openxmlformats.org/drawingml/2006/main" xmlns:r="http://schemas.openxmlformats.org/officeDocument/2006/relationships" xmlns:p="http://schemas.openxmlformats.org/presentationml/2006/main">
+  <p:cSld>
+    <p:spTree>
+      <p:nvGrpSpPr>
+        <p:cNvPr id="1" name=""/>
+        <p:cNvGrpSpPr/>
+        <p:nvPr/>
+      </p:nvGrpSpPr>
+      <p:grpSpPr>
+        <a:xfrm>
+          <a:off x="0" y="0"/>
+          <a:ext cx="0" cy="0"/>
+          <a:chOff x="0" y="0"/>
+          <a:chExt cx="0" cy="0"/>
+        </a:xfrm>
+      </p:grpSpPr>
+      <p:pic>
+        <p:nvPicPr>
+          <p:cNvPr id="3" name="Picture 2"/>
+          <p:cNvPicPr>
+            <a:picLocks noChangeAspect="1"/>
+          </p:cNvPicPr>
+          <p:nvPr/>
+        </p:nvPicPr>
+        <p:blipFill>
+          <a:blip r:embed="rId2"/>
+          <a:stretch>
+            <a:fillRect/>
+          </a:stretch>
+        </p:blipFill>
+        <p:spPr>
+          <a:xfrm>
+            <a:off x="4401431" y="2178163"/>
+            <a:ext cx="4742569" cy="4679837"/>
+          </a:xfrm>
+          <a:prstGeom prst="rect">
+            <a:avLst/>
+          </a:prstGeom>
+        </p:spPr>
+      </p:pic>
+      <p:pic>
+        <p:nvPicPr>
+          <p:cNvPr id="4" name="Picture 3"/>
+          <p:cNvPicPr>
+            <a:picLocks noChangeAspect="1"/>
+          </p:cNvPicPr>
+          <p:nvPr/>
+        </p:nvPicPr>
+        <p:blipFill>
+          <a:blip r:embed="rId3"/>
+          <a:stretch>
+            <a:fillRect/>
+          </a:stretch>
+        </p:blipFill>
+        <p:spPr>
+          <a:xfrm>
+            <a:off x="0" y="0"/>
+            <a:ext cx="4401431" cy="4343211"/>
+          </a:xfrm>
+          <a:prstGeom prst="rect">
+            <a:avLst/>
+          </a:prstGeom>
+        </p:spPr>
+      </p:pic>
+    </p:spTree>
+    <p:extLst>
+      <p:ext uri="{BB962C8B-B14F-4D97-AF65-F5344CB8AC3E}">
+        <p14:creationId xmlns:p14="http://schemas.microsoft.com/office/powerpoint/2010/main" val="2481431231"/>
+      </p:ext>
+    </p:extLst>
+  </p:cSld>
+  <p:clrMapOvr>
+    <a:masterClrMapping/>
+  </p:clrMapOvr>
+</p:sld>
+</file>
+
+<file path=ppt/slides/slide13.xml><?xml version="1.0" encoding="utf-8"?>
+<p:sld xmlns:a="http://schemas.openxmlformats.org/drawingml/2006/main" xmlns:r="http://schemas.openxmlformats.org/officeDocument/2006/relationships" xmlns:p="http://schemas.openxmlformats.org/presentationml/2006/main">
+  <p:cSld>
+    <p:spTree>
+      <p:nvGrpSpPr>
+        <p:cNvPr id="1" name=""/>
+        <p:cNvGrpSpPr/>
+        <p:nvPr/>
+      </p:nvGrpSpPr>
+      <p:grpSpPr>
+        <a:xfrm>
+          <a:off x="0" y="0"/>
+          <a:ext cx="0" cy="0"/>
+          <a:chOff x="0" y="0"/>
+          <a:chExt cx="0" cy="0"/>
+        </a:xfrm>
+      </p:grpSpPr>
+      <p:pic>
+        <p:nvPicPr>
+          <p:cNvPr id="2" name="Picture 1"/>
+          <p:cNvPicPr>
+            <a:picLocks noChangeAspect="1"/>
+          </p:cNvPicPr>
+          <p:nvPr/>
+        </p:nvPicPr>
+        <p:blipFill>
+          <a:blip r:embed="rId2"/>
+          <a:stretch>
+            <a:fillRect/>
+          </a:stretch>
+        </p:blipFill>
+        <p:spPr>
+          <a:xfrm>
+            <a:off x="1092200" y="0"/>
+            <a:ext cx="6949930" cy="6858000"/>
+          </a:xfrm>
+          <a:prstGeom prst="rect">
+            <a:avLst/>
+          </a:prstGeom>
+        </p:spPr>
+      </p:pic>
+    </p:spTree>
+    <p:extLst>
+      <p:ext uri="{BB962C8B-B14F-4D97-AF65-F5344CB8AC3E}">
+        <p14:creationId xmlns:p14="http://schemas.microsoft.com/office/powerpoint/2010/main" val="3942785797"/>
+      </p:ext>
+    </p:extLst>
+  </p:cSld>
+  <p:clrMapOvr>
+    <a:masterClrMapping/>
+  </p:clrMapOvr>
+</p:sld>
+</file>
+
+<file path=ppt/slides/slide14.xml><?xml version="1.0" encoding="utf-8"?>
+<p:sld xmlns:a="http://schemas.openxmlformats.org/drawingml/2006/main" xmlns:r="http://schemas.openxmlformats.org/officeDocument/2006/relationships" xmlns:p="http://schemas.openxmlformats.org/presentationml/2006/main">
+  <p:cSld>
+    <p:spTree>
+      <p:nvGrpSpPr>
+        <p:cNvPr id="1" name=""/>
+        <p:cNvGrpSpPr/>
+        <p:nvPr/>
+      </p:nvGrpSpPr>
+      <p:grpSpPr>
+        <a:xfrm>
+          <a:off x="0" y="0"/>
+          <a:ext cx="0" cy="0"/>
+          <a:chOff x="0" y="0"/>
+          <a:chExt cx="0" cy="0"/>
+        </a:xfrm>
+      </p:grpSpPr>
+      <p:pic>
+        <p:nvPicPr>
+          <p:cNvPr id="2" name="Picture 1"/>
+          <p:cNvPicPr>
+            <a:picLocks noChangeAspect="1"/>
+          </p:cNvPicPr>
+          <p:nvPr/>
+        </p:nvPicPr>
+        <p:blipFill>
+          <a:blip r:embed="rId2"/>
+          <a:stretch>
+            <a:fillRect/>
+          </a:stretch>
+        </p:blipFill>
+        <p:spPr>
+          <a:xfrm>
+            <a:off x="1092200" y="0"/>
+            <a:ext cx="6949930" cy="6858000"/>
+          </a:xfrm>
+          <a:prstGeom prst="rect">
+            <a:avLst/>
+          </a:prstGeom>
+        </p:spPr>
+      </p:pic>
+    </p:spTree>
+    <p:extLst>
+      <p:ext uri="{BB962C8B-B14F-4D97-AF65-F5344CB8AC3E}">
+        <p14:creationId xmlns:p14="http://schemas.microsoft.com/office/powerpoint/2010/main" val="4002945263"/>
+      </p:ext>
+    </p:extLst>
+  </p:cSld>
+  <p:clrMapOvr>
+    <a:masterClrMapping/>
+  </p:clrMapOvr>
+</p:sld>
+</file>
+
+<file path=ppt/slides/slide15.xml><?xml version="1.0" encoding="utf-8"?>
+<p:sld xmlns:a="http://schemas.openxmlformats.org/drawingml/2006/main" xmlns:r="http://schemas.openxmlformats.org/officeDocument/2006/relationships" xmlns:p="http://schemas.openxmlformats.org/presentationml/2006/main">
+  <p:cSld>
+    <p:spTree>
+      <p:nvGrpSpPr>
+        <p:cNvPr id="1" name=""/>
+        <p:cNvGrpSpPr/>
+        <p:nvPr/>
+      </p:nvGrpSpPr>
+      <p:grpSpPr>
+        <a:xfrm>
+          <a:off x="0" y="0"/>
+          <a:ext cx="0" cy="0"/>
+          <a:chOff x="0" y="0"/>
+          <a:chExt cx="0" cy="0"/>
+        </a:xfrm>
+      </p:grpSpPr>
+    </p:spTree>
+    <p:extLst>
+      <p:ext uri="{BB962C8B-B14F-4D97-AF65-F5344CB8AC3E}">
+        <p14:creationId xmlns:p14="http://schemas.microsoft.com/office/powerpoint/2010/main" val="1719986713"/>
+      </p:ext>
+    </p:extLst>
+  </p:cSld>
+  <p:clrMapOvr>
+    <a:masterClrMapping/>
+  </p:clrMapOvr>
+</p:sld>
+</file>
+
+<file path=ppt/slides/slide16.xml><?xml version="1.0" encoding="utf-8"?>
+<p:sld xmlns:a="http://schemas.openxmlformats.org/drawingml/2006/main" xmlns:r="http://schemas.openxmlformats.org/officeDocument/2006/relationships" xmlns:p="http://schemas.openxmlformats.org/presentationml/2006/main">
+  <p:cSld>
+    <p:spTree>
+      <p:nvGrpSpPr>
+        <p:cNvPr id="1" name=""/>
+        <p:cNvGrpSpPr/>
+        <p:nvPr/>
+      </p:nvGrpSpPr>
+      <p:grpSpPr>
+        <a:xfrm>
+          <a:off x="0" y="0"/>
+          <a:ext cx="0" cy="0"/>
+          <a:chOff x="0" y="0"/>
+          <a:chExt cx="0" cy="0"/>
+        </a:xfrm>
+      </p:grpSpPr>
+      <p:sp>
+        <p:nvSpPr>
+          <p:cNvPr id="2" name="Title 1"/>
+          <p:cNvSpPr>
+            <a:spLocks noGrp="1"/>
+          </p:cNvSpPr>
+          <p:nvPr>
+            <p:ph type="title"/>
+          </p:nvPr>
+        </p:nvSpPr>
+        <p:spPr/>
+        <p:txBody>
+          <a:bodyPr/>
+          <a:lstStyle/>
+          <a:p>
+            <a:r>
+              <a:rPr lang="en-US" dirty="0" smtClean="0"/>
+              <a:t>Linear Mixed-Effect Model</a:t>
+            </a:r>
+            <a:endParaRPr lang="en-US" dirty="0"/>
+          </a:p>
+        </p:txBody>
+      </p:sp>
+      <p:sp>
+        <p:nvSpPr>
+          <p:cNvPr id="3" name="Text Placeholder 2"/>
+          <p:cNvSpPr>
+            <a:spLocks noGrp="1"/>
+          </p:cNvSpPr>
+          <p:nvPr>
+            <p:ph type="body" idx="1"/>
+          </p:nvPr>
+        </p:nvSpPr>
+        <p:spPr/>
+        <p:txBody>
+          <a:bodyPr/>
+          <a:lstStyle/>
+          <a:p>
+            <a:endParaRPr lang="en-US" dirty="0"/>
+          </a:p>
+        </p:txBody>
+      </p:sp>
+    </p:spTree>
+    <p:extLst>
+      <p:ext uri="{BB962C8B-B14F-4D97-AF65-F5344CB8AC3E}">
+        <p14:creationId xmlns:p14="http://schemas.microsoft.com/office/powerpoint/2010/main" val="3244480159"/>
+      </p:ext>
+    </p:extLst>
+  </p:cSld>
+  <p:clrMapOvr>
+    <a:masterClrMapping/>
+  </p:clrMapOvr>
+</p:sld>
+</file>
+
+<file path=ppt/slides/slide17.xml><?xml version="1.0" encoding="utf-8"?>
+<p:sld xmlns:a="http://schemas.openxmlformats.org/drawingml/2006/main" xmlns:r="http://schemas.openxmlformats.org/officeDocument/2006/relationships" xmlns:p="http://schemas.openxmlformats.org/presentationml/2006/main">
+  <p:cSld>
+    <p:spTree>
+      <p:nvGrpSpPr>
+        <p:cNvPr id="1" name=""/>
+        <p:cNvGrpSpPr/>
+        <p:nvPr/>
+      </p:nvGrpSpPr>
+      <p:grpSpPr>
+        <a:xfrm>
+          <a:off x="0" y="0"/>
+          <a:ext cx="0" cy="0"/>
+          <a:chOff x="0" y="0"/>
+          <a:chExt cx="0" cy="0"/>
+        </a:xfrm>
+      </p:grpSpPr>
+      <p:sp>
+        <p:nvSpPr>
+          <p:cNvPr id="2" name="Title 1"/>
+          <p:cNvSpPr>
+            <a:spLocks noGrp="1"/>
+          </p:cNvSpPr>
+          <p:nvPr>
+            <p:ph type="title"/>
+          </p:nvPr>
+        </p:nvSpPr>
+        <p:spPr/>
+        <p:txBody>
+          <a:bodyPr/>
+          <a:lstStyle/>
+          <a:p>
+            <a:r>
+              <a:rPr lang="en-US" dirty="0" smtClean="0"/>
+              <a:t>RE-EM tree</a:t>
+            </a:r>
+            <a:endParaRPr lang="en-US" dirty="0"/>
+          </a:p>
+        </p:txBody>
+      </p:sp>
+      <p:sp>
+        <p:nvSpPr>
+          <p:cNvPr id="3" name="Text Placeholder 2"/>
+          <p:cNvSpPr>
+            <a:spLocks noGrp="1"/>
+          </p:cNvSpPr>
+          <p:nvPr>
+            <p:ph type="body" idx="1"/>
+          </p:nvPr>
+        </p:nvSpPr>
+        <p:spPr/>
+        <p:txBody>
+          <a:bodyPr/>
+          <a:lstStyle/>
+          <a:p>
+            <a:endParaRPr lang="en-US"/>
+          </a:p>
+        </p:txBody>
+      </p:sp>
+    </p:spTree>
+    <p:extLst>
+      <p:ext uri="{BB962C8B-B14F-4D97-AF65-F5344CB8AC3E}">
+        <p14:creationId xmlns:p14="http://schemas.microsoft.com/office/powerpoint/2010/main" val="449019630"/>
       </p:ext>
     </p:extLst>
   </p:cSld>
@@ -3380,8 +3838,13 @@
           <a:p>
             <a:r>
               <a:rPr lang="en-US" dirty="0" smtClean="0"/>
-              <a:t>HFD#8 – cohort id is 8 (training data set, n=19)</a:t>
-            </a:r>
+              <a:t>HFD#8 – cohort id is 8 (training data set, n</a:t>
+            </a:r>
+            <a:r>
+              <a:rPr lang="en-US" dirty="0" smtClean="0"/>
+              <a:t>=24)</a:t>
+            </a:r>
+            <a:endParaRPr lang="en-US" dirty="0" smtClean="0"/>
           </a:p>
           <a:p>
             <a:pPr marL="0" indent="0">
@@ -3540,6 +4003,348 @@
           </a:fontRef>
         </p:style>
       </p:cxnSp>
+      <p:sp>
+        <p:nvSpPr>
+          <p:cNvPr id="8" name="TextBox 7"/>
+          <p:cNvSpPr txBox="1"/>
+          <p:nvPr/>
+        </p:nvSpPr>
+        <p:spPr>
+          <a:xfrm>
+            <a:off x="1607241" y="3922301"/>
+            <a:ext cx="1382501" cy="369332"/>
+          </a:xfrm>
+          <a:prstGeom prst="rect">
+            <a:avLst/>
+          </a:prstGeom>
+          <a:noFill/>
+        </p:spPr>
+        <p:txBody>
+          <a:bodyPr wrap="square" rtlCol="0">
+            <a:spAutoFit/>
+          </a:bodyPr>
+          <a:lstStyle/>
+          <a:p>
+            <a:r>
+              <a:rPr lang="en-US" dirty="0" smtClean="0"/>
+              <a:t>10</a:t>
+            </a:r>
+            <a:r>
+              <a:rPr lang="en-US" dirty="0" smtClean="0"/>
+              <a:t>/21/</a:t>
+            </a:r>
+            <a:r>
+              <a:rPr lang="en-US" dirty="0" smtClean="0"/>
+              <a:t>2014</a:t>
+            </a:r>
+            <a:endParaRPr lang="en-US" dirty="0"/>
+          </a:p>
+        </p:txBody>
+      </p:sp>
+      <p:sp>
+        <p:nvSpPr>
+          <p:cNvPr id="10" name="TextBox 9"/>
+          <p:cNvSpPr txBox="1"/>
+          <p:nvPr/>
+        </p:nvSpPr>
+        <p:spPr>
+          <a:xfrm>
+            <a:off x="2989742" y="3922301"/>
+            <a:ext cx="1382501" cy="369332"/>
+          </a:xfrm>
+          <a:prstGeom prst="rect">
+            <a:avLst/>
+          </a:prstGeom>
+          <a:noFill/>
+        </p:spPr>
+        <p:txBody>
+          <a:bodyPr wrap="square" rtlCol="0">
+            <a:spAutoFit/>
+          </a:bodyPr>
+          <a:lstStyle/>
+          <a:p>
+            <a:r>
+              <a:rPr lang="en-US" dirty="0" smtClean="0"/>
+              <a:t>10</a:t>
+            </a:r>
+            <a:r>
+              <a:rPr lang="en-US" dirty="0" smtClean="0"/>
+              <a:t>/22/</a:t>
+            </a:r>
+            <a:r>
+              <a:rPr lang="en-US" dirty="0" smtClean="0"/>
+              <a:t>2014</a:t>
+            </a:r>
+            <a:endParaRPr lang="en-US" dirty="0"/>
+          </a:p>
+        </p:txBody>
+      </p:sp>
+      <p:sp>
+        <p:nvSpPr>
+          <p:cNvPr id="12" name="TextBox 11"/>
+          <p:cNvSpPr txBox="1"/>
+          <p:nvPr/>
+        </p:nvSpPr>
+        <p:spPr>
+          <a:xfrm>
+            <a:off x="7402494" y="3440052"/>
+            <a:ext cx="1382501" cy="369332"/>
+          </a:xfrm>
+          <a:prstGeom prst="rect">
+            <a:avLst/>
+          </a:prstGeom>
+          <a:noFill/>
+        </p:spPr>
+        <p:txBody>
+          <a:bodyPr wrap="square" rtlCol="0">
+            <a:spAutoFit/>
+          </a:bodyPr>
+          <a:lstStyle/>
+          <a:p>
+            <a:r>
+              <a:rPr lang="en-US" dirty="0" smtClean="0"/>
+              <a:t>1/16/2015</a:t>
+            </a:r>
+            <a:endParaRPr lang="en-US" dirty="0"/>
+          </a:p>
+        </p:txBody>
+      </p:sp>
+      <p:cxnSp>
+        <p:nvCxnSpPr>
+          <p:cNvPr id="13" name="Straight Connector 12"/>
+          <p:cNvCxnSpPr/>
+          <p:nvPr/>
+        </p:nvCxnSpPr>
+        <p:spPr>
+          <a:xfrm flipV="1">
+            <a:off x="787386" y="6085977"/>
+            <a:ext cx="7651984" cy="40186"/>
+          </a:xfrm>
+          <a:prstGeom prst="line">
+            <a:avLst/>
+          </a:prstGeom>
+          <a:ln>
+            <a:solidFill>
+              <a:schemeClr val="accent6">
+                <a:lumMod val="75000"/>
+              </a:schemeClr>
+            </a:solidFill>
+          </a:ln>
+          <a:effectLst/>
+        </p:spPr>
+        <p:style>
+          <a:lnRef idx="2">
+            <a:schemeClr val="accent1"/>
+          </a:lnRef>
+          <a:fillRef idx="0">
+            <a:schemeClr val="accent1"/>
+          </a:fillRef>
+          <a:effectRef idx="1">
+            <a:schemeClr val="accent1"/>
+          </a:effectRef>
+          <a:fontRef idx="minor">
+            <a:schemeClr val="tx1"/>
+          </a:fontRef>
+        </p:style>
+      </p:cxnSp>
+      <p:sp>
+        <p:nvSpPr>
+          <p:cNvPr id="14" name="TextBox 13"/>
+          <p:cNvSpPr txBox="1"/>
+          <p:nvPr/>
+        </p:nvSpPr>
+        <p:spPr>
+          <a:xfrm>
+            <a:off x="224740" y="5716645"/>
+            <a:ext cx="1382501" cy="369332"/>
+          </a:xfrm>
+          <a:prstGeom prst="rect">
+            <a:avLst/>
+          </a:prstGeom>
+          <a:noFill/>
+        </p:spPr>
+        <p:txBody>
+          <a:bodyPr wrap="square" rtlCol="0">
+            <a:spAutoFit/>
+          </a:bodyPr>
+          <a:lstStyle/>
+          <a:p>
+            <a:r>
+              <a:rPr lang="en-US" dirty="0" smtClean="0"/>
+              <a:t>11/26/</a:t>
+            </a:r>
+            <a:r>
+              <a:rPr lang="en-US" dirty="0" smtClean="0"/>
+              <a:t>2014</a:t>
+            </a:r>
+            <a:endParaRPr lang="en-US" dirty="0"/>
+          </a:p>
+        </p:txBody>
+      </p:sp>
+      <p:cxnSp>
+        <p:nvCxnSpPr>
+          <p:cNvPr id="15" name="Straight Arrow Connector 14"/>
+          <p:cNvCxnSpPr/>
+          <p:nvPr/>
+        </p:nvCxnSpPr>
+        <p:spPr>
+          <a:xfrm>
+            <a:off x="2644118" y="5643914"/>
+            <a:ext cx="8037" cy="442063"/>
+          </a:xfrm>
+          <a:prstGeom prst="straightConnector1">
+            <a:avLst/>
+          </a:prstGeom>
+          <a:ln>
+            <a:tailEnd type="arrow"/>
+          </a:ln>
+        </p:spPr>
+        <p:style>
+          <a:lnRef idx="2">
+            <a:schemeClr val="accent1"/>
+          </a:lnRef>
+          <a:fillRef idx="0">
+            <a:schemeClr val="accent1"/>
+          </a:fillRef>
+          <a:effectRef idx="1">
+            <a:schemeClr val="accent1"/>
+          </a:effectRef>
+          <a:fontRef idx="minor">
+            <a:schemeClr val="tx1"/>
+          </a:fontRef>
+        </p:style>
+      </p:cxnSp>
+      <p:cxnSp>
+        <p:nvCxnSpPr>
+          <p:cNvPr id="16" name="Straight Arrow Connector 15"/>
+          <p:cNvCxnSpPr/>
+          <p:nvPr/>
+        </p:nvCxnSpPr>
+        <p:spPr>
+          <a:xfrm>
+            <a:off x="3319292" y="5643914"/>
+            <a:ext cx="0" cy="442063"/>
+          </a:xfrm>
+          <a:prstGeom prst="straightConnector1">
+            <a:avLst/>
+          </a:prstGeom>
+          <a:ln>
+            <a:tailEnd type="arrow"/>
+          </a:ln>
+        </p:spPr>
+        <p:style>
+          <a:lnRef idx="2">
+            <a:schemeClr val="accent1"/>
+          </a:lnRef>
+          <a:fillRef idx="0">
+            <a:schemeClr val="accent1"/>
+          </a:fillRef>
+          <a:effectRef idx="1">
+            <a:schemeClr val="accent1"/>
+          </a:effectRef>
+          <a:fontRef idx="minor">
+            <a:schemeClr val="tx1"/>
+          </a:fontRef>
+        </p:style>
+      </p:cxnSp>
+      <p:sp>
+        <p:nvSpPr>
+          <p:cNvPr id="17" name="TextBox 16"/>
+          <p:cNvSpPr txBox="1"/>
+          <p:nvPr/>
+        </p:nvSpPr>
+        <p:spPr>
+          <a:xfrm>
+            <a:off x="1759641" y="6126163"/>
+            <a:ext cx="1382501" cy="369332"/>
+          </a:xfrm>
+          <a:prstGeom prst="rect">
+            <a:avLst/>
+          </a:prstGeom>
+          <a:noFill/>
+        </p:spPr>
+        <p:txBody>
+          <a:bodyPr wrap="square" rtlCol="0">
+            <a:spAutoFit/>
+          </a:bodyPr>
+          <a:lstStyle/>
+          <a:p>
+            <a:r>
+              <a:rPr lang="en-US" dirty="0" smtClean="0"/>
+              <a:t>12/01/</a:t>
+            </a:r>
+            <a:r>
+              <a:rPr lang="en-US" dirty="0" smtClean="0"/>
+              <a:t>2014</a:t>
+            </a:r>
+            <a:endParaRPr lang="en-US" dirty="0"/>
+          </a:p>
+        </p:txBody>
+      </p:sp>
+      <p:sp>
+        <p:nvSpPr>
+          <p:cNvPr id="18" name="TextBox 17"/>
+          <p:cNvSpPr txBox="1"/>
+          <p:nvPr/>
+        </p:nvSpPr>
+        <p:spPr>
+          <a:xfrm>
+            <a:off x="3142142" y="6126163"/>
+            <a:ext cx="1382501" cy="369332"/>
+          </a:xfrm>
+          <a:prstGeom prst="rect">
+            <a:avLst/>
+          </a:prstGeom>
+          <a:noFill/>
+        </p:spPr>
+        <p:txBody>
+          <a:bodyPr wrap="square" rtlCol="0">
+            <a:spAutoFit/>
+          </a:bodyPr>
+          <a:lstStyle/>
+          <a:p>
+            <a:r>
+              <a:rPr lang="en-US" dirty="0" smtClean="0"/>
+              <a:t>12/02/</a:t>
+            </a:r>
+            <a:r>
+              <a:rPr lang="en-US" dirty="0" smtClean="0"/>
+              <a:t>2014</a:t>
+            </a:r>
+            <a:endParaRPr lang="en-US" dirty="0"/>
+          </a:p>
+        </p:txBody>
+      </p:sp>
+      <p:sp>
+        <p:nvSpPr>
+          <p:cNvPr id="19" name="TextBox 18"/>
+          <p:cNvSpPr txBox="1"/>
+          <p:nvPr/>
+        </p:nvSpPr>
+        <p:spPr>
+          <a:xfrm>
+            <a:off x="7554894" y="5643914"/>
+            <a:ext cx="1382501" cy="369332"/>
+          </a:xfrm>
+          <a:prstGeom prst="rect">
+            <a:avLst/>
+          </a:prstGeom>
+          <a:noFill/>
+        </p:spPr>
+        <p:txBody>
+          <a:bodyPr wrap="square" rtlCol="0">
+            <a:spAutoFit/>
+          </a:bodyPr>
+          <a:lstStyle/>
+          <a:p>
+            <a:r>
+              <a:rPr lang="en-US" dirty="0" smtClean="0"/>
+              <a:t>2/24/2015</a:t>
+            </a:r>
+            <a:endParaRPr lang="en-US" dirty="0"/>
+          </a:p>
+        </p:txBody>
+      </p:sp>
     </p:spTree>
     <p:extLst>
       <p:ext uri="{BB962C8B-B14F-4D97-AF65-F5344CB8AC3E}">
@@ -3572,7 +4377,7 @@
       </p:grpSpPr>
       <p:pic>
         <p:nvPicPr>
-          <p:cNvPr id="3" name="Picture 2"/>
+          <p:cNvPr id="2" name="Picture 1"/>
           <p:cNvPicPr>
             <a:picLocks noChangeAspect="1"/>
           </p:cNvPicPr>
@@ -3586,8 +4391,8 @@
         </p:blipFill>
         <p:spPr>
           <a:xfrm>
-            <a:off x="901700" y="0"/>
-            <a:ext cx="7322949" cy="6858000"/>
+            <a:off x="1092200" y="0"/>
+            <a:ext cx="6949930" cy="6858000"/>
           </a:xfrm>
           <a:prstGeom prst="rect">
             <a:avLst/>
@@ -3626,7 +4431,7 @@
       </p:grpSpPr>
       <p:pic>
         <p:nvPicPr>
-          <p:cNvPr id="4" name="Picture 3"/>
+          <p:cNvPr id="2" name="Picture 1"/>
           <p:cNvPicPr>
             <a:picLocks noChangeAspect="1"/>
           </p:cNvPicPr>
@@ -3640,14 +4445,150 @@
         </p:blipFill>
         <p:spPr>
           <a:xfrm>
-            <a:off x="1375930" y="249161"/>
-            <a:ext cx="6911039" cy="6472243"/>
+            <a:off x="1092200" y="0"/>
+            <a:ext cx="6949930" cy="6858000"/>
           </a:xfrm>
           <a:prstGeom prst="rect">
             <a:avLst/>
           </a:prstGeom>
         </p:spPr>
       </p:pic>
+      <p:grpSp>
+        <p:nvGrpSpPr>
+          <p:cNvPr id="10" name="Group 9"/>
+          <p:cNvGrpSpPr/>
+          <p:nvPr/>
+        </p:nvGrpSpPr>
+        <p:grpSpPr>
+          <a:xfrm>
+            <a:off x="2130016" y="3818009"/>
+            <a:ext cx="827894" cy="433633"/>
+            <a:chOff x="2138054" y="756311"/>
+            <a:chExt cx="827894" cy="433633"/>
+          </a:xfrm>
+        </p:grpSpPr>
+        <p:cxnSp>
+          <p:nvCxnSpPr>
+            <p:cNvPr id="5" name="Straight Connector 4"/>
+            <p:cNvCxnSpPr/>
+            <p:nvPr/>
+          </p:nvCxnSpPr>
+          <p:spPr>
+            <a:xfrm>
+              <a:off x="2138054" y="1077025"/>
+              <a:ext cx="819856" cy="0"/>
+            </a:xfrm>
+            <a:prstGeom prst="line">
+              <a:avLst/>
+            </a:prstGeom>
+          </p:spPr>
+          <p:style>
+            <a:lnRef idx="2">
+              <a:schemeClr val="accent1"/>
+            </a:lnRef>
+            <a:fillRef idx="0">
+              <a:schemeClr val="accent1"/>
+            </a:fillRef>
+            <a:effectRef idx="1">
+              <a:schemeClr val="accent1"/>
+            </a:effectRef>
+            <a:fontRef idx="minor">
+              <a:schemeClr val="tx1"/>
+            </a:fontRef>
+          </p:style>
+        </p:cxnSp>
+        <p:sp>
+          <p:nvSpPr>
+            <p:cNvPr id="6" name="TextBox 5"/>
+            <p:cNvSpPr txBox="1"/>
+            <p:nvPr/>
+          </p:nvSpPr>
+          <p:spPr>
+            <a:xfrm>
+              <a:off x="2290772" y="756311"/>
+              <a:ext cx="482268" cy="369332"/>
+            </a:xfrm>
+            <a:prstGeom prst="rect">
+              <a:avLst/>
+            </a:prstGeom>
+            <a:noFill/>
+          </p:spPr>
+          <p:txBody>
+            <a:bodyPr wrap="square" rtlCol="0">
+              <a:spAutoFit/>
+            </a:bodyPr>
+            <a:lstStyle/>
+            <a:p>
+              <a:pPr algn="ctr"/>
+              <a:r>
+                <a:rPr lang="en-US" dirty="0" smtClean="0"/>
+                <a:t>*</a:t>
+              </a:r>
+              <a:endParaRPr lang="en-US" dirty="0"/>
+            </a:p>
+          </p:txBody>
+        </p:sp>
+        <p:cxnSp>
+          <p:nvCxnSpPr>
+            <p:cNvPr id="8" name="Straight Connector 7"/>
+            <p:cNvCxnSpPr/>
+            <p:nvPr/>
+          </p:nvCxnSpPr>
+          <p:spPr>
+            <a:xfrm>
+              <a:off x="2138054" y="1077025"/>
+              <a:ext cx="0" cy="112526"/>
+            </a:xfrm>
+            <a:prstGeom prst="line">
+              <a:avLst/>
+            </a:prstGeom>
+          </p:spPr>
+          <p:style>
+            <a:lnRef idx="2">
+              <a:schemeClr val="accent1"/>
+            </a:lnRef>
+            <a:fillRef idx="0">
+              <a:schemeClr val="accent1"/>
+            </a:fillRef>
+            <a:effectRef idx="1">
+              <a:schemeClr val="accent1"/>
+            </a:effectRef>
+            <a:fontRef idx="minor">
+              <a:schemeClr val="tx1"/>
+            </a:fontRef>
+          </p:style>
+        </p:cxnSp>
+        <p:cxnSp>
+          <p:nvCxnSpPr>
+            <p:cNvPr id="9" name="Straight Connector 8"/>
+            <p:cNvCxnSpPr/>
+            <p:nvPr/>
+          </p:nvCxnSpPr>
+          <p:spPr>
+            <a:xfrm>
+              <a:off x="2965948" y="1077418"/>
+              <a:ext cx="0" cy="112526"/>
+            </a:xfrm>
+            <a:prstGeom prst="line">
+              <a:avLst/>
+            </a:prstGeom>
+          </p:spPr>
+          <p:style>
+            <a:lnRef idx="2">
+              <a:schemeClr val="accent1"/>
+            </a:lnRef>
+            <a:fillRef idx="0">
+              <a:schemeClr val="accent1"/>
+            </a:fillRef>
+            <a:effectRef idx="1">
+              <a:schemeClr val="accent1"/>
+            </a:effectRef>
+            <a:fontRef idx="minor">
+              <a:schemeClr val="tx1"/>
+            </a:fontRef>
+          </p:style>
+        </p:cxnSp>
+      </p:grpSp>
     </p:spTree>
     <p:extLst>
       <p:ext uri="{BB962C8B-B14F-4D97-AF65-F5344CB8AC3E}">
@@ -3959,7 +4900,7 @@
       </p:grpSpPr>
       <p:pic>
         <p:nvPicPr>
-          <p:cNvPr id="2" name="Picture 1"/>
+          <p:cNvPr id="3" name="Picture 2"/>
           <p:cNvPicPr>
             <a:picLocks noChangeAspect="1"/>
           </p:cNvPicPr>
@@ -3973,8 +4914,8 @@
         </p:blipFill>
         <p:spPr>
           <a:xfrm>
-            <a:off x="901700" y="0"/>
-            <a:ext cx="7322949" cy="6858000"/>
+            <a:off x="1092200" y="0"/>
+            <a:ext cx="6949930" cy="6858000"/>
           </a:xfrm>
           <a:prstGeom prst="rect">
             <a:avLst/>
@@ -4013,7 +4954,7 @@
       </p:grpSpPr>
       <p:pic>
         <p:nvPicPr>
-          <p:cNvPr id="2" name="Picture 1"/>
+          <p:cNvPr id="4" name="Picture 3"/>
           <p:cNvPicPr>
             <a:picLocks noChangeAspect="1"/>
           </p:cNvPicPr>
@@ -4027,8 +4968,8 @@
         </p:blipFill>
         <p:spPr>
           <a:xfrm>
-            <a:off x="901700" y="0"/>
-            <a:ext cx="7322949" cy="6858000"/>
+            <a:off x="1092200" y="0"/>
+            <a:ext cx="6949930" cy="6858000"/>
           </a:xfrm>
           <a:prstGeom prst="rect">
             <a:avLst/>
@@ -4067,7 +5008,7 @@
       </p:grpSpPr>
       <p:sp>
         <p:nvSpPr>
-          <p:cNvPr id="2" name="Title 1"/>
+          <p:cNvPr id="4" name="Title 3"/>
           <p:cNvSpPr>
             <a:spLocks noGrp="1"/>
           </p:cNvSpPr>
@@ -4080,17 +5021,13 @@
           <a:bodyPr/>
           <a:lstStyle/>
           <a:p>
-            <a:r>
-              <a:rPr lang="en-US" dirty="0" smtClean="0"/>
-              <a:t>Light</a:t>
-            </a:r>
-            <a:endParaRPr lang="en-US" dirty="0"/>
+            <a:endParaRPr lang="en-US"/>
           </a:p>
         </p:txBody>
       </p:sp>
       <p:pic>
         <p:nvPicPr>
-          <p:cNvPr id="3" name="Picture 2"/>
+          <p:cNvPr id="5" name="Picture 4"/>
           <p:cNvPicPr>
             <a:picLocks noChangeAspect="1"/>
           </p:cNvPicPr>
@@ -4104,8 +5041,8 @@
         </p:blipFill>
         <p:spPr>
           <a:xfrm>
-            <a:off x="1551295" y="1187964"/>
-            <a:ext cx="6054444" cy="5670035"/>
+            <a:off x="1092200" y="0"/>
+            <a:ext cx="6949930" cy="6858000"/>
           </a:xfrm>
           <a:prstGeom prst="rect">
             <a:avLst/>

</xml_diff>

<commit_message>
Updated the result powerpoint
</commit_message>
<xml_diff>
--- a/ResultsSlides.pptx
+++ b/ResultsSlides.pptx
@@ -8,20 +8,21 @@
     <p:sldId id="256" r:id="rId2"/>
     <p:sldId id="257" r:id="rId3"/>
     <p:sldId id="258" r:id="rId4"/>
-    <p:sldId id="263" r:id="rId5"/>
-    <p:sldId id="260" r:id="rId6"/>
-    <p:sldId id="262" r:id="rId7"/>
-    <p:sldId id="264" r:id="rId8"/>
-    <p:sldId id="266" r:id="rId9"/>
-    <p:sldId id="267" r:id="rId10"/>
-    <p:sldId id="271" r:id="rId11"/>
-    <p:sldId id="268" r:id="rId12"/>
-    <p:sldId id="269" r:id="rId13"/>
-    <p:sldId id="272" r:id="rId14"/>
-    <p:sldId id="275" r:id="rId15"/>
-    <p:sldId id="276" r:id="rId16"/>
-    <p:sldId id="278" r:id="rId17"/>
-    <p:sldId id="279" r:id="rId18"/>
+    <p:sldId id="280" r:id="rId5"/>
+    <p:sldId id="263" r:id="rId6"/>
+    <p:sldId id="260" r:id="rId7"/>
+    <p:sldId id="262" r:id="rId8"/>
+    <p:sldId id="264" r:id="rId9"/>
+    <p:sldId id="266" r:id="rId10"/>
+    <p:sldId id="267" r:id="rId11"/>
+    <p:sldId id="271" r:id="rId12"/>
+    <p:sldId id="268" r:id="rId13"/>
+    <p:sldId id="269" r:id="rId14"/>
+    <p:sldId id="272" r:id="rId15"/>
+    <p:sldId id="275" r:id="rId16"/>
+    <p:sldId id="276" r:id="rId17"/>
+    <p:sldId id="278" r:id="rId18"/>
+    <p:sldId id="279" r:id="rId19"/>
   </p:sldIdLst>
   <p:sldSz cx="9144000" cy="6858000" type="screen4x3"/>
   <p:notesSz cx="6858000" cy="9144000"/>
@@ -304,7 +305,7 @@
           <a:p>
             <a:fld id="{437BC0E1-BD5C-0446-92AB-909DA47EBC51}" type="datetimeFigureOut">
               <a:rPr lang="en-US" smtClean="0"/>
-              <a:t>4/10/15</a:t>
+              <a:t>11/5/15</a:t>
             </a:fld>
             <a:endParaRPr lang="en-US"/>
           </a:p>
@@ -474,7 +475,7 @@
           <a:p>
             <a:fld id="{437BC0E1-BD5C-0446-92AB-909DA47EBC51}" type="datetimeFigureOut">
               <a:rPr lang="en-US" smtClean="0"/>
-              <a:t>4/10/15</a:t>
+              <a:t>11/5/15</a:t>
             </a:fld>
             <a:endParaRPr lang="en-US"/>
           </a:p>
@@ -654,7 +655,7 @@
           <a:p>
             <a:fld id="{437BC0E1-BD5C-0446-92AB-909DA47EBC51}" type="datetimeFigureOut">
               <a:rPr lang="en-US" smtClean="0"/>
-              <a:t>4/10/15</a:t>
+              <a:t>11/5/15</a:t>
             </a:fld>
             <a:endParaRPr lang="en-US"/>
           </a:p>
@@ -824,7 +825,7 @@
           <a:p>
             <a:fld id="{437BC0E1-BD5C-0446-92AB-909DA47EBC51}" type="datetimeFigureOut">
               <a:rPr lang="en-US" smtClean="0"/>
-              <a:t>4/10/15</a:t>
+              <a:t>11/5/15</a:t>
             </a:fld>
             <a:endParaRPr lang="en-US"/>
           </a:p>
@@ -1070,7 +1071,7 @@
           <a:p>
             <a:fld id="{437BC0E1-BD5C-0446-92AB-909DA47EBC51}" type="datetimeFigureOut">
               <a:rPr lang="en-US" smtClean="0"/>
-              <a:t>4/10/15</a:t>
+              <a:t>11/5/15</a:t>
             </a:fld>
             <a:endParaRPr lang="en-US"/>
           </a:p>
@@ -1358,7 +1359,7 @@
           <a:p>
             <a:fld id="{437BC0E1-BD5C-0446-92AB-909DA47EBC51}" type="datetimeFigureOut">
               <a:rPr lang="en-US" smtClean="0"/>
-              <a:t>4/10/15</a:t>
+              <a:t>11/5/15</a:t>
             </a:fld>
             <a:endParaRPr lang="en-US"/>
           </a:p>
@@ -1780,7 +1781,7 @@
           <a:p>
             <a:fld id="{437BC0E1-BD5C-0446-92AB-909DA47EBC51}" type="datetimeFigureOut">
               <a:rPr lang="en-US" smtClean="0"/>
-              <a:t>4/10/15</a:t>
+              <a:t>11/5/15</a:t>
             </a:fld>
             <a:endParaRPr lang="en-US"/>
           </a:p>
@@ -1898,7 +1899,7 @@
           <a:p>
             <a:fld id="{437BC0E1-BD5C-0446-92AB-909DA47EBC51}" type="datetimeFigureOut">
               <a:rPr lang="en-US" smtClean="0"/>
-              <a:t>4/10/15</a:t>
+              <a:t>11/5/15</a:t>
             </a:fld>
             <a:endParaRPr lang="en-US"/>
           </a:p>
@@ -1993,7 +1994,7 @@
           <a:p>
             <a:fld id="{437BC0E1-BD5C-0446-92AB-909DA47EBC51}" type="datetimeFigureOut">
               <a:rPr lang="en-US" smtClean="0"/>
-              <a:t>4/10/15</a:t>
+              <a:t>11/5/15</a:t>
             </a:fld>
             <a:endParaRPr lang="en-US"/>
           </a:p>
@@ -2270,7 +2271,7 @@
           <a:p>
             <a:fld id="{437BC0E1-BD5C-0446-92AB-909DA47EBC51}" type="datetimeFigureOut">
               <a:rPr lang="en-US" smtClean="0"/>
-              <a:t>4/10/15</a:t>
+              <a:t>11/5/15</a:t>
             </a:fld>
             <a:endParaRPr lang="en-US"/>
           </a:p>
@@ -2523,7 +2524,7 @@
           <a:p>
             <a:fld id="{437BC0E1-BD5C-0446-92AB-909DA47EBC51}" type="datetimeFigureOut">
               <a:rPr lang="en-US" smtClean="0"/>
-              <a:t>4/10/15</a:t>
+              <a:t>11/5/15</a:t>
             </a:fld>
             <a:endParaRPr lang="en-US"/>
           </a:p>
@@ -2736,7 +2737,7 @@
           <a:p>
             <a:fld id="{437BC0E1-BD5C-0446-92AB-909DA47EBC51}" type="datetimeFigureOut">
               <a:rPr lang="en-US" smtClean="0"/>
-              <a:t>4/10/15</a:t>
+              <a:t>11/5/15</a:t>
             </a:fld>
             <a:endParaRPr lang="en-US"/>
           </a:p>
@@ -3130,11 +3131,7 @@
           <a:p>
             <a:r>
               <a:rPr lang="en-US" dirty="0" smtClean="0"/>
-              <a:t>Predicting weight gain based on body composition and metabolic </a:t>
-            </a:r>
-            <a:r>
-              <a:rPr lang="en-US" dirty="0" smtClean="0"/>
-              <a:t>rate</a:t>
+              <a:t>Predicting weight gain based on body composition and metabolic rate</a:t>
             </a:r>
             <a:endParaRPr lang="en-US" dirty="0"/>
           </a:p>
@@ -3173,6 +3170,79 @@
 </file>
 
 <file path=ppt/slides/slide10.xml><?xml version="1.0" encoding="utf-8"?>
+<p:sld xmlns:a="http://schemas.openxmlformats.org/drawingml/2006/main" xmlns:r="http://schemas.openxmlformats.org/officeDocument/2006/relationships" xmlns:p="http://schemas.openxmlformats.org/presentationml/2006/main">
+  <p:cSld>
+    <p:spTree>
+      <p:nvGrpSpPr>
+        <p:cNvPr id="1" name=""/>
+        <p:cNvGrpSpPr/>
+        <p:nvPr/>
+      </p:nvGrpSpPr>
+      <p:grpSpPr>
+        <a:xfrm>
+          <a:off x="0" y="0"/>
+          <a:ext cx="0" cy="0"/>
+          <a:chOff x="0" y="0"/>
+          <a:chExt cx="0" cy="0"/>
+        </a:xfrm>
+      </p:grpSpPr>
+      <p:sp>
+        <p:nvSpPr>
+          <p:cNvPr id="4" name="Title 3"/>
+          <p:cNvSpPr>
+            <a:spLocks noGrp="1"/>
+          </p:cNvSpPr>
+          <p:nvPr>
+            <p:ph type="title"/>
+          </p:nvPr>
+        </p:nvSpPr>
+        <p:spPr/>
+        <p:txBody>
+          <a:bodyPr/>
+          <a:lstStyle/>
+          <a:p>
+            <a:endParaRPr lang="en-US"/>
+          </a:p>
+        </p:txBody>
+      </p:sp>
+      <p:pic>
+        <p:nvPicPr>
+          <p:cNvPr id="5" name="Picture 4"/>
+          <p:cNvPicPr>
+            <a:picLocks noChangeAspect="1"/>
+          </p:cNvPicPr>
+          <p:nvPr/>
+        </p:nvPicPr>
+        <p:blipFill>
+          <a:blip r:embed="rId2"/>
+          <a:stretch>
+            <a:fillRect/>
+          </a:stretch>
+        </p:blipFill>
+        <p:spPr>
+          <a:xfrm>
+            <a:off x="1092200" y="0"/>
+            <a:ext cx="6949930" cy="6858000"/>
+          </a:xfrm>
+          <a:prstGeom prst="rect">
+            <a:avLst/>
+          </a:prstGeom>
+        </p:spPr>
+      </p:pic>
+    </p:spTree>
+    <p:extLst>
+      <p:ext uri="{BB962C8B-B14F-4D97-AF65-F5344CB8AC3E}">
+        <p14:creationId xmlns:p14="http://schemas.microsoft.com/office/powerpoint/2010/main" val="2719338169"/>
+      </p:ext>
+    </p:extLst>
+  </p:cSld>
+  <p:clrMapOvr>
+    <a:masterClrMapping/>
+  </p:clrMapOvr>
+</p:sld>
+</file>
+
+<file path=ppt/slides/slide11.xml><?xml version="1.0" encoding="utf-8"?>
 <p:sld xmlns:a="http://schemas.openxmlformats.org/drawingml/2006/main" xmlns:r="http://schemas.openxmlformats.org/officeDocument/2006/relationships" xmlns:p="http://schemas.openxmlformats.org/presentationml/2006/main">
   <p:cSld>
     <p:spTree>
@@ -3259,7 +3329,7 @@
 </p:sld>
 </file>
 
-<file path=ppt/slides/slide11.xml><?xml version="1.0" encoding="utf-8"?>
+<file path=ppt/slides/slide12.xml><?xml version="1.0" encoding="utf-8"?>
 <p:sld xmlns:a="http://schemas.openxmlformats.org/drawingml/2006/main" xmlns:r="http://schemas.openxmlformats.org/officeDocument/2006/relationships" xmlns:p="http://schemas.openxmlformats.org/presentationml/2006/main">
   <p:cSld>
     <p:spTree>
@@ -3337,7 +3407,7 @@
 </p:sld>
 </file>
 
-<file path=ppt/slides/slide12.xml><?xml version="1.0" encoding="utf-8"?>
+<file path=ppt/slides/slide13.xml><?xml version="1.0" encoding="utf-8"?>
 <p:sld xmlns:a="http://schemas.openxmlformats.org/drawingml/2006/main" xmlns:r="http://schemas.openxmlformats.org/officeDocument/2006/relationships" xmlns:p="http://schemas.openxmlformats.org/presentationml/2006/main">
   <p:cSld>
     <p:spTree>
@@ -3391,7 +3461,7 @@
 </p:sld>
 </file>
 
-<file path=ppt/slides/slide13.xml><?xml version="1.0" encoding="utf-8"?>
+<file path=ppt/slides/slide14.xml><?xml version="1.0" encoding="utf-8"?>
 <p:sld xmlns:a="http://schemas.openxmlformats.org/drawingml/2006/main" xmlns:r="http://schemas.openxmlformats.org/officeDocument/2006/relationships" xmlns:p="http://schemas.openxmlformats.org/presentationml/2006/main">
   <p:cSld>
     <p:spTree>
@@ -3445,7 +3515,7 @@
 </p:sld>
 </file>
 
-<file path=ppt/slides/slide14.xml><?xml version="1.0" encoding="utf-8"?>
+<file path=ppt/slides/slide15.xml><?xml version="1.0" encoding="utf-8"?>
 <p:sld xmlns:a="http://schemas.openxmlformats.org/drawingml/2006/main" xmlns:r="http://schemas.openxmlformats.org/officeDocument/2006/relationships" xmlns:p="http://schemas.openxmlformats.org/presentationml/2006/main">
   <p:cSld>
     <p:spTree>
@@ -3517,7 +3587,7 @@
 </p:sld>
 </file>
 
-<file path=ppt/slides/slide15.xml><?xml version="1.0" encoding="utf-8"?>
+<file path=ppt/slides/slide16.xml><?xml version="1.0" encoding="utf-8"?>
 <p:sld xmlns:a="http://schemas.openxmlformats.org/drawingml/2006/main" xmlns:r="http://schemas.openxmlformats.org/officeDocument/2006/relationships" xmlns:p="http://schemas.openxmlformats.org/presentationml/2006/main">
   <p:cSld>
     <p:spTree>
@@ -3571,7 +3641,7 @@
 </p:sld>
 </file>
 
-<file path=ppt/slides/slide16.xml><?xml version="1.0" encoding="utf-8"?>
+<file path=ppt/slides/slide17.xml><?xml version="1.0" encoding="utf-8"?>
 <p:sld xmlns:a="http://schemas.openxmlformats.org/drawingml/2006/main" xmlns:r="http://schemas.openxmlformats.org/officeDocument/2006/relationships" xmlns:p="http://schemas.openxmlformats.org/presentationml/2006/main">
   <p:cSld>
     <p:spTree>
@@ -3743,7 +3813,7 @@
 </p:sld>
 </file>
 
-<file path=ppt/slides/slide17.xml><?xml version="1.0" encoding="utf-8"?>
+<file path=ppt/slides/slide18.xml><?xml version="1.0" encoding="utf-8"?>
 <p:sld xmlns:a="http://schemas.openxmlformats.org/drawingml/2006/main" xmlns:r="http://schemas.openxmlformats.org/officeDocument/2006/relationships" xmlns:p="http://schemas.openxmlformats.org/presentationml/2006/main">
   <p:cSld>
     <p:spTree>
@@ -3971,44 +4041,6 @@
           </a:p>
         </p:txBody>
       </p:sp>
-      <p:cxnSp>
-        <p:nvCxnSpPr>
-          <p:cNvPr id="5" name="Straight Connector 4"/>
-          <p:cNvCxnSpPr/>
-          <p:nvPr/>
-        </p:nvCxnSpPr>
-        <p:spPr>
-          <a:xfrm flipV="1">
-            <a:off x="634986" y="3882115"/>
-            <a:ext cx="7651984" cy="40186"/>
-          </a:xfrm>
-          <a:prstGeom prst="line">
-            <a:avLst/>
-          </a:prstGeom>
-          <a:ln>
-            <a:solidFill>
-              <a:schemeClr val="accent6">
-                <a:lumMod val="75000"/>
-              </a:schemeClr>
-            </a:solidFill>
-          </a:ln>
-          <a:effectLst/>
-        </p:spPr>
-        <p:style>
-          <a:lnRef idx="2">
-            <a:schemeClr val="accent1"/>
-          </a:lnRef>
-          <a:fillRef idx="0">
-            <a:schemeClr val="accent1"/>
-          </a:fillRef>
-          <a:effectRef idx="1">
-            <a:schemeClr val="accent1"/>
-          </a:effectRef>
-          <a:fontRef idx="minor">
-            <a:schemeClr val="tx1"/>
-          </a:fontRef>
-        </p:style>
-      </p:cxnSp>
       <p:sp>
         <p:nvSpPr>
           <p:cNvPr id="7" name="TextBox 6"/>
@@ -4017,8 +4049,8 @@
         </p:nvSpPr>
         <p:spPr>
           <a:xfrm>
-            <a:off x="72340" y="3512783"/>
-            <a:ext cx="1382501" cy="369332"/>
+            <a:off x="83600" y="3520344"/>
+            <a:ext cx="1382501" cy="307777"/>
           </a:xfrm>
           <a:prstGeom prst="rect">
             <a:avLst/>
@@ -4032,22 +4064,142 @@
           <a:lstStyle/>
           <a:p>
             <a:r>
-              <a:rPr lang="en-US" dirty="0" smtClean="0"/>
+              <a:rPr lang="en-US" sz="1400" dirty="0" smtClean="0"/>
               <a:t>10/17/2014</a:t>
             </a:r>
-            <a:endParaRPr lang="en-US" dirty="0"/>
+            <a:endParaRPr lang="en-US" sz="1400" dirty="0"/>
+          </a:p>
+        </p:txBody>
+      </p:sp>
+      <p:sp>
+        <p:nvSpPr>
+          <p:cNvPr id="8" name="TextBox 7"/>
+          <p:cNvSpPr txBox="1"/>
+          <p:nvPr/>
+        </p:nvSpPr>
+        <p:spPr>
+          <a:xfrm>
+            <a:off x="1860591" y="3988701"/>
+            <a:ext cx="1382501" cy="307777"/>
+          </a:xfrm>
+          <a:prstGeom prst="rect">
+            <a:avLst/>
+          </a:prstGeom>
+          <a:noFill/>
+        </p:spPr>
+        <p:txBody>
+          <a:bodyPr wrap="square" rtlCol="0">
+            <a:spAutoFit/>
+          </a:bodyPr>
+          <a:lstStyle/>
+          <a:p>
+            <a:r>
+              <a:rPr lang="en-US" sz="1400" dirty="0" smtClean="0"/>
+              <a:t>10/21/2014</a:t>
+            </a:r>
+            <a:endParaRPr lang="en-US" sz="1400" dirty="0"/>
+          </a:p>
+        </p:txBody>
+      </p:sp>
+      <p:sp>
+        <p:nvSpPr>
+          <p:cNvPr id="10" name="TextBox 9"/>
+          <p:cNvSpPr txBox="1"/>
+          <p:nvPr/>
+        </p:nvSpPr>
+        <p:spPr>
+          <a:xfrm>
+            <a:off x="2909163" y="4002331"/>
+            <a:ext cx="1201257" cy="307777"/>
+          </a:xfrm>
+          <a:prstGeom prst="rect">
+            <a:avLst/>
+          </a:prstGeom>
+          <a:noFill/>
+        </p:spPr>
+        <p:txBody>
+          <a:bodyPr wrap="square" rtlCol="0">
+            <a:spAutoFit/>
+          </a:bodyPr>
+          <a:lstStyle/>
+          <a:p>
+            <a:r>
+              <a:rPr lang="en-US" sz="1400" dirty="0" smtClean="0"/>
+              <a:t>10/22/2014</a:t>
+            </a:r>
+            <a:endParaRPr lang="en-US" sz="1400" dirty="0"/>
+          </a:p>
+        </p:txBody>
+      </p:sp>
+      <p:sp>
+        <p:nvSpPr>
+          <p:cNvPr id="12" name="TextBox 11"/>
+          <p:cNvSpPr txBox="1"/>
+          <p:nvPr/>
+        </p:nvSpPr>
+        <p:spPr>
+          <a:xfrm>
+            <a:off x="7595719" y="3528493"/>
+            <a:ext cx="1382501" cy="307777"/>
+          </a:xfrm>
+          <a:prstGeom prst="rect">
+            <a:avLst/>
+          </a:prstGeom>
+          <a:noFill/>
+        </p:spPr>
+        <p:txBody>
+          <a:bodyPr wrap="square" rtlCol="0">
+            <a:spAutoFit/>
+          </a:bodyPr>
+          <a:lstStyle/>
+          <a:p>
+            <a:r>
+              <a:rPr lang="en-US" sz="1400" dirty="0" smtClean="0"/>
+              <a:t>1/16/2015</a:t>
+            </a:r>
+            <a:endParaRPr lang="en-US" sz="1400" dirty="0"/>
+          </a:p>
+        </p:txBody>
+      </p:sp>
+      <p:sp>
+        <p:nvSpPr>
+          <p:cNvPr id="14" name="TextBox 13"/>
+          <p:cNvSpPr txBox="1"/>
+          <p:nvPr/>
+        </p:nvSpPr>
+        <p:spPr>
+          <a:xfrm>
+            <a:off x="224740" y="5797802"/>
+            <a:ext cx="1382501" cy="307777"/>
+          </a:xfrm>
+          <a:prstGeom prst="rect">
+            <a:avLst/>
+          </a:prstGeom>
+          <a:noFill/>
+        </p:spPr>
+        <p:txBody>
+          <a:bodyPr wrap="square" rtlCol="0">
+            <a:spAutoFit/>
+          </a:bodyPr>
+          <a:lstStyle/>
+          <a:p>
+            <a:r>
+              <a:rPr lang="en-US" sz="1400" dirty="0" smtClean="0"/>
+              <a:t>11/26/2014</a:t>
+            </a:r>
+            <a:endParaRPr lang="en-US" sz="1400" dirty="0"/>
           </a:p>
         </p:txBody>
       </p:sp>
       <p:cxnSp>
         <p:nvCxnSpPr>
-          <p:cNvPr id="9" name="Straight Arrow Connector 8"/>
+          <p:cNvPr id="15" name="Straight Arrow Connector 14"/>
           <p:cNvCxnSpPr/>
           <p:nvPr/>
         </p:nvCxnSpPr>
         <p:spPr>
           <a:xfrm>
-            <a:off x="2491718" y="3440052"/>
+            <a:off x="2478381" y="5643914"/>
             <a:ext cx="8037" cy="442063"/>
           </a:xfrm>
           <a:prstGeom prst="straightConnector1">
@@ -4072,49 +4224,16 @@
           </a:fontRef>
         </p:style>
       </p:cxnSp>
-      <p:cxnSp>
-        <p:nvCxnSpPr>
-          <p:cNvPr id="11" name="Straight Arrow Connector 10"/>
-          <p:cNvCxnSpPr/>
+      <p:sp>
+        <p:nvSpPr>
+          <p:cNvPr id="17" name="TextBox 16"/>
+          <p:cNvSpPr txBox="1"/>
           <p:nvPr/>
-        </p:nvCxnSpPr>
+        </p:nvSpPr>
         <p:spPr>
           <a:xfrm>
-            <a:off x="3166892" y="3440052"/>
-            <a:ext cx="0" cy="442063"/>
-          </a:xfrm>
-          <a:prstGeom prst="straightConnector1">
-            <a:avLst/>
-          </a:prstGeom>
-          <a:ln>
-            <a:tailEnd type="arrow"/>
-          </a:ln>
-        </p:spPr>
-        <p:style>
-          <a:lnRef idx="2">
-            <a:schemeClr val="accent1"/>
-          </a:lnRef>
-          <a:fillRef idx="0">
-            <a:schemeClr val="accent1"/>
-          </a:fillRef>
-          <a:effectRef idx="1">
-            <a:schemeClr val="accent1"/>
-          </a:effectRef>
-          <a:fontRef idx="minor">
-            <a:schemeClr val="tx1"/>
-          </a:fontRef>
-        </p:style>
-      </p:cxnSp>
-      <p:sp>
-        <p:nvSpPr>
-          <p:cNvPr id="8" name="TextBox 7"/>
-          <p:cNvSpPr txBox="1"/>
-          <p:nvPr/>
-        </p:nvSpPr>
-        <p:spPr>
-          <a:xfrm>
-            <a:off x="1607241" y="3922301"/>
-            <a:ext cx="1382501" cy="369332"/>
+            <a:off x="1840809" y="6230571"/>
+            <a:ext cx="1382501" cy="307777"/>
           </a:xfrm>
           <a:prstGeom prst="rect">
             <a:avLst/>
@@ -4128,23 +4247,23 @@
           <a:lstStyle/>
           <a:p>
             <a:r>
-              <a:rPr lang="en-US" dirty="0" smtClean="0"/>
-              <a:t>10/21/2014</a:t>
-            </a:r>
-            <a:endParaRPr lang="en-US" dirty="0"/>
-          </a:p>
-        </p:txBody>
-      </p:sp>
-      <p:sp>
-        <p:nvSpPr>
-          <p:cNvPr id="10" name="TextBox 9"/>
+              <a:rPr lang="en-US" sz="1400" dirty="0" smtClean="0"/>
+              <a:t>12/01/2014</a:t>
+            </a:r>
+            <a:endParaRPr lang="en-US" sz="1400" dirty="0"/>
+          </a:p>
+        </p:txBody>
+      </p:sp>
+      <p:sp>
+        <p:nvSpPr>
+          <p:cNvPr id="18" name="TextBox 17"/>
           <p:cNvSpPr txBox="1"/>
           <p:nvPr/>
         </p:nvSpPr>
         <p:spPr>
           <a:xfrm>
-            <a:off x="2989742" y="3922301"/>
-            <a:ext cx="1382501" cy="369332"/>
+            <a:off x="2824493" y="6230571"/>
+            <a:ext cx="1382501" cy="307777"/>
           </a:xfrm>
           <a:prstGeom prst="rect">
             <a:avLst/>
@@ -4158,23 +4277,23 @@
           <a:lstStyle/>
           <a:p>
             <a:r>
-              <a:rPr lang="en-US" dirty="0" smtClean="0"/>
-              <a:t>10/22/2014</a:t>
-            </a:r>
-            <a:endParaRPr lang="en-US" dirty="0"/>
-          </a:p>
-        </p:txBody>
-      </p:sp>
-      <p:sp>
-        <p:nvSpPr>
-          <p:cNvPr id="12" name="TextBox 11"/>
+              <a:rPr lang="en-US" sz="1400" dirty="0" smtClean="0"/>
+              <a:t>12/02/2014</a:t>
+            </a:r>
+            <a:endParaRPr lang="en-US" sz="1400" dirty="0"/>
+          </a:p>
+        </p:txBody>
+      </p:sp>
+      <p:sp>
+        <p:nvSpPr>
+          <p:cNvPr id="19" name="TextBox 18"/>
           <p:cNvSpPr txBox="1"/>
           <p:nvPr/>
         </p:nvSpPr>
         <p:spPr>
           <a:xfrm>
-            <a:off x="7402494" y="3440052"/>
-            <a:ext cx="1382501" cy="369332"/>
+            <a:off x="7761499" y="5759283"/>
+            <a:ext cx="1382501" cy="307777"/>
           </a:xfrm>
           <a:prstGeom prst="rect">
             <a:avLst/>
@@ -4188,237 +4307,686 @@
           <a:lstStyle/>
           <a:p>
             <a:r>
-              <a:rPr lang="en-US" dirty="0" smtClean="0"/>
-              <a:t>1/16/2015</a:t>
-            </a:r>
-            <a:endParaRPr lang="en-US" dirty="0"/>
-          </a:p>
-        </p:txBody>
-      </p:sp>
-      <p:cxnSp>
-        <p:nvCxnSpPr>
-          <p:cNvPr id="13" name="Straight Connector 12"/>
-          <p:cNvCxnSpPr/>
+              <a:rPr lang="en-US" sz="1400" dirty="0" smtClean="0"/>
+              <a:t>2/24/2015</a:t>
+            </a:r>
+            <a:endParaRPr lang="en-US" sz="1400" dirty="0"/>
+          </a:p>
+        </p:txBody>
+      </p:sp>
+      <p:grpSp>
+        <p:nvGrpSpPr>
+          <p:cNvPr id="26" name="Group 25"/>
+          <p:cNvGrpSpPr/>
           <p:nvPr/>
-        </p:nvCxnSpPr>
-        <p:spPr>
-          <a:xfrm flipV="1">
-            <a:off x="787386" y="6085977"/>
-            <a:ext cx="7651984" cy="40186"/>
+        </p:nvGrpSpPr>
+        <p:grpSpPr>
+          <a:xfrm>
+            <a:off x="634986" y="3406852"/>
+            <a:ext cx="7651984" cy="669337"/>
+            <a:chOff x="634986" y="3406852"/>
+            <a:chExt cx="7651984" cy="669337"/>
           </a:xfrm>
-          <a:prstGeom prst="line">
-            <a:avLst/>
-          </a:prstGeom>
-          <a:ln>
-            <a:solidFill>
-              <a:schemeClr val="accent6">
-                <a:lumMod val="75000"/>
-              </a:schemeClr>
-            </a:solidFill>
-          </a:ln>
-          <a:effectLst/>
-        </p:spPr>
-        <p:style>
-          <a:lnRef idx="2">
-            <a:schemeClr val="accent1"/>
-          </a:lnRef>
-          <a:fillRef idx="0">
-            <a:schemeClr val="accent1"/>
-          </a:fillRef>
-          <a:effectRef idx="1">
-            <a:schemeClr val="accent1"/>
-          </a:effectRef>
-          <a:fontRef idx="minor">
-            <a:schemeClr val="tx1"/>
-          </a:fontRef>
-        </p:style>
-      </p:cxnSp>
-      <p:sp>
-        <p:nvSpPr>
-          <p:cNvPr id="14" name="TextBox 13"/>
-          <p:cNvSpPr txBox="1"/>
+        </p:grpSpPr>
+        <p:cxnSp>
+          <p:nvCxnSpPr>
+            <p:cNvPr id="9" name="Straight Arrow Connector 8"/>
+            <p:cNvCxnSpPr/>
+            <p:nvPr/>
+          </p:nvCxnSpPr>
+          <p:spPr>
+            <a:xfrm>
+              <a:off x="2491718" y="3406852"/>
+              <a:ext cx="8037" cy="442063"/>
+            </a:xfrm>
+            <a:prstGeom prst="straightConnector1">
+              <a:avLst/>
+            </a:prstGeom>
+            <a:ln>
+              <a:tailEnd type="arrow"/>
+            </a:ln>
+          </p:spPr>
+          <p:style>
+            <a:lnRef idx="2">
+              <a:schemeClr val="accent1"/>
+            </a:lnRef>
+            <a:fillRef idx="0">
+              <a:schemeClr val="accent1"/>
+            </a:fillRef>
+            <a:effectRef idx="1">
+              <a:schemeClr val="accent1"/>
+            </a:effectRef>
+            <a:fontRef idx="minor">
+              <a:schemeClr val="tx1"/>
+            </a:fontRef>
+          </p:style>
+        </p:cxnSp>
+        <p:cxnSp>
+          <p:nvCxnSpPr>
+            <p:cNvPr id="11" name="Straight Arrow Connector 10"/>
+            <p:cNvCxnSpPr/>
+            <p:nvPr/>
+          </p:nvCxnSpPr>
+          <p:spPr>
+            <a:xfrm>
+              <a:off x="3019058" y="3406852"/>
+              <a:ext cx="0" cy="442063"/>
+            </a:xfrm>
+            <a:prstGeom prst="straightConnector1">
+              <a:avLst/>
+            </a:prstGeom>
+            <a:ln>
+              <a:tailEnd type="arrow"/>
+            </a:ln>
+          </p:spPr>
+          <p:style>
+            <a:lnRef idx="2">
+              <a:schemeClr val="accent1"/>
+            </a:lnRef>
+            <a:fillRef idx="0">
+              <a:schemeClr val="accent1"/>
+            </a:fillRef>
+            <a:effectRef idx="1">
+              <a:schemeClr val="accent1"/>
+            </a:effectRef>
+            <a:fontRef idx="minor">
+              <a:schemeClr val="tx1"/>
+            </a:fontRef>
+          </p:style>
+        </p:cxnSp>
+        <p:grpSp>
+          <p:nvGrpSpPr>
+            <p:cNvPr id="25" name="Group 24"/>
+            <p:cNvGrpSpPr/>
+            <p:nvPr/>
+          </p:nvGrpSpPr>
+          <p:grpSpPr>
+            <a:xfrm>
+              <a:off x="634986" y="3766200"/>
+              <a:ext cx="7651984" cy="309989"/>
+              <a:chOff x="634986" y="3766200"/>
+              <a:chExt cx="7651984" cy="309989"/>
+            </a:xfrm>
+          </p:grpSpPr>
+          <p:cxnSp>
+            <p:nvCxnSpPr>
+              <p:cNvPr id="5" name="Straight Connector 4"/>
+              <p:cNvCxnSpPr/>
+              <p:nvPr/>
+            </p:nvCxnSpPr>
+            <p:spPr>
+              <a:xfrm flipV="1">
+                <a:off x="634986" y="3882115"/>
+                <a:ext cx="7651984" cy="40186"/>
+              </a:xfrm>
+              <a:prstGeom prst="line">
+                <a:avLst/>
+              </a:prstGeom>
+              <a:ln>
+                <a:solidFill>
+                  <a:schemeClr val="accent6">
+                    <a:lumMod val="75000"/>
+                  </a:schemeClr>
+                </a:solidFill>
+              </a:ln>
+              <a:effectLst/>
+            </p:spPr>
+            <p:style>
+              <a:lnRef idx="2">
+                <a:schemeClr val="accent1"/>
+              </a:lnRef>
+              <a:fillRef idx="0">
+                <a:schemeClr val="accent1"/>
+              </a:fillRef>
+              <a:effectRef idx="1">
+                <a:schemeClr val="accent1"/>
+              </a:effectRef>
+              <a:fontRef idx="minor">
+                <a:schemeClr val="tx1"/>
+              </a:fontRef>
+            </p:style>
+          </p:cxnSp>
+          <p:sp>
+            <p:nvSpPr>
+              <p:cNvPr id="20" name="Rectangle 19"/>
+              <p:cNvSpPr/>
+              <p:nvPr/>
+            </p:nvSpPr>
+            <p:spPr>
+              <a:xfrm>
+                <a:off x="3009192" y="3827968"/>
+                <a:ext cx="5277778" cy="166063"/>
+              </a:xfrm>
+              <a:prstGeom prst="rect">
+                <a:avLst/>
+              </a:prstGeom>
+              <a:solidFill>
+                <a:schemeClr val="accent6"/>
+              </a:solidFill>
+              <a:ln>
+                <a:noFill/>
+              </a:ln>
+            </p:spPr>
+            <p:style>
+              <a:lnRef idx="1">
+                <a:schemeClr val="accent1"/>
+              </a:lnRef>
+              <a:fillRef idx="3">
+                <a:schemeClr val="accent1"/>
+              </a:fillRef>
+              <a:effectRef idx="2">
+                <a:schemeClr val="accent1"/>
+              </a:effectRef>
+              <a:fontRef idx="minor">
+                <a:schemeClr val="lt1"/>
+              </a:fontRef>
+            </p:style>
+            <p:txBody>
+              <a:bodyPr rtlCol="0" anchor="ctr"/>
+              <a:lstStyle/>
+              <a:p>
+                <a:pPr algn="ctr"/>
+                <a:endParaRPr lang="en-US"/>
+              </a:p>
+            </p:txBody>
+          </p:sp>
+          <p:sp>
+            <p:nvSpPr>
+              <p:cNvPr id="21" name="Rectangle 20"/>
+              <p:cNvSpPr/>
+              <p:nvPr/>
+            </p:nvSpPr>
+            <p:spPr>
+              <a:xfrm>
+                <a:off x="634986" y="3842270"/>
+                <a:ext cx="1856732" cy="160061"/>
+              </a:xfrm>
+              <a:prstGeom prst="rect">
+                <a:avLst/>
+              </a:prstGeom>
+              <a:ln>
+                <a:noFill/>
+              </a:ln>
+            </p:spPr>
+            <p:style>
+              <a:lnRef idx="1">
+                <a:schemeClr val="accent1"/>
+              </a:lnRef>
+              <a:fillRef idx="3">
+                <a:schemeClr val="accent1"/>
+              </a:fillRef>
+              <a:effectRef idx="2">
+                <a:schemeClr val="accent1"/>
+              </a:effectRef>
+              <a:fontRef idx="minor">
+                <a:schemeClr val="lt1"/>
+              </a:fontRef>
+            </p:style>
+            <p:txBody>
+              <a:bodyPr rtlCol="0" anchor="ctr"/>
+              <a:lstStyle/>
+              <a:p>
+                <a:pPr algn="ctr"/>
+                <a:endParaRPr lang="en-US"/>
+              </a:p>
+            </p:txBody>
+          </p:sp>
+          <p:sp>
+            <p:nvSpPr>
+              <p:cNvPr id="22" name="Rectangle 21"/>
+              <p:cNvSpPr/>
+              <p:nvPr/>
+            </p:nvSpPr>
+            <p:spPr>
+              <a:xfrm>
+                <a:off x="2486418" y="3836270"/>
+                <a:ext cx="522774" cy="152431"/>
+              </a:xfrm>
+              <a:prstGeom prst="rect">
+                <a:avLst/>
+              </a:prstGeom>
+              <a:solidFill>
+                <a:schemeClr val="accent3"/>
+              </a:solidFill>
+              <a:ln>
+                <a:noFill/>
+              </a:ln>
+            </p:spPr>
+            <p:style>
+              <a:lnRef idx="1">
+                <a:schemeClr val="accent1"/>
+              </a:lnRef>
+              <a:fillRef idx="3">
+                <a:schemeClr val="accent1"/>
+              </a:fillRef>
+              <a:effectRef idx="2">
+                <a:schemeClr val="accent1"/>
+              </a:effectRef>
+              <a:fontRef idx="minor">
+                <a:schemeClr val="lt1"/>
+              </a:fontRef>
+            </p:style>
+            <p:txBody>
+              <a:bodyPr rtlCol="0" anchor="ctr"/>
+              <a:lstStyle/>
+              <a:p>
+                <a:pPr algn="ctr"/>
+                <a:endParaRPr lang="en-US"/>
+              </a:p>
+            </p:txBody>
+          </p:sp>
+          <p:sp>
+            <p:nvSpPr>
+              <p:cNvPr id="6" name="TextBox 5"/>
+              <p:cNvSpPr txBox="1"/>
+              <p:nvPr/>
+            </p:nvSpPr>
+            <p:spPr>
+              <a:xfrm>
+                <a:off x="5287396" y="3768412"/>
+                <a:ext cx="771944" cy="307777"/>
+              </a:xfrm>
+              <a:prstGeom prst="rect">
+                <a:avLst/>
+              </a:prstGeom>
+              <a:noFill/>
+            </p:spPr>
+            <p:txBody>
+              <a:bodyPr wrap="square" rtlCol="0">
+                <a:spAutoFit/>
+              </a:bodyPr>
+              <a:lstStyle/>
+              <a:p>
+                <a:r>
+                  <a:rPr lang="en-US" sz="1400" dirty="0" smtClean="0"/>
+                  <a:t>HFD</a:t>
+                </a:r>
+                <a:endParaRPr lang="en-US" sz="1400" dirty="0"/>
+              </a:p>
+            </p:txBody>
+          </p:sp>
+          <p:sp>
+            <p:nvSpPr>
+              <p:cNvPr id="23" name="TextBox 22"/>
+              <p:cNvSpPr txBox="1"/>
+              <p:nvPr/>
+            </p:nvSpPr>
+            <p:spPr>
+              <a:xfrm>
+                <a:off x="1221269" y="3766200"/>
+                <a:ext cx="771944" cy="307777"/>
+              </a:xfrm>
+              <a:prstGeom prst="rect">
+                <a:avLst/>
+              </a:prstGeom>
+              <a:noFill/>
+            </p:spPr>
+            <p:txBody>
+              <a:bodyPr wrap="square" rtlCol="0">
+                <a:spAutoFit/>
+              </a:bodyPr>
+              <a:lstStyle/>
+              <a:p>
+                <a:r>
+                  <a:rPr lang="en-US" sz="1400" dirty="0" smtClean="0"/>
+                  <a:t>NCD</a:t>
+                </a:r>
+                <a:endParaRPr lang="en-US" sz="1400" dirty="0"/>
+              </a:p>
+            </p:txBody>
+          </p:sp>
+          <p:sp>
+            <p:nvSpPr>
+              <p:cNvPr id="24" name="TextBox 23"/>
+              <p:cNvSpPr txBox="1"/>
+              <p:nvPr/>
+            </p:nvSpPr>
+            <p:spPr>
+              <a:xfrm>
+                <a:off x="2505848" y="3766200"/>
+                <a:ext cx="636294" cy="307777"/>
+              </a:xfrm>
+              <a:prstGeom prst="rect">
+                <a:avLst/>
+              </a:prstGeom>
+              <a:noFill/>
+            </p:spPr>
+            <p:txBody>
+              <a:bodyPr wrap="square" rtlCol="0">
+                <a:spAutoFit/>
+              </a:bodyPr>
+              <a:lstStyle/>
+              <a:p>
+                <a:r>
+                  <a:rPr lang="en-US" sz="1400" dirty="0" smtClean="0"/>
+                  <a:t>FAST</a:t>
+                </a:r>
+                <a:endParaRPr lang="en-US" sz="1400" dirty="0"/>
+              </a:p>
+            </p:txBody>
+          </p:sp>
+        </p:grpSp>
+      </p:grpSp>
+      <p:grpSp>
+        <p:nvGrpSpPr>
+          <p:cNvPr id="27" name="Group 26"/>
+          <p:cNvGrpSpPr/>
           <p:nvPr/>
-        </p:nvSpPr>
-        <p:spPr>
+        </p:nvGrpSpPr>
+        <p:grpSpPr>
           <a:xfrm>
-            <a:off x="224740" y="5716645"/>
-            <a:ext cx="1382501" cy="369332"/>
+            <a:off x="636785" y="5648722"/>
+            <a:ext cx="7651984" cy="669337"/>
+            <a:chOff x="634986" y="3406852"/>
+            <a:chExt cx="7651984" cy="669337"/>
           </a:xfrm>
-          <a:prstGeom prst="rect">
-            <a:avLst/>
-          </a:prstGeom>
-          <a:noFill/>
-        </p:spPr>
-        <p:txBody>
-          <a:bodyPr wrap="square" rtlCol="0">
-            <a:spAutoFit/>
-          </a:bodyPr>
-          <a:lstStyle/>
-          <a:p>
-            <a:r>
-              <a:rPr lang="en-US" dirty="0" smtClean="0"/>
-              <a:t>11/26/2014</a:t>
-            </a:r>
-            <a:endParaRPr lang="en-US" dirty="0"/>
-          </a:p>
-        </p:txBody>
-      </p:sp>
-      <p:cxnSp>
-        <p:nvCxnSpPr>
-          <p:cNvPr id="15" name="Straight Arrow Connector 14"/>
-          <p:cNvCxnSpPr/>
-          <p:nvPr/>
-        </p:nvCxnSpPr>
-        <p:spPr>
-          <a:xfrm>
-            <a:off x="2644118" y="5643914"/>
-            <a:ext cx="8037" cy="442063"/>
-          </a:xfrm>
-          <a:prstGeom prst="straightConnector1">
-            <a:avLst/>
-          </a:prstGeom>
-          <a:ln>
-            <a:tailEnd type="arrow"/>
-          </a:ln>
-        </p:spPr>
-        <p:style>
-          <a:lnRef idx="2">
-            <a:schemeClr val="accent1"/>
-          </a:lnRef>
-          <a:fillRef idx="0">
-            <a:schemeClr val="accent1"/>
-          </a:fillRef>
-          <a:effectRef idx="1">
-            <a:schemeClr val="accent1"/>
-          </a:effectRef>
-          <a:fontRef idx="minor">
-            <a:schemeClr val="tx1"/>
-          </a:fontRef>
-        </p:style>
-      </p:cxnSp>
-      <p:cxnSp>
-        <p:nvCxnSpPr>
-          <p:cNvPr id="16" name="Straight Arrow Connector 15"/>
-          <p:cNvCxnSpPr/>
-          <p:nvPr/>
-        </p:nvCxnSpPr>
-        <p:spPr>
-          <a:xfrm>
-            <a:off x="3319292" y="5643914"/>
-            <a:ext cx="0" cy="442063"/>
-          </a:xfrm>
-          <a:prstGeom prst="straightConnector1">
-            <a:avLst/>
-          </a:prstGeom>
-          <a:ln>
-            <a:tailEnd type="arrow"/>
-          </a:ln>
-        </p:spPr>
-        <p:style>
-          <a:lnRef idx="2">
-            <a:schemeClr val="accent1"/>
-          </a:lnRef>
-          <a:fillRef idx="0">
-            <a:schemeClr val="accent1"/>
-          </a:fillRef>
-          <a:effectRef idx="1">
-            <a:schemeClr val="accent1"/>
-          </a:effectRef>
-          <a:fontRef idx="minor">
-            <a:schemeClr val="tx1"/>
-          </a:fontRef>
-        </p:style>
-      </p:cxnSp>
-      <p:sp>
-        <p:nvSpPr>
-          <p:cNvPr id="17" name="TextBox 16"/>
-          <p:cNvSpPr txBox="1"/>
-          <p:nvPr/>
-        </p:nvSpPr>
-        <p:spPr>
-          <a:xfrm>
-            <a:off x="1759641" y="6126163"/>
-            <a:ext cx="1382501" cy="369332"/>
-          </a:xfrm>
-          <a:prstGeom prst="rect">
-            <a:avLst/>
-          </a:prstGeom>
-          <a:noFill/>
-        </p:spPr>
-        <p:txBody>
-          <a:bodyPr wrap="square" rtlCol="0">
-            <a:spAutoFit/>
-          </a:bodyPr>
-          <a:lstStyle/>
-          <a:p>
-            <a:r>
-              <a:rPr lang="en-US" dirty="0" smtClean="0"/>
-              <a:t>12/01/2014</a:t>
-            </a:r>
-            <a:endParaRPr lang="en-US" dirty="0"/>
-          </a:p>
-        </p:txBody>
-      </p:sp>
-      <p:sp>
-        <p:nvSpPr>
-          <p:cNvPr id="18" name="TextBox 17"/>
-          <p:cNvSpPr txBox="1"/>
-          <p:nvPr/>
-        </p:nvSpPr>
-        <p:spPr>
-          <a:xfrm>
-            <a:off x="3142142" y="6126163"/>
-            <a:ext cx="1382501" cy="369332"/>
-          </a:xfrm>
-          <a:prstGeom prst="rect">
-            <a:avLst/>
-          </a:prstGeom>
-          <a:noFill/>
-        </p:spPr>
-        <p:txBody>
-          <a:bodyPr wrap="square" rtlCol="0">
-            <a:spAutoFit/>
-          </a:bodyPr>
-          <a:lstStyle/>
-          <a:p>
-            <a:r>
-              <a:rPr lang="en-US" dirty="0" smtClean="0"/>
-              <a:t>12/02/2014</a:t>
-            </a:r>
-            <a:endParaRPr lang="en-US" dirty="0"/>
-          </a:p>
-        </p:txBody>
-      </p:sp>
-      <p:sp>
-        <p:nvSpPr>
-          <p:cNvPr id="19" name="TextBox 18"/>
-          <p:cNvSpPr txBox="1"/>
-          <p:nvPr/>
-        </p:nvSpPr>
-        <p:spPr>
-          <a:xfrm>
-            <a:off x="7554894" y="5643914"/>
-            <a:ext cx="1382501" cy="369332"/>
-          </a:xfrm>
-          <a:prstGeom prst="rect">
-            <a:avLst/>
-          </a:prstGeom>
-          <a:noFill/>
-        </p:spPr>
-        <p:txBody>
-          <a:bodyPr wrap="square" rtlCol="0">
-            <a:spAutoFit/>
-          </a:bodyPr>
-          <a:lstStyle/>
-          <a:p>
-            <a:r>
-              <a:rPr lang="en-US" dirty="0" smtClean="0"/>
-              <a:t>2/24/2015</a:t>
-            </a:r>
-            <a:endParaRPr lang="en-US" dirty="0"/>
-          </a:p>
-        </p:txBody>
-      </p:sp>
+        </p:grpSpPr>
+        <p:cxnSp>
+          <p:nvCxnSpPr>
+            <p:cNvPr id="29" name="Straight Arrow Connector 28"/>
+            <p:cNvCxnSpPr/>
+            <p:nvPr/>
+          </p:nvCxnSpPr>
+          <p:spPr>
+            <a:xfrm>
+              <a:off x="3019058" y="3406852"/>
+              <a:ext cx="0" cy="442063"/>
+            </a:xfrm>
+            <a:prstGeom prst="straightConnector1">
+              <a:avLst/>
+            </a:prstGeom>
+            <a:ln>
+              <a:tailEnd type="arrow"/>
+            </a:ln>
+          </p:spPr>
+          <p:style>
+            <a:lnRef idx="2">
+              <a:schemeClr val="accent1"/>
+            </a:lnRef>
+            <a:fillRef idx="0">
+              <a:schemeClr val="accent1"/>
+            </a:fillRef>
+            <a:effectRef idx="1">
+              <a:schemeClr val="accent1"/>
+            </a:effectRef>
+            <a:fontRef idx="minor">
+              <a:schemeClr val="tx1"/>
+            </a:fontRef>
+          </p:style>
+        </p:cxnSp>
+        <p:grpSp>
+          <p:nvGrpSpPr>
+            <p:cNvPr id="30" name="Group 29"/>
+            <p:cNvGrpSpPr/>
+            <p:nvPr/>
+          </p:nvGrpSpPr>
+          <p:grpSpPr>
+            <a:xfrm>
+              <a:off x="634986" y="3766200"/>
+              <a:ext cx="7651984" cy="309989"/>
+              <a:chOff x="634986" y="3766200"/>
+              <a:chExt cx="7651984" cy="309989"/>
+            </a:xfrm>
+          </p:grpSpPr>
+          <p:cxnSp>
+            <p:nvCxnSpPr>
+              <p:cNvPr id="31" name="Straight Connector 30"/>
+              <p:cNvCxnSpPr/>
+              <p:nvPr/>
+            </p:nvCxnSpPr>
+            <p:spPr>
+              <a:xfrm flipV="1">
+                <a:off x="634986" y="3882115"/>
+                <a:ext cx="7651984" cy="40186"/>
+              </a:xfrm>
+              <a:prstGeom prst="line">
+                <a:avLst/>
+              </a:prstGeom>
+              <a:ln>
+                <a:solidFill>
+                  <a:schemeClr val="accent6">
+                    <a:lumMod val="75000"/>
+                  </a:schemeClr>
+                </a:solidFill>
+              </a:ln>
+              <a:effectLst/>
+            </p:spPr>
+            <p:style>
+              <a:lnRef idx="2">
+                <a:schemeClr val="accent1"/>
+              </a:lnRef>
+              <a:fillRef idx="0">
+                <a:schemeClr val="accent1"/>
+              </a:fillRef>
+              <a:effectRef idx="1">
+                <a:schemeClr val="accent1"/>
+              </a:effectRef>
+              <a:fontRef idx="minor">
+                <a:schemeClr val="tx1"/>
+              </a:fontRef>
+            </p:style>
+          </p:cxnSp>
+          <p:sp>
+            <p:nvSpPr>
+              <p:cNvPr id="32" name="Rectangle 31"/>
+              <p:cNvSpPr/>
+              <p:nvPr/>
+            </p:nvSpPr>
+            <p:spPr>
+              <a:xfrm>
+                <a:off x="3009192" y="3827968"/>
+                <a:ext cx="5277778" cy="166063"/>
+              </a:xfrm>
+              <a:prstGeom prst="rect">
+                <a:avLst/>
+              </a:prstGeom>
+              <a:solidFill>
+                <a:schemeClr val="accent6"/>
+              </a:solidFill>
+              <a:ln>
+                <a:noFill/>
+              </a:ln>
+            </p:spPr>
+            <p:style>
+              <a:lnRef idx="1">
+                <a:schemeClr val="accent1"/>
+              </a:lnRef>
+              <a:fillRef idx="3">
+                <a:schemeClr val="accent1"/>
+              </a:fillRef>
+              <a:effectRef idx="2">
+                <a:schemeClr val="accent1"/>
+              </a:effectRef>
+              <a:fontRef idx="minor">
+                <a:schemeClr val="lt1"/>
+              </a:fontRef>
+            </p:style>
+            <p:txBody>
+              <a:bodyPr rtlCol="0" anchor="ctr"/>
+              <a:lstStyle/>
+              <a:p>
+                <a:pPr algn="ctr"/>
+                <a:endParaRPr lang="en-US"/>
+              </a:p>
+            </p:txBody>
+          </p:sp>
+          <p:sp>
+            <p:nvSpPr>
+              <p:cNvPr id="33" name="Rectangle 32"/>
+              <p:cNvSpPr/>
+              <p:nvPr/>
+            </p:nvSpPr>
+            <p:spPr>
+              <a:xfrm>
+                <a:off x="634986" y="3842270"/>
+                <a:ext cx="1856732" cy="160061"/>
+              </a:xfrm>
+              <a:prstGeom prst="rect">
+                <a:avLst/>
+              </a:prstGeom>
+              <a:ln>
+                <a:noFill/>
+              </a:ln>
+            </p:spPr>
+            <p:style>
+              <a:lnRef idx="1">
+                <a:schemeClr val="accent1"/>
+              </a:lnRef>
+              <a:fillRef idx="3">
+                <a:schemeClr val="accent1"/>
+              </a:fillRef>
+              <a:effectRef idx="2">
+                <a:schemeClr val="accent1"/>
+              </a:effectRef>
+              <a:fontRef idx="minor">
+                <a:schemeClr val="lt1"/>
+              </a:fontRef>
+            </p:style>
+            <p:txBody>
+              <a:bodyPr rtlCol="0" anchor="ctr"/>
+              <a:lstStyle/>
+              <a:p>
+                <a:pPr algn="ctr"/>
+                <a:endParaRPr lang="en-US"/>
+              </a:p>
+            </p:txBody>
+          </p:sp>
+          <p:sp>
+            <p:nvSpPr>
+              <p:cNvPr id="34" name="Rectangle 33"/>
+              <p:cNvSpPr/>
+              <p:nvPr/>
+            </p:nvSpPr>
+            <p:spPr>
+              <a:xfrm>
+                <a:off x="2486418" y="3836270"/>
+                <a:ext cx="522774" cy="152431"/>
+              </a:xfrm>
+              <a:prstGeom prst="rect">
+                <a:avLst/>
+              </a:prstGeom>
+              <a:solidFill>
+                <a:schemeClr val="accent3"/>
+              </a:solidFill>
+              <a:ln>
+                <a:noFill/>
+              </a:ln>
+            </p:spPr>
+            <p:style>
+              <a:lnRef idx="1">
+                <a:schemeClr val="accent1"/>
+              </a:lnRef>
+              <a:fillRef idx="3">
+                <a:schemeClr val="accent1"/>
+              </a:fillRef>
+              <a:effectRef idx="2">
+                <a:schemeClr val="accent1"/>
+              </a:effectRef>
+              <a:fontRef idx="minor">
+                <a:schemeClr val="lt1"/>
+              </a:fontRef>
+            </p:style>
+            <p:txBody>
+              <a:bodyPr rtlCol="0" anchor="ctr"/>
+              <a:lstStyle/>
+              <a:p>
+                <a:pPr algn="ctr"/>
+                <a:endParaRPr lang="en-US"/>
+              </a:p>
+            </p:txBody>
+          </p:sp>
+          <p:sp>
+            <p:nvSpPr>
+              <p:cNvPr id="35" name="TextBox 34"/>
+              <p:cNvSpPr txBox="1"/>
+              <p:nvPr/>
+            </p:nvSpPr>
+            <p:spPr>
+              <a:xfrm>
+                <a:off x="5287396" y="3768412"/>
+                <a:ext cx="771944" cy="307777"/>
+              </a:xfrm>
+              <a:prstGeom prst="rect">
+                <a:avLst/>
+              </a:prstGeom>
+              <a:noFill/>
+            </p:spPr>
+            <p:txBody>
+              <a:bodyPr wrap="square" rtlCol="0">
+                <a:spAutoFit/>
+              </a:bodyPr>
+              <a:lstStyle/>
+              <a:p>
+                <a:r>
+                  <a:rPr lang="en-US" sz="1400" dirty="0" smtClean="0"/>
+                  <a:t>HFD</a:t>
+                </a:r>
+                <a:endParaRPr lang="en-US" sz="1400" dirty="0"/>
+              </a:p>
+            </p:txBody>
+          </p:sp>
+          <p:sp>
+            <p:nvSpPr>
+              <p:cNvPr id="36" name="TextBox 35"/>
+              <p:cNvSpPr txBox="1"/>
+              <p:nvPr/>
+            </p:nvSpPr>
+            <p:spPr>
+              <a:xfrm>
+                <a:off x="1221269" y="3766200"/>
+                <a:ext cx="771944" cy="307777"/>
+              </a:xfrm>
+              <a:prstGeom prst="rect">
+                <a:avLst/>
+              </a:prstGeom>
+              <a:noFill/>
+            </p:spPr>
+            <p:txBody>
+              <a:bodyPr wrap="square" rtlCol="0">
+                <a:spAutoFit/>
+              </a:bodyPr>
+              <a:lstStyle/>
+              <a:p>
+                <a:r>
+                  <a:rPr lang="en-US" sz="1400" dirty="0" smtClean="0"/>
+                  <a:t>NCD</a:t>
+                </a:r>
+                <a:endParaRPr lang="en-US" sz="1400" dirty="0"/>
+              </a:p>
+            </p:txBody>
+          </p:sp>
+          <p:sp>
+            <p:nvSpPr>
+              <p:cNvPr id="37" name="TextBox 36"/>
+              <p:cNvSpPr txBox="1"/>
+              <p:nvPr/>
+            </p:nvSpPr>
+            <p:spPr>
+              <a:xfrm>
+                <a:off x="2505848" y="3766200"/>
+                <a:ext cx="636294" cy="307777"/>
+              </a:xfrm>
+              <a:prstGeom prst="rect">
+                <a:avLst/>
+              </a:prstGeom>
+              <a:noFill/>
+            </p:spPr>
+            <p:txBody>
+              <a:bodyPr wrap="square" rtlCol="0">
+                <a:spAutoFit/>
+              </a:bodyPr>
+              <a:lstStyle/>
+              <a:p>
+                <a:r>
+                  <a:rPr lang="en-US" sz="1400" dirty="0" smtClean="0"/>
+                  <a:t>FAST</a:t>
+                </a:r>
+                <a:endParaRPr lang="en-US" sz="1400" dirty="0"/>
+              </a:p>
+            </p:txBody>
+          </p:sp>
+        </p:grpSp>
+      </p:grpSp>
     </p:spTree>
     <p:extLst>
       <p:ext uri="{BB962C8B-B14F-4D97-AF65-F5344CB8AC3E}">
@@ -4433,6 +5001,533 @@
 </file>
 
 <file path=ppt/slides/slide4.xml><?xml version="1.0" encoding="utf-8"?>
+<p:sld xmlns:a="http://schemas.openxmlformats.org/drawingml/2006/main" xmlns:r="http://schemas.openxmlformats.org/officeDocument/2006/relationships" xmlns:p="http://schemas.openxmlformats.org/presentationml/2006/main">
+  <p:cSld>
+    <p:spTree>
+      <p:nvGrpSpPr>
+        <p:cNvPr id="1" name=""/>
+        <p:cNvGrpSpPr/>
+        <p:nvPr/>
+      </p:nvGrpSpPr>
+      <p:grpSpPr>
+        <a:xfrm>
+          <a:off x="0" y="0"/>
+          <a:ext cx="0" cy="0"/>
+          <a:chOff x="0" y="0"/>
+          <a:chExt cx="0" cy="0"/>
+        </a:xfrm>
+      </p:grpSpPr>
+      <p:sp>
+        <p:nvSpPr>
+          <p:cNvPr id="2" name="Title 1"/>
+          <p:cNvSpPr>
+            <a:spLocks noGrp="1"/>
+          </p:cNvSpPr>
+          <p:nvPr>
+            <p:ph type="title"/>
+          </p:nvPr>
+        </p:nvSpPr>
+        <p:spPr/>
+        <p:txBody>
+          <a:bodyPr/>
+          <a:lstStyle/>
+          <a:p>
+            <a:r>
+              <a:rPr lang="en-US" dirty="0" smtClean="0"/>
+              <a:t>Data summary</a:t>
+            </a:r>
+            <a:endParaRPr lang="en-US" dirty="0"/>
+          </a:p>
+        </p:txBody>
+      </p:sp>
+      <p:graphicFrame>
+        <p:nvGraphicFramePr>
+          <p:cNvPr id="4" name="Content Placeholder 3"/>
+          <p:cNvGraphicFramePr>
+            <a:graphicFrameLocks noGrp="1"/>
+          </p:cNvGraphicFramePr>
+          <p:nvPr>
+            <p:ph idx="1"/>
+            <p:extLst>
+              <p:ext uri="{D42A27DB-BD31-4B8C-83A1-F6EECF244321}">
+                <p14:modId xmlns:p14="http://schemas.microsoft.com/office/powerpoint/2010/main" val="3049408623"/>
+              </p:ext>
+            </p:extLst>
+          </p:nvPr>
+        </p:nvGraphicFramePr>
+        <p:xfrm>
+          <a:off x="1100666" y="2590800"/>
+          <a:ext cx="7053942" cy="2123440"/>
+        </p:xfrm>
+        <a:graphic>
+          <a:graphicData uri="http://schemas.openxmlformats.org/drawingml/2006/table">
+            <a:tbl>
+              <a:tblPr firstRow="1" bandRow="1">
+                <a:tableStyleId>{5C22544A-7EE6-4342-B048-85BDC9FD1C3A}</a:tableStyleId>
+              </a:tblPr>
+              <a:tblGrid>
+                <a:gridCol w="1175657"/>
+                <a:gridCol w="1175657"/>
+                <a:gridCol w="1175657"/>
+                <a:gridCol w="1175657"/>
+                <a:gridCol w="1175657"/>
+                <a:gridCol w="1175657"/>
+              </a:tblGrid>
+              <a:tr h="370840">
+                <a:tc>
+                  <a:txBody>
+                    <a:bodyPr/>
+                    <a:lstStyle/>
+                    <a:p>
+                      <a:r>
+                        <a:rPr lang="en-US" dirty="0" smtClean="0"/>
+                        <a:t>Cohort</a:t>
+                      </a:r>
+                      <a:endParaRPr lang="en-US" dirty="0"/>
+                    </a:p>
+                  </a:txBody>
+                  <a:tcPr/>
+                </a:tc>
+                <a:tc>
+                  <a:txBody>
+                    <a:bodyPr/>
+                    <a:lstStyle/>
+                    <a:p>
+                      <a:r>
+                        <a:rPr lang="en-US" dirty="0" smtClean="0"/>
+                        <a:t>Body</a:t>
+                      </a:r>
+                      <a:r>
+                        <a:rPr lang="en-US" baseline="0" dirty="0" smtClean="0"/>
+                        <a:t> Weight</a:t>
+                      </a:r>
+                      <a:endParaRPr lang="en-US" dirty="0"/>
+                    </a:p>
+                  </a:txBody>
+                  <a:tcPr/>
+                </a:tc>
+                <a:tc>
+                  <a:txBody>
+                    <a:bodyPr/>
+                    <a:lstStyle/>
+                    <a:p>
+                      <a:r>
+                        <a:rPr lang="en-US" dirty="0" smtClean="0"/>
+                        <a:t>Lean</a:t>
+                      </a:r>
+                      <a:r>
+                        <a:rPr lang="en-US" baseline="0" dirty="0" smtClean="0"/>
+                        <a:t> &amp; Fat Mass</a:t>
+                      </a:r>
+                      <a:endParaRPr lang="en-US" dirty="0"/>
+                    </a:p>
+                  </a:txBody>
+                  <a:tcPr/>
+                </a:tc>
+                <a:tc>
+                  <a:txBody>
+                    <a:bodyPr/>
+                    <a:lstStyle/>
+                    <a:p>
+                      <a:r>
+                        <a:rPr lang="en-US" dirty="0" smtClean="0"/>
+                        <a:t>CLAMS</a:t>
+                      </a:r>
+                      <a:endParaRPr lang="en-US" dirty="0"/>
+                    </a:p>
+                  </a:txBody>
+                  <a:tcPr/>
+                </a:tc>
+                <a:tc>
+                  <a:txBody>
+                    <a:bodyPr/>
+                    <a:lstStyle/>
+                    <a:p>
+                      <a:r>
+                        <a:rPr lang="en-US" dirty="0" smtClean="0"/>
+                        <a:t>Hormones</a:t>
+                      </a:r>
+                      <a:endParaRPr lang="en-US" dirty="0"/>
+                    </a:p>
+                  </a:txBody>
+                  <a:tcPr/>
+                </a:tc>
+                <a:tc>
+                  <a:txBody>
+                    <a:bodyPr/>
+                    <a:lstStyle/>
+                    <a:p>
+                      <a:r>
+                        <a:rPr lang="en-US" dirty="0" smtClean="0"/>
+                        <a:t>Glucose</a:t>
+                      </a:r>
+                      <a:endParaRPr lang="en-US" dirty="0"/>
+                    </a:p>
+                  </a:txBody>
+                  <a:tcPr/>
+                </a:tc>
+              </a:tr>
+              <a:tr h="370840">
+                <a:tc>
+                  <a:txBody>
+                    <a:bodyPr/>
+                    <a:lstStyle/>
+                    <a:p>
+                      <a:r>
+                        <a:rPr lang="en-US" dirty="0" smtClean="0"/>
+                        <a:t>5</a:t>
+                      </a:r>
+                      <a:endParaRPr lang="en-US" dirty="0"/>
+                    </a:p>
+                  </a:txBody>
+                  <a:tcPr/>
+                </a:tc>
+                <a:tc>
+                  <a:txBody>
+                    <a:bodyPr/>
+                    <a:lstStyle/>
+                    <a:p>
+                      <a:r>
+                        <a:rPr lang="en-US" dirty="0" smtClean="0"/>
+                        <a:t>Yes</a:t>
+                      </a:r>
+                    </a:p>
+                  </a:txBody>
+                  <a:tcPr/>
+                </a:tc>
+                <a:tc>
+                  <a:txBody>
+                    <a:bodyPr/>
+                    <a:lstStyle/>
+                    <a:p>
+                      <a:r>
+                        <a:rPr lang="en-US" dirty="0" smtClean="0"/>
+                        <a:t>no</a:t>
+                      </a:r>
+                      <a:endParaRPr lang="en-US" dirty="0"/>
+                    </a:p>
+                  </a:txBody>
+                  <a:tcPr/>
+                </a:tc>
+                <a:tc>
+                  <a:txBody>
+                    <a:bodyPr/>
+                    <a:lstStyle/>
+                    <a:p>
+                      <a:r>
+                        <a:rPr lang="en-US" dirty="0" smtClean="0"/>
+                        <a:t>no</a:t>
+                      </a:r>
+                      <a:endParaRPr lang="en-US" dirty="0"/>
+                    </a:p>
+                  </a:txBody>
+                  <a:tcPr/>
+                </a:tc>
+                <a:tc>
+                  <a:txBody>
+                    <a:bodyPr/>
+                    <a:lstStyle/>
+                    <a:p>
+                      <a:r>
+                        <a:rPr lang="en-US" dirty="0" smtClean="0"/>
+                        <a:t>yes</a:t>
+                      </a:r>
+                      <a:endParaRPr lang="en-US" dirty="0"/>
+                    </a:p>
+                  </a:txBody>
+                  <a:tcPr/>
+                </a:tc>
+                <a:tc>
+                  <a:txBody>
+                    <a:bodyPr/>
+                    <a:lstStyle/>
+                    <a:p>
+                      <a:r>
+                        <a:rPr lang="en-US" dirty="0" smtClean="0"/>
+                        <a:t>yes</a:t>
+                      </a:r>
+                      <a:endParaRPr lang="en-US" dirty="0"/>
+                    </a:p>
+                  </a:txBody>
+                  <a:tcPr/>
+                </a:tc>
+              </a:tr>
+              <a:tr h="370840">
+                <a:tc>
+                  <a:txBody>
+                    <a:bodyPr/>
+                    <a:lstStyle/>
+                    <a:p>
+                      <a:r>
+                        <a:rPr lang="en-US" dirty="0" smtClean="0"/>
+                        <a:t>6</a:t>
+                      </a:r>
+                      <a:endParaRPr lang="en-US" dirty="0"/>
+                    </a:p>
+                  </a:txBody>
+                  <a:tcPr/>
+                </a:tc>
+                <a:tc>
+                  <a:txBody>
+                    <a:bodyPr/>
+                    <a:lstStyle/>
+                    <a:p>
+                      <a:r>
+                        <a:rPr lang="en-US" dirty="0" smtClean="0"/>
+                        <a:t>yes</a:t>
+                      </a:r>
+                      <a:endParaRPr lang="en-US" dirty="0"/>
+                    </a:p>
+                  </a:txBody>
+                  <a:tcPr/>
+                </a:tc>
+                <a:tc>
+                  <a:txBody>
+                    <a:bodyPr/>
+                    <a:lstStyle/>
+                    <a:p>
+                      <a:r>
+                        <a:rPr lang="en-US" dirty="0" smtClean="0"/>
+                        <a:t>no</a:t>
+                      </a:r>
+                      <a:endParaRPr lang="en-US" dirty="0"/>
+                    </a:p>
+                  </a:txBody>
+                  <a:tcPr/>
+                </a:tc>
+                <a:tc>
+                  <a:txBody>
+                    <a:bodyPr/>
+                    <a:lstStyle/>
+                    <a:p>
+                      <a:r>
+                        <a:rPr lang="en-US" dirty="0" smtClean="0"/>
+                        <a:t>no</a:t>
+                      </a:r>
+                      <a:endParaRPr lang="en-US" dirty="0"/>
+                    </a:p>
+                  </a:txBody>
+                  <a:tcPr/>
+                </a:tc>
+                <a:tc>
+                  <a:txBody>
+                    <a:bodyPr/>
+                    <a:lstStyle/>
+                    <a:p>
+                      <a:r>
+                        <a:rPr lang="en-US" dirty="0" smtClean="0"/>
+                        <a:t>Yes</a:t>
+                      </a:r>
+                      <a:endParaRPr lang="en-US" dirty="0"/>
+                    </a:p>
+                  </a:txBody>
+                  <a:tcPr/>
+                </a:tc>
+                <a:tc>
+                  <a:txBody>
+                    <a:bodyPr/>
+                    <a:lstStyle/>
+                    <a:p>
+                      <a:r>
+                        <a:rPr lang="en-US" dirty="0" smtClean="0"/>
+                        <a:t>yes</a:t>
+                      </a:r>
+                      <a:endParaRPr lang="en-US" dirty="0"/>
+                    </a:p>
+                  </a:txBody>
+                  <a:tcPr/>
+                </a:tc>
+              </a:tr>
+              <a:tr h="370840">
+                <a:tc>
+                  <a:txBody>
+                    <a:bodyPr/>
+                    <a:lstStyle/>
+                    <a:p>
+                      <a:r>
+                        <a:rPr lang="en-US" dirty="0" smtClean="0"/>
+                        <a:t>8</a:t>
+                      </a:r>
+                      <a:endParaRPr lang="en-US" dirty="0"/>
+                    </a:p>
+                  </a:txBody>
+                  <a:tcPr/>
+                </a:tc>
+                <a:tc>
+                  <a:txBody>
+                    <a:bodyPr/>
+                    <a:lstStyle/>
+                    <a:p>
+                      <a:r>
+                        <a:rPr lang="en-US" dirty="0" smtClean="0"/>
+                        <a:t>yes</a:t>
+                      </a:r>
+                      <a:endParaRPr lang="en-US" dirty="0"/>
+                    </a:p>
+                  </a:txBody>
+                  <a:tcPr/>
+                </a:tc>
+                <a:tc>
+                  <a:txBody>
+                    <a:bodyPr/>
+                    <a:lstStyle/>
+                    <a:p>
+                      <a:r>
+                        <a:rPr lang="en-US" dirty="0" smtClean="0"/>
+                        <a:t>yes</a:t>
+                      </a:r>
+                      <a:endParaRPr lang="en-US" dirty="0"/>
+                    </a:p>
+                  </a:txBody>
+                  <a:tcPr/>
+                </a:tc>
+                <a:tc>
+                  <a:txBody>
+                    <a:bodyPr/>
+                    <a:lstStyle/>
+                    <a:p>
+                      <a:r>
+                        <a:rPr lang="en-US" dirty="0" smtClean="0"/>
+                        <a:t>yes</a:t>
+                      </a:r>
+                      <a:endParaRPr lang="en-US" dirty="0"/>
+                    </a:p>
+                  </a:txBody>
+                  <a:tcPr/>
+                </a:tc>
+                <a:tc>
+                  <a:txBody>
+                    <a:bodyPr/>
+                    <a:lstStyle/>
+                    <a:p>
+                      <a:r>
+                        <a:rPr lang="en-US" dirty="0" smtClean="0"/>
+                        <a:t>Not yet</a:t>
+                      </a:r>
+                      <a:endParaRPr lang="en-US" dirty="0"/>
+                    </a:p>
+                  </a:txBody>
+                  <a:tcPr/>
+                </a:tc>
+                <a:tc>
+                  <a:txBody>
+                    <a:bodyPr/>
+                    <a:lstStyle/>
+                    <a:p>
+                      <a:r>
+                        <a:rPr lang="en-US" dirty="0" smtClean="0"/>
+                        <a:t>Not yet</a:t>
+                      </a:r>
+                      <a:endParaRPr lang="en-US" dirty="0"/>
+                    </a:p>
+                  </a:txBody>
+                  <a:tcPr/>
+                </a:tc>
+              </a:tr>
+              <a:tr h="370840">
+                <a:tc>
+                  <a:txBody>
+                    <a:bodyPr/>
+                    <a:lstStyle/>
+                    <a:p>
+                      <a:r>
+                        <a:rPr lang="en-US" dirty="0" smtClean="0"/>
+                        <a:t>9</a:t>
+                      </a:r>
+                      <a:endParaRPr lang="en-US" dirty="0"/>
+                    </a:p>
+                  </a:txBody>
+                  <a:tcPr/>
+                </a:tc>
+                <a:tc>
+                  <a:txBody>
+                    <a:bodyPr/>
+                    <a:lstStyle/>
+                    <a:p>
+                      <a:r>
+                        <a:rPr lang="en-US" dirty="0" smtClean="0"/>
+                        <a:t>yes</a:t>
+                      </a:r>
+                      <a:endParaRPr lang="en-US" dirty="0"/>
+                    </a:p>
+                  </a:txBody>
+                  <a:tcPr/>
+                </a:tc>
+                <a:tc>
+                  <a:txBody>
+                    <a:bodyPr/>
+                    <a:lstStyle/>
+                    <a:p>
+                      <a:r>
+                        <a:rPr lang="en-US" dirty="0" smtClean="0"/>
+                        <a:t>yes</a:t>
+                      </a:r>
+                      <a:endParaRPr lang="en-US" dirty="0"/>
+                    </a:p>
+                  </a:txBody>
+                  <a:tcPr/>
+                </a:tc>
+                <a:tc>
+                  <a:txBody>
+                    <a:bodyPr/>
+                    <a:lstStyle/>
+                    <a:p>
+                      <a:r>
+                        <a:rPr lang="en-US" dirty="0" smtClean="0"/>
+                        <a:t>yes</a:t>
+                      </a:r>
+                      <a:endParaRPr lang="en-US" dirty="0"/>
+                    </a:p>
+                  </a:txBody>
+                  <a:tcPr/>
+                </a:tc>
+                <a:tc>
+                  <a:txBody>
+                    <a:bodyPr/>
+                    <a:lstStyle/>
+                    <a:p>
+                      <a:r>
+                        <a:rPr lang="en-US" dirty="0" smtClean="0"/>
+                        <a:t>Not yet</a:t>
+                      </a:r>
+                      <a:endParaRPr lang="en-US" dirty="0"/>
+                    </a:p>
+                  </a:txBody>
+                  <a:tcPr/>
+                </a:tc>
+                <a:tc>
+                  <a:txBody>
+                    <a:bodyPr/>
+                    <a:lstStyle/>
+                    <a:p>
+                      <a:r>
+                        <a:rPr lang="en-US" dirty="0" smtClean="0"/>
+                        <a:t>Not yet</a:t>
+                      </a:r>
+                      <a:endParaRPr lang="en-US" dirty="0"/>
+                    </a:p>
+                  </a:txBody>
+                  <a:tcPr/>
+                </a:tc>
+              </a:tr>
+            </a:tbl>
+          </a:graphicData>
+        </a:graphic>
+      </p:graphicFrame>
+    </p:spTree>
+    <p:extLst>
+      <p:ext uri="{BB962C8B-B14F-4D97-AF65-F5344CB8AC3E}">
+        <p14:creationId xmlns:p14="http://schemas.microsoft.com/office/powerpoint/2010/main" val="3915301768"/>
+      </p:ext>
+    </p:extLst>
+  </p:cSld>
+  <p:clrMapOvr>
+    <a:masterClrMapping/>
+  </p:clrMapOvr>
+</p:sld>
+</file>
+
+<file path=ppt/slides/slide5.xml><?xml version="1.0" encoding="utf-8"?>
 <p:sld xmlns:a="http://schemas.openxmlformats.org/drawingml/2006/main" xmlns:r="http://schemas.openxmlformats.org/officeDocument/2006/relationships" xmlns:p="http://schemas.openxmlformats.org/presentationml/2006/main">
   <p:cSld>
     <p:spTree>
@@ -4486,7 +5581,7 @@
 </p:sld>
 </file>
 
-<file path=ppt/slides/slide5.xml><?xml version="1.0" encoding="utf-8"?>
+<file path=ppt/slides/slide6.xml><?xml version="1.0" encoding="utf-8"?>
 <p:sld xmlns:a="http://schemas.openxmlformats.org/drawingml/2006/main" xmlns:r="http://schemas.openxmlformats.org/officeDocument/2006/relationships" xmlns:p="http://schemas.openxmlformats.org/presentationml/2006/main">
   <p:cSld>
     <p:spTree>
@@ -4676,7 +5771,7 @@
 </p:sld>
 </file>
 
-<file path=ppt/slides/slide6.xml><?xml version="1.0" encoding="utf-8"?>
+<file path=ppt/slides/slide7.xml><?xml version="1.0" encoding="utf-8"?>
 <p:sld xmlns:a="http://schemas.openxmlformats.org/drawingml/2006/main" xmlns:r="http://schemas.openxmlformats.org/officeDocument/2006/relationships" xmlns:p="http://schemas.openxmlformats.org/presentationml/2006/main">
   <p:cSld>
     <p:spTree>
@@ -4730,7 +5825,7 @@
 </p:sld>
 </file>
 
-<file path=ppt/slides/slide7.xml><?xml version="1.0" encoding="utf-8"?>
+<file path=ppt/slides/slide8.xml><?xml version="1.0" encoding="utf-8"?>
 <p:sld xmlns:a="http://schemas.openxmlformats.org/drawingml/2006/main" xmlns:r="http://schemas.openxmlformats.org/officeDocument/2006/relationships" xmlns:p="http://schemas.openxmlformats.org/presentationml/2006/main">
   <p:cSld>
     <p:spTree>
@@ -4784,7 +5879,7 @@
 </p:sld>
 </file>
 
-<file path=ppt/slides/slide8.xml><?xml version="1.0" encoding="utf-8"?>
+<file path=ppt/slides/slide9.xml><?xml version="1.0" encoding="utf-8"?>
 <p:sld xmlns:a="http://schemas.openxmlformats.org/drawingml/2006/main" xmlns:r="http://schemas.openxmlformats.org/officeDocument/2006/relationships" xmlns:p="http://schemas.openxmlformats.org/presentationml/2006/main">
   <p:cSld>
     <p:spTree>
@@ -4848,79 +5943,6 @@
     <p:extLst>
       <p:ext uri="{BB962C8B-B14F-4D97-AF65-F5344CB8AC3E}">
         <p14:creationId xmlns:p14="http://schemas.microsoft.com/office/powerpoint/2010/main" val="2161139024"/>
-      </p:ext>
-    </p:extLst>
-  </p:cSld>
-  <p:clrMapOvr>
-    <a:masterClrMapping/>
-  </p:clrMapOvr>
-</p:sld>
-</file>
-
-<file path=ppt/slides/slide9.xml><?xml version="1.0" encoding="utf-8"?>
-<p:sld xmlns:a="http://schemas.openxmlformats.org/drawingml/2006/main" xmlns:r="http://schemas.openxmlformats.org/officeDocument/2006/relationships" xmlns:p="http://schemas.openxmlformats.org/presentationml/2006/main">
-  <p:cSld>
-    <p:spTree>
-      <p:nvGrpSpPr>
-        <p:cNvPr id="1" name=""/>
-        <p:cNvGrpSpPr/>
-        <p:nvPr/>
-      </p:nvGrpSpPr>
-      <p:grpSpPr>
-        <a:xfrm>
-          <a:off x="0" y="0"/>
-          <a:ext cx="0" cy="0"/>
-          <a:chOff x="0" y="0"/>
-          <a:chExt cx="0" cy="0"/>
-        </a:xfrm>
-      </p:grpSpPr>
-      <p:sp>
-        <p:nvSpPr>
-          <p:cNvPr id="4" name="Title 3"/>
-          <p:cNvSpPr>
-            <a:spLocks noGrp="1"/>
-          </p:cNvSpPr>
-          <p:nvPr>
-            <p:ph type="title"/>
-          </p:nvPr>
-        </p:nvSpPr>
-        <p:spPr/>
-        <p:txBody>
-          <a:bodyPr/>
-          <a:lstStyle/>
-          <a:p>
-            <a:endParaRPr lang="en-US"/>
-          </a:p>
-        </p:txBody>
-      </p:sp>
-      <p:pic>
-        <p:nvPicPr>
-          <p:cNvPr id="5" name="Picture 4"/>
-          <p:cNvPicPr>
-            <a:picLocks noChangeAspect="1"/>
-          </p:cNvPicPr>
-          <p:nvPr/>
-        </p:nvPicPr>
-        <p:blipFill>
-          <a:blip r:embed="rId2"/>
-          <a:stretch>
-            <a:fillRect/>
-          </a:stretch>
-        </p:blipFill>
-        <p:spPr>
-          <a:xfrm>
-            <a:off x="1092200" y="0"/>
-            <a:ext cx="6949930" cy="6858000"/>
-          </a:xfrm>
-          <a:prstGeom prst="rect">
-            <a:avLst/>
-          </a:prstGeom>
-        </p:spPr>
-      </p:pic>
-    </p:spTree>
-    <p:extLst>
-      <p:ext uri="{BB962C8B-B14F-4D97-AF65-F5344CB8AC3E}">
-        <p14:creationId xmlns:p14="http://schemas.microsoft.com/office/powerpoint/2010/main" val="2719338169"/>
       </p:ext>
     </p:extLst>
   </p:cSld>

</xml_diff>

<commit_message>
Updated with clams analysis and no initial weight analysis
</commit_message>
<xml_diff>
--- a/ResultsSlides.pptx
+++ b/ResultsSlides.pptx
@@ -10,32 +10,40 @@
     <p:sldId id="281" r:id="rId4"/>
     <p:sldId id="258" r:id="rId5"/>
     <p:sldId id="280" r:id="rId6"/>
-    <p:sldId id="282" r:id="rId7"/>
-    <p:sldId id="283" r:id="rId8"/>
-    <p:sldId id="284" r:id="rId9"/>
-    <p:sldId id="285" r:id="rId10"/>
-    <p:sldId id="286" r:id="rId11"/>
-    <p:sldId id="287" r:id="rId12"/>
-    <p:sldId id="288" r:id="rId13"/>
-    <p:sldId id="289" r:id="rId14"/>
+    <p:sldId id="294" r:id="rId7"/>
+    <p:sldId id="282" r:id="rId8"/>
+    <p:sldId id="283" r:id="rId9"/>
+    <p:sldId id="284" r:id="rId10"/>
+    <p:sldId id="285" r:id="rId11"/>
+    <p:sldId id="286" r:id="rId12"/>
+    <p:sldId id="287" r:id="rId13"/>
+    <p:sldId id="288" r:id="rId14"/>
     <p:sldId id="290" r:id="rId15"/>
     <p:sldId id="291" r:id="rId16"/>
-    <p:sldId id="293" r:id="rId17"/>
-    <p:sldId id="292" r:id="rId18"/>
-    <p:sldId id="263" r:id="rId19"/>
-    <p:sldId id="260" r:id="rId20"/>
-    <p:sldId id="262" r:id="rId21"/>
-    <p:sldId id="264" r:id="rId22"/>
-    <p:sldId id="266" r:id="rId23"/>
-    <p:sldId id="267" r:id="rId24"/>
-    <p:sldId id="271" r:id="rId25"/>
-    <p:sldId id="268" r:id="rId26"/>
-    <p:sldId id="269" r:id="rId27"/>
-    <p:sldId id="272" r:id="rId28"/>
-    <p:sldId id="275" r:id="rId29"/>
-    <p:sldId id="276" r:id="rId30"/>
-    <p:sldId id="278" r:id="rId31"/>
-    <p:sldId id="279" r:id="rId32"/>
+    <p:sldId id="295" r:id="rId17"/>
+    <p:sldId id="263" r:id="rId18"/>
+    <p:sldId id="260" r:id="rId19"/>
+    <p:sldId id="302" r:id="rId20"/>
+    <p:sldId id="292" r:id="rId21"/>
+    <p:sldId id="297" r:id="rId22"/>
+    <p:sldId id="298" r:id="rId23"/>
+    <p:sldId id="299" r:id="rId24"/>
+    <p:sldId id="300" r:id="rId25"/>
+    <p:sldId id="301" r:id="rId26"/>
+    <p:sldId id="303" r:id="rId27"/>
+    <p:sldId id="293" r:id="rId28"/>
+    <p:sldId id="262" r:id="rId29"/>
+    <p:sldId id="264" r:id="rId30"/>
+    <p:sldId id="266" r:id="rId31"/>
+    <p:sldId id="267" r:id="rId32"/>
+    <p:sldId id="271" r:id="rId33"/>
+    <p:sldId id="268" r:id="rId34"/>
+    <p:sldId id="269" r:id="rId35"/>
+    <p:sldId id="272" r:id="rId36"/>
+    <p:sldId id="275" r:id="rId37"/>
+    <p:sldId id="276" r:id="rId38"/>
+    <p:sldId id="278" r:id="rId39"/>
+    <p:sldId id="279" r:id="rId40"/>
   </p:sldIdLst>
   <p:sldSz cx="9144000" cy="6858000" type="screen4x3"/>
   <p:notesSz cx="6858000" cy="9144000"/>
@@ -318,7 +326,7 @@
           <a:p>
             <a:fld id="{437BC0E1-BD5C-0446-92AB-909DA47EBC51}" type="datetimeFigureOut">
               <a:rPr lang="en-US" smtClean="0"/>
-              <a:t>11/10/15</a:t>
+              <a:t>11/25/15</a:t>
             </a:fld>
             <a:endParaRPr lang="en-US"/>
           </a:p>
@@ -488,7 +496,7 @@
           <a:p>
             <a:fld id="{437BC0E1-BD5C-0446-92AB-909DA47EBC51}" type="datetimeFigureOut">
               <a:rPr lang="en-US" smtClean="0"/>
-              <a:t>11/10/15</a:t>
+              <a:t>11/25/15</a:t>
             </a:fld>
             <a:endParaRPr lang="en-US"/>
           </a:p>
@@ -668,7 +676,7 @@
           <a:p>
             <a:fld id="{437BC0E1-BD5C-0446-92AB-909DA47EBC51}" type="datetimeFigureOut">
               <a:rPr lang="en-US" smtClean="0"/>
-              <a:t>11/10/15</a:t>
+              <a:t>11/25/15</a:t>
             </a:fld>
             <a:endParaRPr lang="en-US"/>
           </a:p>
@@ -838,7 +846,7 @@
           <a:p>
             <a:fld id="{437BC0E1-BD5C-0446-92AB-909DA47EBC51}" type="datetimeFigureOut">
               <a:rPr lang="en-US" smtClean="0"/>
-              <a:t>11/10/15</a:t>
+              <a:t>11/25/15</a:t>
             </a:fld>
             <a:endParaRPr lang="en-US"/>
           </a:p>
@@ -1084,7 +1092,7 @@
           <a:p>
             <a:fld id="{437BC0E1-BD5C-0446-92AB-909DA47EBC51}" type="datetimeFigureOut">
               <a:rPr lang="en-US" smtClean="0"/>
-              <a:t>11/10/15</a:t>
+              <a:t>11/25/15</a:t>
             </a:fld>
             <a:endParaRPr lang="en-US"/>
           </a:p>
@@ -1372,7 +1380,7 @@
           <a:p>
             <a:fld id="{437BC0E1-BD5C-0446-92AB-909DA47EBC51}" type="datetimeFigureOut">
               <a:rPr lang="en-US" smtClean="0"/>
-              <a:t>11/10/15</a:t>
+              <a:t>11/25/15</a:t>
             </a:fld>
             <a:endParaRPr lang="en-US"/>
           </a:p>
@@ -1794,7 +1802,7 @@
           <a:p>
             <a:fld id="{437BC0E1-BD5C-0446-92AB-909DA47EBC51}" type="datetimeFigureOut">
               <a:rPr lang="en-US" smtClean="0"/>
-              <a:t>11/10/15</a:t>
+              <a:t>11/25/15</a:t>
             </a:fld>
             <a:endParaRPr lang="en-US"/>
           </a:p>
@@ -1912,7 +1920,7 @@
           <a:p>
             <a:fld id="{437BC0E1-BD5C-0446-92AB-909DA47EBC51}" type="datetimeFigureOut">
               <a:rPr lang="en-US" smtClean="0"/>
-              <a:t>11/10/15</a:t>
+              <a:t>11/25/15</a:t>
             </a:fld>
             <a:endParaRPr lang="en-US"/>
           </a:p>
@@ -2007,7 +2015,7 @@
           <a:p>
             <a:fld id="{437BC0E1-BD5C-0446-92AB-909DA47EBC51}" type="datetimeFigureOut">
               <a:rPr lang="en-US" smtClean="0"/>
-              <a:t>11/10/15</a:t>
+              <a:t>11/25/15</a:t>
             </a:fld>
             <a:endParaRPr lang="en-US"/>
           </a:p>
@@ -2284,7 +2292,7 @@
           <a:p>
             <a:fld id="{437BC0E1-BD5C-0446-92AB-909DA47EBC51}" type="datetimeFigureOut">
               <a:rPr lang="en-US" smtClean="0"/>
-              <a:t>11/10/15</a:t>
+              <a:t>11/25/15</a:t>
             </a:fld>
             <a:endParaRPr lang="en-US"/>
           </a:p>
@@ -2537,7 +2545,7 @@
           <a:p>
             <a:fld id="{437BC0E1-BD5C-0446-92AB-909DA47EBC51}" type="datetimeFigureOut">
               <a:rPr lang="en-US" smtClean="0"/>
-              <a:t>11/10/15</a:t>
+              <a:t>11/25/15</a:t>
             </a:fld>
             <a:endParaRPr lang="en-US"/>
           </a:p>
@@ -2750,7 +2758,7 @@
           <a:p>
             <a:fld id="{437BC0E1-BD5C-0446-92AB-909DA47EBC51}" type="datetimeFigureOut">
               <a:rPr lang="en-US" smtClean="0"/>
-              <a:t>11/10/15</a:t>
+              <a:t>11/25/15</a:t>
             </a:fld>
             <a:endParaRPr lang="en-US"/>
           </a:p>
@@ -3216,7 +3224,53 @@
           <a:p>
             <a:r>
               <a:rPr lang="en-US" dirty="0" smtClean="0"/>
-              <a:t>Relationship between WL and WG</a:t>
+              <a:t>Checking normality for WL and WG</a:t>
+            </a:r>
+            <a:endParaRPr lang="en-US" dirty="0"/>
+          </a:p>
+        </p:txBody>
+      </p:sp>
+      <p:sp>
+        <p:nvSpPr>
+          <p:cNvPr id="6" name="TextBox 5"/>
+          <p:cNvSpPr txBox="1"/>
+          <p:nvPr/>
+        </p:nvSpPr>
+        <p:spPr>
+          <a:xfrm>
+            <a:off x="1168400" y="5672667"/>
+            <a:ext cx="6925734" cy="646331"/>
+          </a:xfrm>
+          <a:prstGeom prst="rect">
+            <a:avLst/>
+          </a:prstGeom>
+          <a:noFill/>
+        </p:spPr>
+        <p:txBody>
+          <a:bodyPr wrap="square" rtlCol="0">
+            <a:spAutoFit/>
+          </a:bodyPr>
+          <a:lstStyle/>
+          <a:p>
+            <a:r>
+              <a:rPr lang="en-US" dirty="0" smtClean="0"/>
+              <a:t>Shapiro’s p-values for WL and WG are </a:t>
+            </a:r>
+            <a:r>
+              <a:rPr lang="en-US" dirty="0" smtClean="0"/>
+              <a:t>0.6206632 </a:t>
+            </a:r>
+            <a:r>
+              <a:rPr lang="en-US" dirty="0" smtClean="0"/>
+              <a:t>and </a:t>
+            </a:r>
+            <a:r>
+              <a:rPr lang="en-US" dirty="0" smtClean="0"/>
+              <a:t>0.0097316, </a:t>
+            </a:r>
+            <a:r>
+              <a:rPr lang="en-US" dirty="0" smtClean="0"/>
+              <a:t>respectively.</a:t>
             </a:r>
             <a:endParaRPr lang="en-US" dirty="0"/>
           </a:p>
@@ -3224,7 +3278,7 @@
       </p:sp>
       <p:pic>
         <p:nvPicPr>
-          <p:cNvPr id="4" name="Picture 3"/>
+          <p:cNvPr id="3" name="Picture 2"/>
           <p:cNvPicPr>
             <a:picLocks noChangeAspect="1"/>
           </p:cNvPicPr>
@@ -3238,8 +3292,32 @@
         </p:blipFill>
         <p:spPr>
           <a:xfrm>
-            <a:off x="1050185" y="1562099"/>
-            <a:ext cx="7030933" cy="4567768"/>
+            <a:off x="225778" y="1848887"/>
+            <a:ext cx="4106333" cy="3351389"/>
+          </a:xfrm>
+          <a:prstGeom prst="rect">
+            <a:avLst/>
+          </a:prstGeom>
+        </p:spPr>
+      </p:pic>
+      <p:pic>
+        <p:nvPicPr>
+          <p:cNvPr id="7" name="Picture 6"/>
+          <p:cNvPicPr>
+            <a:picLocks noChangeAspect="1"/>
+          </p:cNvPicPr>
+          <p:nvPr/>
+        </p:nvPicPr>
+        <p:blipFill>
+          <a:blip r:embed="rId3"/>
+          <a:stretch>
+            <a:fillRect/>
+          </a:stretch>
+        </p:blipFill>
+        <p:spPr>
+          <a:xfrm>
+            <a:off x="4501444" y="1933223"/>
+            <a:ext cx="4501445" cy="3224720"/>
           </a:xfrm>
           <a:prstGeom prst="rect">
             <a:avLst/>
@@ -3249,7 +3327,7 @@
     </p:spTree>
     <p:extLst>
       <p:ext uri="{BB962C8B-B14F-4D97-AF65-F5344CB8AC3E}">
-        <p14:creationId xmlns:p14="http://schemas.microsoft.com/office/powerpoint/2010/main" val="2996229051"/>
+        <p14:creationId xmlns:p14="http://schemas.microsoft.com/office/powerpoint/2010/main" val="3671359124"/>
       </p:ext>
     </p:extLst>
   </p:cSld>
@@ -3276,9 +3354,32 @@
           <a:chExt cx="0" cy="0"/>
         </a:xfrm>
       </p:grpSpPr>
+      <p:sp>
+        <p:nvSpPr>
+          <p:cNvPr id="2" name="Title 1"/>
+          <p:cNvSpPr>
+            <a:spLocks noGrp="1"/>
+          </p:cNvSpPr>
+          <p:nvPr>
+            <p:ph type="title"/>
+          </p:nvPr>
+        </p:nvSpPr>
+        <p:spPr/>
+        <p:txBody>
+          <a:bodyPr/>
+          <a:lstStyle/>
+          <a:p>
+            <a:r>
+              <a:rPr lang="en-US" dirty="0" smtClean="0"/>
+              <a:t>Relationship between WL and WG</a:t>
+            </a:r>
+            <a:endParaRPr lang="en-US" dirty="0"/>
+          </a:p>
+        </p:txBody>
+      </p:sp>
       <p:pic>
         <p:nvPicPr>
-          <p:cNvPr id="5" name="Picture 4" descr="Correlation_percentWL_percentWG_each_cohort.pdf"/>
+          <p:cNvPr id="3" name="Picture 2" descr="Correlation_WL_WG.pdf"/>
           <p:cNvPicPr>
             <a:picLocks noChangeAspect="1"/>
           </p:cNvPicPr>
@@ -3298,32 +3399,8 @@
         </p:blipFill>
         <p:spPr>
           <a:xfrm>
-            <a:off x="4021666" y="3253100"/>
-            <a:ext cx="5122333" cy="3604899"/>
-          </a:xfrm>
-          <a:prstGeom prst="rect">
-            <a:avLst/>
-          </a:prstGeom>
-        </p:spPr>
-      </p:pic>
-      <p:pic>
-        <p:nvPicPr>
-          <p:cNvPr id="4" name="Picture 3"/>
-          <p:cNvPicPr>
-            <a:picLocks noChangeAspect="1"/>
-          </p:cNvPicPr>
-          <p:nvPr/>
-        </p:nvPicPr>
-        <p:blipFill>
-          <a:blip r:embed="rId3"/>
-          <a:stretch>
-            <a:fillRect/>
-          </a:stretch>
-        </p:blipFill>
-        <p:spPr>
-          <a:xfrm>
-            <a:off x="0" y="0"/>
-            <a:ext cx="5235222" cy="3741384"/>
+            <a:off x="817817" y="1114778"/>
+            <a:ext cx="7521849" cy="5207434"/>
           </a:xfrm>
           <a:prstGeom prst="rect">
             <a:avLst/>
@@ -3333,7 +3410,7 @@
     </p:spTree>
     <p:extLst>
       <p:ext uri="{BB962C8B-B14F-4D97-AF65-F5344CB8AC3E}">
-        <p14:creationId xmlns:p14="http://schemas.microsoft.com/office/powerpoint/2010/main" val="3927911585"/>
+        <p14:creationId xmlns:p14="http://schemas.microsoft.com/office/powerpoint/2010/main" val="2996229051"/>
       </p:ext>
     </p:extLst>
   </p:cSld>
@@ -3362,22 +3439,28 @@
       </p:grpSpPr>
       <p:pic>
         <p:nvPicPr>
-          <p:cNvPr id="2" name="Picture 1"/>
+          <p:cNvPr id="2" name="Picture 1" descr="Correlation_WL_WG_each_cohort.pdf"/>
           <p:cNvPicPr>
             <a:picLocks noChangeAspect="1"/>
           </p:cNvPicPr>
           <p:nvPr/>
         </p:nvPicPr>
         <p:blipFill>
-          <a:blip r:embed="rId2"/>
+          <a:blip r:embed="rId2">
+            <a:extLst>
+              <a:ext uri="{28A0092B-C50C-407E-A947-70E740481C1C}">
+                <a14:useLocalDpi xmlns:a14="http://schemas.microsoft.com/office/drawing/2010/main" val="0"/>
+              </a:ext>
+            </a:extLst>
+          </a:blip>
           <a:stretch>
             <a:fillRect/>
           </a:stretch>
         </p:blipFill>
         <p:spPr>
           <a:xfrm>
-            <a:off x="0" y="135466"/>
-            <a:ext cx="5147286" cy="3454401"/>
+            <a:off x="0" y="0"/>
+            <a:ext cx="4769556" cy="3753556"/>
           </a:xfrm>
           <a:prstGeom prst="rect">
             <a:avLst/>
@@ -3386,78 +3469,38 @@
       </p:pic>
       <p:pic>
         <p:nvPicPr>
-          <p:cNvPr id="3" name="Picture 2"/>
+          <p:cNvPr id="3" name="Picture 2" descr="Correlation_percentWL_percentWG_each_cohort.pdf"/>
           <p:cNvPicPr>
             <a:picLocks noChangeAspect="1"/>
           </p:cNvPicPr>
           <p:nvPr/>
         </p:nvPicPr>
         <p:blipFill>
-          <a:blip r:embed="rId3"/>
+          <a:blip r:embed="rId3">
+            <a:extLst>
+              <a:ext uri="{28A0092B-C50C-407E-A947-70E740481C1C}">
+                <a14:useLocalDpi xmlns:a14="http://schemas.microsoft.com/office/drawing/2010/main" val="0"/>
+              </a:ext>
+            </a:extLst>
+          </a:blip>
           <a:stretch>
             <a:fillRect/>
           </a:stretch>
         </p:blipFill>
         <p:spPr>
           <a:xfrm>
-            <a:off x="3843866" y="3235271"/>
-            <a:ext cx="5300133" cy="3622728"/>
+            <a:off x="4120444" y="3380152"/>
+            <a:ext cx="5023556" cy="3477847"/>
           </a:xfrm>
           <a:prstGeom prst="rect">
             <a:avLst/>
           </a:prstGeom>
         </p:spPr>
       </p:pic>
-      <p:sp>
-        <p:nvSpPr>
-          <p:cNvPr id="4" name="Title 1"/>
-          <p:cNvSpPr txBox="1">
-            <a:spLocks/>
-          </p:cNvSpPr>
-          <p:nvPr/>
-        </p:nvSpPr>
-        <p:spPr>
-          <a:xfrm>
-            <a:off x="-155222" y="5802843"/>
-            <a:ext cx="4826000" cy="439737"/>
-          </a:xfrm>
-          <a:prstGeom prst="rect">
-            <a:avLst/>
-          </a:prstGeom>
-        </p:spPr>
-        <p:txBody>
-          <a:bodyPr vert="horz" lIns="91440" tIns="45720" rIns="91440" bIns="45720" rtlCol="0" anchor="ctr">
-            <a:normAutofit fontScale="97500"/>
-          </a:bodyPr>
-          <a:lstStyle>
-            <a:lvl1pPr algn="ctr" defTabSz="457200" rtl="0" eaLnBrk="1" latinLnBrk="0" hangingPunct="1">
-              <a:spcBef>
-                <a:spcPct val="0"/>
-              </a:spcBef>
-              <a:buNone/>
-              <a:defRPr sz="4400" kern="1200">
-                <a:solidFill>
-                  <a:schemeClr val="tx1"/>
-                </a:solidFill>
-                <a:latin typeface="+mj-lt"/>
-                <a:ea typeface="+mj-ea"/>
-                <a:cs typeface="+mj-cs"/>
-              </a:defRPr>
-            </a:lvl1pPr>
-          </a:lstStyle>
-          <a:p>
-            <a:r>
-              <a:rPr lang="en-US" sz="2000" dirty="0" smtClean="0"/>
-              <a:t>The 95% CI for Kendall’s tau is (0.031, 0.281)</a:t>
-            </a:r>
-            <a:endParaRPr lang="en-US" sz="2000" dirty="0"/>
-          </a:p>
-        </p:txBody>
-      </p:sp>
     </p:spTree>
     <p:extLst>
       <p:ext uri="{BB962C8B-B14F-4D97-AF65-F5344CB8AC3E}">
-        <p14:creationId xmlns:p14="http://schemas.microsoft.com/office/powerpoint/2010/main" val="4244050436"/>
+        <p14:creationId xmlns:p14="http://schemas.microsoft.com/office/powerpoint/2010/main" val="3927911585"/>
       </p:ext>
     </p:extLst>
   </p:cSld>
@@ -3486,61 +3529,7 @@
       </p:grpSpPr>
       <p:sp>
         <p:nvSpPr>
-          <p:cNvPr id="2" name="Title 1"/>
-          <p:cNvSpPr>
-            <a:spLocks noGrp="1"/>
-          </p:cNvSpPr>
-          <p:nvPr>
-            <p:ph type="title"/>
-          </p:nvPr>
-        </p:nvSpPr>
-        <p:spPr>
-          <a:xfrm>
-            <a:off x="457200" y="54769"/>
-            <a:ext cx="8229600" cy="439737"/>
-          </a:xfrm>
-        </p:spPr>
-        <p:txBody>
-          <a:bodyPr>
-            <a:normAutofit fontScale="90000"/>
-          </a:bodyPr>
-          <a:lstStyle/>
-          <a:p>
-            <a:r>
-              <a:rPr lang="en-US" sz="2400" dirty="0" smtClean="0"/>
-              <a:t>Relationship between Initial weight and WG</a:t>
-            </a:r>
-            <a:endParaRPr lang="en-US" sz="2400" dirty="0"/>
-          </a:p>
-        </p:txBody>
-      </p:sp>
-      <p:pic>
-        <p:nvPicPr>
-          <p:cNvPr id="5" name="Picture 4"/>
-          <p:cNvPicPr>
-            <a:picLocks noChangeAspect="1"/>
-          </p:cNvPicPr>
-          <p:nvPr/>
-        </p:nvPicPr>
-        <p:blipFill>
-          <a:blip r:embed="rId2"/>
-          <a:stretch>
-            <a:fillRect/>
-          </a:stretch>
-        </p:blipFill>
-        <p:spPr>
-          <a:xfrm>
-            <a:off x="4333875" y="3623636"/>
-            <a:ext cx="4810125" cy="3242301"/>
-          </a:xfrm>
-          <a:prstGeom prst="rect">
-            <a:avLst/>
-          </a:prstGeom>
-        </p:spPr>
-      </p:pic>
-      <p:sp>
-        <p:nvSpPr>
-          <p:cNvPr id="6" name="Title 1"/>
+          <p:cNvPr id="4" name="Title 1"/>
           <p:cNvSpPr txBox="1">
             <a:spLocks/>
           </p:cNvSpPr>
@@ -3548,8 +3537,8 @@
         </p:nvSpPr>
         <p:spPr>
           <a:xfrm>
-            <a:off x="0" y="5780088"/>
-            <a:ext cx="4826000" cy="439737"/>
+            <a:off x="0" y="4501445"/>
+            <a:ext cx="4028252" cy="1741136"/>
           </a:xfrm>
           <a:prstGeom prst="rect">
             <a:avLst/>
@@ -3578,7 +3567,11 @@
           <a:p>
             <a:r>
               <a:rPr lang="en-US" sz="2000" dirty="0" smtClean="0"/>
-              <a:t>The 95% CI for Kendall’s tau is (0.032, 0.315)</a:t>
+              <a:t>The 95% CI for Kendall’s tau is (</a:t>
+            </a:r>
+            <a:r>
+              <a:rPr lang="en-US" sz="2000" dirty="0" smtClean="0"/>
+              <a:t>0.149, 0.375)</a:t>
             </a:r>
             <a:endParaRPr lang="en-US" sz="2000" dirty="0"/>
           </a:p>
@@ -3586,22 +3579,58 @@
       </p:sp>
       <p:pic>
         <p:nvPicPr>
-          <p:cNvPr id="4" name="Picture 3"/>
+          <p:cNvPr id="5" name="Picture 4" descr="Correlation_WL_WG_all_cohort.pdf"/>
           <p:cNvPicPr>
             <a:picLocks noChangeAspect="1"/>
           </p:cNvPicPr>
           <p:nvPr/>
         </p:nvPicPr>
         <p:blipFill>
-          <a:blip r:embed="rId3"/>
+          <a:blip r:embed="rId2">
+            <a:extLst>
+              <a:ext uri="{28A0092B-C50C-407E-A947-70E740481C1C}">
+                <a14:useLocalDpi xmlns:a14="http://schemas.microsoft.com/office/drawing/2010/main" val="0"/>
+              </a:ext>
+            </a:extLst>
+          </a:blip>
           <a:stretch>
             <a:fillRect/>
           </a:stretch>
         </p:blipFill>
         <p:spPr>
           <a:xfrm>
-            <a:off x="0" y="531548"/>
-            <a:ext cx="5143557" cy="3159125"/>
+            <a:off x="0" y="0"/>
+            <a:ext cx="4830703" cy="3344333"/>
+          </a:xfrm>
+          <a:prstGeom prst="rect">
+            <a:avLst/>
+          </a:prstGeom>
+        </p:spPr>
+      </p:pic>
+      <p:pic>
+        <p:nvPicPr>
+          <p:cNvPr id="6" name="Picture 5" descr="Correlation_percentWL_percentWG_all_cohort.pdf"/>
+          <p:cNvPicPr>
+            <a:picLocks noChangeAspect="1"/>
+          </p:cNvPicPr>
+          <p:nvPr/>
+        </p:nvPicPr>
+        <p:blipFill>
+          <a:blip r:embed="rId3">
+            <a:extLst>
+              <a:ext uri="{28A0092B-C50C-407E-A947-70E740481C1C}">
+                <a14:useLocalDpi xmlns:a14="http://schemas.microsoft.com/office/drawing/2010/main" val="0"/>
+              </a:ext>
+            </a:extLst>
+          </a:blip>
+          <a:stretch>
+            <a:fillRect/>
+          </a:stretch>
+        </p:blipFill>
+        <p:spPr>
+          <a:xfrm>
+            <a:off x="3873030" y="3048000"/>
+            <a:ext cx="5270969" cy="3649133"/>
           </a:xfrm>
           <a:prstGeom prst="rect">
             <a:avLst/>
@@ -3611,7 +3640,7 @@
     </p:spTree>
     <p:extLst>
       <p:ext uri="{BB962C8B-B14F-4D97-AF65-F5344CB8AC3E}">
-        <p14:creationId xmlns:p14="http://schemas.microsoft.com/office/powerpoint/2010/main" val="2730841141"/>
+        <p14:creationId xmlns:p14="http://schemas.microsoft.com/office/powerpoint/2010/main" val="4244050436"/>
       </p:ext>
     </p:extLst>
   </p:cSld>
@@ -3659,22 +3688,28 @@
       </p:sp>
       <p:pic>
         <p:nvPicPr>
-          <p:cNvPr id="4" name="Picture 3"/>
+          <p:cNvPr id="3" name="Picture 2" descr="Correlation_PercentFatMassPre-fasted_PercentWG_each_cohort.pdf"/>
           <p:cNvPicPr>
             <a:picLocks noChangeAspect="1"/>
           </p:cNvPicPr>
           <p:nvPr/>
         </p:nvPicPr>
         <p:blipFill>
-          <a:blip r:embed="rId2"/>
+          <a:blip r:embed="rId2">
+            <a:extLst>
+              <a:ext uri="{28A0092B-C50C-407E-A947-70E740481C1C}">
+                <a14:useLocalDpi xmlns:a14="http://schemas.microsoft.com/office/drawing/2010/main" val="0"/>
+              </a:ext>
+            </a:extLst>
+          </a:blip>
           <a:stretch>
             <a:fillRect/>
           </a:stretch>
         </p:blipFill>
         <p:spPr>
           <a:xfrm>
-            <a:off x="972254" y="776111"/>
-            <a:ext cx="7231089" cy="4826000"/>
+            <a:off x="1317978" y="1284111"/>
+            <a:ext cx="6400800" cy="4572000"/>
           </a:xfrm>
           <a:prstGeom prst="rect">
             <a:avLst/>
@@ -3713,22 +3748,28 @@
       </p:grpSpPr>
       <p:pic>
         <p:nvPicPr>
-          <p:cNvPr id="3" name="Picture 2"/>
+          <p:cNvPr id="2" name="Picture 1" descr="Correlation_PercentFatMassFasted_PercentWG_each_cohort.pdf"/>
           <p:cNvPicPr>
             <a:picLocks noChangeAspect="1"/>
           </p:cNvPicPr>
           <p:nvPr/>
         </p:nvPicPr>
         <p:blipFill>
-          <a:blip r:embed="rId2"/>
+          <a:blip r:embed="rId2">
+            <a:extLst>
+              <a:ext uri="{28A0092B-C50C-407E-A947-70E740481C1C}">
+                <a14:useLocalDpi xmlns:a14="http://schemas.microsoft.com/office/drawing/2010/main" val="0"/>
+              </a:ext>
+            </a:extLst>
+          </a:blip>
           <a:stretch>
             <a:fillRect/>
           </a:stretch>
         </p:blipFill>
         <p:spPr>
           <a:xfrm>
-            <a:off x="1" y="0"/>
-            <a:ext cx="4727222" cy="3667672"/>
+            <a:off x="0" y="1"/>
+            <a:ext cx="4984529" cy="3450828"/>
           </a:xfrm>
           <a:prstGeom prst="rect">
             <a:avLst/>
@@ -3737,22 +3778,28 @@
       </p:pic>
       <p:pic>
         <p:nvPicPr>
-          <p:cNvPr id="4" name="Picture 3"/>
+          <p:cNvPr id="5" name="Picture 4" descr="Correlation_PercentFatFasted_PercentWG_cohort8_9.pdf"/>
           <p:cNvPicPr>
             <a:picLocks noChangeAspect="1"/>
           </p:cNvPicPr>
           <p:nvPr/>
         </p:nvPicPr>
         <p:blipFill>
-          <a:blip r:embed="rId3"/>
+          <a:blip r:embed="rId3">
+            <a:extLst>
+              <a:ext uri="{28A0092B-C50C-407E-A947-70E740481C1C}">
+                <a14:useLocalDpi xmlns:a14="http://schemas.microsoft.com/office/drawing/2010/main" val="0"/>
+              </a:ext>
+            </a:extLst>
+          </a:blip>
           <a:stretch>
             <a:fillRect/>
           </a:stretch>
         </p:blipFill>
         <p:spPr>
           <a:xfrm>
-            <a:off x="4261555" y="3450828"/>
-            <a:ext cx="4882443" cy="3407171"/>
+            <a:off x="4244622" y="3330222"/>
+            <a:ext cx="4899378" cy="3499556"/>
           </a:xfrm>
           <a:prstGeom prst="rect">
             <a:avLst/>
@@ -3806,7 +3853,7 @@
           <a:p>
             <a:r>
               <a:rPr lang="en-US" dirty="0" smtClean="0"/>
-              <a:t>Juvenile HFD</a:t>
+              <a:t>Body composition and Clams</a:t>
             </a:r>
             <a:endParaRPr lang="en-US" dirty="0"/>
           </a:p>
@@ -3814,12 +3861,12 @@
       </p:sp>
       <p:sp>
         <p:nvSpPr>
-          <p:cNvPr id="3" name="Content Placeholder 2"/>
+          <p:cNvPr id="3" name="Text Placeholder 2"/>
           <p:cNvSpPr>
             <a:spLocks noGrp="1"/>
           </p:cNvSpPr>
           <p:nvPr>
-            <p:ph idx="1"/>
+            <p:ph type="body" idx="1"/>
           </p:nvPr>
         </p:nvSpPr>
         <p:spPr/>
@@ -3828,32 +3875,8 @@
           <a:lstStyle/>
           <a:p>
             <a:r>
-              <a:rPr lang="en-US" dirty="0" err="1" smtClean="0"/>
-              <a:t>JuvHFD</a:t>
-            </a:r>
-            <a:r>
               <a:rPr lang="en-US" dirty="0" smtClean="0"/>
-              <a:t> # 1 – Born 2014-04-21 (Mice #410-433)</a:t>
-            </a:r>
-          </a:p>
-          <a:p>
-            <a:r>
-              <a:rPr lang="en-US" dirty="0" err="1" smtClean="0"/>
-              <a:t>JuvHFD</a:t>
-            </a:r>
-            <a:r>
-              <a:rPr lang="en-US" dirty="0" smtClean="0"/>
-              <a:t> # 2 – Born 2014-07-07</a:t>
-            </a:r>
-          </a:p>
-          <a:p>
-            <a:r>
-              <a:rPr lang="en-US" dirty="0" err="1" smtClean="0"/>
-              <a:t>RNAseq</a:t>
-            </a:r>
-            <a:r>
-              <a:rPr lang="en-US" dirty="0" smtClean="0"/>
-              <a:t> – Born 2015-01-21</a:t>
+              <a:t>Cohort 7 and 8</a:t>
             </a:r>
             <a:endParaRPr lang="en-US" dirty="0"/>
           </a:p>
@@ -3862,7 +3885,7 @@
     </p:spTree>
     <p:extLst>
       <p:ext uri="{BB962C8B-B14F-4D97-AF65-F5344CB8AC3E}">
-        <p14:creationId xmlns:p14="http://schemas.microsoft.com/office/powerpoint/2010/main" val="1740669473"/>
+        <p14:creationId xmlns:p14="http://schemas.microsoft.com/office/powerpoint/2010/main" val="3149187977"/>
       </p:ext>
     </p:extLst>
   </p:cSld>
@@ -3889,10 +3912,40 @@
           <a:chExt cx="0" cy="0"/>
         </a:xfrm>
       </p:grpSpPr>
+      <p:pic>
+        <p:nvPicPr>
+          <p:cNvPr id="3" name="Picture 2" descr="Body_weight_LinePlot_cohort7and8.pdf"/>
+          <p:cNvPicPr>
+            <a:picLocks noChangeAspect="1"/>
+          </p:cNvPicPr>
+          <p:nvPr/>
+        </p:nvPicPr>
+        <p:blipFill>
+          <a:blip r:embed="rId2">
+            <a:extLst>
+              <a:ext uri="{28A0092B-C50C-407E-A947-70E740481C1C}">
+                <a14:useLocalDpi xmlns:a14="http://schemas.microsoft.com/office/drawing/2010/main" val="0"/>
+              </a:ext>
+            </a:extLst>
+          </a:blip>
+          <a:stretch>
+            <a:fillRect/>
+          </a:stretch>
+        </p:blipFill>
+        <p:spPr>
+          <a:xfrm>
+            <a:off x="1497189" y="705555"/>
+            <a:ext cx="6616700" cy="5232400"/>
+          </a:xfrm>
+          <a:prstGeom prst="rect">
+            <a:avLst/>
+          </a:prstGeom>
+        </p:spPr>
+      </p:pic>
     </p:spTree>
     <p:extLst>
       <p:ext uri="{BB962C8B-B14F-4D97-AF65-F5344CB8AC3E}">
-        <p14:creationId xmlns:p14="http://schemas.microsoft.com/office/powerpoint/2010/main" val="1555029584"/>
+        <p14:creationId xmlns:p14="http://schemas.microsoft.com/office/powerpoint/2010/main" val="1622069557"/>
       </p:ext>
     </p:extLst>
   </p:cSld>
@@ -3921,76 +3974,28 @@
       </p:grpSpPr>
       <p:pic>
         <p:nvPicPr>
-          <p:cNvPr id="2" name="Picture 1"/>
+          <p:cNvPr id="16" name="Picture 15" descr="Body_composition_Barplot_cohort7and8.pdf"/>
           <p:cNvPicPr>
             <a:picLocks noChangeAspect="1"/>
           </p:cNvPicPr>
           <p:nvPr/>
         </p:nvPicPr>
         <p:blipFill>
-          <a:blip r:embed="rId2"/>
+          <a:blip r:embed="rId2">
+            <a:extLst>
+              <a:ext uri="{28A0092B-C50C-407E-A947-70E740481C1C}">
+                <a14:useLocalDpi xmlns:a14="http://schemas.microsoft.com/office/drawing/2010/main" val="0"/>
+              </a:ext>
+            </a:extLst>
+          </a:blip>
           <a:stretch>
             <a:fillRect/>
           </a:stretch>
         </p:blipFill>
         <p:spPr>
           <a:xfrm>
-            <a:off x="1092200" y="0"/>
-            <a:ext cx="6949930" cy="6858000"/>
-          </a:xfrm>
-          <a:prstGeom prst="rect">
-            <a:avLst/>
-          </a:prstGeom>
-        </p:spPr>
-      </p:pic>
-    </p:spTree>
-    <p:extLst>
-      <p:ext uri="{BB962C8B-B14F-4D97-AF65-F5344CB8AC3E}">
-        <p14:creationId xmlns:p14="http://schemas.microsoft.com/office/powerpoint/2010/main" val="1622069557"/>
-      </p:ext>
-    </p:extLst>
-  </p:cSld>
-  <p:clrMapOvr>
-    <a:masterClrMapping/>
-  </p:clrMapOvr>
-</p:sld>
-</file>
-
-<file path=ppt/slides/slide19.xml><?xml version="1.0" encoding="utf-8"?>
-<p:sld xmlns:a="http://schemas.openxmlformats.org/drawingml/2006/main" xmlns:r="http://schemas.openxmlformats.org/officeDocument/2006/relationships" xmlns:p="http://schemas.openxmlformats.org/presentationml/2006/main">
-  <p:cSld>
-    <p:spTree>
-      <p:nvGrpSpPr>
-        <p:cNvPr id="1" name=""/>
-        <p:cNvGrpSpPr/>
-        <p:nvPr/>
-      </p:nvGrpSpPr>
-      <p:grpSpPr>
-        <a:xfrm>
-          <a:off x="0" y="0"/>
-          <a:ext cx="0" cy="0"/>
-          <a:chOff x="0" y="0"/>
-          <a:chExt cx="0" cy="0"/>
-        </a:xfrm>
-      </p:grpSpPr>
-      <p:pic>
-        <p:nvPicPr>
-          <p:cNvPr id="2" name="Picture 1"/>
-          <p:cNvPicPr>
-            <a:picLocks noChangeAspect="1"/>
-          </p:cNvPicPr>
-          <p:nvPr/>
-        </p:nvPicPr>
-        <p:blipFill>
-          <a:blip r:embed="rId2"/>
-          <a:stretch>
-            <a:fillRect/>
-          </a:stretch>
-        </p:blipFill>
-        <p:spPr>
-          <a:xfrm>
-            <a:off x="1092200" y="0"/>
-            <a:ext cx="6949930" cy="6858000"/>
+            <a:off x="1134534" y="239889"/>
+            <a:ext cx="6400800" cy="6400800"/>
           </a:xfrm>
           <a:prstGeom prst="rect">
             <a:avLst/>
@@ -4133,10 +4138,835 @@
           </p:style>
         </p:cxnSp>
       </p:grpSp>
+      <p:grpSp>
+        <p:nvGrpSpPr>
+          <p:cNvPr id="11" name="Group 10"/>
+          <p:cNvGrpSpPr/>
+          <p:nvPr/>
+        </p:nvGrpSpPr>
+        <p:grpSpPr>
+          <a:xfrm>
+            <a:off x="2130016" y="1058370"/>
+            <a:ext cx="827894" cy="433633"/>
+            <a:chOff x="2138054" y="756311"/>
+            <a:chExt cx="827894" cy="433633"/>
+          </a:xfrm>
+        </p:grpSpPr>
+        <p:cxnSp>
+          <p:nvCxnSpPr>
+            <p:cNvPr id="12" name="Straight Connector 11"/>
+            <p:cNvCxnSpPr/>
+            <p:nvPr/>
+          </p:nvCxnSpPr>
+          <p:spPr>
+            <a:xfrm>
+              <a:off x="2138054" y="1077025"/>
+              <a:ext cx="819856" cy="0"/>
+            </a:xfrm>
+            <a:prstGeom prst="line">
+              <a:avLst/>
+            </a:prstGeom>
+          </p:spPr>
+          <p:style>
+            <a:lnRef idx="2">
+              <a:schemeClr val="accent1"/>
+            </a:lnRef>
+            <a:fillRef idx="0">
+              <a:schemeClr val="accent1"/>
+            </a:fillRef>
+            <a:effectRef idx="1">
+              <a:schemeClr val="accent1"/>
+            </a:effectRef>
+            <a:fontRef idx="minor">
+              <a:schemeClr val="tx1"/>
+            </a:fontRef>
+          </p:style>
+        </p:cxnSp>
+        <p:sp>
+          <p:nvSpPr>
+            <p:cNvPr id="13" name="TextBox 12"/>
+            <p:cNvSpPr txBox="1"/>
+            <p:nvPr/>
+          </p:nvSpPr>
+          <p:spPr>
+            <a:xfrm>
+              <a:off x="2290772" y="756311"/>
+              <a:ext cx="482268" cy="369332"/>
+            </a:xfrm>
+            <a:prstGeom prst="rect">
+              <a:avLst/>
+            </a:prstGeom>
+            <a:noFill/>
+          </p:spPr>
+          <p:txBody>
+            <a:bodyPr wrap="square" rtlCol="0">
+              <a:spAutoFit/>
+            </a:bodyPr>
+            <a:lstStyle/>
+            <a:p>
+              <a:pPr algn="ctr"/>
+              <a:r>
+                <a:rPr lang="en-US" dirty="0" smtClean="0"/>
+                <a:t>*</a:t>
+              </a:r>
+              <a:endParaRPr lang="en-US" dirty="0"/>
+            </a:p>
+          </p:txBody>
+        </p:sp>
+        <p:cxnSp>
+          <p:nvCxnSpPr>
+            <p:cNvPr id="14" name="Straight Connector 13"/>
+            <p:cNvCxnSpPr/>
+            <p:nvPr/>
+          </p:nvCxnSpPr>
+          <p:spPr>
+            <a:xfrm>
+              <a:off x="2138054" y="1077025"/>
+              <a:ext cx="0" cy="112526"/>
+            </a:xfrm>
+            <a:prstGeom prst="line">
+              <a:avLst/>
+            </a:prstGeom>
+          </p:spPr>
+          <p:style>
+            <a:lnRef idx="2">
+              <a:schemeClr val="accent1"/>
+            </a:lnRef>
+            <a:fillRef idx="0">
+              <a:schemeClr val="accent1"/>
+            </a:fillRef>
+            <a:effectRef idx="1">
+              <a:schemeClr val="accent1"/>
+            </a:effectRef>
+            <a:fontRef idx="minor">
+              <a:schemeClr val="tx1"/>
+            </a:fontRef>
+          </p:style>
+        </p:cxnSp>
+        <p:cxnSp>
+          <p:nvCxnSpPr>
+            <p:cNvPr id="15" name="Straight Connector 14"/>
+            <p:cNvCxnSpPr/>
+            <p:nvPr/>
+          </p:nvCxnSpPr>
+          <p:spPr>
+            <a:xfrm>
+              <a:off x="2965948" y="1077418"/>
+              <a:ext cx="0" cy="112526"/>
+            </a:xfrm>
+            <a:prstGeom prst="line">
+              <a:avLst/>
+            </a:prstGeom>
+          </p:spPr>
+          <p:style>
+            <a:lnRef idx="2">
+              <a:schemeClr val="accent1"/>
+            </a:lnRef>
+            <a:fillRef idx="0">
+              <a:schemeClr val="accent1"/>
+            </a:fillRef>
+            <a:effectRef idx="1">
+              <a:schemeClr val="accent1"/>
+            </a:effectRef>
+            <a:fontRef idx="minor">
+              <a:schemeClr val="tx1"/>
+            </a:fontRef>
+          </p:style>
+        </p:cxnSp>
+      </p:grpSp>
     </p:spTree>
     <p:extLst>
       <p:ext uri="{BB962C8B-B14F-4D97-AF65-F5344CB8AC3E}">
         <p14:creationId xmlns:p14="http://schemas.microsoft.com/office/powerpoint/2010/main" val="1616068748"/>
+      </p:ext>
+    </p:extLst>
+  </p:cSld>
+  <p:clrMapOvr>
+    <a:masterClrMapping/>
+  </p:clrMapOvr>
+</p:sld>
+</file>
+
+<file path=ppt/slides/slide19.xml><?xml version="1.0" encoding="utf-8"?>
+<p:sld xmlns:a="http://schemas.openxmlformats.org/drawingml/2006/main" xmlns:r="http://schemas.openxmlformats.org/officeDocument/2006/relationships" xmlns:p="http://schemas.openxmlformats.org/presentationml/2006/main">
+  <p:cSld>
+    <p:spTree>
+      <p:nvGrpSpPr>
+        <p:cNvPr id="1" name=""/>
+        <p:cNvGrpSpPr/>
+        <p:nvPr/>
+      </p:nvGrpSpPr>
+      <p:grpSpPr>
+        <a:xfrm>
+          <a:off x="0" y="0"/>
+          <a:ext cx="0" cy="0"/>
+          <a:chOff x="0" y="0"/>
+          <a:chExt cx="0" cy="0"/>
+        </a:xfrm>
+      </p:grpSpPr>
+      <p:sp>
+        <p:nvSpPr>
+          <p:cNvPr id="2" name="Title 1"/>
+          <p:cNvSpPr>
+            <a:spLocks noGrp="1"/>
+          </p:cNvSpPr>
+          <p:nvPr>
+            <p:ph type="title"/>
+          </p:nvPr>
+        </p:nvSpPr>
+        <p:spPr/>
+        <p:txBody>
+          <a:bodyPr/>
+          <a:lstStyle/>
+          <a:p>
+            <a:r>
+              <a:rPr lang="en-US" dirty="0" smtClean="0"/>
+              <a:t>Notes</a:t>
+            </a:r>
+            <a:endParaRPr lang="en-US" dirty="0"/>
+          </a:p>
+        </p:txBody>
+      </p:sp>
+      <p:sp>
+        <p:nvSpPr>
+          <p:cNvPr id="3" name="Content Placeholder 2"/>
+          <p:cNvSpPr>
+            <a:spLocks noGrp="1"/>
+          </p:cNvSpPr>
+          <p:nvPr>
+            <p:ph idx="1"/>
+          </p:nvPr>
+        </p:nvSpPr>
+        <p:spPr/>
+        <p:txBody>
+          <a:bodyPr/>
+          <a:lstStyle/>
+          <a:p>
+            <a:r>
+              <a:rPr lang="en-US" dirty="0" smtClean="0"/>
+              <a:t>Cohort 8 doesn’t have CLAMS after fasting.</a:t>
+            </a:r>
+          </a:p>
+          <a:p>
+            <a:endParaRPr lang="en-US" dirty="0"/>
+          </a:p>
+        </p:txBody>
+      </p:sp>
+      <p:grpSp>
+        <p:nvGrpSpPr>
+          <p:cNvPr id="4" name="Group 3"/>
+          <p:cNvGrpSpPr/>
+          <p:nvPr/>
+        </p:nvGrpSpPr>
+        <p:grpSpPr>
+          <a:xfrm>
+            <a:off x="636785" y="3270811"/>
+            <a:ext cx="7651984" cy="682837"/>
+            <a:chOff x="636785" y="5855511"/>
+            <a:chExt cx="7651984" cy="682837"/>
+          </a:xfrm>
+        </p:grpSpPr>
+        <p:cxnSp>
+          <p:nvCxnSpPr>
+            <p:cNvPr id="5" name="Straight Arrow Connector 4"/>
+            <p:cNvCxnSpPr/>
+            <p:nvPr/>
+          </p:nvCxnSpPr>
+          <p:spPr>
+            <a:xfrm>
+              <a:off x="2493517" y="5855511"/>
+              <a:ext cx="8037" cy="442063"/>
+            </a:xfrm>
+            <a:prstGeom prst="straightConnector1">
+              <a:avLst/>
+            </a:prstGeom>
+            <a:ln>
+              <a:tailEnd type="arrow"/>
+            </a:ln>
+          </p:spPr>
+          <p:style>
+            <a:lnRef idx="2">
+              <a:schemeClr val="accent1"/>
+            </a:lnRef>
+            <a:fillRef idx="0">
+              <a:schemeClr val="accent1"/>
+            </a:fillRef>
+            <a:effectRef idx="1">
+              <a:schemeClr val="accent1"/>
+            </a:effectRef>
+            <a:fontRef idx="minor">
+              <a:schemeClr val="tx1"/>
+            </a:fontRef>
+          </p:style>
+        </p:cxnSp>
+        <p:grpSp>
+          <p:nvGrpSpPr>
+            <p:cNvPr id="6" name="Group 5"/>
+            <p:cNvGrpSpPr/>
+            <p:nvPr/>
+          </p:nvGrpSpPr>
+          <p:grpSpPr>
+            <a:xfrm>
+              <a:off x="636785" y="5869011"/>
+              <a:ext cx="7651984" cy="669337"/>
+              <a:chOff x="634986" y="3406852"/>
+              <a:chExt cx="7651984" cy="669337"/>
+            </a:xfrm>
+          </p:grpSpPr>
+          <p:cxnSp>
+            <p:nvCxnSpPr>
+              <p:cNvPr id="8" name="Straight Arrow Connector 7"/>
+              <p:cNvCxnSpPr/>
+              <p:nvPr/>
+            </p:nvCxnSpPr>
+            <p:spPr>
+              <a:xfrm>
+                <a:off x="3019058" y="3406852"/>
+                <a:ext cx="0" cy="442063"/>
+              </a:xfrm>
+              <a:prstGeom prst="straightConnector1">
+                <a:avLst/>
+              </a:prstGeom>
+              <a:ln>
+                <a:tailEnd type="arrow"/>
+              </a:ln>
+            </p:spPr>
+            <p:style>
+              <a:lnRef idx="2">
+                <a:schemeClr val="accent1"/>
+              </a:lnRef>
+              <a:fillRef idx="0">
+                <a:schemeClr val="accent1"/>
+              </a:fillRef>
+              <a:effectRef idx="1">
+                <a:schemeClr val="accent1"/>
+              </a:effectRef>
+              <a:fontRef idx="minor">
+                <a:schemeClr val="tx1"/>
+              </a:fontRef>
+            </p:style>
+          </p:cxnSp>
+          <p:grpSp>
+            <p:nvGrpSpPr>
+              <p:cNvPr id="9" name="Group 8"/>
+              <p:cNvGrpSpPr/>
+              <p:nvPr/>
+            </p:nvGrpSpPr>
+            <p:grpSpPr>
+              <a:xfrm>
+                <a:off x="634986" y="3766200"/>
+                <a:ext cx="7651984" cy="309989"/>
+                <a:chOff x="634986" y="3766200"/>
+                <a:chExt cx="7651984" cy="309989"/>
+              </a:xfrm>
+            </p:grpSpPr>
+            <p:cxnSp>
+              <p:nvCxnSpPr>
+                <p:cNvPr id="10" name="Straight Connector 9"/>
+                <p:cNvCxnSpPr/>
+                <p:nvPr/>
+              </p:nvCxnSpPr>
+              <p:spPr>
+                <a:xfrm flipV="1">
+                  <a:off x="634986" y="3882115"/>
+                  <a:ext cx="7651984" cy="40186"/>
+                </a:xfrm>
+                <a:prstGeom prst="line">
+                  <a:avLst/>
+                </a:prstGeom>
+                <a:ln>
+                  <a:solidFill>
+                    <a:schemeClr val="accent6">
+                      <a:lumMod val="75000"/>
+                    </a:schemeClr>
+                  </a:solidFill>
+                </a:ln>
+                <a:effectLst/>
+              </p:spPr>
+              <p:style>
+                <a:lnRef idx="2">
+                  <a:schemeClr val="accent1"/>
+                </a:lnRef>
+                <a:fillRef idx="0">
+                  <a:schemeClr val="accent1"/>
+                </a:fillRef>
+                <a:effectRef idx="1">
+                  <a:schemeClr val="accent1"/>
+                </a:effectRef>
+                <a:fontRef idx="minor">
+                  <a:schemeClr val="tx1"/>
+                </a:fontRef>
+              </p:style>
+            </p:cxnSp>
+            <p:sp>
+              <p:nvSpPr>
+                <p:cNvPr id="11" name="Rectangle 10"/>
+                <p:cNvSpPr/>
+                <p:nvPr/>
+              </p:nvSpPr>
+              <p:spPr>
+                <a:xfrm>
+                  <a:off x="3009192" y="3827968"/>
+                  <a:ext cx="5277778" cy="166063"/>
+                </a:xfrm>
+                <a:prstGeom prst="rect">
+                  <a:avLst/>
+                </a:prstGeom>
+                <a:solidFill>
+                  <a:schemeClr val="accent6"/>
+                </a:solidFill>
+                <a:ln>
+                  <a:noFill/>
+                </a:ln>
+              </p:spPr>
+              <p:style>
+                <a:lnRef idx="1">
+                  <a:schemeClr val="accent1"/>
+                </a:lnRef>
+                <a:fillRef idx="3">
+                  <a:schemeClr val="accent1"/>
+                </a:fillRef>
+                <a:effectRef idx="2">
+                  <a:schemeClr val="accent1"/>
+                </a:effectRef>
+                <a:fontRef idx="minor">
+                  <a:schemeClr val="lt1"/>
+                </a:fontRef>
+              </p:style>
+              <p:txBody>
+                <a:bodyPr rtlCol="0" anchor="ctr"/>
+                <a:lstStyle/>
+                <a:p>
+                  <a:pPr algn="ctr"/>
+                  <a:endParaRPr lang="en-US"/>
+                </a:p>
+              </p:txBody>
+            </p:sp>
+            <p:sp>
+              <p:nvSpPr>
+                <p:cNvPr id="12" name="Rectangle 11"/>
+                <p:cNvSpPr/>
+                <p:nvPr/>
+              </p:nvSpPr>
+              <p:spPr>
+                <a:xfrm>
+                  <a:off x="634986" y="3842270"/>
+                  <a:ext cx="1856732" cy="160061"/>
+                </a:xfrm>
+                <a:prstGeom prst="rect">
+                  <a:avLst/>
+                </a:prstGeom>
+                <a:ln>
+                  <a:noFill/>
+                </a:ln>
+              </p:spPr>
+              <p:style>
+                <a:lnRef idx="1">
+                  <a:schemeClr val="accent1"/>
+                </a:lnRef>
+                <a:fillRef idx="3">
+                  <a:schemeClr val="accent1"/>
+                </a:fillRef>
+                <a:effectRef idx="2">
+                  <a:schemeClr val="accent1"/>
+                </a:effectRef>
+                <a:fontRef idx="minor">
+                  <a:schemeClr val="lt1"/>
+                </a:fontRef>
+              </p:style>
+              <p:txBody>
+                <a:bodyPr rtlCol="0" anchor="ctr"/>
+                <a:lstStyle/>
+                <a:p>
+                  <a:pPr algn="ctr"/>
+                  <a:endParaRPr lang="en-US"/>
+                </a:p>
+              </p:txBody>
+            </p:sp>
+            <p:sp>
+              <p:nvSpPr>
+                <p:cNvPr id="13" name="Rectangle 12"/>
+                <p:cNvSpPr/>
+                <p:nvPr/>
+              </p:nvSpPr>
+              <p:spPr>
+                <a:xfrm>
+                  <a:off x="2486418" y="3836270"/>
+                  <a:ext cx="522774" cy="152431"/>
+                </a:xfrm>
+                <a:prstGeom prst="rect">
+                  <a:avLst/>
+                </a:prstGeom>
+                <a:solidFill>
+                  <a:schemeClr val="accent3"/>
+                </a:solidFill>
+                <a:ln>
+                  <a:noFill/>
+                </a:ln>
+              </p:spPr>
+              <p:style>
+                <a:lnRef idx="1">
+                  <a:schemeClr val="accent1"/>
+                </a:lnRef>
+                <a:fillRef idx="3">
+                  <a:schemeClr val="accent1"/>
+                </a:fillRef>
+                <a:effectRef idx="2">
+                  <a:schemeClr val="accent1"/>
+                </a:effectRef>
+                <a:fontRef idx="minor">
+                  <a:schemeClr val="lt1"/>
+                </a:fontRef>
+              </p:style>
+              <p:txBody>
+                <a:bodyPr rtlCol="0" anchor="ctr"/>
+                <a:lstStyle/>
+                <a:p>
+                  <a:pPr algn="ctr"/>
+                  <a:endParaRPr lang="en-US"/>
+                </a:p>
+              </p:txBody>
+            </p:sp>
+            <p:sp>
+              <p:nvSpPr>
+                <p:cNvPr id="14" name="TextBox 13"/>
+                <p:cNvSpPr txBox="1"/>
+                <p:nvPr/>
+              </p:nvSpPr>
+              <p:spPr>
+                <a:xfrm>
+                  <a:off x="5287396" y="3768412"/>
+                  <a:ext cx="771944" cy="307777"/>
+                </a:xfrm>
+                <a:prstGeom prst="rect">
+                  <a:avLst/>
+                </a:prstGeom>
+                <a:noFill/>
+              </p:spPr>
+              <p:txBody>
+                <a:bodyPr wrap="square" rtlCol="0">
+                  <a:spAutoFit/>
+                </a:bodyPr>
+                <a:lstStyle/>
+                <a:p>
+                  <a:r>
+                    <a:rPr lang="en-US" sz="1400" dirty="0" smtClean="0"/>
+                    <a:t>HFD</a:t>
+                  </a:r>
+                  <a:endParaRPr lang="en-US" sz="1400" dirty="0"/>
+                </a:p>
+              </p:txBody>
+            </p:sp>
+            <p:sp>
+              <p:nvSpPr>
+                <p:cNvPr id="15" name="TextBox 14"/>
+                <p:cNvSpPr txBox="1"/>
+                <p:nvPr/>
+              </p:nvSpPr>
+              <p:spPr>
+                <a:xfrm>
+                  <a:off x="1221269" y="3766200"/>
+                  <a:ext cx="771944" cy="307777"/>
+                </a:xfrm>
+                <a:prstGeom prst="rect">
+                  <a:avLst/>
+                </a:prstGeom>
+                <a:noFill/>
+              </p:spPr>
+              <p:txBody>
+                <a:bodyPr wrap="square" rtlCol="0">
+                  <a:spAutoFit/>
+                </a:bodyPr>
+                <a:lstStyle/>
+                <a:p>
+                  <a:r>
+                    <a:rPr lang="en-US" sz="1400" dirty="0" smtClean="0"/>
+                    <a:t>NCD</a:t>
+                  </a:r>
+                  <a:endParaRPr lang="en-US" sz="1400" dirty="0"/>
+                </a:p>
+              </p:txBody>
+            </p:sp>
+            <p:sp>
+              <p:nvSpPr>
+                <p:cNvPr id="16" name="TextBox 15"/>
+                <p:cNvSpPr txBox="1"/>
+                <p:nvPr/>
+              </p:nvSpPr>
+              <p:spPr>
+                <a:xfrm>
+                  <a:off x="2505848" y="3766200"/>
+                  <a:ext cx="636294" cy="307777"/>
+                </a:xfrm>
+                <a:prstGeom prst="rect">
+                  <a:avLst/>
+                </a:prstGeom>
+                <a:noFill/>
+              </p:spPr>
+              <p:txBody>
+                <a:bodyPr wrap="square" rtlCol="0">
+                  <a:spAutoFit/>
+                </a:bodyPr>
+                <a:lstStyle/>
+                <a:p>
+                  <a:r>
+                    <a:rPr lang="en-US" sz="1400" dirty="0" smtClean="0"/>
+                    <a:t>FAST</a:t>
+                  </a:r>
+                  <a:endParaRPr lang="en-US" sz="1400" dirty="0"/>
+                </a:p>
+              </p:txBody>
+            </p:sp>
+          </p:grpSp>
+        </p:grpSp>
+        <p:cxnSp>
+          <p:nvCxnSpPr>
+            <p:cNvPr id="7" name="Straight Arrow Connector 6"/>
+            <p:cNvCxnSpPr/>
+            <p:nvPr/>
+          </p:nvCxnSpPr>
+          <p:spPr>
+            <a:xfrm>
+              <a:off x="1868415" y="5862366"/>
+              <a:ext cx="8037" cy="442063"/>
+            </a:xfrm>
+            <a:prstGeom prst="straightConnector1">
+              <a:avLst/>
+            </a:prstGeom>
+            <a:ln>
+              <a:tailEnd type="arrow"/>
+            </a:ln>
+          </p:spPr>
+          <p:style>
+            <a:lnRef idx="2">
+              <a:schemeClr val="accent1"/>
+            </a:lnRef>
+            <a:fillRef idx="0">
+              <a:schemeClr val="accent1"/>
+            </a:fillRef>
+            <a:effectRef idx="1">
+              <a:schemeClr val="accent1"/>
+            </a:effectRef>
+            <a:fontRef idx="minor">
+              <a:schemeClr val="tx1"/>
+            </a:fontRef>
+          </p:style>
+        </p:cxnSp>
+      </p:grpSp>
+      <p:sp>
+        <p:nvSpPr>
+          <p:cNvPr id="17" name="Right Brace 16"/>
+          <p:cNvSpPr/>
+          <p:nvPr/>
+        </p:nvSpPr>
+        <p:spPr>
+          <a:xfrm rot="5400000">
+            <a:off x="2628755" y="3728345"/>
+            <a:ext cx="264900" cy="519303"/>
+          </a:xfrm>
+          <a:prstGeom prst="rightBrace">
+            <a:avLst/>
+          </a:prstGeom>
+        </p:spPr>
+        <p:style>
+          <a:lnRef idx="2">
+            <a:schemeClr val="accent1"/>
+          </a:lnRef>
+          <a:fillRef idx="0">
+            <a:schemeClr val="accent1"/>
+          </a:fillRef>
+          <a:effectRef idx="1">
+            <a:schemeClr val="accent1"/>
+          </a:effectRef>
+          <a:fontRef idx="minor">
+            <a:schemeClr val="tx1"/>
+          </a:fontRef>
+        </p:style>
+        <p:txBody>
+          <a:bodyPr rtlCol="0" anchor="ctr"/>
+          <a:lstStyle/>
+          <a:p>
+            <a:pPr algn="ctr"/>
+            <a:endParaRPr lang="en-US"/>
+          </a:p>
+        </p:txBody>
+      </p:sp>
+      <p:sp>
+        <p:nvSpPr>
+          <p:cNvPr id="18" name="TextBox 17"/>
+          <p:cNvSpPr txBox="1"/>
+          <p:nvPr/>
+        </p:nvSpPr>
+        <p:spPr>
+          <a:xfrm>
+            <a:off x="2681112" y="4120447"/>
+            <a:ext cx="1493355" cy="369332"/>
+          </a:xfrm>
+          <a:prstGeom prst="rect">
+            <a:avLst/>
+          </a:prstGeom>
+          <a:noFill/>
+        </p:spPr>
+        <p:txBody>
+          <a:bodyPr wrap="none" rtlCol="0">
+            <a:spAutoFit/>
+          </a:bodyPr>
+          <a:lstStyle/>
+          <a:p>
+            <a:r>
+              <a:rPr lang="en-US" dirty="0" smtClean="0"/>
+              <a:t>During fasting</a:t>
+            </a:r>
+            <a:endParaRPr lang="en-US" dirty="0"/>
+          </a:p>
+        </p:txBody>
+      </p:sp>
+      <p:sp>
+        <p:nvSpPr>
+          <p:cNvPr id="22" name="Right Arrow 21"/>
+          <p:cNvSpPr/>
+          <p:nvPr/>
+        </p:nvSpPr>
+        <p:spPr>
+          <a:xfrm>
+            <a:off x="3010991" y="3005668"/>
+            <a:ext cx="1484503" cy="250422"/>
+          </a:xfrm>
+          <a:prstGeom prst="rightArrow">
+            <a:avLst/>
+          </a:prstGeom>
+        </p:spPr>
+        <p:style>
+          <a:lnRef idx="1">
+            <a:schemeClr val="accent1"/>
+          </a:lnRef>
+          <a:fillRef idx="3">
+            <a:schemeClr val="accent1"/>
+          </a:fillRef>
+          <a:effectRef idx="2">
+            <a:schemeClr val="accent1"/>
+          </a:effectRef>
+          <a:fontRef idx="minor">
+            <a:schemeClr val="lt1"/>
+          </a:fontRef>
+        </p:style>
+        <p:txBody>
+          <a:bodyPr rtlCol="0" anchor="ctr"/>
+          <a:lstStyle/>
+          <a:p>
+            <a:pPr algn="ctr"/>
+            <a:endParaRPr lang="en-US"/>
+          </a:p>
+        </p:txBody>
+      </p:sp>
+      <p:sp>
+        <p:nvSpPr>
+          <p:cNvPr id="23" name="Right Arrow 22"/>
+          <p:cNvSpPr/>
+          <p:nvPr/>
+        </p:nvSpPr>
+        <p:spPr>
+          <a:xfrm rot="10800000">
+            <a:off x="1622777" y="3005668"/>
+            <a:ext cx="865439" cy="250422"/>
+          </a:xfrm>
+          <a:prstGeom prst="rightArrow">
+            <a:avLst/>
+          </a:prstGeom>
+          <a:solidFill>
+            <a:schemeClr val="accent4">
+              <a:lumMod val="60000"/>
+              <a:lumOff val="40000"/>
+            </a:schemeClr>
+          </a:solidFill>
+        </p:spPr>
+        <p:style>
+          <a:lnRef idx="1">
+            <a:schemeClr val="accent1"/>
+          </a:lnRef>
+          <a:fillRef idx="3">
+            <a:schemeClr val="accent1"/>
+          </a:fillRef>
+          <a:effectRef idx="2">
+            <a:schemeClr val="accent1"/>
+          </a:effectRef>
+          <a:fontRef idx="minor">
+            <a:schemeClr val="lt1"/>
+          </a:fontRef>
+        </p:style>
+        <p:txBody>
+          <a:bodyPr rtlCol="0" anchor="ctr"/>
+          <a:lstStyle/>
+          <a:p>
+            <a:pPr algn="ctr"/>
+            <a:endParaRPr lang="en-US"/>
+          </a:p>
+        </p:txBody>
+      </p:sp>
+      <p:sp>
+        <p:nvSpPr>
+          <p:cNvPr id="24" name="TextBox 23"/>
+          <p:cNvSpPr txBox="1"/>
+          <p:nvPr/>
+        </p:nvSpPr>
+        <p:spPr>
+          <a:xfrm>
+            <a:off x="1223068" y="2632761"/>
+            <a:ext cx="1199742" cy="369332"/>
+          </a:xfrm>
+          <a:prstGeom prst="rect">
+            <a:avLst/>
+          </a:prstGeom>
+          <a:noFill/>
+        </p:spPr>
+        <p:txBody>
+          <a:bodyPr wrap="none" rtlCol="0">
+            <a:spAutoFit/>
+          </a:bodyPr>
+          <a:lstStyle/>
+          <a:p>
+            <a:r>
+              <a:rPr lang="en-US" dirty="0" smtClean="0"/>
+              <a:t>Pre-fasting</a:t>
+            </a:r>
+            <a:endParaRPr lang="en-US" dirty="0"/>
+          </a:p>
+        </p:txBody>
+      </p:sp>
+      <p:sp>
+        <p:nvSpPr>
+          <p:cNvPr id="25" name="TextBox 24"/>
+          <p:cNvSpPr txBox="1"/>
+          <p:nvPr/>
+        </p:nvSpPr>
+        <p:spPr>
+          <a:xfrm>
+            <a:off x="3010991" y="2632761"/>
+            <a:ext cx="1356186" cy="369332"/>
+          </a:xfrm>
+          <a:prstGeom prst="rect">
+            <a:avLst/>
+          </a:prstGeom>
+          <a:noFill/>
+        </p:spPr>
+        <p:txBody>
+          <a:bodyPr wrap="none" rtlCol="0">
+            <a:spAutoFit/>
+          </a:bodyPr>
+          <a:lstStyle/>
+          <a:p>
+            <a:r>
+              <a:rPr lang="en-US" dirty="0" smtClean="0"/>
+              <a:t>After-fasting</a:t>
+            </a:r>
+            <a:endParaRPr lang="en-US" dirty="0"/>
+          </a:p>
+        </p:txBody>
+      </p:sp>
+    </p:spTree>
+    <p:extLst>
+      <p:ext uri="{BB962C8B-B14F-4D97-AF65-F5344CB8AC3E}">
+        <p14:creationId xmlns:p14="http://schemas.microsoft.com/office/powerpoint/2010/main" val="3491424195"/>
       </p:ext>
     </p:extLst>
   </p:cSld>
@@ -4223,6 +5053,676 @@
 </file>
 
 <file path=ppt/slides/slide20.xml><?xml version="1.0" encoding="utf-8"?>
+<p:sld xmlns:a="http://schemas.openxmlformats.org/drawingml/2006/main" xmlns:r="http://schemas.openxmlformats.org/officeDocument/2006/relationships" xmlns:p="http://schemas.openxmlformats.org/presentationml/2006/main">
+  <p:cSld>
+    <p:spTree>
+      <p:nvGrpSpPr>
+        <p:cNvPr id="1" name=""/>
+        <p:cNvGrpSpPr/>
+        <p:nvPr/>
+      </p:nvGrpSpPr>
+      <p:grpSpPr>
+        <a:xfrm>
+          <a:off x="0" y="0"/>
+          <a:ext cx="0" cy="0"/>
+          <a:chOff x="0" y="0"/>
+          <a:chExt cx="0" cy="0"/>
+        </a:xfrm>
+      </p:grpSpPr>
+      <p:pic>
+        <p:nvPicPr>
+          <p:cNvPr id="3" name="Picture 2" descr="Ambulatory_Light.pdf"/>
+          <p:cNvPicPr>
+            <a:picLocks noChangeAspect="1"/>
+          </p:cNvPicPr>
+          <p:nvPr/>
+        </p:nvPicPr>
+        <p:blipFill>
+          <a:blip r:embed="rId2">
+            <a:extLst>
+              <a:ext uri="{28A0092B-C50C-407E-A947-70E740481C1C}">
+                <a14:useLocalDpi xmlns:a14="http://schemas.microsoft.com/office/drawing/2010/main" val="0"/>
+              </a:ext>
+            </a:extLst>
+          </a:blip>
+          <a:stretch>
+            <a:fillRect/>
+          </a:stretch>
+        </p:blipFill>
+        <p:spPr>
+          <a:xfrm>
+            <a:off x="0" y="0"/>
+            <a:ext cx="5067807" cy="4007556"/>
+          </a:xfrm>
+          <a:prstGeom prst="rect">
+            <a:avLst/>
+          </a:prstGeom>
+        </p:spPr>
+      </p:pic>
+      <p:pic>
+        <p:nvPicPr>
+          <p:cNvPr id="2" name="Picture 1" descr="Ambulatory_Dark.pdf"/>
+          <p:cNvPicPr>
+            <a:picLocks noChangeAspect="1"/>
+          </p:cNvPicPr>
+          <p:nvPr/>
+        </p:nvPicPr>
+        <p:blipFill>
+          <a:blip r:embed="rId3">
+            <a:extLst>
+              <a:ext uri="{28A0092B-C50C-407E-A947-70E740481C1C}">
+                <a14:useLocalDpi xmlns:a14="http://schemas.microsoft.com/office/drawing/2010/main" val="0"/>
+              </a:ext>
+            </a:extLst>
+          </a:blip>
+          <a:stretch>
+            <a:fillRect/>
+          </a:stretch>
+        </p:blipFill>
+        <p:spPr>
+          <a:xfrm>
+            <a:off x="4144425" y="2808110"/>
+            <a:ext cx="5049963" cy="3993445"/>
+          </a:xfrm>
+          <a:prstGeom prst="rect">
+            <a:avLst/>
+          </a:prstGeom>
+        </p:spPr>
+      </p:pic>
+    </p:spTree>
+    <p:extLst>
+      <p:ext uri="{BB962C8B-B14F-4D97-AF65-F5344CB8AC3E}">
+        <p14:creationId xmlns:p14="http://schemas.microsoft.com/office/powerpoint/2010/main" val="1555029584"/>
+      </p:ext>
+    </p:extLst>
+  </p:cSld>
+  <p:clrMapOvr>
+    <a:masterClrMapping/>
+  </p:clrMapOvr>
+</p:sld>
+</file>
+
+<file path=ppt/slides/slide21.xml><?xml version="1.0" encoding="utf-8"?>
+<p:sld xmlns:a="http://schemas.openxmlformats.org/drawingml/2006/main" xmlns:r="http://schemas.openxmlformats.org/officeDocument/2006/relationships" xmlns:p="http://schemas.openxmlformats.org/presentationml/2006/main">
+  <p:cSld>
+    <p:spTree>
+      <p:nvGrpSpPr>
+        <p:cNvPr id="1" name=""/>
+        <p:cNvGrpSpPr/>
+        <p:nvPr/>
+      </p:nvGrpSpPr>
+      <p:grpSpPr>
+        <a:xfrm>
+          <a:off x="0" y="0"/>
+          <a:ext cx="0" cy="0"/>
+          <a:chOff x="0" y="0"/>
+          <a:chExt cx="0" cy="0"/>
+        </a:xfrm>
+      </p:grpSpPr>
+      <p:pic>
+        <p:nvPicPr>
+          <p:cNvPr id="3" name="Picture 2" descr="VO2.LBM_Light.pdf"/>
+          <p:cNvPicPr>
+            <a:picLocks noChangeAspect="1"/>
+          </p:cNvPicPr>
+          <p:nvPr/>
+        </p:nvPicPr>
+        <p:blipFill>
+          <a:blip r:embed="rId2">
+            <a:extLst>
+              <a:ext uri="{28A0092B-C50C-407E-A947-70E740481C1C}">
+                <a14:useLocalDpi xmlns:a14="http://schemas.microsoft.com/office/drawing/2010/main" val="0"/>
+              </a:ext>
+            </a:extLst>
+          </a:blip>
+          <a:stretch>
+            <a:fillRect/>
+          </a:stretch>
+        </p:blipFill>
+        <p:spPr>
+          <a:xfrm>
+            <a:off x="0" y="1"/>
+            <a:ext cx="4889363" cy="3866444"/>
+          </a:xfrm>
+          <a:prstGeom prst="rect">
+            <a:avLst/>
+          </a:prstGeom>
+        </p:spPr>
+      </p:pic>
+      <p:pic>
+        <p:nvPicPr>
+          <p:cNvPr id="2" name="Picture 1" descr="VO2.LBM_Dark.pdf"/>
+          <p:cNvPicPr>
+            <a:picLocks noChangeAspect="1"/>
+          </p:cNvPicPr>
+          <p:nvPr/>
+        </p:nvPicPr>
+        <p:blipFill>
+          <a:blip r:embed="rId3">
+            <a:extLst>
+              <a:ext uri="{28A0092B-C50C-407E-A947-70E740481C1C}">
+                <a14:useLocalDpi xmlns:a14="http://schemas.microsoft.com/office/drawing/2010/main" val="0"/>
+              </a:ext>
+            </a:extLst>
+          </a:blip>
+          <a:stretch>
+            <a:fillRect/>
+          </a:stretch>
+        </p:blipFill>
+        <p:spPr>
+          <a:xfrm>
+            <a:off x="4129726" y="2892778"/>
+            <a:ext cx="5014273" cy="3965222"/>
+          </a:xfrm>
+          <a:prstGeom prst="rect">
+            <a:avLst/>
+          </a:prstGeom>
+        </p:spPr>
+      </p:pic>
+    </p:spTree>
+    <p:extLst>
+      <p:ext uri="{BB962C8B-B14F-4D97-AF65-F5344CB8AC3E}">
+        <p14:creationId xmlns:p14="http://schemas.microsoft.com/office/powerpoint/2010/main" val="3664139651"/>
+      </p:ext>
+    </p:extLst>
+  </p:cSld>
+  <p:clrMapOvr>
+    <a:masterClrMapping/>
+  </p:clrMapOvr>
+</p:sld>
+</file>
+
+<file path=ppt/slides/slide22.xml><?xml version="1.0" encoding="utf-8"?>
+<p:sld xmlns:a="http://schemas.openxmlformats.org/drawingml/2006/main" xmlns:r="http://schemas.openxmlformats.org/officeDocument/2006/relationships" xmlns:p="http://schemas.openxmlformats.org/presentationml/2006/main">
+  <p:cSld>
+    <p:spTree>
+      <p:nvGrpSpPr>
+        <p:cNvPr id="1" name=""/>
+        <p:cNvGrpSpPr/>
+        <p:nvPr/>
+      </p:nvGrpSpPr>
+      <p:grpSpPr>
+        <a:xfrm>
+          <a:off x="0" y="0"/>
+          <a:ext cx="0" cy="0"/>
+          <a:chOff x="0" y="0"/>
+          <a:chExt cx="0" cy="0"/>
+        </a:xfrm>
+      </p:grpSpPr>
+      <p:pic>
+        <p:nvPicPr>
+          <p:cNvPr id="3" name="Picture 2" descr="RER_Light.pdf"/>
+          <p:cNvPicPr>
+            <a:picLocks noChangeAspect="1"/>
+          </p:cNvPicPr>
+          <p:nvPr/>
+        </p:nvPicPr>
+        <p:blipFill>
+          <a:blip r:embed="rId2">
+            <a:extLst>
+              <a:ext uri="{28A0092B-C50C-407E-A947-70E740481C1C}">
+                <a14:useLocalDpi xmlns:a14="http://schemas.microsoft.com/office/drawing/2010/main" val="0"/>
+              </a:ext>
+            </a:extLst>
+          </a:blip>
+          <a:stretch>
+            <a:fillRect/>
+          </a:stretch>
+        </p:blipFill>
+        <p:spPr>
+          <a:xfrm>
+            <a:off x="0" y="0"/>
+            <a:ext cx="5221111" cy="4128786"/>
+          </a:xfrm>
+          <a:prstGeom prst="rect">
+            <a:avLst/>
+          </a:prstGeom>
+        </p:spPr>
+      </p:pic>
+      <p:pic>
+        <p:nvPicPr>
+          <p:cNvPr id="2" name="Picture 1" descr="RER_Dark.pdf"/>
+          <p:cNvPicPr>
+            <a:picLocks noChangeAspect="1"/>
+          </p:cNvPicPr>
+          <p:nvPr/>
+        </p:nvPicPr>
+        <p:blipFill>
+          <a:blip r:embed="rId3">
+            <a:extLst>
+              <a:ext uri="{28A0092B-C50C-407E-A947-70E740481C1C}">
+                <a14:useLocalDpi xmlns:a14="http://schemas.microsoft.com/office/drawing/2010/main" val="0"/>
+              </a:ext>
+            </a:extLst>
+          </a:blip>
+          <a:stretch>
+            <a:fillRect/>
+          </a:stretch>
+        </p:blipFill>
+        <p:spPr>
+          <a:xfrm>
+            <a:off x="4097607" y="2909711"/>
+            <a:ext cx="5046393" cy="3990622"/>
+          </a:xfrm>
+          <a:prstGeom prst="rect">
+            <a:avLst/>
+          </a:prstGeom>
+        </p:spPr>
+      </p:pic>
+    </p:spTree>
+    <p:extLst>
+      <p:ext uri="{BB962C8B-B14F-4D97-AF65-F5344CB8AC3E}">
+        <p14:creationId xmlns:p14="http://schemas.microsoft.com/office/powerpoint/2010/main" val="2937199701"/>
+      </p:ext>
+    </p:extLst>
+  </p:cSld>
+  <p:clrMapOvr>
+    <a:masterClrMapping/>
+  </p:clrMapOvr>
+</p:sld>
+</file>
+
+<file path=ppt/slides/slide23.xml><?xml version="1.0" encoding="utf-8"?>
+<p:sld xmlns:a="http://schemas.openxmlformats.org/drawingml/2006/main" xmlns:r="http://schemas.openxmlformats.org/officeDocument/2006/relationships" xmlns:p="http://schemas.openxmlformats.org/presentationml/2006/main">
+  <p:cSld>
+    <p:spTree>
+      <p:nvGrpSpPr>
+        <p:cNvPr id="1" name=""/>
+        <p:cNvGrpSpPr/>
+        <p:nvPr/>
+      </p:nvGrpSpPr>
+      <p:grpSpPr>
+        <a:xfrm>
+          <a:off x="0" y="0"/>
+          <a:ext cx="0" cy="0"/>
+          <a:chOff x="0" y="0"/>
+          <a:chExt cx="0" cy="0"/>
+        </a:xfrm>
+      </p:grpSpPr>
+      <p:pic>
+        <p:nvPicPr>
+          <p:cNvPr id="3" name="Picture 2" descr="VO2.LBM_vs_PercentWG_Dark.pdf"/>
+          <p:cNvPicPr>
+            <a:picLocks noChangeAspect="1"/>
+          </p:cNvPicPr>
+          <p:nvPr/>
+        </p:nvPicPr>
+        <p:blipFill>
+          <a:blip r:embed="rId2">
+            <a:extLst>
+              <a:ext uri="{28A0092B-C50C-407E-A947-70E740481C1C}">
+                <a14:useLocalDpi xmlns:a14="http://schemas.microsoft.com/office/drawing/2010/main" val="0"/>
+              </a:ext>
+            </a:extLst>
+          </a:blip>
+          <a:stretch>
+            <a:fillRect/>
+          </a:stretch>
+        </p:blipFill>
+        <p:spPr>
+          <a:xfrm>
+            <a:off x="3951110" y="2751530"/>
+            <a:ext cx="5192889" cy="4106469"/>
+          </a:xfrm>
+          <a:prstGeom prst="rect">
+            <a:avLst/>
+          </a:prstGeom>
+        </p:spPr>
+      </p:pic>
+      <p:pic>
+        <p:nvPicPr>
+          <p:cNvPr id="4" name="Picture 3" descr="VO2.LBM_vs_PercentWG_Light.pdf"/>
+          <p:cNvPicPr>
+            <a:picLocks noChangeAspect="1"/>
+          </p:cNvPicPr>
+          <p:nvPr/>
+        </p:nvPicPr>
+        <p:blipFill>
+          <a:blip r:embed="rId3">
+            <a:extLst>
+              <a:ext uri="{28A0092B-C50C-407E-A947-70E740481C1C}">
+                <a14:useLocalDpi xmlns:a14="http://schemas.microsoft.com/office/drawing/2010/main" val="0"/>
+              </a:ext>
+            </a:extLst>
+          </a:blip>
+          <a:stretch>
+            <a:fillRect/>
+          </a:stretch>
+        </p:blipFill>
+        <p:spPr>
+          <a:xfrm>
+            <a:off x="1" y="0"/>
+            <a:ext cx="4924778" cy="3894450"/>
+          </a:xfrm>
+          <a:prstGeom prst="rect">
+            <a:avLst/>
+          </a:prstGeom>
+        </p:spPr>
+      </p:pic>
+    </p:spTree>
+    <p:extLst>
+      <p:ext uri="{BB962C8B-B14F-4D97-AF65-F5344CB8AC3E}">
+        <p14:creationId xmlns:p14="http://schemas.microsoft.com/office/powerpoint/2010/main" val="538061056"/>
+      </p:ext>
+    </p:extLst>
+  </p:cSld>
+  <p:clrMapOvr>
+    <a:masterClrMapping/>
+  </p:clrMapOvr>
+</p:sld>
+</file>
+
+<file path=ppt/slides/slide24.xml><?xml version="1.0" encoding="utf-8"?>
+<p:sld xmlns:a="http://schemas.openxmlformats.org/drawingml/2006/main" xmlns:r="http://schemas.openxmlformats.org/officeDocument/2006/relationships" xmlns:p="http://schemas.openxmlformats.org/presentationml/2006/main">
+  <p:cSld>
+    <p:spTree>
+      <p:nvGrpSpPr>
+        <p:cNvPr id="1" name=""/>
+        <p:cNvGrpSpPr/>
+        <p:nvPr/>
+      </p:nvGrpSpPr>
+      <p:grpSpPr>
+        <a:xfrm>
+          <a:off x="0" y="0"/>
+          <a:ext cx="0" cy="0"/>
+          <a:chOff x="0" y="0"/>
+          <a:chExt cx="0" cy="0"/>
+        </a:xfrm>
+      </p:grpSpPr>
+      <p:pic>
+        <p:nvPicPr>
+          <p:cNvPr id="2" name="Picture 1" descr="RER_vs_PercentWG_Dark.pdf"/>
+          <p:cNvPicPr>
+            <a:picLocks noChangeAspect="1"/>
+          </p:cNvPicPr>
+          <p:nvPr/>
+        </p:nvPicPr>
+        <p:blipFill>
+          <a:blip r:embed="rId2">
+            <a:extLst>
+              <a:ext uri="{28A0092B-C50C-407E-A947-70E740481C1C}">
+                <a14:useLocalDpi xmlns:a14="http://schemas.microsoft.com/office/drawing/2010/main" val="0"/>
+              </a:ext>
+            </a:extLst>
+          </a:blip>
+          <a:stretch>
+            <a:fillRect/>
+          </a:stretch>
+        </p:blipFill>
+        <p:spPr>
+          <a:xfrm>
+            <a:off x="4219222" y="2963550"/>
+            <a:ext cx="4924777" cy="3894449"/>
+          </a:xfrm>
+          <a:prstGeom prst="rect">
+            <a:avLst/>
+          </a:prstGeom>
+        </p:spPr>
+      </p:pic>
+      <p:pic>
+        <p:nvPicPr>
+          <p:cNvPr id="3" name="Picture 2" descr="RER_vs_PercentWG_Light.pdf"/>
+          <p:cNvPicPr>
+            <a:picLocks noChangeAspect="1"/>
+          </p:cNvPicPr>
+          <p:nvPr/>
+        </p:nvPicPr>
+        <p:blipFill>
+          <a:blip r:embed="rId3">
+            <a:extLst>
+              <a:ext uri="{28A0092B-C50C-407E-A947-70E740481C1C}">
+                <a14:useLocalDpi xmlns:a14="http://schemas.microsoft.com/office/drawing/2010/main" val="0"/>
+              </a:ext>
+            </a:extLst>
+          </a:blip>
+          <a:stretch>
+            <a:fillRect/>
+          </a:stretch>
+        </p:blipFill>
+        <p:spPr>
+          <a:xfrm>
+            <a:off x="0" y="0"/>
+            <a:ext cx="4642556" cy="3671273"/>
+          </a:xfrm>
+          <a:prstGeom prst="rect">
+            <a:avLst/>
+          </a:prstGeom>
+        </p:spPr>
+      </p:pic>
+    </p:spTree>
+    <p:extLst>
+      <p:ext uri="{BB962C8B-B14F-4D97-AF65-F5344CB8AC3E}">
+        <p14:creationId xmlns:p14="http://schemas.microsoft.com/office/powerpoint/2010/main" val="3131907003"/>
+      </p:ext>
+    </p:extLst>
+  </p:cSld>
+  <p:clrMapOvr>
+    <a:masterClrMapping/>
+  </p:clrMapOvr>
+</p:sld>
+</file>
+
+<file path=ppt/slides/slide25.xml><?xml version="1.0" encoding="utf-8"?>
+<p:sld xmlns:a="http://schemas.openxmlformats.org/drawingml/2006/main" xmlns:r="http://schemas.openxmlformats.org/officeDocument/2006/relationships" xmlns:p="http://schemas.openxmlformats.org/presentationml/2006/main">
+  <p:cSld>
+    <p:spTree>
+      <p:nvGrpSpPr>
+        <p:cNvPr id="1" name=""/>
+        <p:cNvGrpSpPr/>
+        <p:nvPr/>
+      </p:nvGrpSpPr>
+      <p:grpSpPr>
+        <a:xfrm>
+          <a:off x="0" y="0"/>
+          <a:ext cx="0" cy="0"/>
+          <a:chOff x="0" y="0"/>
+          <a:chExt cx="0" cy="0"/>
+        </a:xfrm>
+      </p:grpSpPr>
+      <p:pic>
+        <p:nvPicPr>
+          <p:cNvPr id="3" name="Picture 2" descr="Ambulatory_vs_PercentWG_Dark.pdf"/>
+          <p:cNvPicPr>
+            <a:picLocks noChangeAspect="1"/>
+          </p:cNvPicPr>
+          <p:nvPr/>
+        </p:nvPicPr>
+        <p:blipFill>
+          <a:blip r:embed="rId2">
+            <a:extLst>
+              <a:ext uri="{28A0092B-C50C-407E-A947-70E740481C1C}">
+                <a14:useLocalDpi xmlns:a14="http://schemas.microsoft.com/office/drawing/2010/main" val="0"/>
+              </a:ext>
+            </a:extLst>
+          </a:blip>
+          <a:stretch>
+            <a:fillRect/>
+          </a:stretch>
+        </p:blipFill>
+        <p:spPr>
+          <a:xfrm>
+            <a:off x="4388556" y="3097456"/>
+            <a:ext cx="4755444" cy="3760543"/>
+          </a:xfrm>
+          <a:prstGeom prst="rect">
+            <a:avLst/>
+          </a:prstGeom>
+        </p:spPr>
+      </p:pic>
+      <p:pic>
+        <p:nvPicPr>
+          <p:cNvPr id="2" name="Picture 1" descr="Ambulatory_vs_PercentWG_Light.pdf"/>
+          <p:cNvPicPr>
+            <a:picLocks noChangeAspect="1"/>
+          </p:cNvPicPr>
+          <p:nvPr/>
+        </p:nvPicPr>
+        <p:blipFill>
+          <a:blip r:embed="rId3">
+            <a:extLst>
+              <a:ext uri="{28A0092B-C50C-407E-A947-70E740481C1C}">
+                <a14:useLocalDpi xmlns:a14="http://schemas.microsoft.com/office/drawing/2010/main" val="0"/>
+              </a:ext>
+            </a:extLst>
+          </a:blip>
+          <a:stretch>
+            <a:fillRect/>
+          </a:stretch>
+        </p:blipFill>
+        <p:spPr>
+          <a:xfrm>
+            <a:off x="0" y="0"/>
+            <a:ext cx="4868333" cy="3849814"/>
+          </a:xfrm>
+          <a:prstGeom prst="rect">
+            <a:avLst/>
+          </a:prstGeom>
+        </p:spPr>
+      </p:pic>
+    </p:spTree>
+    <p:extLst>
+      <p:ext uri="{BB962C8B-B14F-4D97-AF65-F5344CB8AC3E}">
+        <p14:creationId xmlns:p14="http://schemas.microsoft.com/office/powerpoint/2010/main" val="2890911517"/>
+      </p:ext>
+    </p:extLst>
+  </p:cSld>
+  <p:clrMapOvr>
+    <a:masterClrMapping/>
+  </p:clrMapOvr>
+</p:sld>
+</file>
+
+<file path=ppt/slides/slide26.xml><?xml version="1.0" encoding="utf-8"?>
+<p:sld xmlns:a="http://schemas.openxmlformats.org/drawingml/2006/main" xmlns:r="http://schemas.openxmlformats.org/officeDocument/2006/relationships" xmlns:p="http://schemas.openxmlformats.org/presentationml/2006/main">
+  <p:cSld>
+    <p:spTree>
+      <p:nvGrpSpPr>
+        <p:cNvPr id="1" name=""/>
+        <p:cNvGrpSpPr/>
+        <p:nvPr/>
+      </p:nvGrpSpPr>
+      <p:grpSpPr>
+        <a:xfrm>
+          <a:off x="0" y="0"/>
+          <a:ext cx="0" cy="0"/>
+          <a:chOff x="0" y="0"/>
+          <a:chExt cx="0" cy="0"/>
+        </a:xfrm>
+      </p:grpSpPr>
+    </p:spTree>
+    <p:extLst>
+      <p:ext uri="{BB962C8B-B14F-4D97-AF65-F5344CB8AC3E}">
+        <p14:creationId xmlns:p14="http://schemas.microsoft.com/office/powerpoint/2010/main" val="1495769990"/>
+      </p:ext>
+    </p:extLst>
+  </p:cSld>
+  <p:clrMapOvr>
+    <a:masterClrMapping/>
+  </p:clrMapOvr>
+</p:sld>
+</file>
+
+<file path=ppt/slides/slide27.xml><?xml version="1.0" encoding="utf-8"?>
+<p:sld xmlns:a="http://schemas.openxmlformats.org/drawingml/2006/main" xmlns:r="http://schemas.openxmlformats.org/officeDocument/2006/relationships" xmlns:p="http://schemas.openxmlformats.org/presentationml/2006/main">
+  <p:cSld>
+    <p:spTree>
+      <p:nvGrpSpPr>
+        <p:cNvPr id="1" name=""/>
+        <p:cNvGrpSpPr/>
+        <p:nvPr/>
+      </p:nvGrpSpPr>
+      <p:grpSpPr>
+        <a:xfrm>
+          <a:off x="0" y="0"/>
+          <a:ext cx="0" cy="0"/>
+          <a:chOff x="0" y="0"/>
+          <a:chExt cx="0" cy="0"/>
+        </a:xfrm>
+      </p:grpSpPr>
+      <p:sp>
+        <p:nvSpPr>
+          <p:cNvPr id="2" name="Title 1"/>
+          <p:cNvSpPr>
+            <a:spLocks noGrp="1"/>
+          </p:cNvSpPr>
+          <p:nvPr>
+            <p:ph type="title"/>
+          </p:nvPr>
+        </p:nvSpPr>
+        <p:spPr/>
+        <p:txBody>
+          <a:bodyPr/>
+          <a:lstStyle/>
+          <a:p>
+            <a:r>
+              <a:rPr lang="en-US" dirty="0" smtClean="0"/>
+              <a:t>Juvenile HFD</a:t>
+            </a:r>
+            <a:endParaRPr lang="en-US" dirty="0"/>
+          </a:p>
+        </p:txBody>
+      </p:sp>
+      <p:sp>
+        <p:nvSpPr>
+          <p:cNvPr id="3" name="Content Placeholder 2"/>
+          <p:cNvSpPr>
+            <a:spLocks noGrp="1"/>
+          </p:cNvSpPr>
+          <p:nvPr>
+            <p:ph idx="1"/>
+          </p:nvPr>
+        </p:nvSpPr>
+        <p:spPr/>
+        <p:txBody>
+          <a:bodyPr/>
+          <a:lstStyle/>
+          <a:p>
+            <a:r>
+              <a:rPr lang="en-US" dirty="0" err="1" smtClean="0"/>
+              <a:t>JuvHFD</a:t>
+            </a:r>
+            <a:r>
+              <a:rPr lang="en-US" dirty="0" smtClean="0"/>
+              <a:t> # 1 – Born 2014-04-21 (Mice #410-433)</a:t>
+            </a:r>
+          </a:p>
+          <a:p>
+            <a:r>
+              <a:rPr lang="en-US" dirty="0" err="1" smtClean="0"/>
+              <a:t>JuvHFD</a:t>
+            </a:r>
+            <a:r>
+              <a:rPr lang="en-US" dirty="0" smtClean="0"/>
+              <a:t> # 2 – Born 2014-07-07</a:t>
+            </a:r>
+          </a:p>
+          <a:p>
+            <a:r>
+              <a:rPr lang="en-US" dirty="0" err="1" smtClean="0"/>
+              <a:t>RNAseq</a:t>
+            </a:r>
+            <a:r>
+              <a:rPr lang="en-US" dirty="0" smtClean="0"/>
+              <a:t> – Born 2015-01-21</a:t>
+            </a:r>
+            <a:endParaRPr lang="en-US" dirty="0"/>
+          </a:p>
+        </p:txBody>
+      </p:sp>
+    </p:spTree>
+    <p:extLst>
+      <p:ext uri="{BB962C8B-B14F-4D97-AF65-F5344CB8AC3E}">
+        <p14:creationId xmlns:p14="http://schemas.microsoft.com/office/powerpoint/2010/main" val="1740669473"/>
+      </p:ext>
+    </p:extLst>
+  </p:cSld>
+  <p:clrMapOvr>
+    <a:masterClrMapping/>
+  </p:clrMapOvr>
+</p:sld>
+</file>
+
+<file path=ppt/slides/slide28.xml><?xml version="1.0" encoding="utf-8"?>
 <p:sld xmlns:a="http://schemas.openxmlformats.org/drawingml/2006/main" xmlns:r="http://schemas.openxmlformats.org/officeDocument/2006/relationships" xmlns:p="http://schemas.openxmlformats.org/presentationml/2006/main">
   <p:cSld>
     <p:spTree>
@@ -4276,7 +5776,7 @@
 </p:sld>
 </file>
 
-<file path=ppt/slides/slide21.xml><?xml version="1.0" encoding="utf-8"?>
+<file path=ppt/slides/slide29.xml><?xml version="1.0" encoding="utf-8"?>
 <p:sld xmlns:a="http://schemas.openxmlformats.org/drawingml/2006/main" xmlns:r="http://schemas.openxmlformats.org/officeDocument/2006/relationships" xmlns:p="http://schemas.openxmlformats.org/presentationml/2006/main">
   <p:cSld>
     <p:spTree>
@@ -4330,7 +5830,97 @@
 </p:sld>
 </file>
 
-<file path=ppt/slides/slide22.xml><?xml version="1.0" encoding="utf-8"?>
+<file path=ppt/slides/slide3.xml><?xml version="1.0" encoding="utf-8"?>
+<p:sld xmlns:a="http://schemas.openxmlformats.org/drawingml/2006/main" xmlns:r="http://schemas.openxmlformats.org/officeDocument/2006/relationships" xmlns:p="http://schemas.openxmlformats.org/presentationml/2006/main">
+  <p:cSld>
+    <p:spTree>
+      <p:nvGrpSpPr>
+        <p:cNvPr id="1" name=""/>
+        <p:cNvGrpSpPr/>
+        <p:nvPr/>
+      </p:nvGrpSpPr>
+      <p:grpSpPr>
+        <a:xfrm>
+          <a:off x="0" y="0"/>
+          <a:ext cx="0" cy="0"/>
+          <a:chOff x="0" y="0"/>
+          <a:chExt cx="0" cy="0"/>
+        </a:xfrm>
+      </p:grpSpPr>
+      <p:sp>
+        <p:nvSpPr>
+          <p:cNvPr id="2" name="Title 1"/>
+          <p:cNvSpPr>
+            <a:spLocks noGrp="1"/>
+          </p:cNvSpPr>
+          <p:nvPr>
+            <p:ph type="title"/>
+          </p:nvPr>
+        </p:nvSpPr>
+        <p:spPr/>
+        <p:txBody>
+          <a:bodyPr/>
+          <a:lstStyle/>
+          <a:p>
+            <a:r>
+              <a:rPr lang="en-US" dirty="0" smtClean="0"/>
+              <a:t>Hypothesis</a:t>
+            </a:r>
+            <a:endParaRPr lang="en-US" dirty="0"/>
+          </a:p>
+        </p:txBody>
+      </p:sp>
+      <p:sp>
+        <p:nvSpPr>
+          <p:cNvPr id="3" name="Content Placeholder 2"/>
+          <p:cNvSpPr>
+            <a:spLocks noGrp="1"/>
+          </p:cNvSpPr>
+          <p:nvPr>
+            <p:ph idx="1"/>
+          </p:nvPr>
+        </p:nvSpPr>
+        <p:spPr/>
+        <p:txBody>
+          <a:bodyPr/>
+          <a:lstStyle/>
+          <a:p>
+            <a:r>
+              <a:rPr lang="en-US" dirty="0" smtClean="0"/>
+              <a:t>Weight loss during fasting may be a predictor of weight gain after HFD.</a:t>
+            </a:r>
+          </a:p>
+          <a:p>
+            <a:pPr lvl="1"/>
+            <a:r>
+              <a:rPr lang="en-US" dirty="0" smtClean="0"/>
+              <a:t>Previous cohorts 5-6: there appeared to be a negative relationship</a:t>
+            </a:r>
+          </a:p>
+          <a:p>
+            <a:pPr lvl="1"/>
+            <a:r>
+              <a:rPr lang="en-US" dirty="0" smtClean="0"/>
+              <a:t>Current cohorts 7-8: there is a positive relationship</a:t>
+            </a:r>
+            <a:endParaRPr lang="en-US" dirty="0"/>
+          </a:p>
+        </p:txBody>
+      </p:sp>
+    </p:spTree>
+    <p:extLst>
+      <p:ext uri="{BB962C8B-B14F-4D97-AF65-F5344CB8AC3E}">
+        <p14:creationId xmlns:p14="http://schemas.microsoft.com/office/powerpoint/2010/main" val="3921865371"/>
+      </p:ext>
+    </p:extLst>
+  </p:cSld>
+  <p:clrMapOvr>
+    <a:masterClrMapping/>
+  </p:clrMapOvr>
+</p:sld>
+</file>
+
+<file path=ppt/slides/slide30.xml><?xml version="1.0" encoding="utf-8"?>
 <p:sld xmlns:a="http://schemas.openxmlformats.org/drawingml/2006/main" xmlns:r="http://schemas.openxmlformats.org/officeDocument/2006/relationships" xmlns:p="http://schemas.openxmlformats.org/presentationml/2006/main">
   <p:cSld>
     <p:spTree>
@@ -4403,7 +5993,7 @@
 </p:sld>
 </file>
 
-<file path=ppt/slides/slide23.xml><?xml version="1.0" encoding="utf-8"?>
+<file path=ppt/slides/slide31.xml><?xml version="1.0" encoding="utf-8"?>
 <p:sld xmlns:a="http://schemas.openxmlformats.org/drawingml/2006/main" xmlns:r="http://schemas.openxmlformats.org/officeDocument/2006/relationships" xmlns:p="http://schemas.openxmlformats.org/presentationml/2006/main">
   <p:cSld>
     <p:spTree>
@@ -4476,7 +6066,7 @@
 </p:sld>
 </file>
 
-<file path=ppt/slides/slide24.xml><?xml version="1.0" encoding="utf-8"?>
+<file path=ppt/slides/slide32.xml><?xml version="1.0" encoding="utf-8"?>
 <p:sld xmlns:a="http://schemas.openxmlformats.org/drawingml/2006/main" xmlns:r="http://schemas.openxmlformats.org/officeDocument/2006/relationships" xmlns:p="http://schemas.openxmlformats.org/presentationml/2006/main">
   <p:cSld>
     <p:spTree>
@@ -4563,7 +6153,7 @@
 </p:sld>
 </file>
 
-<file path=ppt/slides/slide25.xml><?xml version="1.0" encoding="utf-8"?>
+<file path=ppt/slides/slide33.xml><?xml version="1.0" encoding="utf-8"?>
 <p:sld xmlns:a="http://schemas.openxmlformats.org/drawingml/2006/main" xmlns:r="http://schemas.openxmlformats.org/officeDocument/2006/relationships" xmlns:p="http://schemas.openxmlformats.org/presentationml/2006/main">
   <p:cSld>
     <p:spTree>
@@ -4641,7 +6231,7 @@
 </p:sld>
 </file>
 
-<file path=ppt/slides/slide26.xml><?xml version="1.0" encoding="utf-8"?>
+<file path=ppt/slides/slide34.xml><?xml version="1.0" encoding="utf-8"?>
 <p:sld xmlns:a="http://schemas.openxmlformats.org/drawingml/2006/main" xmlns:r="http://schemas.openxmlformats.org/officeDocument/2006/relationships" xmlns:p="http://schemas.openxmlformats.org/presentationml/2006/main">
   <p:cSld>
     <p:spTree>
@@ -4695,7 +6285,7 @@
 </p:sld>
 </file>
 
-<file path=ppt/slides/slide27.xml><?xml version="1.0" encoding="utf-8"?>
+<file path=ppt/slides/slide35.xml><?xml version="1.0" encoding="utf-8"?>
 <p:sld xmlns:a="http://schemas.openxmlformats.org/drawingml/2006/main" xmlns:r="http://schemas.openxmlformats.org/officeDocument/2006/relationships" xmlns:p="http://schemas.openxmlformats.org/presentationml/2006/main">
   <p:cSld>
     <p:spTree>
@@ -4749,7 +6339,7 @@
 </p:sld>
 </file>
 
-<file path=ppt/slides/slide28.xml><?xml version="1.0" encoding="utf-8"?>
+<file path=ppt/slides/slide36.xml><?xml version="1.0" encoding="utf-8"?>
 <p:sld xmlns:a="http://schemas.openxmlformats.org/drawingml/2006/main" xmlns:r="http://schemas.openxmlformats.org/officeDocument/2006/relationships" xmlns:p="http://schemas.openxmlformats.org/presentationml/2006/main">
   <p:cSld>
     <p:spTree>
@@ -4821,7 +6411,7 @@
 </p:sld>
 </file>
 
-<file path=ppt/slides/slide29.xml><?xml version="1.0" encoding="utf-8"?>
+<file path=ppt/slides/slide37.xml><?xml version="1.0" encoding="utf-8"?>
 <p:sld xmlns:a="http://schemas.openxmlformats.org/drawingml/2006/main" xmlns:r="http://schemas.openxmlformats.org/officeDocument/2006/relationships" xmlns:p="http://schemas.openxmlformats.org/presentationml/2006/main">
   <p:cSld>
     <p:spTree>
@@ -4875,7 +6465,7 @@
 </p:sld>
 </file>
 
-<file path=ppt/slides/slide3.xml><?xml version="1.0" encoding="utf-8"?>
+<file path=ppt/slides/slide38.xml><?xml version="1.0" encoding="utf-8"?>
 <p:sld xmlns:a="http://schemas.openxmlformats.org/drawingml/2006/main" xmlns:r="http://schemas.openxmlformats.org/officeDocument/2006/relationships" xmlns:p="http://schemas.openxmlformats.org/presentationml/2006/main">
   <p:cSld>
     <p:spTree>
@@ -4907,96 +6497,6 @@
           <a:bodyPr/>
           <a:lstStyle/>
           <a:p>
-            <a:r>
-              <a:rPr lang="en-US" dirty="0" smtClean="0"/>
-              <a:t>Hypothesis</a:t>
-            </a:r>
-            <a:endParaRPr lang="en-US" dirty="0"/>
-          </a:p>
-        </p:txBody>
-      </p:sp>
-      <p:sp>
-        <p:nvSpPr>
-          <p:cNvPr id="3" name="Content Placeholder 2"/>
-          <p:cNvSpPr>
-            <a:spLocks noGrp="1"/>
-          </p:cNvSpPr>
-          <p:nvPr>
-            <p:ph idx="1"/>
-          </p:nvPr>
-        </p:nvSpPr>
-        <p:spPr/>
-        <p:txBody>
-          <a:bodyPr/>
-          <a:lstStyle/>
-          <a:p>
-            <a:r>
-              <a:rPr lang="en-US" dirty="0" smtClean="0"/>
-              <a:t>Weight loss during fasting may be a predictor of weight gain after HFD.</a:t>
-            </a:r>
-          </a:p>
-          <a:p>
-            <a:pPr lvl="1"/>
-            <a:r>
-              <a:rPr lang="en-US" dirty="0" smtClean="0"/>
-              <a:t>Previous cohorts 5-6: there appeared to be a negative relationship</a:t>
-            </a:r>
-          </a:p>
-          <a:p>
-            <a:pPr lvl="1"/>
-            <a:r>
-              <a:rPr lang="en-US" dirty="0" smtClean="0"/>
-              <a:t>Current cohorts 7-8: there is a positive relationship</a:t>
-            </a:r>
-            <a:endParaRPr lang="en-US" dirty="0"/>
-          </a:p>
-        </p:txBody>
-      </p:sp>
-    </p:spTree>
-    <p:extLst>
-      <p:ext uri="{BB962C8B-B14F-4D97-AF65-F5344CB8AC3E}">
-        <p14:creationId xmlns:p14="http://schemas.microsoft.com/office/powerpoint/2010/main" val="3921865371"/>
-      </p:ext>
-    </p:extLst>
-  </p:cSld>
-  <p:clrMapOvr>
-    <a:masterClrMapping/>
-  </p:clrMapOvr>
-</p:sld>
-</file>
-
-<file path=ppt/slides/slide30.xml><?xml version="1.0" encoding="utf-8"?>
-<p:sld xmlns:a="http://schemas.openxmlformats.org/drawingml/2006/main" xmlns:r="http://schemas.openxmlformats.org/officeDocument/2006/relationships" xmlns:p="http://schemas.openxmlformats.org/presentationml/2006/main">
-  <p:cSld>
-    <p:spTree>
-      <p:nvGrpSpPr>
-        <p:cNvPr id="1" name=""/>
-        <p:cNvGrpSpPr/>
-        <p:nvPr/>
-      </p:nvGrpSpPr>
-      <p:grpSpPr>
-        <a:xfrm>
-          <a:off x="0" y="0"/>
-          <a:ext cx="0" cy="0"/>
-          <a:chOff x="0" y="0"/>
-          <a:chExt cx="0" cy="0"/>
-        </a:xfrm>
-      </p:grpSpPr>
-      <p:sp>
-        <p:nvSpPr>
-          <p:cNvPr id="2" name="Title 1"/>
-          <p:cNvSpPr>
-            <a:spLocks noGrp="1"/>
-          </p:cNvSpPr>
-          <p:nvPr>
-            <p:ph type="title"/>
-          </p:nvPr>
-        </p:nvSpPr>
-        <p:spPr/>
-        <p:txBody>
-          <a:bodyPr/>
-          <a:lstStyle/>
-          <a:p>
             <a:endParaRPr lang="en-US"/>
           </a:p>
         </p:txBody>
@@ -5137,7 +6637,7 @@
 </p:sld>
 </file>
 
-<file path=ppt/slides/slide31.xml><?xml version="1.0" encoding="utf-8"?>
+<file path=ppt/slides/slide39.xml><?xml version="1.0" encoding="utf-8"?>
 <p:sld xmlns:a="http://schemas.openxmlformats.org/drawingml/2006/main" xmlns:r="http://schemas.openxmlformats.org/officeDocument/2006/relationships" xmlns:p="http://schemas.openxmlformats.org/presentationml/2006/main">
   <p:cSld>
     <p:spTree>
@@ -5256,11 +6756,7 @@
           <a:p>
             <a:r>
               <a:rPr lang="en-US" dirty="0" smtClean="0"/>
-              <a:t>C57BL/6J </a:t>
-            </a:r>
-            <a:r>
-              <a:rPr lang="en-US" dirty="0" smtClean="0"/>
-              <a:t>mice</a:t>
+              <a:t>C57BL/6J mice</a:t>
             </a:r>
           </a:p>
           <a:p>
@@ -5279,19 +6775,7 @@
           <a:p>
             <a:r>
               <a:rPr lang="en-US" dirty="0" smtClean="0"/>
-              <a:t>HFD #7 </a:t>
-            </a:r>
-            <a:r>
-              <a:rPr lang="en-US" dirty="0" smtClean="0"/>
-              <a:t>– cohort id is 8 </a:t>
-            </a:r>
-            <a:r>
-              <a:rPr lang="en-US" dirty="0" smtClean="0"/>
-              <a:t>(n</a:t>
-            </a:r>
-            <a:r>
-              <a:rPr lang="en-US" dirty="0" smtClean="0"/>
-              <a:t>=24)</a:t>
+              <a:t>HFD #7 – cohort id is 8 (n=24)</a:t>
             </a:r>
           </a:p>
           <a:p>
@@ -5306,19 +6790,7 @@
           <a:p>
             <a:r>
               <a:rPr lang="en-US" dirty="0" smtClean="0"/>
-              <a:t>HFD #8 </a:t>
-            </a:r>
-            <a:r>
-              <a:rPr lang="en-US" dirty="0" smtClean="0"/>
-              <a:t>– cohort id is 15 </a:t>
-            </a:r>
-            <a:r>
-              <a:rPr lang="en-US" dirty="0" smtClean="0"/>
-              <a:t>(n</a:t>
-            </a:r>
-            <a:r>
-              <a:rPr lang="en-US" dirty="0" smtClean="0"/>
-              <a:t>=30)</a:t>
+              <a:t>HFD #8 – cohort id is 15 (n=30)</a:t>
             </a:r>
           </a:p>
           <a:p>
@@ -5353,11 +6825,7 @@
           <a:p>
             <a:r>
               <a:rPr lang="en-US" sz="1400" dirty="0" smtClean="0"/>
-              <a:t>09/22/</a:t>
-            </a:r>
-            <a:r>
-              <a:rPr lang="en-US" sz="1400" dirty="0" smtClean="0"/>
-              <a:t>2014</a:t>
+              <a:t>09/22/2014</a:t>
             </a:r>
             <a:endParaRPr lang="en-US" sz="1400" dirty="0"/>
           </a:p>
@@ -5387,11 +6855,7 @@
           <a:p>
             <a:r>
               <a:rPr lang="en-US" sz="1400" dirty="0" smtClean="0"/>
-              <a:t>12/</a:t>
-            </a:r>
-            <a:r>
-              <a:rPr lang="en-US" sz="1400" dirty="0" smtClean="0"/>
-              <a:t>01</a:t>
+              <a:t>12/01</a:t>
             </a:r>
             <a:endParaRPr lang="en-US" sz="1400" dirty="0"/>
           </a:p>
@@ -5421,11 +6885,7 @@
           <a:p>
             <a:r>
               <a:rPr lang="en-US" sz="1400" dirty="0" smtClean="0"/>
-              <a:t>12/</a:t>
-            </a:r>
-            <a:r>
-              <a:rPr lang="en-US" sz="1400" dirty="0" smtClean="0"/>
-              <a:t>02</a:t>
+              <a:t>12/02</a:t>
             </a:r>
             <a:endParaRPr lang="en-US" sz="1400" dirty="0"/>
           </a:p>
@@ -5513,11 +6973,7 @@
               <a:p>
                 <a:r>
                   <a:rPr lang="en-US" sz="1400" dirty="0" smtClean="0"/>
-                  <a:t>10/</a:t>
-                </a:r>
-                <a:r>
-                  <a:rPr lang="en-US" sz="1400" dirty="0" smtClean="0"/>
-                  <a:t>17</a:t>
+                  <a:t>10/17</a:t>
                 </a:r>
                 <a:endParaRPr lang="en-US" sz="1400" dirty="0"/>
               </a:p>
@@ -5547,11 +7003,7 @@
               <a:p>
                 <a:r>
                   <a:rPr lang="en-US" sz="1400" dirty="0" smtClean="0"/>
-                  <a:t>10/</a:t>
-                </a:r>
-                <a:r>
-                  <a:rPr lang="en-US" sz="1400" dirty="0" smtClean="0"/>
-                  <a:t>21</a:t>
+                  <a:t>10/21</a:t>
                 </a:r>
                 <a:endParaRPr lang="en-US" sz="1400" dirty="0"/>
               </a:p>
@@ -5581,11 +7033,7 @@
               <a:p>
                 <a:r>
                   <a:rPr lang="en-US" sz="1400" dirty="0" smtClean="0"/>
-                  <a:t>10/</a:t>
-                </a:r>
-                <a:r>
-                  <a:rPr lang="en-US" sz="1400" dirty="0" smtClean="0"/>
-                  <a:t>22</a:t>
+                  <a:t>10/22</a:t>
                 </a:r>
                 <a:endParaRPr lang="en-US" sz="1400" dirty="0"/>
               </a:p>
@@ -5998,15 +7446,7 @@
               <a:p>
                 <a:r>
                   <a:rPr lang="en-US" sz="1400" dirty="0" smtClean="0"/>
-                  <a:t>08</a:t>
-                </a:r>
-                <a:r>
-                  <a:rPr lang="en-US" sz="1400" dirty="0" smtClean="0"/>
-                  <a:t>/11/</a:t>
-                </a:r>
-                <a:r>
-                  <a:rPr lang="en-US" sz="1400" dirty="0" smtClean="0"/>
-                  <a:t>2014</a:t>
+                  <a:t>08/11/2014</a:t>
                 </a:r>
                 <a:endParaRPr lang="en-US" sz="1400" dirty="0"/>
               </a:p>
@@ -6541,7 +7981,7 @@
             <p:ph idx="1"/>
             <p:extLst>
               <p:ext uri="{D42A27DB-BD31-4B8C-83A1-F6EECF244321}">
-                <p14:modId xmlns:p14="http://schemas.microsoft.com/office/powerpoint/2010/main" val="345536861"/>
+                <p14:modId xmlns:p14="http://schemas.microsoft.com/office/powerpoint/2010/main" val="3605673534"/>
               </p:ext>
             </p:extLst>
           </p:nvPr>
@@ -6907,7 +8347,7 @@
                     <a:p>
                       <a:r>
                         <a:rPr lang="en-US" dirty="0" smtClean="0"/>
-                        <a:t>Not yet</a:t>
+                        <a:t>?</a:t>
                       </a:r>
                       <a:endParaRPr lang="en-US" dirty="0"/>
                     </a:p>
@@ -6993,7 +8433,7 @@
                     <a:p>
                       <a:r>
                         <a:rPr lang="en-US" dirty="0" smtClean="0"/>
-                        <a:t>Not yet</a:t>
+                        <a:t>?</a:t>
                       </a:r>
                       <a:endParaRPr lang="en-US" dirty="0"/>
                     </a:p>
@@ -7052,154 +8492,64 @@
           <a:p>
             <a:r>
               <a:rPr lang="en-US" dirty="0" smtClean="0"/>
-              <a:t>Body weight</a:t>
+              <a:t>Changes</a:t>
             </a:r>
             <a:endParaRPr lang="en-US" dirty="0"/>
           </a:p>
         </p:txBody>
       </p:sp>
-      <p:pic>
-        <p:nvPicPr>
-          <p:cNvPr id="6" name="Content Placeholder 5" descr="Body_weight_Barplot.pdf"/>
-          <p:cNvPicPr>
-            <a:picLocks noGrp="1" noChangeAspect="1"/>
-          </p:cNvPicPr>
+      <p:sp>
+        <p:nvSpPr>
+          <p:cNvPr id="3" name="Content Placeholder 2"/>
+          <p:cNvSpPr>
+            <a:spLocks noGrp="1"/>
+          </p:cNvSpPr>
           <p:nvPr>
             <p:ph idx="1"/>
           </p:nvPr>
-        </p:nvPicPr>
-        <p:blipFill>
-          <a:blip r:embed="rId2">
-            <a:extLst>
-              <a:ext uri="{28A0092B-C50C-407E-A947-70E740481C1C}">
-                <a14:useLocalDpi xmlns:a14="http://schemas.microsoft.com/office/drawing/2010/main" val="0"/>
-              </a:ext>
-            </a:extLst>
-          </a:blip>
-          <a:srcRect l="-12941" r="-12941"/>
-          <a:stretch>
-            <a:fillRect/>
-          </a:stretch>
-        </p:blipFill>
+        </p:nvSpPr>
         <p:spPr>
           <a:xfrm>
-            <a:off x="-491066" y="1515663"/>
-            <a:ext cx="6172200" cy="3890834"/>
+            <a:off x="457200" y="1698978"/>
+            <a:ext cx="8229600" cy="4525963"/>
           </a:xfrm>
         </p:spPr>
-      </p:pic>
-      <p:pic>
-        <p:nvPicPr>
-          <p:cNvPr id="7" name="Picture 6"/>
-          <p:cNvPicPr>
-            <a:picLocks noChangeAspect="1"/>
-          </p:cNvPicPr>
-          <p:nvPr/>
-        </p:nvPicPr>
-        <p:blipFill>
-          <a:blip r:embed="rId3"/>
-          <a:stretch>
-            <a:fillRect/>
-          </a:stretch>
-        </p:blipFill>
-        <p:spPr>
-          <a:xfrm>
-            <a:off x="5829300" y="1824567"/>
-            <a:ext cx="2171700" cy="1231900"/>
-          </a:xfrm>
-          <a:prstGeom prst="rect">
-            <a:avLst/>
-          </a:prstGeom>
-        </p:spPr>
-      </p:pic>
-      <p:sp>
-        <p:nvSpPr>
-          <p:cNvPr id="8" name="TextBox 7"/>
-          <p:cNvSpPr txBox="1"/>
-          <p:nvPr/>
-        </p:nvSpPr>
-        <p:spPr>
-          <a:xfrm>
-            <a:off x="5291668" y="1515663"/>
-            <a:ext cx="3395132" cy="369332"/>
-          </a:xfrm>
-          <a:prstGeom prst="rect">
-            <a:avLst/>
-          </a:prstGeom>
-          <a:noFill/>
-        </p:spPr>
-        <p:txBody>
-          <a:bodyPr wrap="square" rtlCol="0">
-            <a:spAutoFit/>
-          </a:bodyPr>
+        <p:txBody>
+          <a:bodyPr/>
           <a:lstStyle/>
           <a:p>
             <a:r>
-              <a:rPr lang="en-US" dirty="0" err="1" smtClean="0"/>
-              <a:t>Tukey’s</a:t>
-            </a:r>
-            <a:r>
               <a:rPr lang="en-US" dirty="0" smtClean="0"/>
-              <a:t> post-hoc of initial weights</a:t>
-            </a:r>
-            <a:endParaRPr lang="en-US" dirty="0"/>
-          </a:p>
-        </p:txBody>
-      </p:sp>
-      <p:pic>
-        <p:nvPicPr>
-          <p:cNvPr id="9" name="Picture 8"/>
-          <p:cNvPicPr>
-            <a:picLocks noChangeAspect="1"/>
-          </p:cNvPicPr>
-          <p:nvPr/>
-        </p:nvPicPr>
-        <p:blipFill>
-          <a:blip r:embed="rId4"/>
-          <a:stretch>
-            <a:fillRect/>
-          </a:stretch>
-        </p:blipFill>
-        <p:spPr>
-          <a:xfrm>
-            <a:off x="5880100" y="3860800"/>
-            <a:ext cx="2120900" cy="1193800"/>
-          </a:xfrm>
-          <a:prstGeom prst="rect">
-            <a:avLst/>
-          </a:prstGeom>
-        </p:spPr>
-      </p:pic>
-      <p:sp>
-        <p:nvSpPr>
-          <p:cNvPr id="10" name="TextBox 9"/>
-          <p:cNvSpPr txBox="1"/>
-          <p:nvPr/>
-        </p:nvSpPr>
-        <p:spPr>
-          <a:xfrm>
-            <a:off x="5291668" y="3556130"/>
-            <a:ext cx="3395132" cy="369332"/>
-          </a:xfrm>
-          <a:prstGeom prst="rect">
-            <a:avLst/>
-          </a:prstGeom>
-          <a:noFill/>
-        </p:spPr>
-        <p:txBody>
-          <a:bodyPr wrap="square" rtlCol="0">
-            <a:spAutoFit/>
-          </a:bodyPr>
-          <a:lstStyle/>
-          <a:p>
-            <a:r>
-              <a:rPr lang="en-US" dirty="0" err="1" smtClean="0"/>
-              <a:t>Tukey’s</a:t>
-            </a:r>
+              <a:t>Removed the initial weight analysis.</a:t>
+            </a:r>
+          </a:p>
+          <a:p>
             <a:r>
               <a:rPr lang="en-US" dirty="0" smtClean="0"/>
-              <a:t> post-hoc of fasted weights</a:t>
-            </a:r>
+              <a:t>Fixed </a:t>
+            </a:r>
+            <a:r>
+              <a:rPr lang="en-US" dirty="0"/>
+              <a:t>the initial </a:t>
+            </a:r>
+            <a:r>
+              <a:rPr lang="en-US" dirty="0" smtClean="0"/>
+              <a:t>weights in cohort 5 &amp; 6 to be the pre-fasting weights.</a:t>
+            </a:r>
+          </a:p>
+          <a:p>
+            <a:r>
+              <a:rPr lang="en-US" dirty="0" smtClean="0"/>
+              <a:t>Updated the WL as the difference of after fasting from pre-fasting instead of from the initial weights.</a:t>
+            </a:r>
+          </a:p>
+          <a:p>
+            <a:r>
+              <a:rPr lang="en-US" dirty="0" smtClean="0"/>
+              <a:t>Checked and removed mice with negative WL.</a:t>
+            </a:r>
+          </a:p>
+          <a:p>
             <a:endParaRPr lang="en-US" dirty="0"/>
           </a:p>
         </p:txBody>
@@ -7207,7 +8557,7 @@
     </p:spTree>
     <p:extLst>
       <p:ext uri="{BB962C8B-B14F-4D97-AF65-F5344CB8AC3E}">
-        <p14:creationId xmlns:p14="http://schemas.microsoft.com/office/powerpoint/2010/main" val="697766054"/>
+        <p14:creationId xmlns:p14="http://schemas.microsoft.com/office/powerpoint/2010/main" val="810439050"/>
       </p:ext>
     </p:extLst>
   </p:cSld>
@@ -7251,7 +8601,87 @@
           <a:p>
             <a:r>
               <a:rPr lang="en-US" dirty="0" smtClean="0"/>
-              <a:t>HFD weights</a:t>
+              <a:t>Body weight</a:t>
+            </a:r>
+            <a:endParaRPr lang="en-US" dirty="0"/>
+          </a:p>
+        </p:txBody>
+      </p:sp>
+      <p:sp>
+        <p:nvSpPr>
+          <p:cNvPr id="8" name="TextBox 7"/>
+          <p:cNvSpPr txBox="1"/>
+          <p:nvPr/>
+        </p:nvSpPr>
+        <p:spPr>
+          <a:xfrm>
+            <a:off x="5291668" y="1515663"/>
+            <a:ext cx="3852332" cy="369332"/>
+          </a:xfrm>
+          <a:prstGeom prst="rect">
+            <a:avLst/>
+          </a:prstGeom>
+          <a:noFill/>
+        </p:spPr>
+        <p:txBody>
+          <a:bodyPr wrap="square" rtlCol="0">
+            <a:spAutoFit/>
+          </a:bodyPr>
+          <a:lstStyle/>
+          <a:p>
+            <a:r>
+              <a:rPr lang="en-US" dirty="0" err="1" smtClean="0"/>
+              <a:t>Tukey’s</a:t>
+            </a:r>
+            <a:r>
+              <a:rPr lang="en-US" dirty="0" smtClean="0"/>
+              <a:t> post-hoc of </a:t>
+            </a:r>
+            <a:r>
+              <a:rPr lang="en-US" dirty="0" smtClean="0"/>
+              <a:t>pre-fasted</a:t>
+            </a:r>
+            <a:r>
+              <a:rPr lang="en-US" dirty="0" smtClean="0"/>
+              <a:t> </a:t>
+            </a:r>
+            <a:r>
+              <a:rPr lang="en-US" dirty="0" smtClean="0"/>
+              <a:t>weights</a:t>
+            </a:r>
+            <a:endParaRPr lang="en-US" dirty="0"/>
+          </a:p>
+        </p:txBody>
+      </p:sp>
+      <p:sp>
+        <p:nvSpPr>
+          <p:cNvPr id="10" name="TextBox 9"/>
+          <p:cNvSpPr txBox="1"/>
+          <p:nvPr/>
+        </p:nvSpPr>
+        <p:spPr>
+          <a:xfrm>
+            <a:off x="5542532" y="3556130"/>
+            <a:ext cx="3395132" cy="369332"/>
+          </a:xfrm>
+          <a:prstGeom prst="rect">
+            <a:avLst/>
+          </a:prstGeom>
+          <a:noFill/>
+        </p:spPr>
+        <p:txBody>
+          <a:bodyPr wrap="square" rtlCol="0">
+            <a:spAutoFit/>
+          </a:bodyPr>
+          <a:lstStyle/>
+          <a:p>
+            <a:r>
+              <a:rPr lang="en-US" dirty="0" err="1" smtClean="0"/>
+              <a:t>Tukey’s</a:t>
+            </a:r>
+            <a:r>
+              <a:rPr lang="en-US" dirty="0" smtClean="0"/>
+              <a:t> post-hoc of fasted weights</a:t>
             </a:r>
             <a:endParaRPr lang="en-US" dirty="0"/>
           </a:p>
@@ -7259,13 +8689,11 @@
       </p:sp>
       <p:pic>
         <p:nvPicPr>
-          <p:cNvPr id="4" name="Content Placeholder 3" descr="Body_weight_Boxplot.pdf"/>
+          <p:cNvPr id="4" name="Picture 3" descr="Body_weight_Barplot.pdf"/>
           <p:cNvPicPr>
-            <a:picLocks noGrp="1" noChangeAspect="1"/>
+            <a:picLocks noChangeAspect="1"/>
           </p:cNvPicPr>
-          <p:nvPr>
-            <p:ph idx="1"/>
-          </p:nvPr>
+          <p:nvPr/>
         </p:nvPicPr>
         <p:blipFill>
           <a:blip r:embed="rId2">
@@ -7275,56 +8703,23 @@
               </a:ext>
             </a:extLst>
           </a:blip>
-          <a:srcRect l="-12941" r="-12941"/>
           <a:stretch>
             <a:fillRect/>
           </a:stretch>
         </p:blipFill>
         <p:spPr>
           <a:xfrm>
-            <a:off x="-321733" y="2057401"/>
-            <a:ext cx="5842000" cy="3522133"/>
-          </a:xfrm>
-        </p:spPr>
-      </p:pic>
-      <p:sp>
-        <p:nvSpPr>
-          <p:cNvPr id="5" name="TextBox 4"/>
-          <p:cNvSpPr txBox="1"/>
-          <p:nvPr/>
-        </p:nvSpPr>
-        <p:spPr>
-          <a:xfrm>
-            <a:off x="5232401" y="2607863"/>
-            <a:ext cx="3395132" cy="646331"/>
+            <a:off x="141111" y="1884995"/>
+            <a:ext cx="5401421" cy="3739445"/>
           </a:xfrm>
           <a:prstGeom prst="rect">
             <a:avLst/>
           </a:prstGeom>
-          <a:noFill/>
         </p:spPr>
-        <p:txBody>
-          <a:bodyPr wrap="square" rtlCol="0">
-            <a:spAutoFit/>
-          </a:bodyPr>
-          <a:lstStyle/>
-          <a:p>
-            <a:pPr algn="ctr"/>
-            <a:r>
-              <a:rPr lang="en-US" dirty="0" err="1" smtClean="0"/>
-              <a:t>Tukey’s</a:t>
-            </a:r>
-            <a:r>
-              <a:rPr lang="en-US" dirty="0" smtClean="0"/>
-              <a:t> post-hoc of after HFD weights</a:t>
-            </a:r>
-            <a:endParaRPr lang="en-US" dirty="0"/>
-          </a:p>
-        </p:txBody>
-      </p:sp>
+      </p:pic>
       <p:pic>
         <p:nvPicPr>
-          <p:cNvPr id="6" name="Picture 5"/>
+          <p:cNvPr id="3" name="Picture 2"/>
           <p:cNvPicPr>
             <a:picLocks noChangeAspect="1"/>
           </p:cNvPicPr>
@@ -7338,8 +8733,32 @@
         </p:blipFill>
         <p:spPr>
           <a:xfrm>
-            <a:off x="5930900" y="3314700"/>
-            <a:ext cx="2095500" cy="1181100"/>
+            <a:off x="5837768" y="1884994"/>
+            <a:ext cx="2579652" cy="1445227"/>
+          </a:xfrm>
+          <a:prstGeom prst="rect">
+            <a:avLst/>
+          </a:prstGeom>
+        </p:spPr>
+      </p:pic>
+      <p:pic>
+        <p:nvPicPr>
+          <p:cNvPr id="5" name="Picture 4"/>
+          <p:cNvPicPr>
+            <a:picLocks noChangeAspect="1"/>
+          </p:cNvPicPr>
+          <p:nvPr/>
+        </p:nvPicPr>
+        <p:blipFill>
+          <a:blip r:embed="rId4"/>
+          <a:stretch>
+            <a:fillRect/>
+          </a:stretch>
+        </p:blipFill>
+        <p:spPr>
+          <a:xfrm>
+            <a:off x="5837767" y="3925462"/>
+            <a:ext cx="2643487" cy="1479094"/>
           </a:xfrm>
           <a:prstGeom prst="rect">
             <a:avLst/>
@@ -7349,7 +8768,7 @@
     </p:spTree>
     <p:extLst>
       <p:ext uri="{BB962C8B-B14F-4D97-AF65-F5344CB8AC3E}">
-        <p14:creationId xmlns:p14="http://schemas.microsoft.com/office/powerpoint/2010/main" val="8029734"/>
+        <p14:creationId xmlns:p14="http://schemas.microsoft.com/office/powerpoint/2010/main" val="697766054"/>
       </p:ext>
     </p:extLst>
   </p:cSld>
@@ -7393,7 +8812,42 @@
           <a:p>
             <a:r>
               <a:rPr lang="en-US" dirty="0" smtClean="0"/>
-              <a:t>Density plots for weights</a:t>
+              <a:t>HFD weights</a:t>
+            </a:r>
+            <a:endParaRPr lang="en-US" dirty="0"/>
+          </a:p>
+        </p:txBody>
+      </p:sp>
+      <p:sp>
+        <p:nvSpPr>
+          <p:cNvPr id="5" name="TextBox 4"/>
+          <p:cNvSpPr txBox="1"/>
+          <p:nvPr/>
+        </p:nvSpPr>
+        <p:spPr>
+          <a:xfrm>
+            <a:off x="5232401" y="2607863"/>
+            <a:ext cx="3395132" cy="646331"/>
+          </a:xfrm>
+          <a:prstGeom prst="rect">
+            <a:avLst/>
+          </a:prstGeom>
+          <a:noFill/>
+        </p:spPr>
+        <p:txBody>
+          <a:bodyPr wrap="square" rtlCol="0">
+            <a:spAutoFit/>
+          </a:bodyPr>
+          <a:lstStyle/>
+          <a:p>
+            <a:pPr algn="ctr"/>
+            <a:r>
+              <a:rPr lang="en-US" dirty="0" err="1" smtClean="0"/>
+              <a:t>Tukey’s</a:t>
+            </a:r>
+            <a:r>
+              <a:rPr lang="en-US" dirty="0" smtClean="0"/>
+              <a:t> post-hoc of after HFD weights</a:t>
             </a:r>
             <a:endParaRPr lang="en-US" dirty="0"/>
           </a:p>
@@ -7401,22 +8855,52 @@
       </p:sp>
       <p:pic>
         <p:nvPicPr>
-          <p:cNvPr id="4" name="Picture 3"/>
+          <p:cNvPr id="7" name="Picture 6" descr="Body_weight_Boxplot.pdf"/>
           <p:cNvPicPr>
             <a:picLocks noChangeAspect="1"/>
           </p:cNvPicPr>
           <p:nvPr/>
         </p:nvPicPr>
         <p:blipFill>
-          <a:blip r:embed="rId2"/>
+          <a:blip r:embed="rId2">
+            <a:extLst>
+              <a:ext uri="{28A0092B-C50C-407E-A947-70E740481C1C}">
+                <a14:useLocalDpi xmlns:a14="http://schemas.microsoft.com/office/drawing/2010/main" val="0"/>
+              </a:ext>
+            </a:extLst>
+          </a:blip>
           <a:stretch>
             <a:fillRect/>
           </a:stretch>
         </p:blipFill>
         <p:spPr>
           <a:xfrm>
-            <a:off x="1184498" y="1862665"/>
-            <a:ext cx="6685268" cy="4072467"/>
+            <a:off x="73693" y="1907822"/>
+            <a:ext cx="5254665" cy="3637845"/>
+          </a:xfrm>
+          <a:prstGeom prst="rect">
+            <a:avLst/>
+          </a:prstGeom>
+        </p:spPr>
+      </p:pic>
+      <p:pic>
+        <p:nvPicPr>
+          <p:cNvPr id="3" name="Picture 2"/>
+          <p:cNvPicPr>
+            <a:picLocks noChangeAspect="1"/>
+          </p:cNvPicPr>
+          <p:nvPr/>
+        </p:nvPicPr>
+        <p:blipFill>
+          <a:blip r:embed="rId3"/>
+          <a:stretch>
+            <a:fillRect/>
+          </a:stretch>
+        </p:blipFill>
+        <p:spPr>
+          <a:xfrm>
+            <a:off x="5717822" y="3254194"/>
+            <a:ext cx="2742300" cy="1571806"/>
           </a:xfrm>
           <a:prstGeom prst="rect">
             <a:avLst/>
@@ -7426,7 +8910,7 @@
     </p:spTree>
     <p:extLst>
       <p:ext uri="{BB962C8B-B14F-4D97-AF65-F5344CB8AC3E}">
-        <p14:creationId xmlns:p14="http://schemas.microsoft.com/office/powerpoint/2010/main" val="1385032686"/>
+        <p14:creationId xmlns:p14="http://schemas.microsoft.com/office/powerpoint/2010/main" val="8029734"/>
       </p:ext>
     </p:extLst>
   </p:cSld>
@@ -7470,7 +8954,7 @@
           <a:p>
             <a:r>
               <a:rPr lang="en-US" dirty="0" smtClean="0"/>
-              <a:t>Checking normality for WL and WG</a:t>
+              <a:t>Density plots for weights</a:t>
             </a:r>
             <a:endParaRPr lang="en-US" dirty="0"/>
           </a:p>
@@ -7478,7 +8962,7 @@
       </p:sp>
       <p:pic>
         <p:nvPicPr>
-          <p:cNvPr id="4" name="Picture 3"/>
+          <p:cNvPr id="3" name="Picture 2"/>
           <p:cNvPicPr>
             <a:picLocks noChangeAspect="1"/>
           </p:cNvPicPr>
@@ -7492,72 +8976,18 @@
         </p:blipFill>
         <p:spPr>
           <a:xfrm>
-            <a:off x="1" y="2019300"/>
-            <a:ext cx="4191000" cy="3248710"/>
+            <a:off x="880532" y="1417637"/>
+            <a:ext cx="7503405" cy="4466695"/>
           </a:xfrm>
           <a:prstGeom prst="rect">
             <a:avLst/>
           </a:prstGeom>
         </p:spPr>
       </p:pic>
-      <p:pic>
-        <p:nvPicPr>
-          <p:cNvPr id="5" name="Picture 4"/>
-          <p:cNvPicPr>
-            <a:picLocks noChangeAspect="1"/>
-          </p:cNvPicPr>
-          <p:nvPr/>
-        </p:nvPicPr>
-        <p:blipFill>
-          <a:blip r:embed="rId3"/>
-          <a:stretch>
-            <a:fillRect/>
-          </a:stretch>
-        </p:blipFill>
-        <p:spPr>
-          <a:xfrm>
-            <a:off x="4445001" y="1940609"/>
-            <a:ext cx="4347632" cy="3259667"/>
-          </a:xfrm>
-          <a:prstGeom prst="rect">
-            <a:avLst/>
-          </a:prstGeom>
-        </p:spPr>
-      </p:pic>
-      <p:sp>
-        <p:nvSpPr>
-          <p:cNvPr id="6" name="TextBox 5"/>
-          <p:cNvSpPr txBox="1"/>
-          <p:nvPr/>
-        </p:nvSpPr>
-        <p:spPr>
-          <a:xfrm>
-            <a:off x="1168400" y="5672667"/>
-            <a:ext cx="6925734" cy="369332"/>
-          </a:xfrm>
-          <a:prstGeom prst="rect">
-            <a:avLst/>
-          </a:prstGeom>
-          <a:noFill/>
-        </p:spPr>
-        <p:txBody>
-          <a:bodyPr wrap="square" rtlCol="0">
-            <a:spAutoFit/>
-          </a:bodyPr>
-          <a:lstStyle/>
-          <a:p>
-            <a:r>
-              <a:rPr lang="en-US" dirty="0" smtClean="0"/>
-              <a:t>Shapiro’s p-values for WL and WG are 0.00307 and 0.0124, respectively.</a:t>
-            </a:r>
-            <a:endParaRPr lang="en-US" dirty="0"/>
-          </a:p>
-        </p:txBody>
-      </p:sp>
     </p:spTree>
     <p:extLst>
       <p:ext uri="{BB962C8B-B14F-4D97-AF65-F5344CB8AC3E}">
-        <p14:creationId xmlns:p14="http://schemas.microsoft.com/office/powerpoint/2010/main" val="3671359124"/>
+        <p14:creationId xmlns:p14="http://schemas.microsoft.com/office/powerpoint/2010/main" val="1385032686"/>
       </p:ext>
     </p:extLst>
   </p:cSld>

</xml_diff>

<commit_message>
Updated with notes from lab meeting and food intake data
</commit_message>
<xml_diff>
--- a/ResultsSlides.pptx
+++ b/ResultsSlides.pptx
@@ -4,6 +4,9 @@
   <p:sldMasterIdLst>
     <p:sldMasterId id="2147483648" r:id="rId1"/>
   </p:sldMasterIdLst>
+  <p:notesMasterIdLst>
+    <p:notesMasterId r:id="rId42"/>
+  </p:notesMasterIdLst>
   <p:sldIdLst>
     <p:sldId id="256" r:id="rId2"/>
     <p:sldId id="257" r:id="rId3"/>
@@ -30,20 +33,21 @@
     <p:sldId id="299" r:id="rId24"/>
     <p:sldId id="300" r:id="rId25"/>
     <p:sldId id="301" r:id="rId26"/>
-    <p:sldId id="303" r:id="rId27"/>
-    <p:sldId id="293" r:id="rId28"/>
-    <p:sldId id="262" r:id="rId29"/>
-    <p:sldId id="264" r:id="rId30"/>
-    <p:sldId id="266" r:id="rId31"/>
-    <p:sldId id="267" r:id="rId32"/>
-    <p:sldId id="271" r:id="rId33"/>
-    <p:sldId id="268" r:id="rId34"/>
-    <p:sldId id="269" r:id="rId35"/>
-    <p:sldId id="272" r:id="rId36"/>
-    <p:sldId id="275" r:id="rId37"/>
-    <p:sldId id="276" r:id="rId38"/>
-    <p:sldId id="278" r:id="rId39"/>
-    <p:sldId id="279" r:id="rId40"/>
+    <p:sldId id="304" r:id="rId27"/>
+    <p:sldId id="305" r:id="rId28"/>
+    <p:sldId id="293" r:id="rId29"/>
+    <p:sldId id="262" r:id="rId30"/>
+    <p:sldId id="264" r:id="rId31"/>
+    <p:sldId id="266" r:id="rId32"/>
+    <p:sldId id="267" r:id="rId33"/>
+    <p:sldId id="271" r:id="rId34"/>
+    <p:sldId id="268" r:id="rId35"/>
+    <p:sldId id="269" r:id="rId36"/>
+    <p:sldId id="272" r:id="rId37"/>
+    <p:sldId id="275" r:id="rId38"/>
+    <p:sldId id="276" r:id="rId39"/>
+    <p:sldId id="278" r:id="rId40"/>
+    <p:sldId id="279" r:id="rId41"/>
   </p:sldIdLst>
   <p:sldSz cx="9144000" cy="6858000" type="screen4x3"/>
   <p:notesSz cx="6858000" cy="9144000"/>
@@ -143,6 +147,464 @@
     </a:lvl9pPr>
   </p:defaultTextStyle>
 </p:presentation>
+</file>
+
+<file path=ppt/notesMasters/notesMaster1.xml><?xml version="1.0" encoding="utf-8"?>
+<p:notesMaster xmlns:a="http://schemas.openxmlformats.org/drawingml/2006/main" xmlns:r="http://schemas.openxmlformats.org/officeDocument/2006/relationships" xmlns:p="http://schemas.openxmlformats.org/presentationml/2006/main">
+  <p:cSld>
+    <p:bg>
+      <p:bgRef idx="1001">
+        <a:schemeClr val="bg1"/>
+      </p:bgRef>
+    </p:bg>
+    <p:spTree>
+      <p:nvGrpSpPr>
+        <p:cNvPr id="1" name=""/>
+        <p:cNvGrpSpPr/>
+        <p:nvPr/>
+      </p:nvGrpSpPr>
+      <p:grpSpPr>
+        <a:xfrm>
+          <a:off x="0" y="0"/>
+          <a:ext cx="0" cy="0"/>
+          <a:chOff x="0" y="0"/>
+          <a:chExt cx="0" cy="0"/>
+        </a:xfrm>
+      </p:grpSpPr>
+      <p:sp>
+        <p:nvSpPr>
+          <p:cNvPr id="2" name="Header Placeholder 1"/>
+          <p:cNvSpPr>
+            <a:spLocks noGrp="1"/>
+          </p:cNvSpPr>
+          <p:nvPr>
+            <p:ph type="hdr" sz="quarter"/>
+          </p:nvPr>
+        </p:nvSpPr>
+        <p:spPr>
+          <a:xfrm>
+            <a:off x="0" y="0"/>
+            <a:ext cx="2971800" cy="457200"/>
+          </a:xfrm>
+          <a:prstGeom prst="rect">
+            <a:avLst/>
+          </a:prstGeom>
+        </p:spPr>
+        <p:txBody>
+          <a:bodyPr vert="horz" lIns="91440" tIns="45720" rIns="91440" bIns="45720" rtlCol="0"/>
+          <a:lstStyle>
+            <a:lvl1pPr algn="l">
+              <a:defRPr sz="1200"/>
+            </a:lvl1pPr>
+          </a:lstStyle>
+          <a:p>
+            <a:endParaRPr lang="en-US"/>
+          </a:p>
+        </p:txBody>
+      </p:sp>
+      <p:sp>
+        <p:nvSpPr>
+          <p:cNvPr id="3" name="Date Placeholder 2"/>
+          <p:cNvSpPr>
+            <a:spLocks noGrp="1"/>
+          </p:cNvSpPr>
+          <p:nvPr>
+            <p:ph type="dt" idx="1"/>
+          </p:nvPr>
+        </p:nvSpPr>
+        <p:spPr>
+          <a:xfrm>
+            <a:off x="3884613" y="0"/>
+            <a:ext cx="2971800" cy="457200"/>
+          </a:xfrm>
+          <a:prstGeom prst="rect">
+            <a:avLst/>
+          </a:prstGeom>
+        </p:spPr>
+        <p:txBody>
+          <a:bodyPr vert="horz" lIns="91440" tIns="45720" rIns="91440" bIns="45720" rtlCol="0"/>
+          <a:lstStyle>
+            <a:lvl1pPr algn="r">
+              <a:defRPr sz="1200"/>
+            </a:lvl1pPr>
+          </a:lstStyle>
+          <a:p>
+            <a:fld id="{FBA4CA3D-6D4A-4942-9F2F-0C2F42AB54B2}" type="datetimeFigureOut">
+              <a:rPr lang="en-US" smtClean="0"/>
+              <a:t>11/25/15</a:t>
+            </a:fld>
+            <a:endParaRPr lang="en-US"/>
+          </a:p>
+        </p:txBody>
+      </p:sp>
+      <p:sp>
+        <p:nvSpPr>
+          <p:cNvPr id="4" name="Slide Image Placeholder 3"/>
+          <p:cNvSpPr>
+            <a:spLocks noGrp="1" noRot="1" noChangeAspect="1"/>
+          </p:cNvSpPr>
+          <p:nvPr>
+            <p:ph type="sldImg" idx="2"/>
+          </p:nvPr>
+        </p:nvSpPr>
+        <p:spPr>
+          <a:xfrm>
+            <a:off x="1143000" y="685800"/>
+            <a:ext cx="4572000" cy="3429000"/>
+          </a:xfrm>
+          <a:prstGeom prst="rect">
+            <a:avLst/>
+          </a:prstGeom>
+          <a:noFill/>
+          <a:ln w="12700">
+            <a:solidFill>
+              <a:prstClr val="black"/>
+            </a:solidFill>
+          </a:ln>
+        </p:spPr>
+        <p:txBody>
+          <a:bodyPr vert="horz" lIns="91440" tIns="45720" rIns="91440" bIns="45720" rtlCol="0" anchor="ctr"/>
+          <a:lstStyle/>
+          <a:p>
+            <a:endParaRPr lang="en-US"/>
+          </a:p>
+        </p:txBody>
+      </p:sp>
+      <p:sp>
+        <p:nvSpPr>
+          <p:cNvPr id="5" name="Notes Placeholder 4"/>
+          <p:cNvSpPr>
+            <a:spLocks noGrp="1"/>
+          </p:cNvSpPr>
+          <p:nvPr>
+            <p:ph type="body" sz="quarter" idx="3"/>
+          </p:nvPr>
+        </p:nvSpPr>
+        <p:spPr>
+          <a:xfrm>
+            <a:off x="685800" y="4343400"/>
+            <a:ext cx="5486400" cy="4114800"/>
+          </a:xfrm>
+          <a:prstGeom prst="rect">
+            <a:avLst/>
+          </a:prstGeom>
+        </p:spPr>
+        <p:txBody>
+          <a:bodyPr vert="horz" lIns="91440" tIns="45720" rIns="91440" bIns="45720" rtlCol="0"/>
+          <a:lstStyle/>
+          <a:p>
+            <a:pPr lvl="0"/>
+            <a:r>
+              <a:rPr lang="en-US" smtClean="0"/>
+              <a:t>Click to edit Master text styles</a:t>
+            </a:r>
+          </a:p>
+          <a:p>
+            <a:pPr lvl="1"/>
+            <a:r>
+              <a:rPr lang="en-US" smtClean="0"/>
+              <a:t>Second level</a:t>
+            </a:r>
+          </a:p>
+          <a:p>
+            <a:pPr lvl="2"/>
+            <a:r>
+              <a:rPr lang="en-US" smtClean="0"/>
+              <a:t>Third level</a:t>
+            </a:r>
+          </a:p>
+          <a:p>
+            <a:pPr lvl="3"/>
+            <a:r>
+              <a:rPr lang="en-US" smtClean="0"/>
+              <a:t>Fourth level</a:t>
+            </a:r>
+          </a:p>
+          <a:p>
+            <a:pPr lvl="4"/>
+            <a:r>
+              <a:rPr lang="en-US" smtClean="0"/>
+              <a:t>Fifth level</a:t>
+            </a:r>
+            <a:endParaRPr lang="en-US"/>
+          </a:p>
+        </p:txBody>
+      </p:sp>
+      <p:sp>
+        <p:nvSpPr>
+          <p:cNvPr id="6" name="Footer Placeholder 5"/>
+          <p:cNvSpPr>
+            <a:spLocks noGrp="1"/>
+          </p:cNvSpPr>
+          <p:nvPr>
+            <p:ph type="ftr" sz="quarter" idx="4"/>
+          </p:nvPr>
+        </p:nvSpPr>
+        <p:spPr>
+          <a:xfrm>
+            <a:off x="0" y="8685213"/>
+            <a:ext cx="2971800" cy="457200"/>
+          </a:xfrm>
+          <a:prstGeom prst="rect">
+            <a:avLst/>
+          </a:prstGeom>
+        </p:spPr>
+        <p:txBody>
+          <a:bodyPr vert="horz" lIns="91440" tIns="45720" rIns="91440" bIns="45720" rtlCol="0" anchor="b"/>
+          <a:lstStyle>
+            <a:lvl1pPr algn="l">
+              <a:defRPr sz="1200"/>
+            </a:lvl1pPr>
+          </a:lstStyle>
+          <a:p>
+            <a:endParaRPr lang="en-US"/>
+          </a:p>
+        </p:txBody>
+      </p:sp>
+      <p:sp>
+        <p:nvSpPr>
+          <p:cNvPr id="7" name="Slide Number Placeholder 6"/>
+          <p:cNvSpPr>
+            <a:spLocks noGrp="1"/>
+          </p:cNvSpPr>
+          <p:nvPr>
+            <p:ph type="sldNum" sz="quarter" idx="5"/>
+          </p:nvPr>
+        </p:nvSpPr>
+        <p:spPr>
+          <a:xfrm>
+            <a:off x="3884613" y="8685213"/>
+            <a:ext cx="2971800" cy="457200"/>
+          </a:xfrm>
+          <a:prstGeom prst="rect">
+            <a:avLst/>
+          </a:prstGeom>
+        </p:spPr>
+        <p:txBody>
+          <a:bodyPr vert="horz" lIns="91440" tIns="45720" rIns="91440" bIns="45720" rtlCol="0" anchor="b"/>
+          <a:lstStyle>
+            <a:lvl1pPr algn="r">
+              <a:defRPr sz="1200"/>
+            </a:lvl1pPr>
+          </a:lstStyle>
+          <a:p>
+            <a:fld id="{408A6340-2867-3F4F-85AE-5F411E163BC1}" type="slidenum">
+              <a:rPr lang="en-US" smtClean="0"/>
+              <a:t>‹#›</a:t>
+            </a:fld>
+            <a:endParaRPr lang="en-US"/>
+          </a:p>
+        </p:txBody>
+      </p:sp>
+    </p:spTree>
+    <p:extLst>
+      <p:ext uri="{BB962C8B-B14F-4D97-AF65-F5344CB8AC3E}">
+        <p14:creationId xmlns:p14="http://schemas.microsoft.com/office/powerpoint/2010/main" val="1129298089"/>
+      </p:ext>
+    </p:extLst>
+  </p:cSld>
+  <p:clrMap bg1="lt1" tx1="dk1" bg2="lt2" tx2="dk2" accent1="accent1" accent2="accent2" accent3="accent3" accent4="accent4" accent5="accent5" accent6="accent6" hlink="hlink" folHlink="folHlink"/>
+  <p:notesStyle>
+    <a:lvl1pPr marL="0" algn="l" defTabSz="457200" rtl="0" eaLnBrk="1" latinLnBrk="0" hangingPunct="1">
+      <a:defRPr sz="1200" kern="1200">
+        <a:solidFill>
+          <a:schemeClr val="tx1"/>
+        </a:solidFill>
+        <a:latin typeface="+mn-lt"/>
+        <a:ea typeface="+mn-ea"/>
+        <a:cs typeface="+mn-cs"/>
+      </a:defRPr>
+    </a:lvl1pPr>
+    <a:lvl2pPr marL="457200" algn="l" defTabSz="457200" rtl="0" eaLnBrk="1" latinLnBrk="0" hangingPunct="1">
+      <a:defRPr sz="1200" kern="1200">
+        <a:solidFill>
+          <a:schemeClr val="tx1"/>
+        </a:solidFill>
+        <a:latin typeface="+mn-lt"/>
+        <a:ea typeface="+mn-ea"/>
+        <a:cs typeface="+mn-cs"/>
+      </a:defRPr>
+    </a:lvl2pPr>
+    <a:lvl3pPr marL="914400" algn="l" defTabSz="457200" rtl="0" eaLnBrk="1" latinLnBrk="0" hangingPunct="1">
+      <a:defRPr sz="1200" kern="1200">
+        <a:solidFill>
+          <a:schemeClr val="tx1"/>
+        </a:solidFill>
+        <a:latin typeface="+mn-lt"/>
+        <a:ea typeface="+mn-ea"/>
+        <a:cs typeface="+mn-cs"/>
+      </a:defRPr>
+    </a:lvl3pPr>
+    <a:lvl4pPr marL="1371600" algn="l" defTabSz="457200" rtl="0" eaLnBrk="1" latinLnBrk="0" hangingPunct="1">
+      <a:defRPr sz="1200" kern="1200">
+        <a:solidFill>
+          <a:schemeClr val="tx1"/>
+        </a:solidFill>
+        <a:latin typeface="+mn-lt"/>
+        <a:ea typeface="+mn-ea"/>
+        <a:cs typeface="+mn-cs"/>
+      </a:defRPr>
+    </a:lvl4pPr>
+    <a:lvl5pPr marL="1828800" algn="l" defTabSz="457200" rtl="0" eaLnBrk="1" latinLnBrk="0" hangingPunct="1">
+      <a:defRPr sz="1200" kern="1200">
+        <a:solidFill>
+          <a:schemeClr val="tx1"/>
+        </a:solidFill>
+        <a:latin typeface="+mn-lt"/>
+        <a:ea typeface="+mn-ea"/>
+        <a:cs typeface="+mn-cs"/>
+      </a:defRPr>
+    </a:lvl5pPr>
+    <a:lvl6pPr marL="2286000" algn="l" defTabSz="457200" rtl="0" eaLnBrk="1" latinLnBrk="0" hangingPunct="1">
+      <a:defRPr sz="1200" kern="1200">
+        <a:solidFill>
+          <a:schemeClr val="tx1"/>
+        </a:solidFill>
+        <a:latin typeface="+mn-lt"/>
+        <a:ea typeface="+mn-ea"/>
+        <a:cs typeface="+mn-cs"/>
+      </a:defRPr>
+    </a:lvl6pPr>
+    <a:lvl7pPr marL="2743200" algn="l" defTabSz="457200" rtl="0" eaLnBrk="1" latinLnBrk="0" hangingPunct="1">
+      <a:defRPr sz="1200" kern="1200">
+        <a:solidFill>
+          <a:schemeClr val="tx1"/>
+        </a:solidFill>
+        <a:latin typeface="+mn-lt"/>
+        <a:ea typeface="+mn-ea"/>
+        <a:cs typeface="+mn-cs"/>
+      </a:defRPr>
+    </a:lvl7pPr>
+    <a:lvl8pPr marL="3200400" algn="l" defTabSz="457200" rtl="0" eaLnBrk="1" latinLnBrk="0" hangingPunct="1">
+      <a:defRPr sz="1200" kern="1200">
+        <a:solidFill>
+          <a:schemeClr val="tx1"/>
+        </a:solidFill>
+        <a:latin typeface="+mn-lt"/>
+        <a:ea typeface="+mn-ea"/>
+        <a:cs typeface="+mn-cs"/>
+      </a:defRPr>
+    </a:lvl8pPr>
+    <a:lvl9pPr marL="3657600" algn="l" defTabSz="457200" rtl="0" eaLnBrk="1" latinLnBrk="0" hangingPunct="1">
+      <a:defRPr sz="1200" kern="1200">
+        <a:solidFill>
+          <a:schemeClr val="tx1"/>
+        </a:solidFill>
+        <a:latin typeface="+mn-lt"/>
+        <a:ea typeface="+mn-ea"/>
+        <a:cs typeface="+mn-cs"/>
+      </a:defRPr>
+    </a:lvl9pPr>
+  </p:notesStyle>
+</p:notesMaster>
+</file>
+
+<file path=ppt/notesSlides/notesSlide1.xml><?xml version="1.0" encoding="utf-8"?>
+<p:notes xmlns:a="http://schemas.openxmlformats.org/drawingml/2006/main" xmlns:r="http://schemas.openxmlformats.org/officeDocument/2006/relationships" xmlns:p="http://schemas.openxmlformats.org/presentationml/2006/main">
+  <p:cSld>
+    <p:spTree>
+      <p:nvGrpSpPr>
+        <p:cNvPr id="1" name=""/>
+        <p:cNvGrpSpPr/>
+        <p:nvPr/>
+      </p:nvGrpSpPr>
+      <p:grpSpPr>
+        <a:xfrm>
+          <a:off x="0" y="0"/>
+          <a:ext cx="0" cy="0"/>
+          <a:chOff x="0" y="0"/>
+          <a:chExt cx="0" cy="0"/>
+        </a:xfrm>
+      </p:grpSpPr>
+      <p:sp>
+        <p:nvSpPr>
+          <p:cNvPr id="2" name="Slide Image Placeholder 1"/>
+          <p:cNvSpPr>
+            <a:spLocks noGrp="1" noRot="1" noChangeAspect="1"/>
+          </p:cNvSpPr>
+          <p:nvPr>
+            <p:ph type="sldImg"/>
+          </p:nvPr>
+        </p:nvSpPr>
+        <p:spPr/>
+      </p:sp>
+      <p:sp>
+        <p:nvSpPr>
+          <p:cNvPr id="3" name="Notes Placeholder 2"/>
+          <p:cNvSpPr>
+            <a:spLocks noGrp="1"/>
+          </p:cNvSpPr>
+          <p:nvPr>
+            <p:ph type="body" idx="1"/>
+          </p:nvPr>
+        </p:nvSpPr>
+        <p:spPr/>
+        <p:txBody>
+          <a:bodyPr/>
+          <a:lstStyle/>
+          <a:p>
+            <a:pPr marL="228600" indent="-228600">
+              <a:buAutoNum type="arabicPeriod"/>
+            </a:pPr>
+            <a:r>
+              <a:rPr lang="en-US" dirty="0" smtClean="0"/>
+              <a:t>Check food intake</a:t>
+            </a:r>
+          </a:p>
+          <a:p>
+            <a:pPr marL="228600" indent="-228600">
+              <a:buAutoNum type="arabicPeriod"/>
+            </a:pPr>
+            <a:r>
+              <a:rPr lang="en-US" dirty="0" smtClean="0"/>
+              <a:t>Take</a:t>
+            </a:r>
+            <a:r>
+              <a:rPr lang="en-US" baseline="0" dirty="0" smtClean="0"/>
+              <a:t> the difference VO2 between Pre-fasting and </a:t>
+            </a:r>
+            <a:r>
+              <a:rPr lang="en-US" baseline="0" smtClean="0"/>
+              <a:t>During fasting.</a:t>
+            </a:r>
+            <a:endParaRPr lang="en-US"/>
+          </a:p>
+        </p:txBody>
+      </p:sp>
+      <p:sp>
+        <p:nvSpPr>
+          <p:cNvPr id="4" name="Slide Number Placeholder 3"/>
+          <p:cNvSpPr>
+            <a:spLocks noGrp="1"/>
+          </p:cNvSpPr>
+          <p:nvPr>
+            <p:ph type="sldNum" sz="quarter" idx="10"/>
+          </p:nvPr>
+        </p:nvSpPr>
+        <p:spPr/>
+        <p:txBody>
+          <a:bodyPr/>
+          <a:lstStyle/>
+          <a:p>
+            <a:fld id="{408A6340-2867-3F4F-85AE-5F411E163BC1}" type="slidenum">
+              <a:rPr lang="en-US" smtClean="0"/>
+              <a:t>25</a:t>
+            </a:fld>
+            <a:endParaRPr lang="en-US"/>
+          </a:p>
+        </p:txBody>
+      </p:sp>
+    </p:spTree>
+    <p:extLst>
+      <p:ext uri="{BB962C8B-B14F-4D97-AF65-F5344CB8AC3E}">
+        <p14:creationId xmlns:p14="http://schemas.microsoft.com/office/powerpoint/2010/main" val="3014475856"/>
+      </p:ext>
+    </p:extLst>
+  </p:cSld>
+  <p:clrMapOvr>
+    <a:masterClrMapping/>
+  </p:clrMapOvr>
+</p:notes>
 </file>
 
 <file path=ppt/slideLayouts/slideLayout1.xml><?xml version="1.0" encoding="utf-8"?>
@@ -3254,23 +3716,7 @@
           <a:p>
             <a:r>
               <a:rPr lang="en-US" dirty="0" smtClean="0"/>
-              <a:t>Shapiro’s p-values for WL and WG are </a:t>
-            </a:r>
-            <a:r>
-              <a:rPr lang="en-US" dirty="0" smtClean="0"/>
-              <a:t>0.6206632 </a:t>
-            </a:r>
-            <a:r>
-              <a:rPr lang="en-US" dirty="0" smtClean="0"/>
-              <a:t>and </a:t>
-            </a:r>
-            <a:r>
-              <a:rPr lang="en-US" dirty="0" smtClean="0"/>
-              <a:t>0.0097316, </a:t>
-            </a:r>
-            <a:r>
-              <a:rPr lang="en-US" dirty="0" smtClean="0"/>
-              <a:t>respectively.</a:t>
+              <a:t>Shapiro’s p-values for WL and WG are 0.6206632 and 0.0097316, respectively.</a:t>
             </a:r>
             <a:endParaRPr lang="en-US" dirty="0"/>
           </a:p>
@@ -3334,6 +3780,13 @@
   <p:clrMapOvr>
     <a:masterClrMapping/>
   </p:clrMapOvr>
+  <p:timing>
+    <p:tnLst>
+      <p:par>
+        <p:cTn xmlns:p14="http://schemas.microsoft.com/office/powerpoint/2010/main" id="1" dur="indefinite" restart="never" nodeType="tmRoot"/>
+      </p:par>
+    </p:tnLst>
+  </p:timing>
 </p:sld>
 </file>
 
@@ -3417,6 +3870,13 @@
   <p:clrMapOvr>
     <a:masterClrMapping/>
   </p:clrMapOvr>
+  <p:timing>
+    <p:tnLst>
+      <p:par>
+        <p:cTn xmlns:p14="http://schemas.microsoft.com/office/powerpoint/2010/main" id="1" dur="indefinite" restart="never" nodeType="tmRoot"/>
+      </p:par>
+    </p:tnLst>
+  </p:timing>
 </p:sld>
 </file>
 
@@ -3507,6 +3967,13 @@
   <p:clrMapOvr>
     <a:masterClrMapping/>
   </p:clrMapOvr>
+  <p:timing>
+    <p:tnLst>
+      <p:par>
+        <p:cTn xmlns:p14="http://schemas.microsoft.com/office/powerpoint/2010/main" id="1" dur="indefinite" restart="never" nodeType="tmRoot"/>
+      </p:par>
+    </p:tnLst>
+  </p:timing>
 </p:sld>
 </file>
 
@@ -3567,11 +4034,7 @@
           <a:p>
             <a:r>
               <a:rPr lang="en-US" sz="2000" dirty="0" smtClean="0"/>
-              <a:t>The 95% CI for Kendall’s tau is (</a:t>
-            </a:r>
-            <a:r>
-              <a:rPr lang="en-US" sz="2000" dirty="0" smtClean="0"/>
-              <a:t>0.149, 0.375)</a:t>
+              <a:t>The 95% CI for Kendall’s tau is (0.149, 0.375)</a:t>
             </a:r>
             <a:endParaRPr lang="en-US" sz="2000" dirty="0"/>
           </a:p>
@@ -3647,6 +4110,13 @@
   <p:clrMapOvr>
     <a:masterClrMapping/>
   </p:clrMapOvr>
+  <p:timing>
+    <p:tnLst>
+      <p:par>
+        <p:cTn xmlns:p14="http://schemas.microsoft.com/office/powerpoint/2010/main" id="1" dur="indefinite" restart="never" nodeType="tmRoot"/>
+      </p:par>
+    </p:tnLst>
+  </p:timing>
 </p:sld>
 </file>
 
@@ -3726,6 +4196,13 @@
   <p:clrMapOvr>
     <a:masterClrMapping/>
   </p:clrMapOvr>
+  <p:timing>
+    <p:tnLst>
+      <p:par>
+        <p:cTn xmlns:p14="http://schemas.microsoft.com/office/powerpoint/2010/main" id="1" dur="indefinite" restart="never" nodeType="tmRoot"/>
+      </p:par>
+    </p:tnLst>
+  </p:timing>
 </p:sld>
 </file>
 
@@ -3816,6 +4293,13 @@
   <p:clrMapOvr>
     <a:masterClrMapping/>
   </p:clrMapOvr>
+  <p:timing>
+    <p:tnLst>
+      <p:par>
+        <p:cTn xmlns:p14="http://schemas.microsoft.com/office/powerpoint/2010/main" id="1" dur="indefinite" restart="never" nodeType="tmRoot"/>
+      </p:par>
+    </p:tnLst>
+  </p:timing>
 </p:sld>
 </file>
 
@@ -3892,6 +4376,13 @@
   <p:clrMapOvr>
     <a:masterClrMapping/>
   </p:clrMapOvr>
+  <p:timing>
+    <p:tnLst>
+      <p:par>
+        <p:cTn xmlns:p14="http://schemas.microsoft.com/office/powerpoint/2010/main" id="1" dur="indefinite" restart="never" nodeType="tmRoot"/>
+      </p:par>
+    </p:tnLst>
+  </p:timing>
 </p:sld>
 </file>
 
@@ -3952,6 +4443,13 @@
   <p:clrMapOvr>
     <a:masterClrMapping/>
   </p:clrMapOvr>
+  <p:timing>
+    <p:tnLst>
+      <p:par>
+        <p:cTn xmlns:p14="http://schemas.microsoft.com/office/powerpoint/2010/main" id="1" dur="indefinite" restart="never" nodeType="tmRoot"/>
+      </p:par>
+    </p:tnLst>
+  </p:timing>
 </p:sld>
 </file>
 
@@ -4284,6 +4782,13 @@
   <p:clrMapOvr>
     <a:masterClrMapping/>
   </p:clrMapOvr>
+  <p:timing>
+    <p:tnLst>
+      <p:par>
+        <p:cTn xmlns:p14="http://schemas.microsoft.com/office/powerpoint/2010/main" id="1" dur="indefinite" restart="never" nodeType="tmRoot"/>
+      </p:par>
+    </p:tnLst>
+  </p:timing>
 </p:sld>
 </file>
 
@@ -4973,6 +5478,13 @@
   <p:clrMapOvr>
     <a:masterClrMapping/>
   </p:clrMapOvr>
+  <p:timing>
+    <p:tnLst>
+      <p:par>
+        <p:cTn xmlns:p14="http://schemas.microsoft.com/office/powerpoint/2010/main" id="1" dur="indefinite" restart="never" nodeType="tmRoot"/>
+      </p:par>
+    </p:tnLst>
+  </p:timing>
 </p:sld>
 </file>
 
@@ -5049,6 +5561,13 @@
   <p:clrMapOvr>
     <a:masterClrMapping/>
   </p:clrMapOvr>
+  <p:timing>
+    <p:tnLst>
+      <p:par>
+        <p:cTn xmlns:p14="http://schemas.microsoft.com/office/powerpoint/2010/main" id="1" dur="indefinite" restart="never" nodeType="tmRoot"/>
+      </p:par>
+    </p:tnLst>
+  </p:timing>
 </p:sld>
 </file>
 
@@ -5139,6 +5658,13 @@
   <p:clrMapOvr>
     <a:masterClrMapping/>
   </p:clrMapOvr>
+  <p:timing>
+    <p:tnLst>
+      <p:par>
+        <p:cTn xmlns:p14="http://schemas.microsoft.com/office/powerpoint/2010/main" id="1" dur="indefinite" restart="never" nodeType="tmRoot"/>
+      </p:par>
+    </p:tnLst>
+  </p:timing>
 </p:sld>
 </file>
 
@@ -5229,6 +5755,13 @@
   <p:clrMapOvr>
     <a:masterClrMapping/>
   </p:clrMapOvr>
+  <p:timing>
+    <p:tnLst>
+      <p:par>
+        <p:cTn xmlns:p14="http://schemas.microsoft.com/office/powerpoint/2010/main" id="1" dur="indefinite" restart="never" nodeType="tmRoot"/>
+      </p:par>
+    </p:tnLst>
+  </p:timing>
 </p:sld>
 </file>
 
@@ -5319,6 +5852,13 @@
   <p:clrMapOvr>
     <a:masterClrMapping/>
   </p:clrMapOvr>
+  <p:timing>
+    <p:tnLst>
+      <p:par>
+        <p:cTn xmlns:p14="http://schemas.microsoft.com/office/powerpoint/2010/main" id="1" dur="indefinite" restart="never" nodeType="tmRoot"/>
+      </p:par>
+    </p:tnLst>
+  </p:timing>
 </p:sld>
 </file>
 
@@ -5409,6 +5949,13 @@
   <p:clrMapOvr>
     <a:masterClrMapping/>
   </p:clrMapOvr>
+  <p:timing>
+    <p:tnLst>
+      <p:par>
+        <p:cTn xmlns:p14="http://schemas.microsoft.com/office/powerpoint/2010/main" id="1" dur="indefinite" restart="never" nodeType="tmRoot"/>
+      </p:par>
+    </p:tnLst>
+  </p:timing>
 </p:sld>
 </file>
 
@@ -5499,6 +6046,13 @@
   <p:clrMapOvr>
     <a:masterClrMapping/>
   </p:clrMapOvr>
+  <p:timing>
+    <p:tnLst>
+      <p:par>
+        <p:cTn xmlns:p14="http://schemas.microsoft.com/office/powerpoint/2010/main" id="1" dur="indefinite" restart="never" nodeType="tmRoot"/>
+      </p:par>
+    </p:tnLst>
+  </p:timing>
 </p:sld>
 </file>
 
@@ -5528,7 +6082,7 @@
           <p:nvPr/>
         </p:nvPicPr>
         <p:blipFill>
-          <a:blip r:embed="rId2">
+          <a:blip r:embed="rId3">
             <a:extLst>
               <a:ext uri="{28A0092B-C50C-407E-A947-70E740481C1C}">
                 <a14:useLocalDpi xmlns:a14="http://schemas.microsoft.com/office/drawing/2010/main" val="0"/>
@@ -5558,7 +6112,7 @@
           <p:nvPr/>
         </p:nvPicPr>
         <p:blipFill>
-          <a:blip r:embed="rId3">
+          <a:blip r:embed="rId4">
             <a:extLst>
               <a:ext uri="{28A0092B-C50C-407E-A947-70E740481C1C}">
                 <a14:useLocalDpi xmlns:a14="http://schemas.microsoft.com/office/drawing/2010/main" val="0"/>
@@ -5589,6 +6143,13 @@
   <p:clrMapOvr>
     <a:masterClrMapping/>
   </p:clrMapOvr>
+  <p:timing>
+    <p:tnLst>
+      <p:par>
+        <p:cTn xmlns:p14="http://schemas.microsoft.com/office/powerpoint/2010/main" id="1" dur="indefinite" restart="never" nodeType="tmRoot"/>
+      </p:par>
+    </p:tnLst>
+  </p:timing>
 </p:sld>
 </file>
 
@@ -5609,10 +6170,56 @@
           <a:chExt cx="0" cy="0"/>
         </a:xfrm>
       </p:grpSpPr>
+      <p:sp>
+        <p:nvSpPr>
+          <p:cNvPr id="2" name="Title 1"/>
+          <p:cNvSpPr>
+            <a:spLocks noGrp="1"/>
+          </p:cNvSpPr>
+          <p:nvPr>
+            <p:ph type="title"/>
+          </p:nvPr>
+        </p:nvSpPr>
+        <p:spPr/>
+        <p:txBody>
+          <a:bodyPr/>
+          <a:lstStyle/>
+          <a:p>
+            <a:r>
+              <a:rPr lang="en-US" dirty="0" smtClean="0"/>
+              <a:t>FOOD INTAKE</a:t>
+            </a:r>
+            <a:endParaRPr lang="en-US" dirty="0"/>
+          </a:p>
+        </p:txBody>
+      </p:sp>
+      <p:sp>
+        <p:nvSpPr>
+          <p:cNvPr id="3" name="Text Placeholder 2"/>
+          <p:cNvSpPr>
+            <a:spLocks noGrp="1"/>
+          </p:cNvSpPr>
+          <p:nvPr>
+            <p:ph type="body" idx="1"/>
+          </p:nvPr>
+        </p:nvSpPr>
+        <p:spPr/>
+        <p:txBody>
+          <a:bodyPr/>
+          <a:lstStyle/>
+          <a:p>
+            <a:r>
+              <a:rPr lang="en-US" dirty="0" smtClean="0"/>
+              <a:t>Cohort 7 and 8</a:t>
+            </a:r>
+            <a:endParaRPr lang="en-US" dirty="0"/>
+          </a:p>
+        </p:txBody>
+      </p:sp>
     </p:spTree>
     <p:extLst>
       <p:ext uri="{BB962C8B-B14F-4D97-AF65-F5344CB8AC3E}">
-        <p14:creationId xmlns:p14="http://schemas.microsoft.com/office/powerpoint/2010/main" val="1495769990"/>
+        <p14:creationId xmlns:p14="http://schemas.microsoft.com/office/powerpoint/2010/main" val="1433592600"/>
       </p:ext>
     </p:extLst>
   </p:cSld>
@@ -5654,6 +6261,92 @@
           <a:bodyPr/>
           <a:lstStyle/>
           <a:p>
+            <a:endParaRPr lang="en-US"/>
+          </a:p>
+        </p:txBody>
+      </p:sp>
+      <p:sp>
+        <p:nvSpPr>
+          <p:cNvPr id="3" name="Content Placeholder 2"/>
+          <p:cNvSpPr>
+            <a:spLocks noGrp="1"/>
+          </p:cNvSpPr>
+          <p:nvPr>
+            <p:ph idx="1"/>
+          </p:nvPr>
+        </p:nvSpPr>
+        <p:spPr/>
+        <p:txBody>
+          <a:bodyPr/>
+          <a:lstStyle/>
+          <a:p>
+            <a:r>
+              <a:rPr lang="en-US" dirty="0" smtClean="0"/>
+              <a:t>Mouse 2110 – no food data</a:t>
+            </a:r>
+          </a:p>
+          <a:p>
+            <a:r>
+              <a:rPr lang="en-US" dirty="0" smtClean="0"/>
+              <a:t>Mouse 2101 – only record the first interval</a:t>
+            </a:r>
+          </a:p>
+          <a:p>
+            <a:r>
+              <a:rPr lang="en-US" dirty="0" smtClean="0"/>
+              <a:t>Mouse 2102 – only record the first 3 intervals</a:t>
+            </a:r>
+          </a:p>
+          <a:p>
+            <a:endParaRPr lang="en-US" dirty="0"/>
+          </a:p>
+        </p:txBody>
+      </p:sp>
+    </p:spTree>
+    <p:extLst>
+      <p:ext uri="{BB962C8B-B14F-4D97-AF65-F5344CB8AC3E}">
+        <p14:creationId xmlns:p14="http://schemas.microsoft.com/office/powerpoint/2010/main" val="1552084091"/>
+      </p:ext>
+    </p:extLst>
+  </p:cSld>
+  <p:clrMapOvr>
+    <a:masterClrMapping/>
+  </p:clrMapOvr>
+</p:sld>
+</file>
+
+<file path=ppt/slides/slide28.xml><?xml version="1.0" encoding="utf-8"?>
+<p:sld xmlns:a="http://schemas.openxmlformats.org/drawingml/2006/main" xmlns:r="http://schemas.openxmlformats.org/officeDocument/2006/relationships" xmlns:p="http://schemas.openxmlformats.org/presentationml/2006/main">
+  <p:cSld>
+    <p:spTree>
+      <p:nvGrpSpPr>
+        <p:cNvPr id="1" name=""/>
+        <p:cNvGrpSpPr/>
+        <p:nvPr/>
+      </p:nvGrpSpPr>
+      <p:grpSpPr>
+        <a:xfrm>
+          <a:off x="0" y="0"/>
+          <a:ext cx="0" cy="0"/>
+          <a:chOff x="0" y="0"/>
+          <a:chExt cx="0" cy="0"/>
+        </a:xfrm>
+      </p:grpSpPr>
+      <p:sp>
+        <p:nvSpPr>
+          <p:cNvPr id="2" name="Title 1"/>
+          <p:cNvSpPr>
+            <a:spLocks noGrp="1"/>
+          </p:cNvSpPr>
+          <p:nvPr>
+            <p:ph type="title"/>
+          </p:nvPr>
+        </p:nvSpPr>
+        <p:spPr/>
+        <p:txBody>
+          <a:bodyPr/>
+          <a:lstStyle/>
+          <a:p>
             <a:r>
               <a:rPr lang="en-US" dirty="0" smtClean="0"/>
               <a:t>Juvenile HFD</a:t>
@@ -5719,10 +6412,17 @@
   <p:clrMapOvr>
     <a:masterClrMapping/>
   </p:clrMapOvr>
+  <p:timing>
+    <p:tnLst>
+      <p:par>
+        <p:cTn xmlns:p14="http://schemas.microsoft.com/office/powerpoint/2010/main" id="1" dur="indefinite" restart="never" nodeType="tmRoot"/>
+      </p:par>
+    </p:tnLst>
+  </p:timing>
 </p:sld>
 </file>
 
-<file path=ppt/slides/slide28.xml><?xml version="1.0" encoding="utf-8"?>
+<file path=ppt/slides/slide29.xml><?xml version="1.0" encoding="utf-8"?>
 <p:sld xmlns:a="http://schemas.openxmlformats.org/drawingml/2006/main" xmlns:r="http://schemas.openxmlformats.org/officeDocument/2006/relationships" xmlns:p="http://schemas.openxmlformats.org/presentationml/2006/main">
   <p:cSld>
     <p:spTree>
@@ -5773,10 +6473,114 @@
   <p:clrMapOvr>
     <a:masterClrMapping/>
   </p:clrMapOvr>
+  <p:timing>
+    <p:tnLst>
+      <p:par>
+        <p:cTn xmlns:p14="http://schemas.microsoft.com/office/powerpoint/2010/main" id="1" dur="indefinite" restart="never" nodeType="tmRoot"/>
+      </p:par>
+    </p:tnLst>
+  </p:timing>
 </p:sld>
 </file>
 
-<file path=ppt/slides/slide29.xml><?xml version="1.0" encoding="utf-8"?>
+<file path=ppt/slides/slide3.xml><?xml version="1.0" encoding="utf-8"?>
+<p:sld xmlns:a="http://schemas.openxmlformats.org/drawingml/2006/main" xmlns:r="http://schemas.openxmlformats.org/officeDocument/2006/relationships" xmlns:p="http://schemas.openxmlformats.org/presentationml/2006/main">
+  <p:cSld>
+    <p:spTree>
+      <p:nvGrpSpPr>
+        <p:cNvPr id="1" name=""/>
+        <p:cNvGrpSpPr/>
+        <p:nvPr/>
+      </p:nvGrpSpPr>
+      <p:grpSpPr>
+        <a:xfrm>
+          <a:off x="0" y="0"/>
+          <a:ext cx="0" cy="0"/>
+          <a:chOff x="0" y="0"/>
+          <a:chExt cx="0" cy="0"/>
+        </a:xfrm>
+      </p:grpSpPr>
+      <p:sp>
+        <p:nvSpPr>
+          <p:cNvPr id="2" name="Title 1"/>
+          <p:cNvSpPr>
+            <a:spLocks noGrp="1"/>
+          </p:cNvSpPr>
+          <p:nvPr>
+            <p:ph type="title"/>
+          </p:nvPr>
+        </p:nvSpPr>
+        <p:spPr/>
+        <p:txBody>
+          <a:bodyPr/>
+          <a:lstStyle/>
+          <a:p>
+            <a:r>
+              <a:rPr lang="en-US" dirty="0" smtClean="0"/>
+              <a:t>Hypothesis</a:t>
+            </a:r>
+            <a:endParaRPr lang="en-US" dirty="0"/>
+          </a:p>
+        </p:txBody>
+      </p:sp>
+      <p:sp>
+        <p:nvSpPr>
+          <p:cNvPr id="3" name="Content Placeholder 2"/>
+          <p:cNvSpPr>
+            <a:spLocks noGrp="1"/>
+          </p:cNvSpPr>
+          <p:nvPr>
+            <p:ph idx="1"/>
+          </p:nvPr>
+        </p:nvSpPr>
+        <p:spPr/>
+        <p:txBody>
+          <a:bodyPr/>
+          <a:lstStyle/>
+          <a:p>
+            <a:r>
+              <a:rPr lang="en-US" dirty="0" smtClean="0"/>
+              <a:t>Weight loss during fasting may be a predictor of weight gain after HFD.</a:t>
+            </a:r>
+          </a:p>
+          <a:p>
+            <a:pPr lvl="1"/>
+            <a:r>
+              <a:rPr lang="en-US" dirty="0" smtClean="0"/>
+              <a:t>Previous cohorts 5-6: there appeared to be a negative relationship</a:t>
+            </a:r>
+          </a:p>
+          <a:p>
+            <a:pPr lvl="1"/>
+            <a:r>
+              <a:rPr lang="en-US" dirty="0" smtClean="0"/>
+              <a:t>Current cohorts 7-8: there is a positive relationship</a:t>
+            </a:r>
+            <a:endParaRPr lang="en-US" dirty="0"/>
+          </a:p>
+        </p:txBody>
+      </p:sp>
+    </p:spTree>
+    <p:extLst>
+      <p:ext uri="{BB962C8B-B14F-4D97-AF65-F5344CB8AC3E}">
+        <p14:creationId xmlns:p14="http://schemas.microsoft.com/office/powerpoint/2010/main" val="3921865371"/>
+      </p:ext>
+    </p:extLst>
+  </p:cSld>
+  <p:clrMapOvr>
+    <a:masterClrMapping/>
+  </p:clrMapOvr>
+  <p:timing>
+    <p:tnLst>
+      <p:par>
+        <p:cTn xmlns:p14="http://schemas.microsoft.com/office/powerpoint/2010/main" id="1" dur="indefinite" restart="never" nodeType="tmRoot"/>
+      </p:par>
+    </p:tnLst>
+  </p:timing>
+</p:sld>
+</file>
+
+<file path=ppt/slides/slide30.xml><?xml version="1.0" encoding="utf-8"?>
 <p:sld xmlns:a="http://schemas.openxmlformats.org/drawingml/2006/main" xmlns:r="http://schemas.openxmlformats.org/officeDocument/2006/relationships" xmlns:p="http://schemas.openxmlformats.org/presentationml/2006/main">
   <p:cSld>
     <p:spTree>
@@ -5827,100 +6631,17 @@
   <p:clrMapOvr>
     <a:masterClrMapping/>
   </p:clrMapOvr>
+  <p:timing>
+    <p:tnLst>
+      <p:par>
+        <p:cTn xmlns:p14="http://schemas.microsoft.com/office/powerpoint/2010/main" id="1" dur="indefinite" restart="never" nodeType="tmRoot"/>
+      </p:par>
+    </p:tnLst>
+  </p:timing>
 </p:sld>
 </file>
 
-<file path=ppt/slides/slide3.xml><?xml version="1.0" encoding="utf-8"?>
-<p:sld xmlns:a="http://schemas.openxmlformats.org/drawingml/2006/main" xmlns:r="http://schemas.openxmlformats.org/officeDocument/2006/relationships" xmlns:p="http://schemas.openxmlformats.org/presentationml/2006/main">
-  <p:cSld>
-    <p:spTree>
-      <p:nvGrpSpPr>
-        <p:cNvPr id="1" name=""/>
-        <p:cNvGrpSpPr/>
-        <p:nvPr/>
-      </p:nvGrpSpPr>
-      <p:grpSpPr>
-        <a:xfrm>
-          <a:off x="0" y="0"/>
-          <a:ext cx="0" cy="0"/>
-          <a:chOff x="0" y="0"/>
-          <a:chExt cx="0" cy="0"/>
-        </a:xfrm>
-      </p:grpSpPr>
-      <p:sp>
-        <p:nvSpPr>
-          <p:cNvPr id="2" name="Title 1"/>
-          <p:cNvSpPr>
-            <a:spLocks noGrp="1"/>
-          </p:cNvSpPr>
-          <p:nvPr>
-            <p:ph type="title"/>
-          </p:nvPr>
-        </p:nvSpPr>
-        <p:spPr/>
-        <p:txBody>
-          <a:bodyPr/>
-          <a:lstStyle/>
-          <a:p>
-            <a:r>
-              <a:rPr lang="en-US" dirty="0" smtClean="0"/>
-              <a:t>Hypothesis</a:t>
-            </a:r>
-            <a:endParaRPr lang="en-US" dirty="0"/>
-          </a:p>
-        </p:txBody>
-      </p:sp>
-      <p:sp>
-        <p:nvSpPr>
-          <p:cNvPr id="3" name="Content Placeholder 2"/>
-          <p:cNvSpPr>
-            <a:spLocks noGrp="1"/>
-          </p:cNvSpPr>
-          <p:nvPr>
-            <p:ph idx="1"/>
-          </p:nvPr>
-        </p:nvSpPr>
-        <p:spPr/>
-        <p:txBody>
-          <a:bodyPr/>
-          <a:lstStyle/>
-          <a:p>
-            <a:r>
-              <a:rPr lang="en-US" dirty="0" smtClean="0"/>
-              <a:t>Weight loss during fasting may be a predictor of weight gain after HFD.</a:t>
-            </a:r>
-          </a:p>
-          <a:p>
-            <a:pPr lvl="1"/>
-            <a:r>
-              <a:rPr lang="en-US" dirty="0" smtClean="0"/>
-              <a:t>Previous cohorts 5-6: there appeared to be a negative relationship</a:t>
-            </a:r>
-          </a:p>
-          <a:p>
-            <a:pPr lvl="1"/>
-            <a:r>
-              <a:rPr lang="en-US" dirty="0" smtClean="0"/>
-              <a:t>Current cohorts 7-8: there is a positive relationship</a:t>
-            </a:r>
-            <a:endParaRPr lang="en-US" dirty="0"/>
-          </a:p>
-        </p:txBody>
-      </p:sp>
-    </p:spTree>
-    <p:extLst>
-      <p:ext uri="{BB962C8B-B14F-4D97-AF65-F5344CB8AC3E}">
-        <p14:creationId xmlns:p14="http://schemas.microsoft.com/office/powerpoint/2010/main" val="3921865371"/>
-      </p:ext>
-    </p:extLst>
-  </p:cSld>
-  <p:clrMapOvr>
-    <a:masterClrMapping/>
-  </p:clrMapOvr>
-</p:sld>
-</file>
-
-<file path=ppt/slides/slide30.xml><?xml version="1.0" encoding="utf-8"?>
+<file path=ppt/slides/slide31.xml><?xml version="1.0" encoding="utf-8"?>
 <p:sld xmlns:a="http://schemas.openxmlformats.org/drawingml/2006/main" xmlns:r="http://schemas.openxmlformats.org/officeDocument/2006/relationships" xmlns:p="http://schemas.openxmlformats.org/presentationml/2006/main">
   <p:cSld>
     <p:spTree>
@@ -5990,10 +6711,17 @@
   <p:clrMapOvr>
     <a:masterClrMapping/>
   </p:clrMapOvr>
+  <p:timing>
+    <p:tnLst>
+      <p:par>
+        <p:cTn xmlns:p14="http://schemas.microsoft.com/office/powerpoint/2010/main" id="1" dur="indefinite" restart="never" nodeType="tmRoot"/>
+      </p:par>
+    </p:tnLst>
+  </p:timing>
 </p:sld>
 </file>
 
-<file path=ppt/slides/slide31.xml><?xml version="1.0" encoding="utf-8"?>
+<file path=ppt/slides/slide32.xml><?xml version="1.0" encoding="utf-8"?>
 <p:sld xmlns:a="http://schemas.openxmlformats.org/drawingml/2006/main" xmlns:r="http://schemas.openxmlformats.org/officeDocument/2006/relationships" xmlns:p="http://schemas.openxmlformats.org/presentationml/2006/main">
   <p:cSld>
     <p:spTree>
@@ -6063,10 +6791,17 @@
   <p:clrMapOvr>
     <a:masterClrMapping/>
   </p:clrMapOvr>
+  <p:timing>
+    <p:tnLst>
+      <p:par>
+        <p:cTn xmlns:p14="http://schemas.microsoft.com/office/powerpoint/2010/main" id="1" dur="indefinite" restart="never" nodeType="tmRoot"/>
+      </p:par>
+    </p:tnLst>
+  </p:timing>
 </p:sld>
 </file>
 
-<file path=ppt/slides/slide32.xml><?xml version="1.0" encoding="utf-8"?>
+<file path=ppt/slides/slide33.xml><?xml version="1.0" encoding="utf-8"?>
 <p:sld xmlns:a="http://schemas.openxmlformats.org/drawingml/2006/main" xmlns:r="http://schemas.openxmlformats.org/officeDocument/2006/relationships" xmlns:p="http://schemas.openxmlformats.org/presentationml/2006/main">
   <p:cSld>
     <p:spTree>
@@ -6150,10 +6885,17 @@
   <p:clrMapOvr>
     <a:masterClrMapping/>
   </p:clrMapOvr>
+  <p:timing>
+    <p:tnLst>
+      <p:par>
+        <p:cTn xmlns:p14="http://schemas.microsoft.com/office/powerpoint/2010/main" id="1" dur="indefinite" restart="never" nodeType="tmRoot"/>
+      </p:par>
+    </p:tnLst>
+  </p:timing>
 </p:sld>
 </file>
 
-<file path=ppt/slides/slide33.xml><?xml version="1.0" encoding="utf-8"?>
+<file path=ppt/slides/slide34.xml><?xml version="1.0" encoding="utf-8"?>
 <p:sld xmlns:a="http://schemas.openxmlformats.org/drawingml/2006/main" xmlns:r="http://schemas.openxmlformats.org/officeDocument/2006/relationships" xmlns:p="http://schemas.openxmlformats.org/presentationml/2006/main">
   <p:cSld>
     <p:spTree>
@@ -6231,7 +6973,7 @@
 </p:sld>
 </file>
 
-<file path=ppt/slides/slide34.xml><?xml version="1.0" encoding="utf-8"?>
+<file path=ppt/slides/slide35.xml><?xml version="1.0" encoding="utf-8"?>
 <p:sld xmlns:a="http://schemas.openxmlformats.org/drawingml/2006/main" xmlns:r="http://schemas.openxmlformats.org/officeDocument/2006/relationships" xmlns:p="http://schemas.openxmlformats.org/presentationml/2006/main">
   <p:cSld>
     <p:spTree>
@@ -6285,7 +7027,7 @@
 </p:sld>
 </file>
 
-<file path=ppt/slides/slide35.xml><?xml version="1.0" encoding="utf-8"?>
+<file path=ppt/slides/slide36.xml><?xml version="1.0" encoding="utf-8"?>
 <p:sld xmlns:a="http://schemas.openxmlformats.org/drawingml/2006/main" xmlns:r="http://schemas.openxmlformats.org/officeDocument/2006/relationships" xmlns:p="http://schemas.openxmlformats.org/presentationml/2006/main">
   <p:cSld>
     <p:spTree>
@@ -6339,7 +7081,7 @@
 </p:sld>
 </file>
 
-<file path=ppt/slides/slide36.xml><?xml version="1.0" encoding="utf-8"?>
+<file path=ppt/slides/slide37.xml><?xml version="1.0" encoding="utf-8"?>
 <p:sld xmlns:a="http://schemas.openxmlformats.org/drawingml/2006/main" xmlns:r="http://schemas.openxmlformats.org/officeDocument/2006/relationships" xmlns:p="http://schemas.openxmlformats.org/presentationml/2006/main">
   <p:cSld>
     <p:spTree>
@@ -6411,7 +7153,7 @@
 </p:sld>
 </file>
 
-<file path=ppt/slides/slide37.xml><?xml version="1.0" encoding="utf-8"?>
+<file path=ppt/slides/slide38.xml><?xml version="1.0" encoding="utf-8"?>
 <p:sld xmlns:a="http://schemas.openxmlformats.org/drawingml/2006/main" xmlns:r="http://schemas.openxmlformats.org/officeDocument/2006/relationships" xmlns:p="http://schemas.openxmlformats.org/presentationml/2006/main">
   <p:cSld>
     <p:spTree>
@@ -6465,178 +7207,6 @@
 </p:sld>
 </file>
 
-<file path=ppt/slides/slide38.xml><?xml version="1.0" encoding="utf-8"?>
-<p:sld xmlns:a="http://schemas.openxmlformats.org/drawingml/2006/main" xmlns:r="http://schemas.openxmlformats.org/officeDocument/2006/relationships" xmlns:p="http://schemas.openxmlformats.org/presentationml/2006/main">
-  <p:cSld>
-    <p:spTree>
-      <p:nvGrpSpPr>
-        <p:cNvPr id="1" name=""/>
-        <p:cNvGrpSpPr/>
-        <p:nvPr/>
-      </p:nvGrpSpPr>
-      <p:grpSpPr>
-        <a:xfrm>
-          <a:off x="0" y="0"/>
-          <a:ext cx="0" cy="0"/>
-          <a:chOff x="0" y="0"/>
-          <a:chExt cx="0" cy="0"/>
-        </a:xfrm>
-      </p:grpSpPr>
-      <p:sp>
-        <p:nvSpPr>
-          <p:cNvPr id="2" name="Title 1"/>
-          <p:cNvSpPr>
-            <a:spLocks noGrp="1"/>
-          </p:cNvSpPr>
-          <p:nvPr>
-            <p:ph type="title"/>
-          </p:nvPr>
-        </p:nvSpPr>
-        <p:spPr/>
-        <p:txBody>
-          <a:bodyPr/>
-          <a:lstStyle/>
-          <a:p>
-            <a:endParaRPr lang="en-US"/>
-          </a:p>
-        </p:txBody>
-      </p:sp>
-      <p:sp>
-        <p:nvSpPr>
-          <p:cNvPr id="3" name="Content Placeholder 2"/>
-          <p:cNvSpPr>
-            <a:spLocks noGrp="1"/>
-          </p:cNvSpPr>
-          <p:nvPr>
-            <p:ph idx="1"/>
-          </p:nvPr>
-        </p:nvSpPr>
-        <p:spPr/>
-        <p:txBody>
-          <a:bodyPr>
-            <a:normAutofit/>
-          </a:bodyPr>
-          <a:lstStyle/>
-          <a:p>
-            <a:r>
-              <a:rPr lang="ro-RO" sz="2000" dirty="0"/>
-              <a:t>sub &lt;- c(rep(TRUE, 96), rep(FALSE, 62))</a:t>
-            </a:r>
-            <a:endParaRPr lang="en-US" sz="2000" dirty="0" smtClean="0"/>
-          </a:p>
-          <a:p>
-            <a:r>
-              <a:rPr lang="en-US" sz="2000" dirty="0" smtClean="0"/>
-              <a:t>weight.rf2 </a:t>
-            </a:r>
-            <a:r>
-              <a:rPr lang="en-US" sz="2000" dirty="0"/>
-              <a:t>&lt;- </a:t>
-            </a:r>
-            <a:r>
-              <a:rPr lang="en-US" sz="2000" dirty="0" err="1"/>
-              <a:t>REEMtree</a:t>
-            </a:r>
-            <a:r>
-              <a:rPr lang="en-US" sz="2000" dirty="0"/>
-              <a:t>(</a:t>
-            </a:r>
-            <a:r>
-              <a:rPr lang="en-US" sz="2000" dirty="0" err="1"/>
-              <a:t>Percent.WG</a:t>
-            </a:r>
-            <a:r>
-              <a:rPr lang="en-US" sz="2000" dirty="0"/>
-              <a:t>~ VO2.LBM + RER + </a:t>
-            </a:r>
-            <a:r>
-              <a:rPr lang="en-US" sz="2000" dirty="0" err="1"/>
-              <a:t>SumXYAmb</a:t>
-            </a:r>
-            <a:r>
-              <a:rPr lang="en-US" sz="2000" dirty="0"/>
-              <a:t>+</a:t>
-            </a:r>
-          </a:p>
-          <a:p>
-            <a:r>
-              <a:rPr lang="en-US" sz="2000" dirty="0"/>
-              <a:t>                     </a:t>
-            </a:r>
-            <a:r>
-              <a:rPr lang="en-US" sz="2000" dirty="0" err="1"/>
-              <a:t>Avg.Percent.FL</a:t>
-            </a:r>
-            <a:r>
-              <a:rPr lang="en-US" sz="2000" dirty="0"/>
-              <a:t> + </a:t>
-            </a:r>
-            <a:r>
-              <a:rPr lang="en-US" sz="2000" dirty="0" err="1"/>
-              <a:t>Avg.Percent.LL</a:t>
-            </a:r>
-            <a:r>
-              <a:rPr lang="en-US" sz="2000" dirty="0"/>
-              <a:t> + </a:t>
-            </a:r>
-            <a:r>
-              <a:rPr lang="en-US" sz="2000" dirty="0" err="1"/>
-              <a:t>Light.Dark</a:t>
-            </a:r>
-            <a:r>
-              <a:rPr lang="en-US" sz="2000" dirty="0"/>
-              <a:t> + Fast</a:t>
-            </a:r>
-          </a:p>
-          <a:p>
-            <a:r>
-              <a:rPr lang="en-US" sz="2000" dirty="0"/>
-              <a:t>                    , data=</a:t>
-            </a:r>
-            <a:r>
-              <a:rPr lang="en-US" sz="2000" dirty="0" err="1"/>
-              <a:t>combine.data</a:t>
-            </a:r>
-            <a:r>
-              <a:rPr lang="en-US" sz="2000" dirty="0"/>
-              <a:t>, random=~1|Subject, subset=sub</a:t>
-            </a:r>
-            <a:r>
-              <a:rPr lang="en-US" sz="2000" dirty="0" smtClean="0"/>
-              <a:t>)</a:t>
-            </a:r>
-          </a:p>
-          <a:p>
-            <a:endParaRPr lang="en-US" sz="2000" dirty="0"/>
-          </a:p>
-          <a:p>
-            <a:r>
-              <a:rPr lang="en-US" sz="2000" dirty="0" smtClean="0"/>
-              <a:t>R2 = 0.288</a:t>
-            </a:r>
-          </a:p>
-          <a:p>
-            <a:r>
-              <a:rPr lang="en-US" sz="2000" dirty="0" smtClean="0"/>
-              <a:t>MSE = 190.12</a:t>
-            </a:r>
-            <a:endParaRPr lang="en-US" sz="2000" dirty="0"/>
-          </a:p>
-        </p:txBody>
-      </p:sp>
-    </p:spTree>
-    <p:extLst>
-      <p:ext uri="{BB962C8B-B14F-4D97-AF65-F5344CB8AC3E}">
-        <p14:creationId xmlns:p14="http://schemas.microsoft.com/office/powerpoint/2010/main" val="3037493318"/>
-      </p:ext>
-    </p:extLst>
-  </p:cSld>
-  <p:clrMapOvr>
-    <a:masterClrMapping/>
-  </p:clrMapOvr>
-</p:sld>
-</file>
-
 <file path=ppt/slides/slide39.xml><?xml version="1.0" encoding="utf-8"?>
 <p:sld xmlns:a="http://schemas.openxmlformats.org/drawingml/2006/main" xmlns:r="http://schemas.openxmlformats.org/officeDocument/2006/relationships" xmlns:p="http://schemas.openxmlformats.org/presentationml/2006/main">
   <p:cSld>
@@ -6654,40 +7224,152 @@
           <a:chExt cx="0" cy="0"/>
         </a:xfrm>
       </p:grpSpPr>
-      <p:pic>
-        <p:nvPicPr>
-          <p:cNvPr id="2" name="Picture 1" descr="Screen Shot 2015-04-10 at 1.53.20 PM.png"/>
-          <p:cNvPicPr>
-            <a:picLocks noChangeAspect="1"/>
-          </p:cNvPicPr>
-          <p:nvPr/>
-        </p:nvPicPr>
-        <p:blipFill>
-          <a:blip r:embed="rId2">
-            <a:extLst>
-              <a:ext uri="{28A0092B-C50C-407E-A947-70E740481C1C}">
-                <a14:useLocalDpi xmlns:a14="http://schemas.microsoft.com/office/drawing/2010/main" val="0"/>
-              </a:ext>
-            </a:extLst>
-          </a:blip>
-          <a:stretch>
-            <a:fillRect/>
-          </a:stretch>
-        </p:blipFill>
-        <p:spPr>
-          <a:xfrm>
-            <a:off x="0" y="1277649"/>
-            <a:ext cx="9144000" cy="1367005"/>
-          </a:xfrm>
-          <a:prstGeom prst="rect">
-            <a:avLst/>
-          </a:prstGeom>
-        </p:spPr>
-      </p:pic>
+      <p:sp>
+        <p:nvSpPr>
+          <p:cNvPr id="2" name="Title 1"/>
+          <p:cNvSpPr>
+            <a:spLocks noGrp="1"/>
+          </p:cNvSpPr>
+          <p:nvPr>
+            <p:ph type="title"/>
+          </p:nvPr>
+        </p:nvSpPr>
+        <p:spPr/>
+        <p:txBody>
+          <a:bodyPr/>
+          <a:lstStyle/>
+          <a:p>
+            <a:endParaRPr lang="en-US"/>
+          </a:p>
+        </p:txBody>
+      </p:sp>
+      <p:sp>
+        <p:nvSpPr>
+          <p:cNvPr id="3" name="Content Placeholder 2"/>
+          <p:cNvSpPr>
+            <a:spLocks noGrp="1"/>
+          </p:cNvSpPr>
+          <p:nvPr>
+            <p:ph idx="1"/>
+          </p:nvPr>
+        </p:nvSpPr>
+        <p:spPr/>
+        <p:txBody>
+          <a:bodyPr>
+            <a:normAutofit/>
+          </a:bodyPr>
+          <a:lstStyle/>
+          <a:p>
+            <a:r>
+              <a:rPr lang="ro-RO" sz="2000" dirty="0"/>
+              <a:t>sub &lt;- c(rep(TRUE, 96), rep(FALSE, 62))</a:t>
+            </a:r>
+            <a:endParaRPr lang="en-US" sz="2000" dirty="0" smtClean="0"/>
+          </a:p>
+          <a:p>
+            <a:r>
+              <a:rPr lang="en-US" sz="2000" dirty="0" smtClean="0"/>
+              <a:t>weight.rf2 </a:t>
+            </a:r>
+            <a:r>
+              <a:rPr lang="en-US" sz="2000" dirty="0"/>
+              <a:t>&lt;- </a:t>
+            </a:r>
+            <a:r>
+              <a:rPr lang="en-US" sz="2000" dirty="0" err="1"/>
+              <a:t>REEMtree</a:t>
+            </a:r>
+            <a:r>
+              <a:rPr lang="en-US" sz="2000" dirty="0"/>
+              <a:t>(</a:t>
+            </a:r>
+            <a:r>
+              <a:rPr lang="en-US" sz="2000" dirty="0" err="1"/>
+              <a:t>Percent.WG</a:t>
+            </a:r>
+            <a:r>
+              <a:rPr lang="en-US" sz="2000" dirty="0"/>
+              <a:t>~ VO2.LBM + RER + </a:t>
+            </a:r>
+            <a:r>
+              <a:rPr lang="en-US" sz="2000" dirty="0" err="1"/>
+              <a:t>SumXYAmb</a:t>
+            </a:r>
+            <a:r>
+              <a:rPr lang="en-US" sz="2000" dirty="0"/>
+              <a:t>+</a:t>
+            </a:r>
+          </a:p>
+          <a:p>
+            <a:r>
+              <a:rPr lang="en-US" sz="2000" dirty="0"/>
+              <a:t>                     </a:t>
+            </a:r>
+            <a:r>
+              <a:rPr lang="en-US" sz="2000" dirty="0" err="1"/>
+              <a:t>Avg.Percent.FL</a:t>
+            </a:r>
+            <a:r>
+              <a:rPr lang="en-US" sz="2000" dirty="0"/>
+              <a:t> + </a:t>
+            </a:r>
+            <a:r>
+              <a:rPr lang="en-US" sz="2000" dirty="0" err="1"/>
+              <a:t>Avg.Percent.LL</a:t>
+            </a:r>
+            <a:r>
+              <a:rPr lang="en-US" sz="2000" dirty="0"/>
+              <a:t> + </a:t>
+            </a:r>
+            <a:r>
+              <a:rPr lang="en-US" sz="2000" dirty="0" err="1"/>
+              <a:t>Light.Dark</a:t>
+            </a:r>
+            <a:r>
+              <a:rPr lang="en-US" sz="2000" dirty="0"/>
+              <a:t> + Fast</a:t>
+            </a:r>
+          </a:p>
+          <a:p>
+            <a:r>
+              <a:rPr lang="en-US" sz="2000" dirty="0"/>
+              <a:t>                    , data=</a:t>
+            </a:r>
+            <a:r>
+              <a:rPr lang="en-US" sz="2000" dirty="0" err="1"/>
+              <a:t>combine.data</a:t>
+            </a:r>
+            <a:r>
+              <a:rPr lang="en-US" sz="2000" dirty="0"/>
+              <a:t>, random=~1|Subject, subset=sub</a:t>
+            </a:r>
+            <a:r>
+              <a:rPr lang="en-US" sz="2000" dirty="0" smtClean="0"/>
+              <a:t>)</a:t>
+            </a:r>
+          </a:p>
+          <a:p>
+            <a:endParaRPr lang="en-US" sz="2000" dirty="0"/>
+          </a:p>
+          <a:p>
+            <a:r>
+              <a:rPr lang="en-US" sz="2000" dirty="0" smtClean="0"/>
+              <a:t>R2 = 0.288</a:t>
+            </a:r>
+          </a:p>
+          <a:p>
+            <a:r>
+              <a:rPr lang="en-US" sz="2000" dirty="0" smtClean="0"/>
+              <a:t>MSE = 190.12</a:t>
+            </a:r>
+            <a:endParaRPr lang="en-US" sz="2000" dirty="0"/>
+          </a:p>
+        </p:txBody>
+      </p:sp>
     </p:spTree>
     <p:extLst>
       <p:ext uri="{BB962C8B-B14F-4D97-AF65-F5344CB8AC3E}">
-        <p14:creationId xmlns:p14="http://schemas.microsoft.com/office/powerpoint/2010/main" val="3641282480"/>
+        <p14:creationId xmlns:p14="http://schemas.microsoft.com/office/powerpoint/2010/main" val="3037493318"/>
       </p:ext>
     </p:extLst>
   </p:cSld>
@@ -6775,7 +7457,15 @@
           <a:p>
             <a:r>
               <a:rPr lang="en-US" dirty="0" smtClean="0"/>
-              <a:t>HFD #7 – cohort id is 8 (n=24)</a:t>
+              <a:t>HFD #7 – cohort id </a:t>
+            </a:r>
+            <a:r>
+              <a:rPr lang="en-US" dirty="0" smtClean="0"/>
+              <a:t> is </a:t>
+            </a:r>
+            <a:r>
+              <a:rPr lang="en-US" dirty="0" smtClean="0"/>
+              <a:t>8 (n=24)</a:t>
             </a:r>
           </a:p>
           <a:p>
@@ -7928,6 +8618,73 @@
   <p:clrMapOvr>
     <a:masterClrMapping/>
   </p:clrMapOvr>
+  <p:timing>
+    <p:tnLst>
+      <p:par>
+        <p:cTn xmlns:p14="http://schemas.microsoft.com/office/powerpoint/2010/main" id="1" dur="indefinite" restart="never" nodeType="tmRoot"/>
+      </p:par>
+    </p:tnLst>
+  </p:timing>
+</p:sld>
+</file>
+
+<file path=ppt/slides/slide40.xml><?xml version="1.0" encoding="utf-8"?>
+<p:sld xmlns:a="http://schemas.openxmlformats.org/drawingml/2006/main" xmlns:r="http://schemas.openxmlformats.org/officeDocument/2006/relationships" xmlns:p="http://schemas.openxmlformats.org/presentationml/2006/main">
+  <p:cSld>
+    <p:spTree>
+      <p:nvGrpSpPr>
+        <p:cNvPr id="1" name=""/>
+        <p:cNvGrpSpPr/>
+        <p:nvPr/>
+      </p:nvGrpSpPr>
+      <p:grpSpPr>
+        <a:xfrm>
+          <a:off x="0" y="0"/>
+          <a:ext cx="0" cy="0"/>
+          <a:chOff x="0" y="0"/>
+          <a:chExt cx="0" cy="0"/>
+        </a:xfrm>
+      </p:grpSpPr>
+      <p:pic>
+        <p:nvPicPr>
+          <p:cNvPr id="2" name="Picture 1" descr="Screen Shot 2015-04-10 at 1.53.20 PM.png"/>
+          <p:cNvPicPr>
+            <a:picLocks noChangeAspect="1"/>
+          </p:cNvPicPr>
+          <p:nvPr/>
+        </p:nvPicPr>
+        <p:blipFill>
+          <a:blip r:embed="rId2">
+            <a:extLst>
+              <a:ext uri="{28A0092B-C50C-407E-A947-70E740481C1C}">
+                <a14:useLocalDpi xmlns:a14="http://schemas.microsoft.com/office/drawing/2010/main" val="0"/>
+              </a:ext>
+            </a:extLst>
+          </a:blip>
+          <a:stretch>
+            <a:fillRect/>
+          </a:stretch>
+        </p:blipFill>
+        <p:spPr>
+          <a:xfrm>
+            <a:off x="0" y="1277649"/>
+            <a:ext cx="9144000" cy="1367005"/>
+          </a:xfrm>
+          <a:prstGeom prst="rect">
+            <a:avLst/>
+          </a:prstGeom>
+        </p:spPr>
+      </p:pic>
+    </p:spTree>
+    <p:extLst>
+      <p:ext uri="{BB962C8B-B14F-4D97-AF65-F5344CB8AC3E}">
+        <p14:creationId xmlns:p14="http://schemas.microsoft.com/office/powerpoint/2010/main" val="3641282480"/>
+      </p:ext>
+    </p:extLst>
+  </p:cSld>
+  <p:clrMapOvr>
+    <a:masterClrMapping/>
+  </p:clrMapOvr>
 </p:sld>
 </file>
 
@@ -8455,6 +9212,13 @@
   <p:clrMapOvr>
     <a:masterClrMapping/>
   </p:clrMapOvr>
+  <p:timing>
+    <p:tnLst>
+      <p:par>
+        <p:cTn xmlns:p14="http://schemas.microsoft.com/office/powerpoint/2010/main" id="1" dur="indefinite" restart="never" nodeType="tmRoot"/>
+      </p:par>
+    </p:tnLst>
+  </p:timing>
 </p:sld>
 </file>
 
@@ -8564,6 +9328,13 @@
   <p:clrMapOvr>
     <a:masterClrMapping/>
   </p:clrMapOvr>
+  <p:timing>
+    <p:tnLst>
+      <p:par>
+        <p:cTn xmlns:p14="http://schemas.microsoft.com/office/powerpoint/2010/main" id="1" dur="indefinite" restart="never" nodeType="tmRoot"/>
+      </p:par>
+    </p:tnLst>
+  </p:timing>
 </p:sld>
 </file>
 
@@ -8635,19 +9406,7 @@
             </a:r>
             <a:r>
               <a:rPr lang="en-US" dirty="0" smtClean="0"/>
-              <a:t> post-hoc of </a:t>
-            </a:r>
-            <a:r>
-              <a:rPr lang="en-US" dirty="0" smtClean="0"/>
-              <a:t>pre-fasted</a:t>
-            </a:r>
-            <a:r>
-              <a:rPr lang="en-US" dirty="0" smtClean="0"/>
-              <a:t> </a:t>
-            </a:r>
-            <a:r>
-              <a:rPr lang="en-US" dirty="0" smtClean="0"/>
-              <a:t>weights</a:t>
+              <a:t> post-hoc of pre-fasted weights</a:t>
             </a:r>
             <a:endParaRPr lang="en-US" dirty="0"/>
           </a:p>
@@ -8775,6 +9534,13 @@
   <p:clrMapOvr>
     <a:masterClrMapping/>
   </p:clrMapOvr>
+  <p:timing>
+    <p:tnLst>
+      <p:par>
+        <p:cTn xmlns:p14="http://schemas.microsoft.com/office/powerpoint/2010/main" id="1" dur="indefinite" restart="never" nodeType="tmRoot"/>
+      </p:par>
+    </p:tnLst>
+  </p:timing>
 </p:sld>
 </file>
 
@@ -8917,6 +9683,13 @@
   <p:clrMapOvr>
     <a:masterClrMapping/>
   </p:clrMapOvr>
+  <p:timing>
+    <p:tnLst>
+      <p:par>
+        <p:cTn xmlns:p14="http://schemas.microsoft.com/office/powerpoint/2010/main" id="1" dur="indefinite" restart="never" nodeType="tmRoot"/>
+      </p:par>
+    </p:tnLst>
+  </p:timing>
 </p:sld>
 </file>
 
@@ -8994,6 +9767,13 @@
   <p:clrMapOvr>
     <a:masterClrMapping/>
   </p:clrMapOvr>
+  <p:timing>
+    <p:tnLst>
+      <p:par>
+        <p:cTn xmlns:p14="http://schemas.microsoft.com/office/powerpoint/2010/main" id="1" dur="indefinite" restart="never" nodeType="tmRoot"/>
+      </p:par>
+    </p:tnLst>
+  </p:timing>
 </p:sld>
 </file>
 
@@ -9315,4 +10095,324 @@
   </a:objectDefaults>
   <a:extraClrSchemeLst/>
 </a:theme>
+</file>
+
+<file path=ppt/theme/theme2.xml><?xml version="1.0" encoding="utf-8"?>
+<a:theme xmlns:a="http://schemas.openxmlformats.org/drawingml/2006/main" name="Office Theme">
+  <a:themeElements>
+    <a:clrScheme name="Office">
+      <a:dk1>
+        <a:sysClr val="windowText" lastClr="000000"/>
+      </a:dk1>
+      <a:lt1>
+        <a:sysClr val="window" lastClr="FFFFFF"/>
+      </a:lt1>
+      <a:dk2>
+        <a:srgbClr val="1F497D"/>
+      </a:dk2>
+      <a:lt2>
+        <a:srgbClr val="EEECE1"/>
+      </a:lt2>
+      <a:accent1>
+        <a:srgbClr val="4F81BD"/>
+      </a:accent1>
+      <a:accent2>
+        <a:srgbClr val="C0504D"/>
+      </a:accent2>
+      <a:accent3>
+        <a:srgbClr val="9BBB59"/>
+      </a:accent3>
+      <a:accent4>
+        <a:srgbClr val="8064A2"/>
+      </a:accent4>
+      <a:accent5>
+        <a:srgbClr val="4BACC6"/>
+      </a:accent5>
+      <a:accent6>
+        <a:srgbClr val="F79646"/>
+      </a:accent6>
+      <a:hlink>
+        <a:srgbClr val="0000FF"/>
+      </a:hlink>
+      <a:folHlink>
+        <a:srgbClr val="800080"/>
+      </a:folHlink>
+    </a:clrScheme>
+    <a:fontScheme name="Office">
+      <a:majorFont>
+        <a:latin typeface="Calibri"/>
+        <a:ea typeface=""/>
+        <a:cs typeface=""/>
+        <a:font script="Jpan" typeface="ＭＳ Ｐゴシック"/>
+        <a:font script="Hang" typeface="맑은 고딕"/>
+        <a:font script="Hans" typeface="宋体"/>
+        <a:font script="Hant" typeface="新細明體"/>
+        <a:font script="Arab" typeface="Times New Roman"/>
+        <a:font script="Hebr" typeface="Times New Roman"/>
+        <a:font script="Thai" typeface="Angsana New"/>
+        <a:font script="Ethi" typeface="Nyala"/>
+        <a:font script="Beng" typeface="Vrinda"/>
+        <a:font script="Gujr" typeface="Shruti"/>
+        <a:font script="Khmr" typeface="MoolBoran"/>
+        <a:font script="Knda" typeface="Tunga"/>
+        <a:font script="Guru" typeface="Raavi"/>
+        <a:font script="Cans" typeface="Euphemia"/>
+        <a:font script="Cher" typeface="Plantagenet Cherokee"/>
+        <a:font script="Yiii" typeface="Microsoft Yi Baiti"/>
+        <a:font script="Tibt" typeface="Microsoft Himalaya"/>
+        <a:font script="Thaa" typeface="MV Boli"/>
+        <a:font script="Deva" typeface="Mangal"/>
+        <a:font script="Telu" typeface="Gautami"/>
+        <a:font script="Taml" typeface="Latha"/>
+        <a:font script="Syrc" typeface="Estrangelo Edessa"/>
+        <a:font script="Orya" typeface="Kalinga"/>
+        <a:font script="Mlym" typeface="Kartika"/>
+        <a:font script="Laoo" typeface="DokChampa"/>
+        <a:font script="Sinh" typeface="Iskoola Pota"/>
+        <a:font script="Mong" typeface="Mongolian Baiti"/>
+        <a:font script="Viet" typeface="Times New Roman"/>
+        <a:font script="Uigh" typeface="Microsoft Uighur"/>
+        <a:font script="Geor" typeface="Sylfaen"/>
+      </a:majorFont>
+      <a:minorFont>
+        <a:latin typeface="Calibri"/>
+        <a:ea typeface=""/>
+        <a:cs typeface=""/>
+        <a:font script="Jpan" typeface="ＭＳ Ｐゴシック"/>
+        <a:font script="Hang" typeface="맑은 고딕"/>
+        <a:font script="Hans" typeface="宋体"/>
+        <a:font script="Hant" typeface="新細明體"/>
+        <a:font script="Arab" typeface="Arial"/>
+        <a:font script="Hebr" typeface="Arial"/>
+        <a:font script="Thai" typeface="Cordia New"/>
+        <a:font script="Ethi" typeface="Nyala"/>
+        <a:font script="Beng" typeface="Vrinda"/>
+        <a:font script="Gujr" typeface="Shruti"/>
+        <a:font script="Khmr" typeface="DaunPenh"/>
+        <a:font script="Knda" typeface="Tunga"/>
+        <a:font script="Guru" typeface="Raavi"/>
+        <a:font script="Cans" typeface="Euphemia"/>
+        <a:font script="Cher" typeface="Plantagenet Cherokee"/>
+        <a:font script="Yiii" typeface="Microsoft Yi Baiti"/>
+        <a:font script="Tibt" typeface="Microsoft Himalaya"/>
+        <a:font script="Thaa" typeface="MV Boli"/>
+        <a:font script="Deva" typeface="Mangal"/>
+        <a:font script="Telu" typeface="Gautami"/>
+        <a:font script="Taml" typeface="Latha"/>
+        <a:font script="Syrc" typeface="Estrangelo Edessa"/>
+        <a:font script="Orya" typeface="Kalinga"/>
+        <a:font script="Mlym" typeface="Kartika"/>
+        <a:font script="Laoo" typeface="DokChampa"/>
+        <a:font script="Sinh" typeface="Iskoola Pota"/>
+        <a:font script="Mong" typeface="Mongolian Baiti"/>
+        <a:font script="Viet" typeface="Arial"/>
+        <a:font script="Uigh" typeface="Microsoft Uighur"/>
+        <a:font script="Geor" typeface="Sylfaen"/>
+      </a:minorFont>
+    </a:fontScheme>
+    <a:fmtScheme name="Office">
+      <a:fillStyleLst>
+        <a:solidFill>
+          <a:schemeClr val="phClr"/>
+        </a:solidFill>
+        <a:gradFill rotWithShape="1">
+          <a:gsLst>
+            <a:gs pos="0">
+              <a:schemeClr val="phClr">
+                <a:tint val="50000"/>
+                <a:satMod val="300000"/>
+              </a:schemeClr>
+            </a:gs>
+            <a:gs pos="35000">
+              <a:schemeClr val="phClr">
+                <a:tint val="37000"/>
+                <a:satMod val="300000"/>
+              </a:schemeClr>
+            </a:gs>
+            <a:gs pos="100000">
+              <a:schemeClr val="phClr">
+                <a:tint val="15000"/>
+                <a:satMod val="350000"/>
+              </a:schemeClr>
+            </a:gs>
+          </a:gsLst>
+          <a:lin ang="16200000" scaled="1"/>
+        </a:gradFill>
+        <a:gradFill rotWithShape="1">
+          <a:gsLst>
+            <a:gs pos="0">
+              <a:schemeClr val="phClr">
+                <a:tint val="100000"/>
+                <a:shade val="100000"/>
+                <a:satMod val="130000"/>
+              </a:schemeClr>
+            </a:gs>
+            <a:gs pos="100000">
+              <a:schemeClr val="phClr">
+                <a:tint val="50000"/>
+                <a:shade val="100000"/>
+                <a:satMod val="350000"/>
+              </a:schemeClr>
+            </a:gs>
+          </a:gsLst>
+          <a:lin ang="16200000" scaled="0"/>
+        </a:gradFill>
+      </a:fillStyleLst>
+      <a:lnStyleLst>
+        <a:ln w="9525" cap="flat" cmpd="sng" algn="ctr">
+          <a:solidFill>
+            <a:schemeClr val="phClr">
+              <a:shade val="95000"/>
+              <a:satMod val="105000"/>
+            </a:schemeClr>
+          </a:solidFill>
+          <a:prstDash val="solid"/>
+        </a:ln>
+        <a:ln w="25400" cap="flat" cmpd="sng" algn="ctr">
+          <a:solidFill>
+            <a:schemeClr val="phClr"/>
+          </a:solidFill>
+          <a:prstDash val="solid"/>
+        </a:ln>
+        <a:ln w="38100" cap="flat" cmpd="sng" algn="ctr">
+          <a:solidFill>
+            <a:schemeClr val="phClr"/>
+          </a:solidFill>
+          <a:prstDash val="solid"/>
+        </a:ln>
+      </a:lnStyleLst>
+      <a:effectStyleLst>
+        <a:effectStyle>
+          <a:effectLst>
+            <a:outerShdw blurRad="40000" dist="20000" dir="5400000" rotWithShape="0">
+              <a:srgbClr val="000000">
+                <a:alpha val="38000"/>
+              </a:srgbClr>
+            </a:outerShdw>
+          </a:effectLst>
+        </a:effectStyle>
+        <a:effectStyle>
+          <a:effectLst>
+            <a:outerShdw blurRad="40000" dist="23000" dir="5400000" rotWithShape="0">
+              <a:srgbClr val="000000">
+                <a:alpha val="35000"/>
+              </a:srgbClr>
+            </a:outerShdw>
+          </a:effectLst>
+        </a:effectStyle>
+        <a:effectStyle>
+          <a:effectLst>
+            <a:outerShdw blurRad="40000" dist="23000" dir="5400000" rotWithShape="0">
+              <a:srgbClr val="000000">
+                <a:alpha val="35000"/>
+              </a:srgbClr>
+            </a:outerShdw>
+          </a:effectLst>
+          <a:scene3d>
+            <a:camera prst="orthographicFront">
+              <a:rot lat="0" lon="0" rev="0"/>
+            </a:camera>
+            <a:lightRig rig="threePt" dir="t">
+              <a:rot lat="0" lon="0" rev="1200000"/>
+            </a:lightRig>
+          </a:scene3d>
+          <a:sp3d>
+            <a:bevelT w="63500" h="25400"/>
+          </a:sp3d>
+        </a:effectStyle>
+      </a:effectStyleLst>
+      <a:bgFillStyleLst>
+        <a:solidFill>
+          <a:schemeClr val="phClr"/>
+        </a:solidFill>
+        <a:gradFill rotWithShape="1">
+          <a:gsLst>
+            <a:gs pos="0">
+              <a:schemeClr val="phClr">
+                <a:tint val="40000"/>
+                <a:satMod val="350000"/>
+              </a:schemeClr>
+            </a:gs>
+            <a:gs pos="40000">
+              <a:schemeClr val="phClr">
+                <a:tint val="45000"/>
+                <a:shade val="99000"/>
+                <a:satMod val="350000"/>
+              </a:schemeClr>
+            </a:gs>
+            <a:gs pos="100000">
+              <a:schemeClr val="phClr">
+                <a:shade val="20000"/>
+                <a:satMod val="255000"/>
+              </a:schemeClr>
+            </a:gs>
+          </a:gsLst>
+          <a:path path="circle">
+            <a:fillToRect l="50000" t="-80000" r="50000" b="180000"/>
+          </a:path>
+        </a:gradFill>
+        <a:gradFill rotWithShape="1">
+          <a:gsLst>
+            <a:gs pos="0">
+              <a:schemeClr val="phClr">
+                <a:tint val="80000"/>
+                <a:satMod val="300000"/>
+              </a:schemeClr>
+            </a:gs>
+            <a:gs pos="100000">
+              <a:schemeClr val="phClr">
+                <a:shade val="30000"/>
+                <a:satMod val="200000"/>
+              </a:schemeClr>
+            </a:gs>
+          </a:gsLst>
+          <a:path path="circle">
+            <a:fillToRect l="50000" t="50000" r="50000" b="50000"/>
+          </a:path>
+        </a:gradFill>
+      </a:bgFillStyleLst>
+    </a:fmtScheme>
+  </a:themeElements>
+  <a:objectDefaults>
+    <a:spDef>
+      <a:spPr/>
+      <a:bodyPr/>
+      <a:lstStyle/>
+      <a:style>
+        <a:lnRef idx="1">
+          <a:schemeClr val="accent1"/>
+        </a:lnRef>
+        <a:fillRef idx="3">
+          <a:schemeClr val="accent1"/>
+        </a:fillRef>
+        <a:effectRef idx="2">
+          <a:schemeClr val="accent1"/>
+        </a:effectRef>
+        <a:fontRef idx="minor">
+          <a:schemeClr val="lt1"/>
+        </a:fontRef>
+      </a:style>
+    </a:spDef>
+    <a:lnDef>
+      <a:spPr/>
+      <a:bodyPr/>
+      <a:lstStyle/>
+      <a:style>
+        <a:lnRef idx="2">
+          <a:schemeClr val="accent1"/>
+        </a:lnRef>
+        <a:fillRef idx="0">
+          <a:schemeClr val="accent1"/>
+        </a:fillRef>
+        <a:effectRef idx="1">
+          <a:schemeClr val="accent1"/>
+        </a:effectRef>
+        <a:fontRef idx="minor">
+          <a:schemeClr val="tx1"/>
+        </a:fontRef>
+      </a:style>
+    </a:lnDef>
+  </a:objectDefaults>
+  <a:extraClrSchemeLst/>
+</a:theme>
 </file>
</xml_diff>

<commit_message>
Made notes of 8 short-term Dex mice
</commit_message>
<xml_diff>
--- a/ResultsSlides.pptx
+++ b/ResultsSlides.pptx
@@ -5,7 +5,7 @@
     <p:sldMasterId id="2147483648" r:id="rId1"/>
   </p:sldMasterIdLst>
   <p:notesMasterIdLst>
-    <p:notesMasterId r:id="rId42"/>
+    <p:notesMasterId r:id="rId43"/>
   </p:notesMasterIdLst>
   <p:sldIdLst>
     <p:sldId id="256" r:id="rId2"/>
@@ -33,21 +33,22 @@
     <p:sldId id="299" r:id="rId24"/>
     <p:sldId id="300" r:id="rId25"/>
     <p:sldId id="301" r:id="rId26"/>
-    <p:sldId id="304" r:id="rId27"/>
-    <p:sldId id="305" r:id="rId28"/>
-    <p:sldId id="293" r:id="rId29"/>
-    <p:sldId id="262" r:id="rId30"/>
-    <p:sldId id="264" r:id="rId31"/>
-    <p:sldId id="266" r:id="rId32"/>
-    <p:sldId id="267" r:id="rId33"/>
-    <p:sldId id="271" r:id="rId34"/>
-    <p:sldId id="268" r:id="rId35"/>
-    <p:sldId id="269" r:id="rId36"/>
-    <p:sldId id="272" r:id="rId37"/>
-    <p:sldId id="275" r:id="rId38"/>
-    <p:sldId id="276" r:id="rId39"/>
-    <p:sldId id="278" r:id="rId40"/>
-    <p:sldId id="279" r:id="rId41"/>
+    <p:sldId id="306" r:id="rId27"/>
+    <p:sldId id="304" r:id="rId28"/>
+    <p:sldId id="305" r:id="rId29"/>
+    <p:sldId id="293" r:id="rId30"/>
+    <p:sldId id="262" r:id="rId31"/>
+    <p:sldId id="264" r:id="rId32"/>
+    <p:sldId id="266" r:id="rId33"/>
+    <p:sldId id="267" r:id="rId34"/>
+    <p:sldId id="271" r:id="rId35"/>
+    <p:sldId id="268" r:id="rId36"/>
+    <p:sldId id="269" r:id="rId37"/>
+    <p:sldId id="272" r:id="rId38"/>
+    <p:sldId id="275" r:id="rId39"/>
+    <p:sldId id="276" r:id="rId40"/>
+    <p:sldId id="278" r:id="rId41"/>
+    <p:sldId id="279" r:id="rId42"/>
   </p:sldIdLst>
   <p:sldSz cx="9144000" cy="6858000" type="screen4x3"/>
   <p:notesSz cx="6858000" cy="9144000"/>
@@ -6187,7 +6188,15 @@
           <a:p>
             <a:r>
               <a:rPr lang="en-US" dirty="0" smtClean="0"/>
-              <a:t>FOOD INTAKE</a:t>
+              <a:t>Short-term </a:t>
+            </a:r>
+            <a:r>
+              <a:rPr lang="en-US" dirty="0" err="1" smtClean="0"/>
+              <a:t>Dex</a:t>
+            </a:r>
+            <a:r>
+              <a:rPr lang="en-US" dirty="0" smtClean="0"/>
+              <a:t> mice</a:t>
             </a:r>
             <a:endParaRPr lang="en-US" dirty="0"/>
           </a:p>
@@ -6195,12 +6204,12 @@
       </p:sp>
       <p:sp>
         <p:nvSpPr>
-          <p:cNvPr id="3" name="Text Placeholder 2"/>
-          <p:cNvSpPr>
-            <a:spLocks noGrp="1"/>
-          </p:cNvSpPr>
-          <p:nvPr>
-            <p:ph type="body" idx="1"/>
+          <p:cNvPr id="3" name="Content Placeholder 2"/>
+          <p:cNvSpPr>
+            <a:spLocks noGrp="1"/>
+          </p:cNvSpPr>
+          <p:nvPr>
+            <p:ph idx="1"/>
           </p:nvPr>
         </p:nvSpPr>
         <p:spPr/>
@@ -6210,7 +6219,7 @@
           <a:p>
             <a:r>
               <a:rPr lang="en-US" dirty="0" smtClean="0"/>
-              <a:t>Cohort 7 and 8</a:t>
+              <a:t>The 8 mice that don’t belong to this cohort are 1740, 1741, 1742, 1743 and 1770, 1771, 1772, 1773</a:t>
             </a:r>
             <a:endParaRPr lang="en-US" dirty="0"/>
           </a:p>
@@ -6219,7 +6228,7 @@
     </p:spTree>
     <p:extLst>
       <p:ext uri="{BB962C8B-B14F-4D97-AF65-F5344CB8AC3E}">
-        <p14:creationId xmlns:p14="http://schemas.microsoft.com/office/powerpoint/2010/main" val="1433592600"/>
+        <p14:creationId xmlns:p14="http://schemas.microsoft.com/office/powerpoint/2010/main" val="1761786969"/>
       </p:ext>
     </p:extLst>
   </p:cSld>
@@ -6261,18 +6270,22 @@
           <a:bodyPr/>
           <a:lstStyle/>
           <a:p>
-            <a:endParaRPr lang="en-US"/>
-          </a:p>
-        </p:txBody>
-      </p:sp>
-      <p:sp>
-        <p:nvSpPr>
-          <p:cNvPr id="3" name="Content Placeholder 2"/>
-          <p:cNvSpPr>
-            <a:spLocks noGrp="1"/>
-          </p:cNvSpPr>
-          <p:nvPr>
-            <p:ph idx="1"/>
+            <a:r>
+              <a:rPr lang="en-US" dirty="0" smtClean="0"/>
+              <a:t>FOOD INTAKE</a:t>
+            </a:r>
+            <a:endParaRPr lang="en-US" dirty="0"/>
+          </a:p>
+        </p:txBody>
+      </p:sp>
+      <p:sp>
+        <p:nvSpPr>
+          <p:cNvPr id="3" name="Text Placeholder 2"/>
+          <p:cNvSpPr>
+            <a:spLocks noGrp="1"/>
+          </p:cNvSpPr>
+          <p:nvPr>
+            <p:ph type="body" idx="1"/>
           </p:nvPr>
         </p:nvSpPr>
         <p:spPr/>
@@ -6282,22 +6295,8 @@
           <a:p>
             <a:r>
               <a:rPr lang="en-US" dirty="0" smtClean="0"/>
-              <a:t>Mouse 2110 – no food data</a:t>
-            </a:r>
-          </a:p>
-          <a:p>
-            <a:r>
-              <a:rPr lang="en-US" dirty="0" smtClean="0"/>
-              <a:t>Mouse 2101 – only record the first interval</a:t>
-            </a:r>
-          </a:p>
-          <a:p>
-            <a:r>
-              <a:rPr lang="en-US" dirty="0" smtClean="0"/>
-              <a:t>Mouse 2102 – only record the first 3 intervals</a:t>
-            </a:r>
-          </a:p>
-          <a:p>
+              <a:t>Cohort 7 and 8</a:t>
+            </a:r>
             <a:endParaRPr lang="en-US" dirty="0"/>
           </a:p>
         </p:txBody>
@@ -6305,7 +6304,7 @@
     </p:spTree>
     <p:extLst>
       <p:ext uri="{BB962C8B-B14F-4D97-AF65-F5344CB8AC3E}">
-        <p14:creationId xmlns:p14="http://schemas.microsoft.com/office/powerpoint/2010/main" val="1552084091"/>
+        <p14:creationId xmlns:p14="http://schemas.microsoft.com/office/powerpoint/2010/main" val="1433592600"/>
       </p:ext>
     </p:extLst>
   </p:cSld>
@@ -6347,6 +6346,92 @@
           <a:bodyPr/>
           <a:lstStyle/>
           <a:p>
+            <a:endParaRPr lang="en-US"/>
+          </a:p>
+        </p:txBody>
+      </p:sp>
+      <p:sp>
+        <p:nvSpPr>
+          <p:cNvPr id="3" name="Content Placeholder 2"/>
+          <p:cNvSpPr>
+            <a:spLocks noGrp="1"/>
+          </p:cNvSpPr>
+          <p:nvPr>
+            <p:ph idx="1"/>
+          </p:nvPr>
+        </p:nvSpPr>
+        <p:spPr/>
+        <p:txBody>
+          <a:bodyPr/>
+          <a:lstStyle/>
+          <a:p>
+            <a:r>
+              <a:rPr lang="en-US" dirty="0" smtClean="0"/>
+              <a:t>Mouse 2110 – no food data</a:t>
+            </a:r>
+          </a:p>
+          <a:p>
+            <a:r>
+              <a:rPr lang="en-US" dirty="0" smtClean="0"/>
+              <a:t>Mouse 2101 – only record the first interval</a:t>
+            </a:r>
+          </a:p>
+          <a:p>
+            <a:r>
+              <a:rPr lang="en-US" dirty="0" smtClean="0"/>
+              <a:t>Mouse 2102 – only record the first 3 intervals</a:t>
+            </a:r>
+          </a:p>
+          <a:p>
+            <a:endParaRPr lang="en-US" dirty="0"/>
+          </a:p>
+        </p:txBody>
+      </p:sp>
+    </p:spTree>
+    <p:extLst>
+      <p:ext uri="{BB962C8B-B14F-4D97-AF65-F5344CB8AC3E}">
+        <p14:creationId xmlns:p14="http://schemas.microsoft.com/office/powerpoint/2010/main" val="1552084091"/>
+      </p:ext>
+    </p:extLst>
+  </p:cSld>
+  <p:clrMapOvr>
+    <a:masterClrMapping/>
+  </p:clrMapOvr>
+</p:sld>
+</file>
+
+<file path=ppt/slides/slide29.xml><?xml version="1.0" encoding="utf-8"?>
+<p:sld xmlns:a="http://schemas.openxmlformats.org/drawingml/2006/main" xmlns:r="http://schemas.openxmlformats.org/officeDocument/2006/relationships" xmlns:p="http://schemas.openxmlformats.org/presentationml/2006/main">
+  <p:cSld>
+    <p:spTree>
+      <p:nvGrpSpPr>
+        <p:cNvPr id="1" name=""/>
+        <p:cNvGrpSpPr/>
+        <p:nvPr/>
+      </p:nvGrpSpPr>
+      <p:grpSpPr>
+        <a:xfrm>
+          <a:off x="0" y="0"/>
+          <a:ext cx="0" cy="0"/>
+          <a:chOff x="0" y="0"/>
+          <a:chExt cx="0" cy="0"/>
+        </a:xfrm>
+      </p:grpSpPr>
+      <p:sp>
+        <p:nvSpPr>
+          <p:cNvPr id="2" name="Title 1"/>
+          <p:cNvSpPr>
+            <a:spLocks noGrp="1"/>
+          </p:cNvSpPr>
+          <p:nvPr>
+            <p:ph type="title"/>
+          </p:nvPr>
+        </p:nvSpPr>
+        <p:spPr/>
+        <p:txBody>
+          <a:bodyPr/>
+          <a:lstStyle/>
+          <a:p>
             <a:r>
               <a:rPr lang="en-US" dirty="0" smtClean="0"/>
               <a:t>Juvenile HFD</a:t>
@@ -6422,7 +6507,104 @@
 </p:sld>
 </file>
 
-<file path=ppt/slides/slide29.xml><?xml version="1.0" encoding="utf-8"?>
+<file path=ppt/slides/slide3.xml><?xml version="1.0" encoding="utf-8"?>
+<p:sld xmlns:a="http://schemas.openxmlformats.org/drawingml/2006/main" xmlns:r="http://schemas.openxmlformats.org/officeDocument/2006/relationships" xmlns:p="http://schemas.openxmlformats.org/presentationml/2006/main">
+  <p:cSld>
+    <p:spTree>
+      <p:nvGrpSpPr>
+        <p:cNvPr id="1" name=""/>
+        <p:cNvGrpSpPr/>
+        <p:nvPr/>
+      </p:nvGrpSpPr>
+      <p:grpSpPr>
+        <a:xfrm>
+          <a:off x="0" y="0"/>
+          <a:ext cx="0" cy="0"/>
+          <a:chOff x="0" y="0"/>
+          <a:chExt cx="0" cy="0"/>
+        </a:xfrm>
+      </p:grpSpPr>
+      <p:sp>
+        <p:nvSpPr>
+          <p:cNvPr id="2" name="Title 1"/>
+          <p:cNvSpPr>
+            <a:spLocks noGrp="1"/>
+          </p:cNvSpPr>
+          <p:nvPr>
+            <p:ph type="title"/>
+          </p:nvPr>
+        </p:nvSpPr>
+        <p:spPr/>
+        <p:txBody>
+          <a:bodyPr/>
+          <a:lstStyle/>
+          <a:p>
+            <a:r>
+              <a:rPr lang="en-US" dirty="0" smtClean="0"/>
+              <a:t>Hypothesis</a:t>
+            </a:r>
+            <a:endParaRPr lang="en-US" dirty="0"/>
+          </a:p>
+        </p:txBody>
+      </p:sp>
+      <p:sp>
+        <p:nvSpPr>
+          <p:cNvPr id="3" name="Content Placeholder 2"/>
+          <p:cNvSpPr>
+            <a:spLocks noGrp="1"/>
+          </p:cNvSpPr>
+          <p:nvPr>
+            <p:ph idx="1"/>
+          </p:nvPr>
+        </p:nvSpPr>
+        <p:spPr/>
+        <p:txBody>
+          <a:bodyPr/>
+          <a:lstStyle/>
+          <a:p>
+            <a:r>
+              <a:rPr lang="en-US" dirty="0" smtClean="0"/>
+              <a:t>Weight loss during fasting may be a predictor of weight gain after HFD.</a:t>
+            </a:r>
+          </a:p>
+          <a:p>
+            <a:pPr lvl="1"/>
+            <a:r>
+              <a:rPr lang="en-US" dirty="0" smtClean="0"/>
+              <a:t>Previous cohorts 5-6: there appeared to be a negative relationship</a:t>
+            </a:r>
+          </a:p>
+          <a:p>
+            <a:pPr lvl="1"/>
+            <a:r>
+              <a:rPr lang="en-US" dirty="0" smtClean="0"/>
+              <a:t>Current cohorts 7-8: there is a positive relationship</a:t>
+            </a:r>
+            <a:endParaRPr lang="en-US" dirty="0"/>
+          </a:p>
+        </p:txBody>
+      </p:sp>
+    </p:spTree>
+    <p:extLst>
+      <p:ext uri="{BB962C8B-B14F-4D97-AF65-F5344CB8AC3E}">
+        <p14:creationId xmlns:p14="http://schemas.microsoft.com/office/powerpoint/2010/main" val="3921865371"/>
+      </p:ext>
+    </p:extLst>
+  </p:cSld>
+  <p:clrMapOvr>
+    <a:masterClrMapping/>
+  </p:clrMapOvr>
+  <p:timing>
+    <p:tnLst>
+      <p:par>
+        <p:cTn xmlns:p14="http://schemas.microsoft.com/office/powerpoint/2010/main" id="1" dur="indefinite" restart="never" nodeType="tmRoot"/>
+      </p:par>
+    </p:tnLst>
+  </p:timing>
+</p:sld>
+</file>
+
+<file path=ppt/slides/slide30.xml><?xml version="1.0" encoding="utf-8"?>
 <p:sld xmlns:a="http://schemas.openxmlformats.org/drawingml/2006/main" xmlns:r="http://schemas.openxmlformats.org/officeDocument/2006/relationships" xmlns:p="http://schemas.openxmlformats.org/presentationml/2006/main">
   <p:cSld>
     <p:spTree>
@@ -6483,104 +6665,7 @@
 </p:sld>
 </file>
 
-<file path=ppt/slides/slide3.xml><?xml version="1.0" encoding="utf-8"?>
-<p:sld xmlns:a="http://schemas.openxmlformats.org/drawingml/2006/main" xmlns:r="http://schemas.openxmlformats.org/officeDocument/2006/relationships" xmlns:p="http://schemas.openxmlformats.org/presentationml/2006/main">
-  <p:cSld>
-    <p:spTree>
-      <p:nvGrpSpPr>
-        <p:cNvPr id="1" name=""/>
-        <p:cNvGrpSpPr/>
-        <p:nvPr/>
-      </p:nvGrpSpPr>
-      <p:grpSpPr>
-        <a:xfrm>
-          <a:off x="0" y="0"/>
-          <a:ext cx="0" cy="0"/>
-          <a:chOff x="0" y="0"/>
-          <a:chExt cx="0" cy="0"/>
-        </a:xfrm>
-      </p:grpSpPr>
-      <p:sp>
-        <p:nvSpPr>
-          <p:cNvPr id="2" name="Title 1"/>
-          <p:cNvSpPr>
-            <a:spLocks noGrp="1"/>
-          </p:cNvSpPr>
-          <p:nvPr>
-            <p:ph type="title"/>
-          </p:nvPr>
-        </p:nvSpPr>
-        <p:spPr/>
-        <p:txBody>
-          <a:bodyPr/>
-          <a:lstStyle/>
-          <a:p>
-            <a:r>
-              <a:rPr lang="en-US" dirty="0" smtClean="0"/>
-              <a:t>Hypothesis</a:t>
-            </a:r>
-            <a:endParaRPr lang="en-US" dirty="0"/>
-          </a:p>
-        </p:txBody>
-      </p:sp>
-      <p:sp>
-        <p:nvSpPr>
-          <p:cNvPr id="3" name="Content Placeholder 2"/>
-          <p:cNvSpPr>
-            <a:spLocks noGrp="1"/>
-          </p:cNvSpPr>
-          <p:nvPr>
-            <p:ph idx="1"/>
-          </p:nvPr>
-        </p:nvSpPr>
-        <p:spPr/>
-        <p:txBody>
-          <a:bodyPr/>
-          <a:lstStyle/>
-          <a:p>
-            <a:r>
-              <a:rPr lang="en-US" dirty="0" smtClean="0"/>
-              <a:t>Weight loss during fasting may be a predictor of weight gain after HFD.</a:t>
-            </a:r>
-          </a:p>
-          <a:p>
-            <a:pPr lvl="1"/>
-            <a:r>
-              <a:rPr lang="en-US" dirty="0" smtClean="0"/>
-              <a:t>Previous cohorts 5-6: there appeared to be a negative relationship</a:t>
-            </a:r>
-          </a:p>
-          <a:p>
-            <a:pPr lvl="1"/>
-            <a:r>
-              <a:rPr lang="en-US" dirty="0" smtClean="0"/>
-              <a:t>Current cohorts 7-8: there is a positive relationship</a:t>
-            </a:r>
-            <a:endParaRPr lang="en-US" dirty="0"/>
-          </a:p>
-        </p:txBody>
-      </p:sp>
-    </p:spTree>
-    <p:extLst>
-      <p:ext uri="{BB962C8B-B14F-4D97-AF65-F5344CB8AC3E}">
-        <p14:creationId xmlns:p14="http://schemas.microsoft.com/office/powerpoint/2010/main" val="3921865371"/>
-      </p:ext>
-    </p:extLst>
-  </p:cSld>
-  <p:clrMapOvr>
-    <a:masterClrMapping/>
-  </p:clrMapOvr>
-  <p:timing>
-    <p:tnLst>
-      <p:par>
-        <p:cTn xmlns:p14="http://schemas.microsoft.com/office/powerpoint/2010/main" id="1" dur="indefinite" restart="never" nodeType="tmRoot"/>
-      </p:par>
-    </p:tnLst>
-  </p:timing>
-</p:sld>
-</file>
-
-<file path=ppt/slides/slide30.xml><?xml version="1.0" encoding="utf-8"?>
+<file path=ppt/slides/slide31.xml><?xml version="1.0" encoding="utf-8"?>
 <p:sld xmlns:a="http://schemas.openxmlformats.org/drawingml/2006/main" xmlns:r="http://schemas.openxmlformats.org/officeDocument/2006/relationships" xmlns:p="http://schemas.openxmlformats.org/presentationml/2006/main">
   <p:cSld>
     <p:spTree>
@@ -6641,7 +6726,7 @@
 </p:sld>
 </file>
 
-<file path=ppt/slides/slide31.xml><?xml version="1.0" encoding="utf-8"?>
+<file path=ppt/slides/slide32.xml><?xml version="1.0" encoding="utf-8"?>
 <p:sld xmlns:a="http://schemas.openxmlformats.org/drawingml/2006/main" xmlns:r="http://schemas.openxmlformats.org/officeDocument/2006/relationships" xmlns:p="http://schemas.openxmlformats.org/presentationml/2006/main">
   <p:cSld>
     <p:spTree>
@@ -6721,7 +6806,7 @@
 </p:sld>
 </file>
 
-<file path=ppt/slides/slide32.xml><?xml version="1.0" encoding="utf-8"?>
+<file path=ppt/slides/slide33.xml><?xml version="1.0" encoding="utf-8"?>
 <p:sld xmlns:a="http://schemas.openxmlformats.org/drawingml/2006/main" xmlns:r="http://schemas.openxmlformats.org/officeDocument/2006/relationships" xmlns:p="http://schemas.openxmlformats.org/presentationml/2006/main">
   <p:cSld>
     <p:spTree>
@@ -6801,7 +6886,7 @@
 </p:sld>
 </file>
 
-<file path=ppt/slides/slide33.xml><?xml version="1.0" encoding="utf-8"?>
+<file path=ppt/slides/slide34.xml><?xml version="1.0" encoding="utf-8"?>
 <p:sld xmlns:a="http://schemas.openxmlformats.org/drawingml/2006/main" xmlns:r="http://schemas.openxmlformats.org/officeDocument/2006/relationships" xmlns:p="http://schemas.openxmlformats.org/presentationml/2006/main">
   <p:cSld>
     <p:spTree>
@@ -6895,7 +6980,7 @@
 </p:sld>
 </file>
 
-<file path=ppt/slides/slide34.xml><?xml version="1.0" encoding="utf-8"?>
+<file path=ppt/slides/slide35.xml><?xml version="1.0" encoding="utf-8"?>
 <p:sld xmlns:a="http://schemas.openxmlformats.org/drawingml/2006/main" xmlns:r="http://schemas.openxmlformats.org/officeDocument/2006/relationships" xmlns:p="http://schemas.openxmlformats.org/presentationml/2006/main">
   <p:cSld>
     <p:spTree>
@@ -6973,7 +7058,7 @@
 </p:sld>
 </file>
 
-<file path=ppt/slides/slide35.xml><?xml version="1.0" encoding="utf-8"?>
+<file path=ppt/slides/slide36.xml><?xml version="1.0" encoding="utf-8"?>
 <p:sld xmlns:a="http://schemas.openxmlformats.org/drawingml/2006/main" xmlns:r="http://schemas.openxmlformats.org/officeDocument/2006/relationships" xmlns:p="http://schemas.openxmlformats.org/presentationml/2006/main">
   <p:cSld>
     <p:spTree>
@@ -7027,7 +7112,7 @@
 </p:sld>
 </file>
 
-<file path=ppt/slides/slide36.xml><?xml version="1.0" encoding="utf-8"?>
+<file path=ppt/slides/slide37.xml><?xml version="1.0" encoding="utf-8"?>
 <p:sld xmlns:a="http://schemas.openxmlformats.org/drawingml/2006/main" xmlns:r="http://schemas.openxmlformats.org/officeDocument/2006/relationships" xmlns:p="http://schemas.openxmlformats.org/presentationml/2006/main">
   <p:cSld>
     <p:spTree>
@@ -7081,7 +7166,7 @@
 </p:sld>
 </file>
 
-<file path=ppt/slides/slide37.xml><?xml version="1.0" encoding="utf-8"?>
+<file path=ppt/slides/slide38.xml><?xml version="1.0" encoding="utf-8"?>
 <p:sld xmlns:a="http://schemas.openxmlformats.org/drawingml/2006/main" xmlns:r="http://schemas.openxmlformats.org/officeDocument/2006/relationships" xmlns:p="http://schemas.openxmlformats.org/presentationml/2006/main">
   <p:cSld>
     <p:spTree>
@@ -7153,7 +7238,7 @@
 </p:sld>
 </file>
 
-<file path=ppt/slides/slide38.xml><?xml version="1.0" encoding="utf-8"?>
+<file path=ppt/slides/slide39.xml><?xml version="1.0" encoding="utf-8"?>
 <p:sld xmlns:a="http://schemas.openxmlformats.org/drawingml/2006/main" xmlns:r="http://schemas.openxmlformats.org/officeDocument/2006/relationships" xmlns:p="http://schemas.openxmlformats.org/presentationml/2006/main">
   <p:cSld>
     <p:spTree>
@@ -7207,178 +7292,6 @@
 </p:sld>
 </file>
 
-<file path=ppt/slides/slide39.xml><?xml version="1.0" encoding="utf-8"?>
-<p:sld xmlns:a="http://schemas.openxmlformats.org/drawingml/2006/main" xmlns:r="http://schemas.openxmlformats.org/officeDocument/2006/relationships" xmlns:p="http://schemas.openxmlformats.org/presentationml/2006/main">
-  <p:cSld>
-    <p:spTree>
-      <p:nvGrpSpPr>
-        <p:cNvPr id="1" name=""/>
-        <p:cNvGrpSpPr/>
-        <p:nvPr/>
-      </p:nvGrpSpPr>
-      <p:grpSpPr>
-        <a:xfrm>
-          <a:off x="0" y="0"/>
-          <a:ext cx="0" cy="0"/>
-          <a:chOff x="0" y="0"/>
-          <a:chExt cx="0" cy="0"/>
-        </a:xfrm>
-      </p:grpSpPr>
-      <p:sp>
-        <p:nvSpPr>
-          <p:cNvPr id="2" name="Title 1"/>
-          <p:cNvSpPr>
-            <a:spLocks noGrp="1"/>
-          </p:cNvSpPr>
-          <p:nvPr>
-            <p:ph type="title"/>
-          </p:nvPr>
-        </p:nvSpPr>
-        <p:spPr/>
-        <p:txBody>
-          <a:bodyPr/>
-          <a:lstStyle/>
-          <a:p>
-            <a:endParaRPr lang="en-US"/>
-          </a:p>
-        </p:txBody>
-      </p:sp>
-      <p:sp>
-        <p:nvSpPr>
-          <p:cNvPr id="3" name="Content Placeholder 2"/>
-          <p:cNvSpPr>
-            <a:spLocks noGrp="1"/>
-          </p:cNvSpPr>
-          <p:nvPr>
-            <p:ph idx="1"/>
-          </p:nvPr>
-        </p:nvSpPr>
-        <p:spPr/>
-        <p:txBody>
-          <a:bodyPr>
-            <a:normAutofit/>
-          </a:bodyPr>
-          <a:lstStyle/>
-          <a:p>
-            <a:r>
-              <a:rPr lang="ro-RO" sz="2000" dirty="0"/>
-              <a:t>sub &lt;- c(rep(TRUE, 96), rep(FALSE, 62))</a:t>
-            </a:r>
-            <a:endParaRPr lang="en-US" sz="2000" dirty="0" smtClean="0"/>
-          </a:p>
-          <a:p>
-            <a:r>
-              <a:rPr lang="en-US" sz="2000" dirty="0" smtClean="0"/>
-              <a:t>weight.rf2 </a:t>
-            </a:r>
-            <a:r>
-              <a:rPr lang="en-US" sz="2000" dirty="0"/>
-              <a:t>&lt;- </a:t>
-            </a:r>
-            <a:r>
-              <a:rPr lang="en-US" sz="2000" dirty="0" err="1"/>
-              <a:t>REEMtree</a:t>
-            </a:r>
-            <a:r>
-              <a:rPr lang="en-US" sz="2000" dirty="0"/>
-              <a:t>(</a:t>
-            </a:r>
-            <a:r>
-              <a:rPr lang="en-US" sz="2000" dirty="0" err="1"/>
-              <a:t>Percent.WG</a:t>
-            </a:r>
-            <a:r>
-              <a:rPr lang="en-US" sz="2000" dirty="0"/>
-              <a:t>~ VO2.LBM + RER + </a:t>
-            </a:r>
-            <a:r>
-              <a:rPr lang="en-US" sz="2000" dirty="0" err="1"/>
-              <a:t>SumXYAmb</a:t>
-            </a:r>
-            <a:r>
-              <a:rPr lang="en-US" sz="2000" dirty="0"/>
-              <a:t>+</a:t>
-            </a:r>
-          </a:p>
-          <a:p>
-            <a:r>
-              <a:rPr lang="en-US" sz="2000" dirty="0"/>
-              <a:t>                     </a:t>
-            </a:r>
-            <a:r>
-              <a:rPr lang="en-US" sz="2000" dirty="0" err="1"/>
-              <a:t>Avg.Percent.FL</a:t>
-            </a:r>
-            <a:r>
-              <a:rPr lang="en-US" sz="2000" dirty="0"/>
-              <a:t> + </a:t>
-            </a:r>
-            <a:r>
-              <a:rPr lang="en-US" sz="2000" dirty="0" err="1"/>
-              <a:t>Avg.Percent.LL</a:t>
-            </a:r>
-            <a:r>
-              <a:rPr lang="en-US" sz="2000" dirty="0"/>
-              <a:t> + </a:t>
-            </a:r>
-            <a:r>
-              <a:rPr lang="en-US" sz="2000" dirty="0" err="1"/>
-              <a:t>Light.Dark</a:t>
-            </a:r>
-            <a:r>
-              <a:rPr lang="en-US" sz="2000" dirty="0"/>
-              <a:t> + Fast</a:t>
-            </a:r>
-          </a:p>
-          <a:p>
-            <a:r>
-              <a:rPr lang="en-US" sz="2000" dirty="0"/>
-              <a:t>                    , data=</a:t>
-            </a:r>
-            <a:r>
-              <a:rPr lang="en-US" sz="2000" dirty="0" err="1"/>
-              <a:t>combine.data</a:t>
-            </a:r>
-            <a:r>
-              <a:rPr lang="en-US" sz="2000" dirty="0"/>
-              <a:t>, random=~1|Subject, subset=sub</a:t>
-            </a:r>
-            <a:r>
-              <a:rPr lang="en-US" sz="2000" dirty="0" smtClean="0"/>
-              <a:t>)</a:t>
-            </a:r>
-          </a:p>
-          <a:p>
-            <a:endParaRPr lang="en-US" sz="2000" dirty="0"/>
-          </a:p>
-          <a:p>
-            <a:r>
-              <a:rPr lang="en-US" sz="2000" dirty="0" smtClean="0"/>
-              <a:t>R2 = 0.288</a:t>
-            </a:r>
-          </a:p>
-          <a:p>
-            <a:r>
-              <a:rPr lang="en-US" sz="2000" dirty="0" smtClean="0"/>
-              <a:t>MSE = 190.12</a:t>
-            </a:r>
-            <a:endParaRPr lang="en-US" sz="2000" dirty="0"/>
-          </a:p>
-        </p:txBody>
-      </p:sp>
-    </p:spTree>
-    <p:extLst>
-      <p:ext uri="{BB962C8B-B14F-4D97-AF65-F5344CB8AC3E}">
-        <p14:creationId xmlns:p14="http://schemas.microsoft.com/office/powerpoint/2010/main" val="3037493318"/>
-      </p:ext>
-    </p:extLst>
-  </p:cSld>
-  <p:clrMapOvr>
-    <a:masterClrMapping/>
-  </p:clrMapOvr>
-</p:sld>
-</file>
-
 <file path=ppt/slides/slide4.xml><?xml version="1.0" encoding="utf-8"?>
 <p:sld xmlns:a="http://schemas.openxmlformats.org/drawingml/2006/main" xmlns:r="http://schemas.openxmlformats.org/officeDocument/2006/relationships" xmlns:p="http://schemas.openxmlformats.org/presentationml/2006/main">
   <p:cSld>
@@ -7457,15 +7370,7 @@
           <a:p>
             <a:r>
               <a:rPr lang="en-US" dirty="0" smtClean="0"/>
-              <a:t>HFD #7 – cohort id </a:t>
-            </a:r>
-            <a:r>
-              <a:rPr lang="en-US" dirty="0" smtClean="0"/>
-              <a:t> is </a:t>
-            </a:r>
-            <a:r>
-              <a:rPr lang="en-US" dirty="0" smtClean="0"/>
-              <a:t>8 (n=24)</a:t>
+              <a:t>HFD #7 – cohort id  is 8 (n=24)</a:t>
             </a:r>
           </a:p>
           <a:p>
@@ -8645,6 +8550,178 @@
           <a:chExt cx="0" cy="0"/>
         </a:xfrm>
       </p:grpSpPr>
+      <p:sp>
+        <p:nvSpPr>
+          <p:cNvPr id="2" name="Title 1"/>
+          <p:cNvSpPr>
+            <a:spLocks noGrp="1"/>
+          </p:cNvSpPr>
+          <p:nvPr>
+            <p:ph type="title"/>
+          </p:nvPr>
+        </p:nvSpPr>
+        <p:spPr/>
+        <p:txBody>
+          <a:bodyPr/>
+          <a:lstStyle/>
+          <a:p>
+            <a:endParaRPr lang="en-US"/>
+          </a:p>
+        </p:txBody>
+      </p:sp>
+      <p:sp>
+        <p:nvSpPr>
+          <p:cNvPr id="3" name="Content Placeholder 2"/>
+          <p:cNvSpPr>
+            <a:spLocks noGrp="1"/>
+          </p:cNvSpPr>
+          <p:nvPr>
+            <p:ph idx="1"/>
+          </p:nvPr>
+        </p:nvSpPr>
+        <p:spPr/>
+        <p:txBody>
+          <a:bodyPr>
+            <a:normAutofit/>
+          </a:bodyPr>
+          <a:lstStyle/>
+          <a:p>
+            <a:r>
+              <a:rPr lang="ro-RO" sz="2000" dirty="0"/>
+              <a:t>sub &lt;- c(rep(TRUE, 96), rep(FALSE, 62))</a:t>
+            </a:r>
+            <a:endParaRPr lang="en-US" sz="2000" dirty="0" smtClean="0"/>
+          </a:p>
+          <a:p>
+            <a:r>
+              <a:rPr lang="en-US" sz="2000" dirty="0" smtClean="0"/>
+              <a:t>weight.rf2 </a:t>
+            </a:r>
+            <a:r>
+              <a:rPr lang="en-US" sz="2000" dirty="0"/>
+              <a:t>&lt;- </a:t>
+            </a:r>
+            <a:r>
+              <a:rPr lang="en-US" sz="2000" dirty="0" err="1"/>
+              <a:t>REEMtree</a:t>
+            </a:r>
+            <a:r>
+              <a:rPr lang="en-US" sz="2000" dirty="0"/>
+              <a:t>(</a:t>
+            </a:r>
+            <a:r>
+              <a:rPr lang="en-US" sz="2000" dirty="0" err="1"/>
+              <a:t>Percent.WG</a:t>
+            </a:r>
+            <a:r>
+              <a:rPr lang="en-US" sz="2000" dirty="0"/>
+              <a:t>~ VO2.LBM + RER + </a:t>
+            </a:r>
+            <a:r>
+              <a:rPr lang="en-US" sz="2000" dirty="0" err="1"/>
+              <a:t>SumXYAmb</a:t>
+            </a:r>
+            <a:r>
+              <a:rPr lang="en-US" sz="2000" dirty="0"/>
+              <a:t>+</a:t>
+            </a:r>
+          </a:p>
+          <a:p>
+            <a:r>
+              <a:rPr lang="en-US" sz="2000" dirty="0"/>
+              <a:t>                     </a:t>
+            </a:r>
+            <a:r>
+              <a:rPr lang="en-US" sz="2000" dirty="0" err="1"/>
+              <a:t>Avg.Percent.FL</a:t>
+            </a:r>
+            <a:r>
+              <a:rPr lang="en-US" sz="2000" dirty="0"/>
+              <a:t> + </a:t>
+            </a:r>
+            <a:r>
+              <a:rPr lang="en-US" sz="2000" dirty="0" err="1"/>
+              <a:t>Avg.Percent.LL</a:t>
+            </a:r>
+            <a:r>
+              <a:rPr lang="en-US" sz="2000" dirty="0"/>
+              <a:t> + </a:t>
+            </a:r>
+            <a:r>
+              <a:rPr lang="en-US" sz="2000" dirty="0" err="1"/>
+              <a:t>Light.Dark</a:t>
+            </a:r>
+            <a:r>
+              <a:rPr lang="en-US" sz="2000" dirty="0"/>
+              <a:t> + Fast</a:t>
+            </a:r>
+          </a:p>
+          <a:p>
+            <a:r>
+              <a:rPr lang="en-US" sz="2000" dirty="0"/>
+              <a:t>                    , data=</a:t>
+            </a:r>
+            <a:r>
+              <a:rPr lang="en-US" sz="2000" dirty="0" err="1"/>
+              <a:t>combine.data</a:t>
+            </a:r>
+            <a:r>
+              <a:rPr lang="en-US" sz="2000" dirty="0"/>
+              <a:t>, random=~1|Subject, subset=sub</a:t>
+            </a:r>
+            <a:r>
+              <a:rPr lang="en-US" sz="2000" dirty="0" smtClean="0"/>
+              <a:t>)</a:t>
+            </a:r>
+          </a:p>
+          <a:p>
+            <a:endParaRPr lang="en-US" sz="2000" dirty="0"/>
+          </a:p>
+          <a:p>
+            <a:r>
+              <a:rPr lang="en-US" sz="2000" dirty="0" smtClean="0"/>
+              <a:t>R2 = 0.288</a:t>
+            </a:r>
+          </a:p>
+          <a:p>
+            <a:r>
+              <a:rPr lang="en-US" sz="2000" dirty="0" smtClean="0"/>
+              <a:t>MSE = 190.12</a:t>
+            </a:r>
+            <a:endParaRPr lang="en-US" sz="2000" dirty="0"/>
+          </a:p>
+        </p:txBody>
+      </p:sp>
+    </p:spTree>
+    <p:extLst>
+      <p:ext uri="{BB962C8B-B14F-4D97-AF65-F5344CB8AC3E}">
+        <p14:creationId xmlns:p14="http://schemas.microsoft.com/office/powerpoint/2010/main" val="3037493318"/>
+      </p:ext>
+    </p:extLst>
+  </p:cSld>
+  <p:clrMapOvr>
+    <a:masterClrMapping/>
+  </p:clrMapOvr>
+</p:sld>
+</file>
+
+<file path=ppt/slides/slide41.xml><?xml version="1.0" encoding="utf-8"?>
+<p:sld xmlns:a="http://schemas.openxmlformats.org/drawingml/2006/main" xmlns:r="http://schemas.openxmlformats.org/officeDocument/2006/relationships" xmlns:p="http://schemas.openxmlformats.org/presentationml/2006/main">
+  <p:cSld>
+    <p:spTree>
+      <p:nvGrpSpPr>
+        <p:cNvPr id="1" name=""/>
+        <p:cNvGrpSpPr/>
+        <p:nvPr/>
+      </p:nvGrpSpPr>
+      <p:grpSpPr>
+        <a:xfrm>
+          <a:off x="0" y="0"/>
+          <a:ext cx="0" cy="0"/>
+          <a:chOff x="0" y="0"/>
+          <a:chExt cx="0" cy="0"/>
+        </a:xfrm>
+      </p:grpSpPr>
       <p:pic>
         <p:nvPicPr>
           <p:cNvPr id="2" name="Picture 1" descr="Screen Shot 2015-04-10 at 1.53.20 PM.png"/>

</xml_diff>

<commit_message>
Added a slide to keep track with the new changes
</commit_message>
<xml_diff>
--- a/ResultsSlides.pptx
+++ b/ResultsSlides.pptx
@@ -5,7 +5,7 @@
     <p:sldMasterId id="2147483648" r:id="rId1"/>
   </p:sldMasterIdLst>
   <p:notesMasterIdLst>
-    <p:notesMasterId r:id="rId43"/>
+    <p:notesMasterId r:id="rId44"/>
   </p:notesMasterIdLst>
   <p:sldIdLst>
     <p:sldId id="256" r:id="rId2"/>
@@ -25,30 +25,31 @@
     <p:sldId id="291" r:id="rId16"/>
     <p:sldId id="295" r:id="rId17"/>
     <p:sldId id="263" r:id="rId18"/>
-    <p:sldId id="260" r:id="rId19"/>
-    <p:sldId id="302" r:id="rId20"/>
-    <p:sldId id="292" r:id="rId21"/>
-    <p:sldId id="297" r:id="rId22"/>
-    <p:sldId id="298" r:id="rId23"/>
-    <p:sldId id="299" r:id="rId24"/>
-    <p:sldId id="300" r:id="rId25"/>
-    <p:sldId id="301" r:id="rId26"/>
-    <p:sldId id="306" r:id="rId27"/>
-    <p:sldId id="304" r:id="rId28"/>
-    <p:sldId id="305" r:id="rId29"/>
-    <p:sldId id="293" r:id="rId30"/>
-    <p:sldId id="262" r:id="rId31"/>
-    <p:sldId id="264" r:id="rId32"/>
-    <p:sldId id="266" r:id="rId33"/>
-    <p:sldId id="267" r:id="rId34"/>
-    <p:sldId id="271" r:id="rId35"/>
-    <p:sldId id="268" r:id="rId36"/>
-    <p:sldId id="269" r:id="rId37"/>
-    <p:sldId id="272" r:id="rId38"/>
-    <p:sldId id="275" r:id="rId39"/>
-    <p:sldId id="276" r:id="rId40"/>
-    <p:sldId id="278" r:id="rId41"/>
-    <p:sldId id="279" r:id="rId42"/>
+    <p:sldId id="307" r:id="rId19"/>
+    <p:sldId id="260" r:id="rId20"/>
+    <p:sldId id="302" r:id="rId21"/>
+    <p:sldId id="292" r:id="rId22"/>
+    <p:sldId id="297" r:id="rId23"/>
+    <p:sldId id="298" r:id="rId24"/>
+    <p:sldId id="299" r:id="rId25"/>
+    <p:sldId id="300" r:id="rId26"/>
+    <p:sldId id="301" r:id="rId27"/>
+    <p:sldId id="306" r:id="rId28"/>
+    <p:sldId id="304" r:id="rId29"/>
+    <p:sldId id="305" r:id="rId30"/>
+    <p:sldId id="293" r:id="rId31"/>
+    <p:sldId id="262" r:id="rId32"/>
+    <p:sldId id="264" r:id="rId33"/>
+    <p:sldId id="266" r:id="rId34"/>
+    <p:sldId id="267" r:id="rId35"/>
+    <p:sldId id="271" r:id="rId36"/>
+    <p:sldId id="268" r:id="rId37"/>
+    <p:sldId id="269" r:id="rId38"/>
+    <p:sldId id="272" r:id="rId39"/>
+    <p:sldId id="275" r:id="rId40"/>
+    <p:sldId id="276" r:id="rId41"/>
+    <p:sldId id="278" r:id="rId42"/>
+    <p:sldId id="279" r:id="rId43"/>
   </p:sldIdLst>
   <p:sldSz cx="9144000" cy="6858000" type="screen4x3"/>
   <p:notesSz cx="6858000" cy="9144000"/>
@@ -232,7 +233,7 @@
           <a:p>
             <a:fld id="{FBA4CA3D-6D4A-4942-9F2F-0C2F42AB54B2}" type="datetimeFigureOut">
               <a:rPr lang="en-US" smtClean="0"/>
-              <a:t>11/25/15</a:t>
+              <a:t>12/6/15</a:t>
             </a:fld>
             <a:endParaRPr lang="en-US"/>
           </a:p>
@@ -589,7 +590,7 @@
           <a:p>
             <a:fld id="{408A6340-2867-3F4F-85AE-5F411E163BC1}" type="slidenum">
               <a:rPr lang="en-US" smtClean="0"/>
-              <a:t>25</a:t>
+              <a:t>26</a:t>
             </a:fld>
             <a:endParaRPr lang="en-US"/>
           </a:p>
@@ -789,7 +790,7 @@
           <a:p>
             <a:fld id="{437BC0E1-BD5C-0446-92AB-909DA47EBC51}" type="datetimeFigureOut">
               <a:rPr lang="en-US" smtClean="0"/>
-              <a:t>11/25/15</a:t>
+              <a:t>12/6/15</a:t>
             </a:fld>
             <a:endParaRPr lang="en-US"/>
           </a:p>
@@ -959,7 +960,7 @@
           <a:p>
             <a:fld id="{437BC0E1-BD5C-0446-92AB-909DA47EBC51}" type="datetimeFigureOut">
               <a:rPr lang="en-US" smtClean="0"/>
-              <a:t>11/25/15</a:t>
+              <a:t>12/6/15</a:t>
             </a:fld>
             <a:endParaRPr lang="en-US"/>
           </a:p>
@@ -1139,7 +1140,7 @@
           <a:p>
             <a:fld id="{437BC0E1-BD5C-0446-92AB-909DA47EBC51}" type="datetimeFigureOut">
               <a:rPr lang="en-US" smtClean="0"/>
-              <a:t>11/25/15</a:t>
+              <a:t>12/6/15</a:t>
             </a:fld>
             <a:endParaRPr lang="en-US"/>
           </a:p>
@@ -1309,7 +1310,7 @@
           <a:p>
             <a:fld id="{437BC0E1-BD5C-0446-92AB-909DA47EBC51}" type="datetimeFigureOut">
               <a:rPr lang="en-US" smtClean="0"/>
-              <a:t>11/25/15</a:t>
+              <a:t>12/6/15</a:t>
             </a:fld>
             <a:endParaRPr lang="en-US"/>
           </a:p>
@@ -1555,7 +1556,7 @@
           <a:p>
             <a:fld id="{437BC0E1-BD5C-0446-92AB-909DA47EBC51}" type="datetimeFigureOut">
               <a:rPr lang="en-US" smtClean="0"/>
-              <a:t>11/25/15</a:t>
+              <a:t>12/6/15</a:t>
             </a:fld>
             <a:endParaRPr lang="en-US"/>
           </a:p>
@@ -1843,7 +1844,7 @@
           <a:p>
             <a:fld id="{437BC0E1-BD5C-0446-92AB-909DA47EBC51}" type="datetimeFigureOut">
               <a:rPr lang="en-US" smtClean="0"/>
-              <a:t>11/25/15</a:t>
+              <a:t>12/6/15</a:t>
             </a:fld>
             <a:endParaRPr lang="en-US"/>
           </a:p>
@@ -2265,7 +2266,7 @@
           <a:p>
             <a:fld id="{437BC0E1-BD5C-0446-92AB-909DA47EBC51}" type="datetimeFigureOut">
               <a:rPr lang="en-US" smtClean="0"/>
-              <a:t>11/25/15</a:t>
+              <a:t>12/6/15</a:t>
             </a:fld>
             <a:endParaRPr lang="en-US"/>
           </a:p>
@@ -2383,7 +2384,7 @@
           <a:p>
             <a:fld id="{437BC0E1-BD5C-0446-92AB-909DA47EBC51}" type="datetimeFigureOut">
               <a:rPr lang="en-US" smtClean="0"/>
-              <a:t>11/25/15</a:t>
+              <a:t>12/6/15</a:t>
             </a:fld>
             <a:endParaRPr lang="en-US"/>
           </a:p>
@@ -2478,7 +2479,7 @@
           <a:p>
             <a:fld id="{437BC0E1-BD5C-0446-92AB-909DA47EBC51}" type="datetimeFigureOut">
               <a:rPr lang="en-US" smtClean="0"/>
-              <a:t>11/25/15</a:t>
+              <a:t>12/6/15</a:t>
             </a:fld>
             <a:endParaRPr lang="en-US"/>
           </a:p>
@@ -2755,7 +2756,7 @@
           <a:p>
             <a:fld id="{437BC0E1-BD5C-0446-92AB-909DA47EBC51}" type="datetimeFigureOut">
               <a:rPr lang="en-US" smtClean="0"/>
-              <a:t>11/25/15</a:t>
+              <a:t>12/6/15</a:t>
             </a:fld>
             <a:endParaRPr lang="en-US"/>
           </a:p>
@@ -3008,7 +3009,7 @@
           <a:p>
             <a:fld id="{437BC0E1-BD5C-0446-92AB-909DA47EBC51}" type="datetimeFigureOut">
               <a:rPr lang="en-US" smtClean="0"/>
-              <a:t>11/25/15</a:t>
+              <a:t>12/6/15</a:t>
             </a:fld>
             <a:endParaRPr lang="en-US"/>
           </a:p>
@@ -3221,7 +3222,7 @@
           <a:p>
             <a:fld id="{437BC0E1-BD5C-0446-92AB-909DA47EBC51}" type="datetimeFigureOut">
               <a:rPr lang="en-US" smtClean="0"/>
-              <a:t>11/25/15</a:t>
+              <a:t>12/6/15</a:t>
             </a:fld>
             <a:endParaRPr lang="en-US"/>
           </a:p>
@@ -4455,6 +4456,131 @@
 </file>
 
 <file path=ppt/slides/slide18.xml><?xml version="1.0" encoding="utf-8"?>
+<p:sld xmlns:a="http://schemas.openxmlformats.org/drawingml/2006/main" xmlns:r="http://schemas.openxmlformats.org/officeDocument/2006/relationships" xmlns:p="http://schemas.openxmlformats.org/presentationml/2006/main">
+  <p:cSld>
+    <p:spTree>
+      <p:nvGrpSpPr>
+        <p:cNvPr id="1" name=""/>
+        <p:cNvGrpSpPr/>
+        <p:nvPr/>
+      </p:nvGrpSpPr>
+      <p:grpSpPr>
+        <a:xfrm>
+          <a:off x="0" y="0"/>
+          <a:ext cx="0" cy="0"/>
+          <a:chOff x="0" y="0"/>
+          <a:chExt cx="0" cy="0"/>
+        </a:xfrm>
+      </p:grpSpPr>
+      <p:sp>
+        <p:nvSpPr>
+          <p:cNvPr id="2" name="Title 1"/>
+          <p:cNvSpPr>
+            <a:spLocks noGrp="1"/>
+          </p:cNvSpPr>
+          <p:nvPr>
+            <p:ph type="title"/>
+          </p:nvPr>
+        </p:nvSpPr>
+        <p:spPr/>
+        <p:txBody>
+          <a:bodyPr/>
+          <a:lstStyle/>
+          <a:p>
+            <a:r>
+              <a:rPr lang="en-US" dirty="0" smtClean="0"/>
+              <a:t>Changes</a:t>
+            </a:r>
+            <a:endParaRPr lang="en-US" dirty="0"/>
+          </a:p>
+        </p:txBody>
+      </p:sp>
+      <p:sp>
+        <p:nvSpPr>
+          <p:cNvPr id="3" name="Content Placeholder 2"/>
+          <p:cNvSpPr>
+            <a:spLocks noGrp="1"/>
+          </p:cNvSpPr>
+          <p:nvPr>
+            <p:ph idx="1"/>
+          </p:nvPr>
+        </p:nvSpPr>
+        <p:spPr/>
+        <p:txBody>
+          <a:bodyPr/>
+          <a:lstStyle/>
+          <a:p>
+            <a:r>
+              <a:rPr lang="en-US" dirty="0" smtClean="0"/>
+              <a:t>Removed </a:t>
+            </a:r>
+            <a:r>
+              <a:rPr lang="en-US" dirty="0" err="1" smtClean="0"/>
+              <a:t>after_fasting</a:t>
+            </a:r>
+            <a:r>
+              <a:rPr lang="en-US" dirty="0" smtClean="0"/>
+              <a:t> data for cohort 7</a:t>
+            </a:r>
+          </a:p>
+          <a:p>
+            <a:r>
+              <a:rPr lang="en-US" dirty="0" smtClean="0"/>
+              <a:t>Removed mice that were for short-term </a:t>
+            </a:r>
+            <a:r>
+              <a:rPr lang="en-US" dirty="0" err="1" smtClean="0"/>
+              <a:t>dex</a:t>
+            </a:r>
+            <a:endParaRPr lang="en-US" dirty="0" smtClean="0"/>
+          </a:p>
+          <a:p>
+            <a:r>
+              <a:rPr lang="en-US" dirty="0" smtClean="0"/>
+              <a:t>Removed RER outliers (&gt;1 and &lt; 0.7)</a:t>
+            </a:r>
+          </a:p>
+          <a:p>
+            <a:r>
+              <a:rPr lang="en-US" dirty="0" smtClean="0"/>
+              <a:t>Added </a:t>
+            </a:r>
+            <a:r>
+              <a:rPr lang="en-US" dirty="0" err="1" smtClean="0"/>
+              <a:t>outlier.size</a:t>
+            </a:r>
+            <a:r>
+              <a:rPr lang="en-US" dirty="0" smtClean="0"/>
+              <a:t>=NA to not show the outlier dots in the box plots.</a:t>
+            </a:r>
+          </a:p>
+          <a:p>
+            <a:r>
+              <a:rPr lang="en-US" dirty="0" smtClean="0"/>
+              <a:t>Fixed the </a:t>
+            </a:r>
+            <a:r>
+              <a:rPr lang="en-US" smtClean="0"/>
+              <a:t>average bugging</a:t>
+            </a:r>
+            <a:endParaRPr lang="en-US"/>
+          </a:p>
+        </p:txBody>
+      </p:sp>
+    </p:spTree>
+    <p:extLst>
+      <p:ext uri="{BB962C8B-B14F-4D97-AF65-F5344CB8AC3E}">
+        <p14:creationId xmlns:p14="http://schemas.microsoft.com/office/powerpoint/2010/main" val="5412826"/>
+      </p:ext>
+    </p:extLst>
+  </p:cSld>
+  <p:clrMapOvr>
+    <a:masterClrMapping/>
+  </p:clrMapOvr>
+</p:sld>
+</file>
+
+<file path=ppt/slides/slide19.xml><?xml version="1.0" encoding="utf-8"?>
 <p:sld xmlns:a="http://schemas.openxmlformats.org/drawingml/2006/main" xmlns:r="http://schemas.openxmlformats.org/officeDocument/2006/relationships" xmlns:p="http://schemas.openxmlformats.org/presentationml/2006/main">
   <p:cSld>
     <p:spTree>
@@ -4793,7 +4919,90 @@
 </p:sld>
 </file>
 
-<file path=ppt/slides/slide19.xml><?xml version="1.0" encoding="utf-8"?>
+<file path=ppt/slides/slide2.xml><?xml version="1.0" encoding="utf-8"?>
+<p:sld xmlns:a="http://schemas.openxmlformats.org/drawingml/2006/main" xmlns:r="http://schemas.openxmlformats.org/officeDocument/2006/relationships" xmlns:p="http://schemas.openxmlformats.org/presentationml/2006/main">
+  <p:cSld>
+    <p:spTree>
+      <p:nvGrpSpPr>
+        <p:cNvPr id="1" name=""/>
+        <p:cNvGrpSpPr/>
+        <p:nvPr/>
+      </p:nvGrpSpPr>
+      <p:grpSpPr>
+        <a:xfrm>
+          <a:off x="0" y="0"/>
+          <a:ext cx="0" cy="0"/>
+          <a:chOff x="0" y="0"/>
+          <a:chExt cx="0" cy="0"/>
+        </a:xfrm>
+      </p:grpSpPr>
+      <p:sp>
+        <p:nvSpPr>
+          <p:cNvPr id="2" name="Title 1"/>
+          <p:cNvSpPr>
+            <a:spLocks noGrp="1"/>
+          </p:cNvSpPr>
+          <p:nvPr>
+            <p:ph type="title"/>
+          </p:nvPr>
+        </p:nvSpPr>
+        <p:spPr/>
+        <p:txBody>
+          <a:bodyPr/>
+          <a:lstStyle/>
+          <a:p>
+            <a:r>
+              <a:rPr lang="en-US" dirty="0" smtClean="0"/>
+              <a:t>Objective</a:t>
+            </a:r>
+            <a:endParaRPr lang="en-US" dirty="0"/>
+          </a:p>
+        </p:txBody>
+      </p:sp>
+      <p:sp>
+        <p:nvSpPr>
+          <p:cNvPr id="3" name="Content Placeholder 2"/>
+          <p:cNvSpPr>
+            <a:spLocks noGrp="1"/>
+          </p:cNvSpPr>
+          <p:nvPr>
+            <p:ph idx="1"/>
+          </p:nvPr>
+        </p:nvSpPr>
+        <p:spPr/>
+        <p:txBody>
+          <a:bodyPr/>
+          <a:lstStyle/>
+          <a:p>
+            <a:r>
+              <a:rPr lang="en-US" dirty="0" smtClean="0"/>
+              <a:t>To identify predictors that can estimate the amount of weight gain after a fasting period of 16 hours</a:t>
+            </a:r>
+            <a:endParaRPr lang="en-US" dirty="0"/>
+          </a:p>
+        </p:txBody>
+      </p:sp>
+    </p:spTree>
+    <p:extLst>
+      <p:ext uri="{BB962C8B-B14F-4D97-AF65-F5344CB8AC3E}">
+        <p14:creationId xmlns:p14="http://schemas.microsoft.com/office/powerpoint/2010/main" val="413790071"/>
+      </p:ext>
+    </p:extLst>
+  </p:cSld>
+  <p:clrMapOvr>
+    <a:masterClrMapping/>
+  </p:clrMapOvr>
+  <p:timing>
+    <p:tnLst>
+      <p:par>
+        <p:cTn xmlns:p14="http://schemas.microsoft.com/office/powerpoint/2010/main" id="1" dur="indefinite" restart="never" nodeType="tmRoot"/>
+      </p:par>
+    </p:tnLst>
+  </p:timing>
+</p:sld>
+</file>
+
+<file path=ppt/slides/slide20.xml><?xml version="1.0" encoding="utf-8"?>
 <p:sld xmlns:a="http://schemas.openxmlformats.org/drawingml/2006/main" xmlns:r="http://schemas.openxmlformats.org/officeDocument/2006/relationships" xmlns:p="http://schemas.openxmlformats.org/presentationml/2006/main">
   <p:cSld>
     <p:spTree>
@@ -5305,7 +5514,7 @@
         </p:nvSpPr>
         <p:spPr>
           <a:xfrm>
-            <a:off x="2681112" y="4120447"/>
+            <a:off x="1876452" y="4092227"/>
             <a:ext cx="1493355" cy="369332"/>
           </a:xfrm>
           <a:prstGeom prst="rect">
@@ -5469,6 +5678,48 @@
           </a:p>
         </p:txBody>
       </p:sp>
+      <p:sp>
+        <p:nvSpPr>
+          <p:cNvPr id="19" name="&quot;No&quot; Symbol 18"/>
+          <p:cNvSpPr/>
+          <p:nvPr/>
+        </p:nvSpPr>
+        <p:spPr>
+          <a:xfrm>
+            <a:off x="4174467" y="2632761"/>
+            <a:ext cx="2119089" cy="2009795"/>
+          </a:xfrm>
+          <a:prstGeom prst="noSmoking">
+            <a:avLst/>
+          </a:prstGeom>
+        </p:spPr>
+        <p:style>
+          <a:lnRef idx="1">
+            <a:schemeClr val="accent2"/>
+          </a:lnRef>
+          <a:fillRef idx="3">
+            <a:schemeClr val="accent2"/>
+          </a:fillRef>
+          <a:effectRef idx="2">
+            <a:schemeClr val="accent2"/>
+          </a:effectRef>
+          <a:fontRef idx="minor">
+            <a:schemeClr val="lt1"/>
+          </a:fontRef>
+        </p:style>
+        <p:txBody>
+          <a:bodyPr rtlCol="0" anchor="ctr"/>
+          <a:lstStyle/>
+          <a:p>
+            <a:pPr algn="ctr"/>
+            <a:endParaRPr lang="en-US">
+              <a:solidFill>
+                <a:schemeClr val="tx1"/>
+              </a:solidFill>
+            </a:endParaRPr>
+          </a:p>
+        </p:txBody>
+      </p:sp>
     </p:spTree>
     <p:extLst>
       <p:ext uri="{BB962C8B-B14F-4D97-AF65-F5344CB8AC3E}">
@@ -5489,90 +5740,7 @@
 </p:sld>
 </file>
 
-<file path=ppt/slides/slide2.xml><?xml version="1.0" encoding="utf-8"?>
-<p:sld xmlns:a="http://schemas.openxmlformats.org/drawingml/2006/main" xmlns:r="http://schemas.openxmlformats.org/officeDocument/2006/relationships" xmlns:p="http://schemas.openxmlformats.org/presentationml/2006/main">
-  <p:cSld>
-    <p:spTree>
-      <p:nvGrpSpPr>
-        <p:cNvPr id="1" name=""/>
-        <p:cNvGrpSpPr/>
-        <p:nvPr/>
-      </p:nvGrpSpPr>
-      <p:grpSpPr>
-        <a:xfrm>
-          <a:off x="0" y="0"/>
-          <a:ext cx="0" cy="0"/>
-          <a:chOff x="0" y="0"/>
-          <a:chExt cx="0" cy="0"/>
-        </a:xfrm>
-      </p:grpSpPr>
-      <p:sp>
-        <p:nvSpPr>
-          <p:cNvPr id="2" name="Title 1"/>
-          <p:cNvSpPr>
-            <a:spLocks noGrp="1"/>
-          </p:cNvSpPr>
-          <p:nvPr>
-            <p:ph type="title"/>
-          </p:nvPr>
-        </p:nvSpPr>
-        <p:spPr/>
-        <p:txBody>
-          <a:bodyPr/>
-          <a:lstStyle/>
-          <a:p>
-            <a:r>
-              <a:rPr lang="en-US" dirty="0" smtClean="0"/>
-              <a:t>Objective</a:t>
-            </a:r>
-            <a:endParaRPr lang="en-US" dirty="0"/>
-          </a:p>
-        </p:txBody>
-      </p:sp>
-      <p:sp>
-        <p:nvSpPr>
-          <p:cNvPr id="3" name="Content Placeholder 2"/>
-          <p:cNvSpPr>
-            <a:spLocks noGrp="1"/>
-          </p:cNvSpPr>
-          <p:nvPr>
-            <p:ph idx="1"/>
-          </p:nvPr>
-        </p:nvSpPr>
-        <p:spPr/>
-        <p:txBody>
-          <a:bodyPr/>
-          <a:lstStyle/>
-          <a:p>
-            <a:r>
-              <a:rPr lang="en-US" dirty="0" smtClean="0"/>
-              <a:t>To identify predictors that can estimate the amount of weight gain after a fasting period of 16 hours</a:t>
-            </a:r>
-            <a:endParaRPr lang="en-US" dirty="0"/>
-          </a:p>
-        </p:txBody>
-      </p:sp>
-    </p:spTree>
-    <p:extLst>
-      <p:ext uri="{BB962C8B-B14F-4D97-AF65-F5344CB8AC3E}">
-        <p14:creationId xmlns:p14="http://schemas.microsoft.com/office/powerpoint/2010/main" val="413790071"/>
-      </p:ext>
-    </p:extLst>
-  </p:cSld>
-  <p:clrMapOvr>
-    <a:masterClrMapping/>
-  </p:clrMapOvr>
-  <p:timing>
-    <p:tnLst>
-      <p:par>
-        <p:cTn xmlns:p14="http://schemas.microsoft.com/office/powerpoint/2010/main" id="1" dur="indefinite" restart="never" nodeType="tmRoot"/>
-      </p:par>
-    </p:tnLst>
-  </p:timing>
-</p:sld>
-</file>
-
-<file path=ppt/slides/slide20.xml><?xml version="1.0" encoding="utf-8"?>
+<file path=ppt/slides/slide21.xml><?xml version="1.0" encoding="utf-8"?>
 <p:sld xmlns:a="http://schemas.openxmlformats.org/drawingml/2006/main" xmlns:r="http://schemas.openxmlformats.org/officeDocument/2006/relationships" xmlns:p="http://schemas.openxmlformats.org/presentationml/2006/main">
   <p:cSld>
     <p:spTree>
@@ -5669,7 +5837,7 @@
 </p:sld>
 </file>
 
-<file path=ppt/slides/slide21.xml><?xml version="1.0" encoding="utf-8"?>
+<file path=ppt/slides/slide22.xml><?xml version="1.0" encoding="utf-8"?>
 <p:sld xmlns:a="http://schemas.openxmlformats.org/drawingml/2006/main" xmlns:r="http://schemas.openxmlformats.org/officeDocument/2006/relationships" xmlns:p="http://schemas.openxmlformats.org/presentationml/2006/main">
   <p:cSld>
     <p:spTree>
@@ -5766,7 +5934,7 @@
 </p:sld>
 </file>
 
-<file path=ppt/slides/slide22.xml><?xml version="1.0" encoding="utf-8"?>
+<file path=ppt/slides/slide23.xml><?xml version="1.0" encoding="utf-8"?>
 <p:sld xmlns:a="http://schemas.openxmlformats.org/drawingml/2006/main" xmlns:r="http://schemas.openxmlformats.org/officeDocument/2006/relationships" xmlns:p="http://schemas.openxmlformats.org/presentationml/2006/main">
   <p:cSld>
     <p:spTree>
@@ -5863,7 +6031,7 @@
 </p:sld>
 </file>
 
-<file path=ppt/slides/slide23.xml><?xml version="1.0" encoding="utf-8"?>
+<file path=ppt/slides/slide24.xml><?xml version="1.0" encoding="utf-8"?>
 <p:sld xmlns:a="http://schemas.openxmlformats.org/drawingml/2006/main" xmlns:r="http://schemas.openxmlformats.org/officeDocument/2006/relationships" xmlns:p="http://schemas.openxmlformats.org/presentationml/2006/main">
   <p:cSld>
     <p:spTree>
@@ -5960,7 +6128,7 @@
 </p:sld>
 </file>
 
-<file path=ppt/slides/slide24.xml><?xml version="1.0" encoding="utf-8"?>
+<file path=ppt/slides/slide25.xml><?xml version="1.0" encoding="utf-8"?>
 <p:sld xmlns:a="http://schemas.openxmlformats.org/drawingml/2006/main" xmlns:r="http://schemas.openxmlformats.org/officeDocument/2006/relationships" xmlns:p="http://schemas.openxmlformats.org/presentationml/2006/main">
   <p:cSld>
     <p:spTree>
@@ -6057,7 +6225,7 @@
 </p:sld>
 </file>
 
-<file path=ppt/slides/slide25.xml><?xml version="1.0" encoding="utf-8"?>
+<file path=ppt/slides/slide26.xml><?xml version="1.0" encoding="utf-8"?>
 <p:sld xmlns:a="http://schemas.openxmlformats.org/drawingml/2006/main" xmlns:r="http://schemas.openxmlformats.org/officeDocument/2006/relationships" xmlns:p="http://schemas.openxmlformats.org/presentationml/2006/main">
   <p:cSld>
     <p:spTree>
@@ -6154,90 +6322,6 @@
 </p:sld>
 </file>
 
-<file path=ppt/slides/slide26.xml><?xml version="1.0" encoding="utf-8"?>
-<p:sld xmlns:a="http://schemas.openxmlformats.org/drawingml/2006/main" xmlns:r="http://schemas.openxmlformats.org/officeDocument/2006/relationships" xmlns:p="http://schemas.openxmlformats.org/presentationml/2006/main">
-  <p:cSld>
-    <p:spTree>
-      <p:nvGrpSpPr>
-        <p:cNvPr id="1" name=""/>
-        <p:cNvGrpSpPr/>
-        <p:nvPr/>
-      </p:nvGrpSpPr>
-      <p:grpSpPr>
-        <a:xfrm>
-          <a:off x="0" y="0"/>
-          <a:ext cx="0" cy="0"/>
-          <a:chOff x="0" y="0"/>
-          <a:chExt cx="0" cy="0"/>
-        </a:xfrm>
-      </p:grpSpPr>
-      <p:sp>
-        <p:nvSpPr>
-          <p:cNvPr id="2" name="Title 1"/>
-          <p:cNvSpPr>
-            <a:spLocks noGrp="1"/>
-          </p:cNvSpPr>
-          <p:nvPr>
-            <p:ph type="title"/>
-          </p:nvPr>
-        </p:nvSpPr>
-        <p:spPr/>
-        <p:txBody>
-          <a:bodyPr/>
-          <a:lstStyle/>
-          <a:p>
-            <a:r>
-              <a:rPr lang="en-US" dirty="0" smtClean="0"/>
-              <a:t>Short-term </a:t>
-            </a:r>
-            <a:r>
-              <a:rPr lang="en-US" dirty="0" err="1" smtClean="0"/>
-              <a:t>Dex</a:t>
-            </a:r>
-            <a:r>
-              <a:rPr lang="en-US" dirty="0" smtClean="0"/>
-              <a:t> mice</a:t>
-            </a:r>
-            <a:endParaRPr lang="en-US" dirty="0"/>
-          </a:p>
-        </p:txBody>
-      </p:sp>
-      <p:sp>
-        <p:nvSpPr>
-          <p:cNvPr id="3" name="Content Placeholder 2"/>
-          <p:cNvSpPr>
-            <a:spLocks noGrp="1"/>
-          </p:cNvSpPr>
-          <p:nvPr>
-            <p:ph idx="1"/>
-          </p:nvPr>
-        </p:nvSpPr>
-        <p:spPr/>
-        <p:txBody>
-          <a:bodyPr/>
-          <a:lstStyle/>
-          <a:p>
-            <a:r>
-              <a:rPr lang="en-US" dirty="0" smtClean="0"/>
-              <a:t>The 8 mice that don’t belong to this cohort are 1740, 1741, 1742, 1743 and 1770, 1771, 1772, 1773</a:t>
-            </a:r>
-            <a:endParaRPr lang="en-US" dirty="0"/>
-          </a:p>
-        </p:txBody>
-      </p:sp>
-    </p:spTree>
-    <p:extLst>
-      <p:ext uri="{BB962C8B-B14F-4D97-AF65-F5344CB8AC3E}">
-        <p14:creationId xmlns:p14="http://schemas.microsoft.com/office/powerpoint/2010/main" val="1761786969"/>
-      </p:ext>
-    </p:extLst>
-  </p:cSld>
-  <p:clrMapOvr>
-    <a:masterClrMapping/>
-  </p:clrMapOvr>
-</p:sld>
-</file>
-
 <file path=ppt/slides/slide27.xml><?xml version="1.0" encoding="utf-8"?>
 <p:sld xmlns:a="http://schemas.openxmlformats.org/drawingml/2006/main" xmlns:r="http://schemas.openxmlformats.org/officeDocument/2006/relationships" xmlns:p="http://schemas.openxmlformats.org/presentationml/2006/main">
   <p:cSld>
@@ -6272,7 +6356,15 @@
           <a:p>
             <a:r>
               <a:rPr lang="en-US" dirty="0" smtClean="0"/>
-              <a:t>FOOD INTAKE</a:t>
+              <a:t>Short-term </a:t>
+            </a:r>
+            <a:r>
+              <a:rPr lang="en-US" dirty="0" err="1" smtClean="0"/>
+              <a:t>Dex</a:t>
+            </a:r>
+            <a:r>
+              <a:rPr lang="en-US" dirty="0" smtClean="0"/>
+              <a:t> mice</a:t>
             </a:r>
             <a:endParaRPr lang="en-US" dirty="0"/>
           </a:p>
@@ -6280,12 +6372,12 @@
       </p:sp>
       <p:sp>
         <p:nvSpPr>
-          <p:cNvPr id="3" name="Text Placeholder 2"/>
-          <p:cNvSpPr>
-            <a:spLocks noGrp="1"/>
-          </p:cNvSpPr>
-          <p:nvPr>
-            <p:ph type="body" idx="1"/>
+          <p:cNvPr id="3" name="Content Placeholder 2"/>
+          <p:cNvSpPr>
+            <a:spLocks noGrp="1"/>
+          </p:cNvSpPr>
+          <p:nvPr>
+            <p:ph idx="1"/>
           </p:nvPr>
         </p:nvSpPr>
         <p:spPr/>
@@ -6295,7 +6387,7 @@
           <a:p>
             <a:r>
               <a:rPr lang="en-US" dirty="0" smtClean="0"/>
-              <a:t>Cohort 7 and 8</a:t>
+              <a:t>The 8 mice that don’t belong to this cohort are 1740, 1741, 1742, 1743 and 1770, 1771, 1772, 1773</a:t>
             </a:r>
             <a:endParaRPr lang="en-US" dirty="0"/>
           </a:p>
@@ -6304,7 +6396,7 @@
     </p:spTree>
     <p:extLst>
       <p:ext uri="{BB962C8B-B14F-4D97-AF65-F5344CB8AC3E}">
-        <p14:creationId xmlns:p14="http://schemas.microsoft.com/office/powerpoint/2010/main" val="1433592600"/>
+        <p14:creationId xmlns:p14="http://schemas.microsoft.com/office/powerpoint/2010/main" val="1761786969"/>
       </p:ext>
     </p:extLst>
   </p:cSld>
@@ -6346,18 +6438,22 @@
           <a:bodyPr/>
           <a:lstStyle/>
           <a:p>
-            <a:endParaRPr lang="en-US"/>
-          </a:p>
-        </p:txBody>
-      </p:sp>
-      <p:sp>
-        <p:nvSpPr>
-          <p:cNvPr id="3" name="Content Placeholder 2"/>
-          <p:cNvSpPr>
-            <a:spLocks noGrp="1"/>
-          </p:cNvSpPr>
-          <p:nvPr>
-            <p:ph idx="1"/>
+            <a:r>
+              <a:rPr lang="en-US" dirty="0" smtClean="0"/>
+              <a:t>FOOD INTAKE</a:t>
+            </a:r>
+            <a:endParaRPr lang="en-US" dirty="0"/>
+          </a:p>
+        </p:txBody>
+      </p:sp>
+      <p:sp>
+        <p:nvSpPr>
+          <p:cNvPr id="3" name="Text Placeholder 2"/>
+          <p:cNvSpPr>
+            <a:spLocks noGrp="1"/>
+          </p:cNvSpPr>
+          <p:nvPr>
+            <p:ph type="body" idx="1"/>
           </p:nvPr>
         </p:nvSpPr>
         <p:spPr/>
@@ -6367,22 +6463,8 @@
           <a:p>
             <a:r>
               <a:rPr lang="en-US" dirty="0" smtClean="0"/>
-              <a:t>Mouse 2110 – no food data</a:t>
-            </a:r>
-          </a:p>
-          <a:p>
-            <a:r>
-              <a:rPr lang="en-US" dirty="0" smtClean="0"/>
-              <a:t>Mouse 2101 – only record the first interval</a:t>
-            </a:r>
-          </a:p>
-          <a:p>
-            <a:r>
-              <a:rPr lang="en-US" dirty="0" smtClean="0"/>
-              <a:t>Mouse 2102 – only record the first 3 intervals</a:t>
-            </a:r>
-          </a:p>
-          <a:p>
+              <a:t>Cohort 7 and 8</a:t>
+            </a:r>
             <a:endParaRPr lang="en-US" dirty="0"/>
           </a:p>
         </p:txBody>
@@ -6390,7 +6472,7 @@
     </p:spTree>
     <p:extLst>
       <p:ext uri="{BB962C8B-B14F-4D97-AF65-F5344CB8AC3E}">
-        <p14:creationId xmlns:p14="http://schemas.microsoft.com/office/powerpoint/2010/main" val="1552084091"/>
+        <p14:creationId xmlns:p14="http://schemas.microsoft.com/office/powerpoint/2010/main" val="1433592600"/>
       </p:ext>
     </p:extLst>
   </p:cSld>
@@ -6432,11 +6514,7 @@
           <a:bodyPr/>
           <a:lstStyle/>
           <a:p>
-            <a:r>
-              <a:rPr lang="en-US" dirty="0" smtClean="0"/>
-              <a:t>Juvenile HFD</a:t>
-            </a:r>
-            <a:endParaRPr lang="en-US" dirty="0"/>
+            <a:endParaRPr lang="en-US"/>
           </a:p>
         </p:txBody>
       </p:sp>
@@ -6456,33 +6534,23 @@
           <a:lstStyle/>
           <a:p>
             <a:r>
-              <a:rPr lang="en-US" dirty="0" err="1" smtClean="0"/>
-              <a:t>JuvHFD</a:t>
-            </a:r>
-            <a:r>
               <a:rPr lang="en-US" dirty="0" smtClean="0"/>
-              <a:t> # 1 – Born 2014-04-21 (Mice #410-433)</a:t>
-            </a:r>
-          </a:p>
-          <a:p>
-            <a:r>
-              <a:rPr lang="en-US" dirty="0" err="1" smtClean="0"/>
-              <a:t>JuvHFD</a:t>
-            </a:r>
+              <a:t>Mouse 2110 – no food data</a:t>
+            </a:r>
+          </a:p>
+          <a:p>
             <a:r>
               <a:rPr lang="en-US" dirty="0" smtClean="0"/>
-              <a:t> # 2 – Born 2014-07-07</a:t>
-            </a:r>
-          </a:p>
-          <a:p>
-            <a:r>
-              <a:rPr lang="en-US" dirty="0" err="1" smtClean="0"/>
-              <a:t>RNAseq</a:t>
-            </a:r>
+              <a:t>Mouse 2101 – only record the first interval</a:t>
+            </a:r>
+          </a:p>
+          <a:p>
             <a:r>
               <a:rPr lang="en-US" dirty="0" smtClean="0"/>
-              <a:t> – Born 2015-01-21</a:t>
-            </a:r>
+              <a:t>Mouse 2102 – only record the first 3 intervals</a:t>
+            </a:r>
+          </a:p>
+          <a:p>
             <a:endParaRPr lang="en-US" dirty="0"/>
           </a:p>
         </p:txBody>
@@ -6490,20 +6558,13 @@
     </p:spTree>
     <p:extLst>
       <p:ext uri="{BB962C8B-B14F-4D97-AF65-F5344CB8AC3E}">
-        <p14:creationId xmlns:p14="http://schemas.microsoft.com/office/powerpoint/2010/main" val="1740669473"/>
+        <p14:creationId xmlns:p14="http://schemas.microsoft.com/office/powerpoint/2010/main" val="1552084091"/>
       </p:ext>
     </p:extLst>
   </p:cSld>
   <p:clrMapOvr>
     <a:masterClrMapping/>
   </p:clrMapOvr>
-  <p:timing>
-    <p:tnLst>
-      <p:par>
-        <p:cTn xmlns:p14="http://schemas.microsoft.com/office/powerpoint/2010/main" id="1" dur="indefinite" restart="never" nodeType="tmRoot"/>
-      </p:par>
-    </p:tnLst>
-  </p:timing>
 </p:sld>
 </file>
 
@@ -6605,6 +6666,113 @@
 </file>
 
 <file path=ppt/slides/slide30.xml><?xml version="1.0" encoding="utf-8"?>
+<p:sld xmlns:a="http://schemas.openxmlformats.org/drawingml/2006/main" xmlns:r="http://schemas.openxmlformats.org/officeDocument/2006/relationships" xmlns:p="http://schemas.openxmlformats.org/presentationml/2006/main">
+  <p:cSld>
+    <p:spTree>
+      <p:nvGrpSpPr>
+        <p:cNvPr id="1" name=""/>
+        <p:cNvGrpSpPr/>
+        <p:nvPr/>
+      </p:nvGrpSpPr>
+      <p:grpSpPr>
+        <a:xfrm>
+          <a:off x="0" y="0"/>
+          <a:ext cx="0" cy="0"/>
+          <a:chOff x="0" y="0"/>
+          <a:chExt cx="0" cy="0"/>
+        </a:xfrm>
+      </p:grpSpPr>
+      <p:sp>
+        <p:nvSpPr>
+          <p:cNvPr id="2" name="Title 1"/>
+          <p:cNvSpPr>
+            <a:spLocks noGrp="1"/>
+          </p:cNvSpPr>
+          <p:nvPr>
+            <p:ph type="title"/>
+          </p:nvPr>
+        </p:nvSpPr>
+        <p:spPr/>
+        <p:txBody>
+          <a:bodyPr/>
+          <a:lstStyle/>
+          <a:p>
+            <a:r>
+              <a:rPr lang="en-US" dirty="0" smtClean="0"/>
+              <a:t>Juvenile HFD</a:t>
+            </a:r>
+            <a:endParaRPr lang="en-US" dirty="0"/>
+          </a:p>
+        </p:txBody>
+      </p:sp>
+      <p:sp>
+        <p:nvSpPr>
+          <p:cNvPr id="3" name="Content Placeholder 2"/>
+          <p:cNvSpPr>
+            <a:spLocks noGrp="1"/>
+          </p:cNvSpPr>
+          <p:nvPr>
+            <p:ph idx="1"/>
+          </p:nvPr>
+        </p:nvSpPr>
+        <p:spPr/>
+        <p:txBody>
+          <a:bodyPr/>
+          <a:lstStyle/>
+          <a:p>
+            <a:r>
+              <a:rPr lang="en-US" dirty="0" err="1" smtClean="0"/>
+              <a:t>JuvHFD</a:t>
+            </a:r>
+            <a:r>
+              <a:rPr lang="en-US" dirty="0" smtClean="0"/>
+              <a:t> # 1 – Born 2014-04-21 (Mice #410-433)</a:t>
+            </a:r>
+          </a:p>
+          <a:p>
+            <a:r>
+              <a:rPr lang="en-US" dirty="0" err="1" smtClean="0"/>
+              <a:t>JuvHFD</a:t>
+            </a:r>
+            <a:r>
+              <a:rPr lang="en-US" dirty="0" smtClean="0"/>
+              <a:t> # 2 – Born 2014-07-07</a:t>
+            </a:r>
+          </a:p>
+          <a:p>
+            <a:r>
+              <a:rPr lang="en-US" dirty="0" err="1" smtClean="0"/>
+              <a:t>RNAseq</a:t>
+            </a:r>
+            <a:r>
+              <a:rPr lang="en-US" dirty="0" smtClean="0"/>
+              <a:t> – Born 2015-01-21</a:t>
+            </a:r>
+            <a:endParaRPr lang="en-US" dirty="0"/>
+          </a:p>
+        </p:txBody>
+      </p:sp>
+    </p:spTree>
+    <p:extLst>
+      <p:ext uri="{BB962C8B-B14F-4D97-AF65-F5344CB8AC3E}">
+        <p14:creationId xmlns:p14="http://schemas.microsoft.com/office/powerpoint/2010/main" val="1740669473"/>
+      </p:ext>
+    </p:extLst>
+  </p:cSld>
+  <p:clrMapOvr>
+    <a:masterClrMapping/>
+  </p:clrMapOvr>
+  <p:timing>
+    <p:tnLst>
+      <p:par>
+        <p:cTn xmlns:p14="http://schemas.microsoft.com/office/powerpoint/2010/main" id="1" dur="indefinite" restart="never" nodeType="tmRoot"/>
+      </p:par>
+    </p:tnLst>
+  </p:timing>
+</p:sld>
+</file>
+
+<file path=ppt/slides/slide31.xml><?xml version="1.0" encoding="utf-8"?>
 <p:sld xmlns:a="http://schemas.openxmlformats.org/drawingml/2006/main" xmlns:r="http://schemas.openxmlformats.org/officeDocument/2006/relationships" xmlns:p="http://schemas.openxmlformats.org/presentationml/2006/main">
   <p:cSld>
     <p:spTree>
@@ -6665,7 +6833,7 @@
 </p:sld>
 </file>
 
-<file path=ppt/slides/slide31.xml><?xml version="1.0" encoding="utf-8"?>
+<file path=ppt/slides/slide32.xml><?xml version="1.0" encoding="utf-8"?>
 <p:sld xmlns:a="http://schemas.openxmlformats.org/drawingml/2006/main" xmlns:r="http://schemas.openxmlformats.org/officeDocument/2006/relationships" xmlns:p="http://schemas.openxmlformats.org/presentationml/2006/main">
   <p:cSld>
     <p:spTree>
@@ -6726,7 +6894,7 @@
 </p:sld>
 </file>
 
-<file path=ppt/slides/slide32.xml><?xml version="1.0" encoding="utf-8"?>
+<file path=ppt/slides/slide33.xml><?xml version="1.0" encoding="utf-8"?>
 <p:sld xmlns:a="http://schemas.openxmlformats.org/drawingml/2006/main" xmlns:r="http://schemas.openxmlformats.org/officeDocument/2006/relationships" xmlns:p="http://schemas.openxmlformats.org/presentationml/2006/main">
   <p:cSld>
     <p:spTree>
@@ -6806,7 +6974,7 @@
 </p:sld>
 </file>
 
-<file path=ppt/slides/slide33.xml><?xml version="1.0" encoding="utf-8"?>
+<file path=ppt/slides/slide34.xml><?xml version="1.0" encoding="utf-8"?>
 <p:sld xmlns:a="http://schemas.openxmlformats.org/drawingml/2006/main" xmlns:r="http://schemas.openxmlformats.org/officeDocument/2006/relationships" xmlns:p="http://schemas.openxmlformats.org/presentationml/2006/main">
   <p:cSld>
     <p:spTree>
@@ -6886,7 +7054,7 @@
 </p:sld>
 </file>
 
-<file path=ppt/slides/slide34.xml><?xml version="1.0" encoding="utf-8"?>
+<file path=ppt/slides/slide35.xml><?xml version="1.0" encoding="utf-8"?>
 <p:sld xmlns:a="http://schemas.openxmlformats.org/drawingml/2006/main" xmlns:r="http://schemas.openxmlformats.org/officeDocument/2006/relationships" xmlns:p="http://schemas.openxmlformats.org/presentationml/2006/main">
   <p:cSld>
     <p:spTree>
@@ -6980,7 +7148,7 @@
 </p:sld>
 </file>
 
-<file path=ppt/slides/slide35.xml><?xml version="1.0" encoding="utf-8"?>
+<file path=ppt/slides/slide36.xml><?xml version="1.0" encoding="utf-8"?>
 <p:sld xmlns:a="http://schemas.openxmlformats.org/drawingml/2006/main" xmlns:r="http://schemas.openxmlformats.org/officeDocument/2006/relationships" xmlns:p="http://schemas.openxmlformats.org/presentationml/2006/main">
   <p:cSld>
     <p:spTree>
@@ -7058,7 +7226,7 @@
 </p:sld>
 </file>
 
-<file path=ppt/slides/slide36.xml><?xml version="1.0" encoding="utf-8"?>
+<file path=ppt/slides/slide37.xml><?xml version="1.0" encoding="utf-8"?>
 <p:sld xmlns:a="http://schemas.openxmlformats.org/drawingml/2006/main" xmlns:r="http://schemas.openxmlformats.org/officeDocument/2006/relationships" xmlns:p="http://schemas.openxmlformats.org/presentationml/2006/main">
   <p:cSld>
     <p:spTree>
@@ -7112,7 +7280,7 @@
 </p:sld>
 </file>
 
-<file path=ppt/slides/slide37.xml><?xml version="1.0" encoding="utf-8"?>
+<file path=ppt/slides/slide38.xml><?xml version="1.0" encoding="utf-8"?>
 <p:sld xmlns:a="http://schemas.openxmlformats.org/drawingml/2006/main" xmlns:r="http://schemas.openxmlformats.org/officeDocument/2006/relationships" xmlns:p="http://schemas.openxmlformats.org/presentationml/2006/main">
   <p:cSld>
     <p:spTree>
@@ -7166,78 +7334,6 @@
 </p:sld>
 </file>
 
-<file path=ppt/slides/slide38.xml><?xml version="1.0" encoding="utf-8"?>
-<p:sld xmlns:a="http://schemas.openxmlformats.org/drawingml/2006/main" xmlns:r="http://schemas.openxmlformats.org/officeDocument/2006/relationships" xmlns:p="http://schemas.openxmlformats.org/presentationml/2006/main">
-  <p:cSld>
-    <p:spTree>
-      <p:nvGrpSpPr>
-        <p:cNvPr id="1" name=""/>
-        <p:cNvGrpSpPr/>
-        <p:nvPr/>
-      </p:nvGrpSpPr>
-      <p:grpSpPr>
-        <a:xfrm>
-          <a:off x="0" y="0"/>
-          <a:ext cx="0" cy="0"/>
-          <a:chOff x="0" y="0"/>
-          <a:chExt cx="0" cy="0"/>
-        </a:xfrm>
-      </p:grpSpPr>
-      <p:sp>
-        <p:nvSpPr>
-          <p:cNvPr id="2" name="Title 1"/>
-          <p:cNvSpPr>
-            <a:spLocks noGrp="1"/>
-          </p:cNvSpPr>
-          <p:nvPr>
-            <p:ph type="title"/>
-          </p:nvPr>
-        </p:nvSpPr>
-        <p:spPr/>
-        <p:txBody>
-          <a:bodyPr/>
-          <a:lstStyle/>
-          <a:p>
-            <a:r>
-              <a:rPr lang="en-US" dirty="0" smtClean="0"/>
-              <a:t>RE-EM tree</a:t>
-            </a:r>
-            <a:endParaRPr lang="en-US" dirty="0"/>
-          </a:p>
-        </p:txBody>
-      </p:sp>
-      <p:sp>
-        <p:nvSpPr>
-          <p:cNvPr id="3" name="Text Placeholder 2"/>
-          <p:cNvSpPr>
-            <a:spLocks noGrp="1"/>
-          </p:cNvSpPr>
-          <p:nvPr>
-            <p:ph type="body" idx="1"/>
-          </p:nvPr>
-        </p:nvSpPr>
-        <p:spPr/>
-        <p:txBody>
-          <a:bodyPr/>
-          <a:lstStyle/>
-          <a:p>
-            <a:endParaRPr lang="en-US"/>
-          </a:p>
-        </p:txBody>
-      </p:sp>
-    </p:spTree>
-    <p:extLst>
-      <p:ext uri="{BB962C8B-B14F-4D97-AF65-F5344CB8AC3E}">
-        <p14:creationId xmlns:p14="http://schemas.microsoft.com/office/powerpoint/2010/main" val="449019630"/>
-      </p:ext>
-    </p:extLst>
-  </p:cSld>
-  <p:clrMapOvr>
-    <a:masterClrMapping/>
-  </p:clrMapOvr>
-</p:sld>
-</file>
-
 <file path=ppt/slides/slide39.xml><?xml version="1.0" encoding="utf-8"?>
 <p:sld xmlns:a="http://schemas.openxmlformats.org/drawingml/2006/main" xmlns:r="http://schemas.openxmlformats.org/officeDocument/2006/relationships" xmlns:p="http://schemas.openxmlformats.org/presentationml/2006/main">
   <p:cSld>
@@ -7255,34 +7351,52 @@
           <a:chExt cx="0" cy="0"/>
         </a:xfrm>
       </p:grpSpPr>
-      <p:pic>
-        <p:nvPicPr>
-          <p:cNvPr id="2" name="Picture 1"/>
-          <p:cNvPicPr>
-            <a:picLocks noChangeAspect="1"/>
-          </p:cNvPicPr>
-          <p:nvPr/>
-        </p:nvPicPr>
-        <p:blipFill>
-          <a:blip r:embed="rId2"/>
-          <a:stretch>
-            <a:fillRect/>
-          </a:stretch>
-        </p:blipFill>
-        <p:spPr>
-          <a:xfrm>
-            <a:off x="1092200" y="0"/>
-            <a:ext cx="6949930" cy="6858000"/>
-          </a:xfrm>
-          <a:prstGeom prst="rect">
-            <a:avLst/>
-          </a:prstGeom>
-        </p:spPr>
-      </p:pic>
+      <p:sp>
+        <p:nvSpPr>
+          <p:cNvPr id="2" name="Title 1"/>
+          <p:cNvSpPr>
+            <a:spLocks noGrp="1"/>
+          </p:cNvSpPr>
+          <p:nvPr>
+            <p:ph type="title"/>
+          </p:nvPr>
+        </p:nvSpPr>
+        <p:spPr/>
+        <p:txBody>
+          <a:bodyPr/>
+          <a:lstStyle/>
+          <a:p>
+            <a:r>
+              <a:rPr lang="en-US" dirty="0" smtClean="0"/>
+              <a:t>RE-EM tree</a:t>
+            </a:r>
+            <a:endParaRPr lang="en-US" dirty="0"/>
+          </a:p>
+        </p:txBody>
+      </p:sp>
+      <p:sp>
+        <p:nvSpPr>
+          <p:cNvPr id="3" name="Text Placeholder 2"/>
+          <p:cNvSpPr>
+            <a:spLocks noGrp="1"/>
+          </p:cNvSpPr>
+          <p:nvPr>
+            <p:ph type="body" idx="1"/>
+          </p:nvPr>
+        </p:nvSpPr>
+        <p:spPr/>
+        <p:txBody>
+          <a:bodyPr/>
+          <a:lstStyle/>
+          <a:p>
+            <a:endParaRPr lang="en-US"/>
+          </a:p>
+        </p:txBody>
+      </p:sp>
     </p:spTree>
     <p:extLst>
       <p:ext uri="{BB962C8B-B14F-4D97-AF65-F5344CB8AC3E}">
-        <p14:creationId xmlns:p14="http://schemas.microsoft.com/office/powerpoint/2010/main" val="2232396973"/>
+        <p14:creationId xmlns:p14="http://schemas.microsoft.com/office/powerpoint/2010/main" val="449019630"/>
       </p:ext>
     </p:extLst>
   </p:cSld>
@@ -8550,6 +8664,60 @@
           <a:chExt cx="0" cy="0"/>
         </a:xfrm>
       </p:grpSpPr>
+      <p:pic>
+        <p:nvPicPr>
+          <p:cNvPr id="2" name="Picture 1"/>
+          <p:cNvPicPr>
+            <a:picLocks noChangeAspect="1"/>
+          </p:cNvPicPr>
+          <p:nvPr/>
+        </p:nvPicPr>
+        <p:blipFill>
+          <a:blip r:embed="rId2"/>
+          <a:stretch>
+            <a:fillRect/>
+          </a:stretch>
+        </p:blipFill>
+        <p:spPr>
+          <a:xfrm>
+            <a:off x="1092200" y="0"/>
+            <a:ext cx="6949930" cy="6858000"/>
+          </a:xfrm>
+          <a:prstGeom prst="rect">
+            <a:avLst/>
+          </a:prstGeom>
+        </p:spPr>
+      </p:pic>
+    </p:spTree>
+    <p:extLst>
+      <p:ext uri="{BB962C8B-B14F-4D97-AF65-F5344CB8AC3E}">
+        <p14:creationId xmlns:p14="http://schemas.microsoft.com/office/powerpoint/2010/main" val="2232396973"/>
+      </p:ext>
+    </p:extLst>
+  </p:cSld>
+  <p:clrMapOvr>
+    <a:masterClrMapping/>
+  </p:clrMapOvr>
+</p:sld>
+</file>
+
+<file path=ppt/slides/slide41.xml><?xml version="1.0" encoding="utf-8"?>
+<p:sld xmlns:a="http://schemas.openxmlformats.org/drawingml/2006/main" xmlns:r="http://schemas.openxmlformats.org/officeDocument/2006/relationships" xmlns:p="http://schemas.openxmlformats.org/presentationml/2006/main">
+  <p:cSld>
+    <p:spTree>
+      <p:nvGrpSpPr>
+        <p:cNvPr id="1" name=""/>
+        <p:cNvGrpSpPr/>
+        <p:nvPr/>
+      </p:nvGrpSpPr>
+      <p:grpSpPr>
+        <a:xfrm>
+          <a:off x="0" y="0"/>
+          <a:ext cx="0" cy="0"/>
+          <a:chOff x="0" y="0"/>
+          <a:chExt cx="0" cy="0"/>
+        </a:xfrm>
+      </p:grpSpPr>
       <p:sp>
         <p:nvSpPr>
           <p:cNvPr id="2" name="Title 1"/>
@@ -8705,7 +8873,7 @@
 </p:sld>
 </file>
 
-<file path=ppt/slides/slide41.xml><?xml version="1.0" encoding="utf-8"?>
+<file path=ppt/slides/slide42.xml><?xml version="1.0" encoding="utf-8"?>
 <p:sld xmlns:a="http://schemas.openxmlformats.org/drawingml/2006/main" xmlns:r="http://schemas.openxmlformats.org/officeDocument/2006/relationships" xmlns:p="http://schemas.openxmlformats.org/presentationml/2006/main">
   <p:cSld>
     <p:spTree>

</xml_diff>